<commit_message>
Updated polling slide with new link.
</commit_message>
<xml_diff>
--- a/ai_getting_started.pptx
+++ b/ai_getting_started.pptx
@@ -221,7 +221,7 @@
           <a:p>
             <a:fld id="{FD93C9B2-20F6-4DB1-B471-224337D0AC79}" type="datetimeFigureOut">
               <a:rPr lang="en-US" smtClean="0"/>
-              <a:t>8/8/2021</a:t>
+              <a:t>8/20/2021</a:t>
             </a:fld>
             <a:endParaRPr lang="en-US"/>
           </a:p>
@@ -2206,7 +2206,7 @@
           <a:p>
             <a:fld id="{C3F78080-8D0A-4BE8-A5B4-CB115102D524}" type="datetimeFigureOut">
               <a:rPr lang="en-US" smtClean="0"/>
-              <a:t>8/8/2021</a:t>
+              <a:t>8/20/2021</a:t>
             </a:fld>
             <a:endParaRPr lang="en-US"/>
           </a:p>
@@ -2404,7 +2404,7 @@
           <a:p>
             <a:fld id="{C3F78080-8D0A-4BE8-A5B4-CB115102D524}" type="datetimeFigureOut">
               <a:rPr lang="en-US" smtClean="0"/>
-              <a:t>8/8/2021</a:t>
+              <a:t>8/20/2021</a:t>
             </a:fld>
             <a:endParaRPr lang="en-US"/>
           </a:p>
@@ -2612,7 +2612,7 @@
           <a:p>
             <a:fld id="{C3F78080-8D0A-4BE8-A5B4-CB115102D524}" type="datetimeFigureOut">
               <a:rPr lang="en-US" smtClean="0"/>
-              <a:t>8/8/2021</a:t>
+              <a:t>8/20/2021</a:t>
             </a:fld>
             <a:endParaRPr lang="en-US"/>
           </a:p>
@@ -2810,7 +2810,7 @@
           <a:p>
             <a:fld id="{C3F78080-8D0A-4BE8-A5B4-CB115102D524}" type="datetimeFigureOut">
               <a:rPr lang="en-US" smtClean="0"/>
-              <a:t>8/8/2021</a:t>
+              <a:t>8/20/2021</a:t>
             </a:fld>
             <a:endParaRPr lang="en-US"/>
           </a:p>
@@ -3085,7 +3085,7 @@
           <a:p>
             <a:fld id="{C3F78080-8D0A-4BE8-A5B4-CB115102D524}" type="datetimeFigureOut">
               <a:rPr lang="en-US" smtClean="0"/>
-              <a:t>8/8/2021</a:t>
+              <a:t>8/20/2021</a:t>
             </a:fld>
             <a:endParaRPr lang="en-US"/>
           </a:p>
@@ -3350,7 +3350,7 @@
           <a:p>
             <a:fld id="{C3F78080-8D0A-4BE8-A5B4-CB115102D524}" type="datetimeFigureOut">
               <a:rPr lang="en-US" smtClean="0"/>
-              <a:t>8/8/2021</a:t>
+              <a:t>8/20/2021</a:t>
             </a:fld>
             <a:endParaRPr lang="en-US"/>
           </a:p>
@@ -3762,7 +3762,7 @@
           <a:p>
             <a:fld id="{C3F78080-8D0A-4BE8-A5B4-CB115102D524}" type="datetimeFigureOut">
               <a:rPr lang="en-US" smtClean="0"/>
-              <a:t>8/8/2021</a:t>
+              <a:t>8/20/2021</a:t>
             </a:fld>
             <a:endParaRPr lang="en-US"/>
           </a:p>
@@ -3903,7 +3903,7 @@
           <a:p>
             <a:fld id="{C3F78080-8D0A-4BE8-A5B4-CB115102D524}" type="datetimeFigureOut">
               <a:rPr lang="en-US" smtClean="0"/>
-              <a:t>8/8/2021</a:t>
+              <a:t>8/20/2021</a:t>
             </a:fld>
             <a:endParaRPr lang="en-US"/>
           </a:p>
@@ -4016,7 +4016,7 @@
           <a:p>
             <a:fld id="{C3F78080-8D0A-4BE8-A5B4-CB115102D524}" type="datetimeFigureOut">
               <a:rPr lang="en-US" smtClean="0"/>
-              <a:t>8/8/2021</a:t>
+              <a:t>8/20/2021</a:t>
             </a:fld>
             <a:endParaRPr lang="en-US"/>
           </a:p>
@@ -4327,7 +4327,7 @@
           <a:p>
             <a:fld id="{C3F78080-8D0A-4BE8-A5B4-CB115102D524}" type="datetimeFigureOut">
               <a:rPr lang="en-US" smtClean="0"/>
-              <a:t>8/8/2021</a:t>
+              <a:t>8/20/2021</a:t>
             </a:fld>
             <a:endParaRPr lang="en-US"/>
           </a:p>
@@ -4615,7 +4615,7 @@
           <a:p>
             <a:fld id="{C3F78080-8D0A-4BE8-A5B4-CB115102D524}" type="datetimeFigureOut">
               <a:rPr lang="en-US" smtClean="0"/>
-              <a:t>8/8/2021</a:t>
+              <a:t>8/20/2021</a:t>
             </a:fld>
             <a:endParaRPr lang="en-US"/>
           </a:p>
@@ -4856,7 +4856,7 @@
           <a:p>
             <a:fld id="{C3F78080-8D0A-4BE8-A5B4-CB115102D524}" type="datetimeFigureOut">
               <a:rPr lang="en-US" smtClean="0"/>
-              <a:t>8/8/2021</a:t>
+              <a:t>8/20/2021</a:t>
             </a:fld>
             <a:endParaRPr lang="en-US"/>
           </a:p>
@@ -7237,15 +7237,12 @@
               <a:t>What is </a:t>
             </a:r>
             <a:r>
-              <a:rPr lang="en-US" sz="2400" b="0" i="1" u="none" strike="noStrike" kern="1200" cap="none" dirty="0">
-                <a:ln>
-                  <a:noFill/>
-                </a:ln>
+              <a:rPr lang="en-US" sz="2400" i="1" dirty="0">
                 <a:latin typeface="Palatino Linotype" panose="02040502050505030304" pitchFamily="18" charset="0"/>
                 <a:ea typeface="Arial" pitchFamily="34"/>
                 <a:cs typeface="Arial" pitchFamily="34"/>
               </a:rPr>
-              <a:t>one word</a:t>
+              <a:t>a short phrase</a:t>
             </a:r>
             <a:r>
               <a:rPr lang="en-US" sz="2400" b="0" i="0" u="none" strike="noStrike" kern="1200" cap="none" dirty="0">
@@ -7283,18 +7280,10 @@
             </a:endParaRPr>
           </a:p>
           <a:p>
-            <a:pPr marL="0" marR="0" lvl="0" indent="0" algn="ctr" hangingPunct="0">
-              <a:lnSpc>
-                <a:spcPct val="100000"/>
-              </a:lnSpc>
-              <a:spcBef>
-                <a:spcPts val="0"/>
-              </a:spcBef>
+            <a:pPr lvl="0" algn="ctr" hangingPunct="0">
               <a:spcAft>
                 <a:spcPts val="1440"/>
               </a:spcAft>
-              <a:buNone/>
-              <a:tabLst/>
             </a:pPr>
             <a:r>
               <a:rPr lang="en-US" sz="2400" b="0" i="0" u="none" strike="noStrike" kern="1200" cap="none" dirty="0">
@@ -7308,49 +7297,26 @@
               <a:t>Please go to </a:t>
             </a:r>
             <a:r>
-              <a:rPr lang="en-US" sz="2400" b="1" i="0" u="none" strike="noStrike" kern="1200" cap="none" dirty="0">
-                <a:ln>
-                  <a:noFill/>
-                </a:ln>
+              <a:rPr lang="en-US" sz="2400" b="1" dirty="0">
                 <a:latin typeface="Palatino Linotype" panose="02040502050505030304" pitchFamily="18" charset="0"/>
                 <a:ea typeface="Arial" pitchFamily="34"/>
                 <a:cs typeface="Arial" pitchFamily="34"/>
               </a:rPr>
-              <a:t>www.menti.com</a:t>
-            </a:r>
-            <a:r>
-              <a:rPr lang="en-US" sz="2400" b="0" i="0" u="none" strike="noStrike" kern="1200" cap="none" dirty="0">
-                <a:ln>
-                  <a:noFill/>
-                </a:ln>
+              <a:t>PollEv.com/mattg252</a:t>
+            </a:r>
+            <a:r>
+              <a:rPr lang="en-US" sz="2400" dirty="0">
                 <a:latin typeface="Palatino Linotype" panose="02040502050505030304" pitchFamily="18" charset="0"/>
                 <a:ea typeface="Arial" pitchFamily="34"/>
                 <a:cs typeface="Arial" pitchFamily="34"/>
               </a:rPr>
-              <a:t> and use the code </a:t>
-            </a:r>
-            <a:r>
-              <a:rPr lang="en-US" sz="2400" b="1" i="0" u="none" strike="noStrike" kern="1200" cap="none" dirty="0">
-                <a:ln>
-                  <a:noFill/>
-                </a:ln>
-                <a:latin typeface="Palatino Linotype" panose="02040502050505030304" pitchFamily="18" charset="0"/>
-                <a:ea typeface="Arial" pitchFamily="34"/>
-                <a:cs typeface="Arial" pitchFamily="34"/>
-              </a:rPr>
-              <a:t>52 04 47 9</a:t>
-            </a:r>
-            <a:r>
-              <a:rPr lang="en-US" sz="2400" b="0" i="0" u="none" strike="noStrike" kern="1200" cap="none" dirty="0">
-                <a:ln>
-                  <a:noFill/>
-                </a:ln>
-                <a:latin typeface="Palatino Linotype" panose="02040502050505030304" pitchFamily="18" charset="0"/>
-                <a:ea typeface="Arial" pitchFamily="34"/>
-                <a:cs typeface="Arial" pitchFamily="34"/>
-              </a:rPr>
-              <a:t>.</a:t>
-            </a:r>
+              <a:t> and record your response</a:t>
+            </a:r>
+            <a:endParaRPr lang="en-US" sz="2400" b="1" dirty="0">
+              <a:latin typeface="Palatino Linotype" panose="02040502050505030304" pitchFamily="18" charset="0"/>
+              <a:ea typeface="Arial" pitchFamily="34"/>
+              <a:cs typeface="Arial" pitchFamily="34"/>
+            </a:endParaRPr>
           </a:p>
         </p:txBody>
       </p:sp>

</xml_diff>

<commit_message>
Initial draft for Frontiers in AI class (08.24.21).
</commit_message>
<xml_diff>
--- a/ai_getting_started.pptx
+++ b/ai_getting_started.pptx
@@ -5,23 +5,25 @@
     <p:sldMasterId id="2147483648" r:id="rId1"/>
   </p:sldMasterIdLst>
   <p:notesMasterIdLst>
-    <p:notesMasterId r:id="rId16"/>
+    <p:notesMasterId r:id="rId18"/>
   </p:notesMasterIdLst>
   <p:sldIdLst>
     <p:sldId id="257" r:id="rId2"/>
     <p:sldId id="278" r:id="rId3"/>
     <p:sldId id="311" r:id="rId4"/>
     <p:sldId id="301" r:id="rId5"/>
-    <p:sldId id="308" r:id="rId6"/>
+    <p:sldId id="313" r:id="rId6"/>
     <p:sldId id="307" r:id="rId7"/>
-    <p:sldId id="309" r:id="rId8"/>
-    <p:sldId id="310" r:id="rId9"/>
-    <p:sldId id="303" r:id="rId10"/>
-    <p:sldId id="312" r:id="rId11"/>
-    <p:sldId id="305" r:id="rId12"/>
-    <p:sldId id="304" r:id="rId13"/>
-    <p:sldId id="262" r:id="rId14"/>
+    <p:sldId id="308" r:id="rId8"/>
+    <p:sldId id="309" r:id="rId9"/>
+    <p:sldId id="310" r:id="rId10"/>
+    <p:sldId id="303" r:id="rId11"/>
+    <p:sldId id="312" r:id="rId12"/>
+    <p:sldId id="305" r:id="rId13"/>
+    <p:sldId id="304" r:id="rId14"/>
     <p:sldId id="306" r:id="rId15"/>
+    <p:sldId id="314" r:id="rId16"/>
+    <p:sldId id="262" r:id="rId17"/>
   </p:sldIdLst>
   <p:sldSz cx="12192000" cy="6858000"/>
   <p:notesSz cx="6858000" cy="9144000"/>
@@ -221,7 +223,7 @@
           <a:p>
             <a:fld id="{FD93C9B2-20F6-4DB1-B471-224337D0AC79}" type="datetimeFigureOut">
               <a:rPr lang="en-US" smtClean="0"/>
-              <a:t>8/20/2021</a:t>
+              <a:t>8/23/2021</a:t>
             </a:fld>
             <a:endParaRPr lang="en-US"/>
           </a:p>
@@ -536,39 +538,8 @@
               <a:rPr lang="en-US" dirty="0">
                 <a:latin typeface="Palatino Linotype" panose="02040502050505030304" pitchFamily="18" charset="0"/>
               </a:rPr>
-              <a:t>Hello and welcome to: “Frontiers of AI</a:t>
-            </a:r>
-          </a:p>
-          <a:p>
-            <a:endParaRPr lang="en-US" dirty="0">
-              <a:latin typeface="Palatino Linotype" panose="02040502050505030304" pitchFamily="18" charset="0"/>
-            </a:endParaRPr>
-          </a:p>
-          <a:p>
-            <a:r>
-              <a:rPr lang="en-US" dirty="0">
-                <a:latin typeface="Palatino Linotype" panose="02040502050505030304" pitchFamily="18" charset="0"/>
-              </a:rPr>
-              <a:t>In this class, we will explore the question of AI and its relationship to our world.  We created this class specifically for STUDENTS who are curious about AI but wonder how it applies to the program of study they are presently engaged in.  The great news is that you do not need to have a strong technical or mathematical background to do interesting AI-enabled research.  Our motto is: AI for Everyone!</a:t>
-            </a:r>
-          </a:p>
-          <a:p>
-            <a:endParaRPr lang="en-US" dirty="0">
-              <a:latin typeface="Palatino Linotype" panose="02040502050505030304" pitchFamily="18" charset="0"/>
-            </a:endParaRPr>
-          </a:p>
-          <a:p>
-            <a:r>
-              <a:rPr lang="en-US" dirty="0">
-                <a:latin typeface="Palatino Linotype" panose="02040502050505030304" pitchFamily="18" charset="0"/>
-              </a:rPr>
-              <a:t>So, let’s start with some basic definitions…</a:t>
-            </a:r>
-          </a:p>
-          <a:p>
-            <a:endParaRPr lang="en-US" dirty="0">
-              <a:latin typeface="Palatino Linotype" panose="02040502050505030304" pitchFamily="18" charset="0"/>
-            </a:endParaRPr>
+              <a:t>Hello and welcome to our class (Frontiers of AI).  So, let’s start with Course goals…</a:t>
+            </a:r>
           </a:p>
         </p:txBody>
       </p:sp>
@@ -652,57 +623,102 @@
           <a:bodyPr/>
           <a:lstStyle/>
           <a:p>
-            <a:r>
-              <a:rPr lang="en-US" dirty="0"/>
-              <a:t>At the heart of our reading this week is the Turing test.  In fact, the entire chapter is named after Turing.  This test has been hugely influential since 1950 since he first described it.  </a:t>
-            </a:r>
-          </a:p>
-          <a:p>
-            <a:endParaRPr lang="en-US" dirty="0"/>
-          </a:p>
-          <a:p>
-            <a:pPr marL="228600" indent="-228600">
-              <a:buAutoNum type="arabicPeriod"/>
+            <a:pPr marL="0" indent="0">
+              <a:buNone/>
             </a:pPr>
             <a:r>
-              <a:rPr lang="en-US" dirty="0"/>
-              <a:t>Victorian parlor game – someone tries to tell if another person is a man or a woman simply on the basis of answers they gave to questions posed to them.</a:t>
-            </a:r>
-          </a:p>
-          <a:p>
-            <a:pPr marL="228600" indent="-228600">
-              <a:buAutoNum type="arabicPeriod"/>
+              <a:rPr lang="en-US" sz="1200" b="0" i="0" u="none" strike="noStrike" kern="1200" cap="none" dirty="0">
+                <a:ln>
+                  <a:noFill/>
+                </a:ln>
+                <a:latin typeface="Arial" pitchFamily="18"/>
+                <a:ea typeface="Arial" pitchFamily="34"/>
+                <a:cs typeface="Arial" pitchFamily="34"/>
+              </a:rPr>
+              <a:t>This week’s reading introduced you to Alan Turing and the foundational work he did in the field of artificial intelligence.  The Turing test of intelligence was first proposed in 1950, in an article entitled, </a:t>
+            </a:r>
+            <a:r>
+              <a:rPr lang="en-US" sz="1200" b="0" i="1" u="none" strike="noStrike" kern="1200" cap="none" dirty="0">
+                <a:ln>
+                  <a:noFill/>
+                </a:ln>
+                <a:latin typeface="Arial" pitchFamily="18"/>
+                <a:ea typeface="Arial" pitchFamily="34"/>
+                <a:cs typeface="Arial" pitchFamily="34"/>
+              </a:rPr>
+              <a:t>Computing Machinery and Intelligence.  </a:t>
+            </a:r>
+            <a:r>
+              <a:rPr lang="en-US" sz="1200" b="0" i="0" u="none" strike="noStrike" kern="1200" cap="none" dirty="0">
+                <a:ln>
+                  <a:noFill/>
+                </a:ln>
+                <a:latin typeface="Arial" pitchFamily="18"/>
+                <a:ea typeface="Arial" pitchFamily="34"/>
+                <a:cs typeface="Arial" pitchFamily="34"/>
+              </a:rPr>
+              <a:t>This is a foundational document…  Let’s review the Turing test.</a:t>
+            </a:r>
+            <a:endParaRPr lang="en-US" sz="1200" b="0" i="1" u="none" strike="noStrike" kern="1200" cap="none" dirty="0">
+              <a:ln>
+                <a:noFill/>
+              </a:ln>
+              <a:latin typeface="Arial" pitchFamily="18"/>
+              <a:ea typeface="Arial" pitchFamily="34"/>
+              <a:cs typeface="Arial" pitchFamily="34"/>
+            </a:endParaRPr>
+          </a:p>
+          <a:p>
+            <a:pPr marL="0" indent="0">
+              <a:buNone/>
             </a:pPr>
-            <a:r>
-              <a:rPr lang="en-US" dirty="0"/>
-              <a:t>Human interacts with a computer – does not know if it is another human or an intelligent system.  The interaction is purely in the form of textual questions and answers: the interrogator types a question, and a response is displayed.  The task of the interrogator is to determine whether the thing being interrogated is a person or a computer program.</a:t>
-            </a:r>
-          </a:p>
-          <a:p>
-            <a:pPr marL="228600" indent="-228600">
-              <a:buAutoNum type="arabicPeriod"/>
+            <a:endParaRPr lang="en-US" sz="1200" b="0" i="0" u="none" strike="noStrike" kern="1200" cap="none" dirty="0">
+              <a:ln>
+                <a:noFill/>
+              </a:ln>
+              <a:latin typeface="Arial" pitchFamily="18"/>
+              <a:ea typeface="Arial" pitchFamily="34"/>
+              <a:cs typeface="Arial" pitchFamily="34"/>
+            </a:endParaRPr>
+          </a:p>
+          <a:p>
+            <a:pPr marL="0" indent="0">
+              <a:buNone/>
             </a:pPr>
             <a:r>
-              <a:rPr lang="en-US" dirty="0"/>
-              <a:t>Now, suppose that the thing being interrogated is indeed a computer program, but after some reasonable amount of time, the interrogators cannot reliably tell whether they are interacting with a program or a person.  Then surely, Turing argued, you should accept that the program has some sort of human level intelligence because the system is doing something that makes it </a:t>
-            </a:r>
-            <a:r>
-              <a:rPr lang="en-US" b="1" dirty="0"/>
-              <a:t>indistinguishable </a:t>
-            </a:r>
-            <a:r>
-              <a:rPr lang="en-US" b="0" dirty="0"/>
-              <a:t>from the real thing.  The key word here is indistinguishable…</a:t>
-            </a:r>
-          </a:p>
-          <a:p>
-            <a:pPr marL="228600" indent="-228600">
-              <a:buAutoNum type="arabicPeriod"/>
-            </a:pPr>
-            <a:endParaRPr lang="en-US" b="0" dirty="0"/>
-          </a:p>
-          <a:p>
-            <a:endParaRPr lang="en-US" dirty="0"/>
+              <a:rPr lang="en-US" sz="1200" b="0" i="0" u="none" strike="noStrike" kern="1200" cap="none" dirty="0">
+                <a:ln>
+                  <a:noFill/>
+                </a:ln>
+                <a:latin typeface="Arial" pitchFamily="18"/>
+                <a:ea typeface="Arial" pitchFamily="34"/>
+                <a:cs typeface="Arial" pitchFamily="34"/>
+              </a:rPr>
+              <a:t>Turing, AM (1950) Computing Machinery and Intelligence. </a:t>
+            </a:r>
+            <a:r>
+              <a:rPr lang="en-US" sz="1200" b="0" i="1" u="none" strike="noStrike" kern="1200" cap="none" dirty="0">
+                <a:ln>
+                  <a:noFill/>
+                </a:ln>
+                <a:latin typeface="Arial" pitchFamily="18"/>
+                <a:ea typeface="Arial" pitchFamily="34"/>
+                <a:cs typeface="Arial" pitchFamily="34"/>
+              </a:rPr>
+              <a:t>Mind</a:t>
+            </a:r>
+            <a:r>
+              <a:rPr lang="en-US" sz="1200" b="0" i="0" u="none" strike="noStrike" kern="1200" cap="none" dirty="0">
+                <a:ln>
+                  <a:noFill/>
+                </a:ln>
+                <a:latin typeface="Arial" pitchFamily="18"/>
+                <a:ea typeface="Arial" pitchFamily="34"/>
+                <a:cs typeface="Arial" pitchFamily="34"/>
+              </a:rPr>
+              <a:t>: 54</a:t>
+            </a:r>
+            <a:endParaRPr lang="en-US" b="1" dirty="0"/>
           </a:p>
         </p:txBody>
       </p:sp>
@@ -732,7 +748,7 @@
     </p:spTree>
     <p:extLst>
       <p:ext uri="{BB962C8B-B14F-4D97-AF65-F5344CB8AC3E}">
-        <p14:creationId xmlns:p14="http://schemas.microsoft.com/office/powerpoint/2010/main" val="2968338234"/>
+        <p14:creationId xmlns:p14="http://schemas.microsoft.com/office/powerpoint/2010/main" val="1860523921"/>
       </p:ext>
     </p:extLst>
   </p:cSld>
@@ -787,36 +803,56 @@
           <a:lstStyle/>
           <a:p>
             <a:r>
+              <a:rPr lang="en-US" dirty="0"/>
+              <a:t>At the heart of our reading this week is the Turing test.  In fact, the entire chapter is named after Turing.  This test has been hugely influential since 1950 since he first described it.  </a:t>
+            </a:r>
+          </a:p>
+          <a:p>
+            <a:endParaRPr lang="en-US" dirty="0"/>
+          </a:p>
+          <a:p>
+            <a:pPr marL="228600" indent="-228600">
+              <a:buAutoNum type="arabicPeriod"/>
+            </a:pPr>
+            <a:r>
+              <a:rPr lang="en-US" dirty="0"/>
+              <a:t>Victorian parlor game – someone tries to tell if another person is a man or a woman simply on the basis of answers they gave to questions posed to them.</a:t>
+            </a:r>
+          </a:p>
+          <a:p>
+            <a:pPr marL="228600" indent="-228600">
+              <a:buAutoNum type="arabicPeriod"/>
+            </a:pPr>
+            <a:r>
+              <a:rPr lang="en-US" dirty="0"/>
+              <a:t>Human interacts with a computer – does not know if it is another human or an intelligent system.  The interaction is purely in the form of textual questions and answers: the interrogator types a question, and a response is displayed.  The task of the interrogator is to determine whether the thing being interrogated is a person or a computer program.</a:t>
+            </a:r>
+          </a:p>
+          <a:p>
+            <a:pPr marL="228600" indent="-228600">
+              <a:buAutoNum type="arabicPeriod"/>
+            </a:pPr>
+            <a:r>
+              <a:rPr lang="en-US" dirty="0"/>
+              <a:t>Now, suppose that the thing being interrogated is indeed a computer program, but after some reasonable amount of time, the interrogators cannot reliably tell whether they are interacting with a program or a person.  Then surely, Turing argued, you should accept that the program has some sort of human level intelligence because the system is doing something that makes it </a:t>
+            </a:r>
+            <a:r>
+              <a:rPr lang="en-US" b="1" dirty="0"/>
+              <a:t>indistinguishable </a:t>
+            </a:r>
+            <a:r>
               <a:rPr lang="en-US" b="0" dirty="0"/>
-              <a:t>Woolridge discusses ELIZA, a computer program written in the 1960’s by the German MIT computer scientist Joseph Weizenbaum.  Eliza takes the role of a psychiatrist talking to a patient to get the interviewee to contemplate themselves.</a:t>
-            </a:r>
-          </a:p>
-          <a:p>
+              <a:t>from the real thing.  The key word here is indistinguishable…</a:t>
+            </a:r>
+          </a:p>
+          <a:p>
+            <a:pPr marL="228600" indent="-228600">
+              <a:buAutoNum type="arabicPeriod"/>
+            </a:pPr>
             <a:endParaRPr lang="en-US" b="0" dirty="0"/>
           </a:p>
           <a:p>
-            <a:r>
-              <a:rPr lang="en-US" b="0" dirty="0"/>
-              <a:t>ELIZA’s legacy lives on to this day, in the form of the annual Loebner Prize competition.  It is unclear whether Turing imagined that anyone would ever actually try out his test for real, but in 1990 that is precisely what American millionaire inventory Hugh Loebner decided to do.  Every year, the Loebner Prize invites the submission of computer programs to engage in the Turing test, attempting to convince a panel of judges that they are in fact people.  </a:t>
-            </a:r>
-          </a:p>
-          <a:p>
-            <a:endParaRPr lang="en-US" b="0" dirty="0"/>
-          </a:p>
-          <a:p>
-            <a:r>
-              <a:rPr lang="en-US" b="0" dirty="0"/>
-              <a:t>We’re going to give you time to chat with this year’s winner of the Loebner prize.  Her name is Kuki…</a:t>
-            </a:r>
-          </a:p>
-          <a:p>
-            <a:endParaRPr lang="en-US" b="0" dirty="0"/>
-          </a:p>
-          <a:p>
-            <a:r>
-              <a:rPr lang="en-US" b="0" dirty="0"/>
-              <a:t>Woolridge concludes, “ELIZA is the direct ancestor of a phenomenon that makes AI researchers groan whenever it is mentioned: the internet chatbot.</a:t>
-            </a:r>
+            <a:endParaRPr lang="en-US" dirty="0"/>
           </a:p>
         </p:txBody>
       </p:sp>
@@ -846,7 +882,7 @@
     </p:spTree>
     <p:extLst>
       <p:ext uri="{BB962C8B-B14F-4D97-AF65-F5344CB8AC3E}">
-        <p14:creationId xmlns:p14="http://schemas.microsoft.com/office/powerpoint/2010/main" val="4034031462"/>
+        <p14:creationId xmlns:p14="http://schemas.microsoft.com/office/powerpoint/2010/main" val="2968338234"/>
       </p:ext>
     </p:extLst>
   </p:cSld>
@@ -900,92 +936,36 @@
           <a:bodyPr/>
           <a:lstStyle/>
           <a:p>
-            <a:pPr marL="0" marR="0" indent="0">
-              <a:spcBef>
-                <a:spcPts val="0"/>
-              </a:spcBef>
-              <a:spcAft>
-                <a:spcPts val="0"/>
-              </a:spcAft>
-              <a:buNone/>
-            </a:pPr>
-            <a:r>
-              <a:rPr lang="en-US" sz="1200" dirty="0">
-                <a:effectLst/>
-                <a:latin typeface="Palatino Linotype" panose="02040502050505030304" pitchFamily="18" charset="0"/>
-                <a:ea typeface="Calibri" panose="020F0502020204030204" pitchFamily="34" charset="0"/>
-              </a:rPr>
-              <a:t>Students engage in a 10-minute conversation with Kuki.ai</a:t>
-            </a:r>
-          </a:p>
-          <a:p>
-            <a:pPr marL="0" marR="0" indent="0">
-              <a:spcBef>
-                <a:spcPts val="0"/>
-              </a:spcBef>
-              <a:spcAft>
-                <a:spcPts val="0"/>
-              </a:spcAft>
-              <a:buNone/>
-            </a:pPr>
-            <a:endParaRPr lang="en-US" sz="1200" dirty="0">
-              <a:effectLst/>
-              <a:latin typeface="Palatino Linotype" panose="02040502050505030304" pitchFamily="18" charset="0"/>
-              <a:ea typeface="Calibri" panose="020F0502020204030204" pitchFamily="34" charset="0"/>
-            </a:endParaRPr>
-          </a:p>
-          <a:p>
-            <a:pPr marL="0" marR="0" indent="0">
-              <a:spcBef>
-                <a:spcPts val="0"/>
-              </a:spcBef>
-              <a:spcAft>
-                <a:spcPts val="0"/>
-              </a:spcAft>
-              <a:buNone/>
-            </a:pPr>
-            <a:r>
-              <a:rPr lang="en-US" sz="1200" dirty="0">
-                <a:effectLst/>
-                <a:latin typeface="Palatino Linotype" panose="02040502050505030304" pitchFamily="18" charset="0"/>
-                <a:ea typeface="Calibri" panose="020F0502020204030204" pitchFamily="34" charset="0"/>
-              </a:rPr>
-              <a:t>Breakout conversations – Is Kuki exhibiting intelligent behavior, is this intelligence? (Yes/No)</a:t>
-            </a:r>
-          </a:p>
-          <a:p>
-            <a:pPr marL="0" marR="0" indent="0">
-              <a:spcBef>
-                <a:spcPts val="0"/>
-              </a:spcBef>
-              <a:spcAft>
-                <a:spcPts val="0"/>
-              </a:spcAft>
-              <a:buNone/>
-            </a:pPr>
-            <a:endParaRPr lang="en-US" sz="1200" dirty="0">
-              <a:effectLst/>
-              <a:latin typeface="Palatino Linotype" panose="02040502050505030304" pitchFamily="18" charset="0"/>
-              <a:ea typeface="Calibri" panose="020F0502020204030204" pitchFamily="34" charset="0"/>
-            </a:endParaRPr>
-          </a:p>
-          <a:p>
-            <a:pPr marL="0" marR="0" indent="0">
-              <a:spcBef>
-                <a:spcPts val="0"/>
-              </a:spcBef>
-              <a:spcAft>
-                <a:spcPts val="0"/>
-              </a:spcAft>
-              <a:buNone/>
-            </a:pPr>
-            <a:r>
-              <a:rPr lang="en-US" sz="1200" dirty="0">
-                <a:effectLst/>
-                <a:latin typeface="Palatino Linotype" panose="02040502050505030304" pitchFamily="18" charset="0"/>
-                <a:ea typeface="Calibri" panose="020F0502020204030204" pitchFamily="34" charset="0"/>
-              </a:rPr>
-              <a:t>Team debate </a:t>
+            <a:r>
+              <a:rPr lang="en-US" b="0" dirty="0"/>
+              <a:t>Woolridge discusses ELIZA, a computer program written in the 1960’s by the German MIT computer scientist Joseph Weizenbaum.  Eliza takes the role of a psychiatrist talking to a patient to get the interviewee to contemplate themselves.</a:t>
+            </a:r>
+          </a:p>
+          <a:p>
+            <a:endParaRPr lang="en-US" b="0" dirty="0"/>
+          </a:p>
+          <a:p>
+            <a:r>
+              <a:rPr lang="en-US" b="0" dirty="0"/>
+              <a:t>ELIZA’s legacy lives on to this day, in the form of the annual Loebner Prize competition.  It is unclear whether Turing imagined that anyone would ever actually try out his test for real, but in 1990 that is precisely what American millionaire inventory Hugh Loebner decided to do.  Every year, the Loebner Prize invites the submission of computer programs to engage in the Turing test, attempting to convince a panel of judges that they are in fact people.  </a:t>
+            </a:r>
+          </a:p>
+          <a:p>
+            <a:endParaRPr lang="en-US" b="0" dirty="0"/>
+          </a:p>
+          <a:p>
+            <a:r>
+              <a:rPr lang="en-US" b="0" dirty="0"/>
+              <a:t>We’re going to give you time to chat with this year’s winner of the Loebner prize.  Her name is Kuki…</a:t>
+            </a:r>
+          </a:p>
+          <a:p>
+            <a:endParaRPr lang="en-US" b="0" dirty="0"/>
+          </a:p>
+          <a:p>
+            <a:r>
+              <a:rPr lang="en-US" b="0" dirty="0"/>
+              <a:t>Woolridge concludes, “ELIZA is the direct ancestor of a phenomenon that makes AI researchers groan whenever it is mentioned: the internet chatbot.</a:t>
             </a:r>
           </a:p>
         </p:txBody>
@@ -1016,7 +996,7 @@
     </p:spTree>
     <p:extLst>
       <p:ext uri="{BB962C8B-B14F-4D97-AF65-F5344CB8AC3E}">
-        <p14:creationId xmlns:p14="http://schemas.microsoft.com/office/powerpoint/2010/main" val="1066522800"/>
+        <p14:creationId xmlns:p14="http://schemas.microsoft.com/office/powerpoint/2010/main" val="4034031462"/>
       </p:ext>
     </p:extLst>
   </p:cSld>
@@ -1070,9 +1050,92 @@
           <a:bodyPr/>
           <a:lstStyle/>
           <a:p>
-            <a:r>
-              <a:rPr lang="en-US" dirty="0"/>
-              <a:t>Okay – let’s quickly summarize what we covered in today’s workshop.</a:t>
+            <a:pPr marL="0" marR="0" indent="0">
+              <a:spcBef>
+                <a:spcPts val="0"/>
+              </a:spcBef>
+              <a:spcAft>
+                <a:spcPts val="0"/>
+              </a:spcAft>
+              <a:buNone/>
+            </a:pPr>
+            <a:r>
+              <a:rPr lang="en-US" sz="1200" dirty="0">
+                <a:effectLst/>
+                <a:latin typeface="Palatino Linotype" panose="02040502050505030304" pitchFamily="18" charset="0"/>
+                <a:ea typeface="Calibri" panose="020F0502020204030204" pitchFamily="34" charset="0"/>
+              </a:rPr>
+              <a:t>Students engage in a 10-minute conversation with Kuki.ai</a:t>
+            </a:r>
+          </a:p>
+          <a:p>
+            <a:pPr marL="0" marR="0" indent="0">
+              <a:spcBef>
+                <a:spcPts val="0"/>
+              </a:spcBef>
+              <a:spcAft>
+                <a:spcPts val="0"/>
+              </a:spcAft>
+              <a:buNone/>
+            </a:pPr>
+            <a:endParaRPr lang="en-US" sz="1200" dirty="0">
+              <a:effectLst/>
+              <a:latin typeface="Palatino Linotype" panose="02040502050505030304" pitchFamily="18" charset="0"/>
+              <a:ea typeface="Calibri" panose="020F0502020204030204" pitchFamily="34" charset="0"/>
+            </a:endParaRPr>
+          </a:p>
+          <a:p>
+            <a:pPr marL="0" marR="0" indent="0">
+              <a:spcBef>
+                <a:spcPts val="0"/>
+              </a:spcBef>
+              <a:spcAft>
+                <a:spcPts val="0"/>
+              </a:spcAft>
+              <a:buNone/>
+            </a:pPr>
+            <a:r>
+              <a:rPr lang="en-US" sz="1200" dirty="0">
+                <a:effectLst/>
+                <a:latin typeface="Palatino Linotype" panose="02040502050505030304" pitchFamily="18" charset="0"/>
+                <a:ea typeface="Calibri" panose="020F0502020204030204" pitchFamily="34" charset="0"/>
+              </a:rPr>
+              <a:t>Breakout conversations – Is Kuki exhibiting intelligent behavior, is this intelligence? (Yes/No)</a:t>
+            </a:r>
+          </a:p>
+          <a:p>
+            <a:pPr marL="0" marR="0" indent="0">
+              <a:spcBef>
+                <a:spcPts val="0"/>
+              </a:spcBef>
+              <a:spcAft>
+                <a:spcPts val="0"/>
+              </a:spcAft>
+              <a:buNone/>
+            </a:pPr>
+            <a:endParaRPr lang="en-US" sz="1200" dirty="0">
+              <a:effectLst/>
+              <a:latin typeface="Palatino Linotype" panose="02040502050505030304" pitchFamily="18" charset="0"/>
+              <a:ea typeface="Calibri" panose="020F0502020204030204" pitchFamily="34" charset="0"/>
+            </a:endParaRPr>
+          </a:p>
+          <a:p>
+            <a:pPr marL="0" marR="0" indent="0">
+              <a:spcBef>
+                <a:spcPts val="0"/>
+              </a:spcBef>
+              <a:spcAft>
+                <a:spcPts val="0"/>
+              </a:spcAft>
+              <a:buNone/>
+            </a:pPr>
+            <a:r>
+              <a:rPr lang="en-US" sz="1200" dirty="0">
+                <a:effectLst/>
+                <a:latin typeface="Palatino Linotype" panose="02040502050505030304" pitchFamily="18" charset="0"/>
+                <a:ea typeface="Calibri" panose="020F0502020204030204" pitchFamily="34" charset="0"/>
+              </a:rPr>
+              <a:t>Team debate </a:t>
             </a:r>
           </a:p>
         </p:txBody>
@@ -1103,7 +1166,7 @@
     </p:spTree>
     <p:extLst>
       <p:ext uri="{BB962C8B-B14F-4D97-AF65-F5344CB8AC3E}">
-        <p14:creationId xmlns:p14="http://schemas.microsoft.com/office/powerpoint/2010/main" val="4007547773"/>
+        <p14:creationId xmlns:p14="http://schemas.microsoft.com/office/powerpoint/2010/main" val="1066522800"/>
       </p:ext>
     </p:extLst>
   </p:cSld>
@@ -1179,6 +1242,177 @@
             <a:fld id="{3148858F-F1DB-4027-9C85-CCA6849540DD}" type="slidenum">
               <a:rPr lang="en-US" smtClean="0"/>
               <a:t>14</a:t>
+            </a:fld>
+            <a:endParaRPr lang="en-US"/>
+          </a:p>
+        </p:txBody>
+      </p:sp>
+    </p:spTree>
+    <p:extLst>
+      <p:ext uri="{BB962C8B-B14F-4D97-AF65-F5344CB8AC3E}">
+        <p14:creationId xmlns:p14="http://schemas.microsoft.com/office/powerpoint/2010/main" val="4007547773"/>
+      </p:ext>
+    </p:extLst>
+  </p:cSld>
+  <p:clrMapOvr>
+    <a:masterClrMapping/>
+  </p:clrMapOvr>
+</p:notes>
+</file>
+
+<file path=ppt/notesSlides/notesSlide15.xml><?xml version="1.0" encoding="utf-8"?>
+<p:notes xmlns:a="http://schemas.openxmlformats.org/drawingml/2006/main" xmlns:r="http://schemas.openxmlformats.org/officeDocument/2006/relationships" xmlns:p="http://schemas.openxmlformats.org/presentationml/2006/main">
+  <p:cSld>
+    <p:spTree>
+      <p:nvGrpSpPr>
+        <p:cNvPr id="1" name=""/>
+        <p:cNvGrpSpPr/>
+        <p:nvPr/>
+      </p:nvGrpSpPr>
+      <p:grpSpPr>
+        <a:xfrm>
+          <a:off x="0" y="0"/>
+          <a:ext cx="0" cy="0"/>
+          <a:chOff x="0" y="0"/>
+          <a:chExt cx="0" cy="0"/>
+        </a:xfrm>
+      </p:grpSpPr>
+      <p:sp>
+        <p:nvSpPr>
+          <p:cNvPr id="2" name="Slide Image Placeholder 1"/>
+          <p:cNvSpPr>
+            <a:spLocks noGrp="1" noRot="1" noChangeAspect="1"/>
+          </p:cNvSpPr>
+          <p:nvPr>
+            <p:ph type="sldImg"/>
+          </p:nvPr>
+        </p:nvSpPr>
+        <p:spPr/>
+      </p:sp>
+      <p:sp>
+        <p:nvSpPr>
+          <p:cNvPr id="3" name="Notes Placeholder 2"/>
+          <p:cNvSpPr>
+            <a:spLocks noGrp="1"/>
+          </p:cNvSpPr>
+          <p:nvPr>
+            <p:ph type="body" idx="1"/>
+          </p:nvPr>
+        </p:nvSpPr>
+        <p:spPr/>
+        <p:txBody>
+          <a:bodyPr/>
+          <a:lstStyle/>
+          <a:p>
+            <a:endParaRPr lang="en-US" dirty="0"/>
+          </a:p>
+        </p:txBody>
+      </p:sp>
+      <p:sp>
+        <p:nvSpPr>
+          <p:cNvPr id="4" name="Slide Number Placeholder 3"/>
+          <p:cNvSpPr>
+            <a:spLocks noGrp="1"/>
+          </p:cNvSpPr>
+          <p:nvPr>
+            <p:ph type="sldNum" sz="quarter" idx="5"/>
+          </p:nvPr>
+        </p:nvSpPr>
+        <p:spPr/>
+        <p:txBody>
+          <a:bodyPr/>
+          <a:lstStyle/>
+          <a:p>
+            <a:fld id="{3148858F-F1DB-4027-9C85-CCA6849540DD}" type="slidenum">
+              <a:rPr lang="en-US" smtClean="0"/>
+              <a:t>15</a:t>
+            </a:fld>
+            <a:endParaRPr lang="en-US"/>
+          </a:p>
+        </p:txBody>
+      </p:sp>
+    </p:spTree>
+    <p:extLst>
+      <p:ext uri="{BB962C8B-B14F-4D97-AF65-F5344CB8AC3E}">
+        <p14:creationId xmlns:p14="http://schemas.microsoft.com/office/powerpoint/2010/main" val="253102611"/>
+      </p:ext>
+    </p:extLst>
+  </p:cSld>
+  <p:clrMapOvr>
+    <a:masterClrMapping/>
+  </p:clrMapOvr>
+</p:notes>
+</file>
+
+<file path=ppt/notesSlides/notesSlide16.xml><?xml version="1.0" encoding="utf-8"?>
+<p:notes xmlns:a="http://schemas.openxmlformats.org/drawingml/2006/main" xmlns:r="http://schemas.openxmlformats.org/officeDocument/2006/relationships" xmlns:p="http://schemas.openxmlformats.org/presentationml/2006/main">
+  <p:cSld>
+    <p:spTree>
+      <p:nvGrpSpPr>
+        <p:cNvPr id="1" name=""/>
+        <p:cNvGrpSpPr/>
+        <p:nvPr/>
+      </p:nvGrpSpPr>
+      <p:grpSpPr>
+        <a:xfrm>
+          <a:off x="0" y="0"/>
+          <a:ext cx="0" cy="0"/>
+          <a:chOff x="0" y="0"/>
+          <a:chExt cx="0" cy="0"/>
+        </a:xfrm>
+      </p:grpSpPr>
+      <p:sp>
+        <p:nvSpPr>
+          <p:cNvPr id="2" name="Slide Image Placeholder 1"/>
+          <p:cNvSpPr>
+            <a:spLocks noGrp="1" noRot="1" noChangeAspect="1"/>
+          </p:cNvSpPr>
+          <p:nvPr>
+            <p:ph type="sldImg"/>
+          </p:nvPr>
+        </p:nvSpPr>
+        <p:spPr/>
+      </p:sp>
+      <p:sp>
+        <p:nvSpPr>
+          <p:cNvPr id="3" name="Notes Placeholder 2"/>
+          <p:cNvSpPr>
+            <a:spLocks noGrp="1"/>
+          </p:cNvSpPr>
+          <p:nvPr>
+            <p:ph type="body" idx="1"/>
+          </p:nvPr>
+        </p:nvSpPr>
+        <p:spPr/>
+        <p:txBody>
+          <a:bodyPr/>
+          <a:lstStyle/>
+          <a:p>
+            <a:r>
+              <a:rPr lang="en-US" dirty="0"/>
+              <a:t>Okay – let’s quickly summarize what we covered in today’s learning experience.</a:t>
+            </a:r>
+          </a:p>
+        </p:txBody>
+      </p:sp>
+      <p:sp>
+        <p:nvSpPr>
+          <p:cNvPr id="4" name="Slide Number Placeholder 3"/>
+          <p:cNvSpPr>
+            <a:spLocks noGrp="1"/>
+          </p:cNvSpPr>
+          <p:nvPr>
+            <p:ph type="sldNum" sz="quarter" idx="5"/>
+          </p:nvPr>
+        </p:nvSpPr>
+        <p:spPr/>
+        <p:txBody>
+          <a:bodyPr/>
+          <a:lstStyle/>
+          <a:p>
+            <a:fld id="{3148858F-F1DB-4027-9C85-CCA6849540DD}" type="slidenum">
+              <a:rPr lang="en-US" smtClean="0"/>
+              <a:t>16</a:t>
             </a:fld>
             <a:endParaRPr lang="en-US"/>
           </a:p>
@@ -1544,20 +1778,33 @@
           <a:lstStyle/>
           <a:p>
             <a:r>
-              <a:rPr lang="en-US" sz="1200" b="0" i="0" kern="1200" dirty="0">
-                <a:solidFill>
-                  <a:schemeClr val="tx1"/>
-                </a:solidFill>
-                <a:effectLst/>
-                <a:latin typeface="+mn-lt"/>
-                <a:ea typeface="+mn-ea"/>
-                <a:cs typeface="+mn-cs"/>
+              <a:rPr lang="en-US" dirty="0">
+                <a:latin typeface="Palatino Linotype" panose="02040502050505030304" pitchFamily="18" charset="0"/>
               </a:rPr>
-              <a:t>Now that we’ve shared our ideas, let’s consider some other definitions.</a:t>
-            </a:r>
-          </a:p>
-          <a:p>
-            <a:endParaRPr lang="en-US" dirty="0"/>
+              <a:t>Hello and welcome to our 2</a:t>
+            </a:r>
+            <a:r>
+              <a:rPr lang="en-US" baseline="30000" dirty="0">
+                <a:latin typeface="Palatino Linotype" panose="02040502050505030304" pitchFamily="18" charset="0"/>
+              </a:rPr>
+              <a:t>nd</a:t>
+            </a:r>
+            <a:r>
+              <a:rPr lang="en-US" dirty="0">
+                <a:latin typeface="Palatino Linotype" panose="02040502050505030304" pitchFamily="18" charset="0"/>
+              </a:rPr>
+              <a:t> learning experience in this course…</a:t>
+            </a:r>
+          </a:p>
+          <a:p>
+            <a:endParaRPr lang="en-US" dirty="0">
+              <a:latin typeface="Palatino Linotype" panose="02040502050505030304" pitchFamily="18" charset="0"/>
+            </a:endParaRPr>
+          </a:p>
+          <a:p>
+            <a:endParaRPr lang="en-US" dirty="0">
+              <a:latin typeface="Palatino Linotype" panose="02040502050505030304" pitchFamily="18" charset="0"/>
+            </a:endParaRPr>
           </a:p>
         </p:txBody>
       </p:sp>
@@ -1587,7 +1834,7 @@
     </p:spTree>
     <p:extLst>
       <p:ext uri="{BB962C8B-B14F-4D97-AF65-F5344CB8AC3E}">
-        <p14:creationId xmlns:p14="http://schemas.microsoft.com/office/powerpoint/2010/main" val="1011519860"/>
+        <p14:creationId xmlns:p14="http://schemas.microsoft.com/office/powerpoint/2010/main" val="1142283009"/>
       </p:ext>
     </p:extLst>
   </p:cSld>
@@ -1701,6 +1948,330 @@
             <a:spAutoFit/>
           </a:bodyPr>
           <a:lstStyle/>
+          <a:p>
+            <a:pPr marL="0" marR="0" lvl="0" indent="0" algn="l" defTabSz="914400" rtl="0" eaLnBrk="1" fontAlgn="auto" latinLnBrk="0" hangingPunct="1">
+              <a:lnSpc>
+                <a:spcPct val="100000"/>
+              </a:lnSpc>
+              <a:spcBef>
+                <a:spcPts val="0"/>
+              </a:spcBef>
+              <a:spcAft>
+                <a:spcPts val="0"/>
+              </a:spcAft>
+              <a:buClrTx/>
+              <a:buSzTx/>
+              <a:buFontTx/>
+              <a:buNone/>
+              <a:tabLst/>
+              <a:defRPr/>
+            </a:pPr>
+            <a:r>
+              <a:rPr lang="en-US" sz="1200" b="0" i="0" kern="1200" dirty="0">
+                <a:solidFill>
+                  <a:schemeClr val="tx1"/>
+                </a:solidFill>
+                <a:effectLst/>
+                <a:latin typeface="+mn-lt"/>
+                <a:ea typeface="+mn-ea"/>
+                <a:cs typeface="+mn-cs"/>
+              </a:rPr>
+              <a:t>So, in last week’s class, you took a poll in which you provided a phrase to describe artificial intelligence.  We did that because we wanted to get a sense of what you currently know about AI.  Today, we want to continue that conversation and provide some historical background.</a:t>
+            </a:r>
+          </a:p>
+          <a:p>
+            <a:pPr algn="l"/>
+            <a:endParaRPr lang="en-US" b="0" i="0" dirty="0">
+              <a:solidFill>
+                <a:srgbClr val="202122"/>
+              </a:solidFill>
+              <a:effectLst/>
+              <a:latin typeface="Arial" panose="020B0604020202020204" pitchFamily="34" charset="0"/>
+            </a:endParaRPr>
+          </a:p>
+          <a:p>
+            <a:pPr algn="l"/>
+            <a:r>
+              <a:rPr lang="en-US" b="0" i="0" dirty="0">
+                <a:solidFill>
+                  <a:srgbClr val="202122"/>
+                </a:solidFill>
+                <a:effectLst/>
+                <a:latin typeface="Arial" panose="020B0604020202020204" pitchFamily="34" charset="0"/>
+              </a:rPr>
+              <a:t>In 1955, </a:t>
+            </a:r>
+            <a:r>
+              <a:rPr lang="en-US" b="0" i="0" u="none" strike="noStrike" dirty="0">
+                <a:solidFill>
+                  <a:srgbClr val="0645AD"/>
+                </a:solidFill>
+                <a:effectLst/>
+                <a:latin typeface="Arial" panose="020B0604020202020204" pitchFamily="34" charset="0"/>
+                <a:hlinkClick r:id="rId3" tooltip="John McCarthy (computer scientist)"/>
+              </a:rPr>
+              <a:t>John McCarthy</a:t>
+            </a:r>
+            <a:r>
+              <a:rPr lang="en-US" b="0" i="0" dirty="0">
+                <a:solidFill>
+                  <a:srgbClr val="202122"/>
+                </a:solidFill>
+                <a:effectLst/>
+                <a:latin typeface="Arial" panose="020B0604020202020204" pitchFamily="34" charset="0"/>
+              </a:rPr>
+              <a:t>, then a young Assistant Professor of Mathematics at </a:t>
+            </a:r>
+            <a:r>
+              <a:rPr lang="en-US" b="0" i="0" u="none" strike="noStrike" dirty="0">
+                <a:solidFill>
+                  <a:srgbClr val="0645AD"/>
+                </a:solidFill>
+                <a:effectLst/>
+                <a:latin typeface="Arial" panose="020B0604020202020204" pitchFamily="34" charset="0"/>
+                <a:hlinkClick r:id="rId4" tooltip="Dartmouth College"/>
+              </a:rPr>
+              <a:t>Dartmouth College</a:t>
+            </a:r>
+            <a:r>
+              <a:rPr lang="en-US" b="0" i="0" dirty="0">
+                <a:solidFill>
+                  <a:srgbClr val="202122"/>
+                </a:solidFill>
+                <a:effectLst/>
+                <a:latin typeface="Arial" panose="020B0604020202020204" pitchFamily="34" charset="0"/>
+              </a:rPr>
+              <a:t>, decided to organize a group to clarify and develop ideas about thinking machines. He picked the name 'Artificial Intelligence' for the new field. He chose the name partly for its neutrality; avoiding a focus on narrow automata theory while avoiding cybernetics which was heavily focused on analog feedback, as well as him potentially having to accept the assertive </a:t>
+            </a:r>
+            <a:r>
+              <a:rPr lang="en-US" b="0" i="0" u="none" strike="noStrike" dirty="0">
+                <a:solidFill>
+                  <a:srgbClr val="0645AD"/>
+                </a:solidFill>
+                <a:effectLst/>
+                <a:latin typeface="Arial" panose="020B0604020202020204" pitchFamily="34" charset="0"/>
+                <a:hlinkClick r:id="rId5" tooltip="Norbert Wiener"/>
+              </a:rPr>
+              <a:t>Norbert Wiener</a:t>
+            </a:r>
+            <a:r>
+              <a:rPr lang="en-US" b="0" i="0" dirty="0">
+                <a:solidFill>
+                  <a:srgbClr val="202122"/>
+                </a:solidFill>
+                <a:effectLst/>
+                <a:latin typeface="Arial" panose="020B0604020202020204" pitchFamily="34" charset="0"/>
+              </a:rPr>
+              <a:t> as guru or having to argue with him.</a:t>
+            </a:r>
+            <a:endParaRPr lang="en-US" b="0" i="0" u="none" strike="noStrike" baseline="30000" dirty="0">
+              <a:solidFill>
+                <a:srgbClr val="0645AD"/>
+              </a:solidFill>
+              <a:effectLst/>
+              <a:latin typeface="Arial" panose="020B0604020202020204" pitchFamily="34" charset="0"/>
+            </a:endParaRPr>
+          </a:p>
+          <a:p>
+            <a:pPr algn="l"/>
+            <a:endParaRPr lang="en-US" b="0" i="0" dirty="0">
+              <a:solidFill>
+                <a:srgbClr val="202122"/>
+              </a:solidFill>
+              <a:effectLst/>
+              <a:latin typeface="Arial" panose="020B0604020202020204" pitchFamily="34" charset="0"/>
+            </a:endParaRPr>
+          </a:p>
+          <a:p>
+            <a:pPr algn="l"/>
+            <a:r>
+              <a:rPr lang="en-US" b="0" i="0" dirty="0">
+                <a:solidFill>
+                  <a:srgbClr val="202122"/>
+                </a:solidFill>
+                <a:effectLst/>
+                <a:latin typeface="Arial" panose="020B0604020202020204" pitchFamily="34" charset="0"/>
+              </a:rPr>
+              <a:t>In early 1955, McCarthy approached the </a:t>
+            </a:r>
+            <a:r>
+              <a:rPr lang="en-US" b="0" i="0" u="none" strike="noStrike" dirty="0">
+                <a:solidFill>
+                  <a:srgbClr val="0645AD"/>
+                </a:solidFill>
+                <a:effectLst/>
+                <a:latin typeface="Arial" panose="020B0604020202020204" pitchFamily="34" charset="0"/>
+                <a:hlinkClick r:id="rId6" tooltip="Rockefeller Foundation"/>
+              </a:rPr>
+              <a:t>Rockefeller Foundation</a:t>
+            </a:r>
+            <a:r>
+              <a:rPr lang="en-US" b="0" i="0" dirty="0">
+                <a:solidFill>
+                  <a:srgbClr val="202122"/>
+                </a:solidFill>
+                <a:effectLst/>
+                <a:latin typeface="Arial" panose="020B0604020202020204" pitchFamily="34" charset="0"/>
+              </a:rPr>
+              <a:t> to request funding for a summer seminar at Dartmouth for about 10 participants. In June, he and </a:t>
+            </a:r>
+            <a:r>
+              <a:rPr lang="en-US" b="0" i="0" u="none" strike="noStrike" dirty="0">
+                <a:solidFill>
+                  <a:srgbClr val="0645AD"/>
+                </a:solidFill>
+                <a:effectLst/>
+                <a:latin typeface="Arial" panose="020B0604020202020204" pitchFamily="34" charset="0"/>
+                <a:hlinkClick r:id="rId7" tooltip="Claude Shannon"/>
+              </a:rPr>
+              <a:t>Claude Shannon</a:t>
+            </a:r>
+            <a:r>
+              <a:rPr lang="en-US" b="0" i="0" dirty="0">
+                <a:solidFill>
+                  <a:srgbClr val="202122"/>
+                </a:solidFill>
+                <a:effectLst/>
+                <a:latin typeface="Arial" panose="020B0604020202020204" pitchFamily="34" charset="0"/>
+              </a:rPr>
+              <a:t>, a founder of </a:t>
+            </a:r>
+            <a:r>
+              <a:rPr lang="en-US" b="0" i="0" u="none" strike="noStrike" dirty="0">
+                <a:solidFill>
+                  <a:srgbClr val="0645AD"/>
+                </a:solidFill>
+                <a:effectLst/>
+                <a:latin typeface="Arial" panose="020B0604020202020204" pitchFamily="34" charset="0"/>
+                <a:hlinkClick r:id="rId8" tooltip="Information theory"/>
+              </a:rPr>
+              <a:t>information theory</a:t>
+            </a:r>
+            <a:r>
+              <a:rPr lang="en-US" b="0" i="0" dirty="0">
+                <a:solidFill>
+                  <a:srgbClr val="202122"/>
+                </a:solidFill>
+                <a:effectLst/>
+                <a:latin typeface="Arial" panose="020B0604020202020204" pitchFamily="34" charset="0"/>
+              </a:rPr>
+              <a:t> then at </a:t>
+            </a:r>
+            <a:r>
+              <a:rPr lang="en-US" b="0" i="0" u="none" strike="noStrike" dirty="0">
+                <a:solidFill>
+                  <a:srgbClr val="0645AD"/>
+                </a:solidFill>
+                <a:effectLst/>
+                <a:latin typeface="Arial" panose="020B0604020202020204" pitchFamily="34" charset="0"/>
+                <a:hlinkClick r:id="rId9" tooltip="Bell Labs"/>
+              </a:rPr>
+              <a:t>Bell Labs</a:t>
+            </a:r>
+            <a:r>
+              <a:rPr lang="en-US" b="0" i="0" dirty="0">
+                <a:solidFill>
+                  <a:srgbClr val="202122"/>
+                </a:solidFill>
+                <a:effectLst/>
+                <a:latin typeface="Arial" panose="020B0604020202020204" pitchFamily="34" charset="0"/>
+              </a:rPr>
+              <a:t>, met with Robert Morison, Director of Biological and Medical Research to discuss the idea and possible funding, though Morison was unsure whether money would be made available for such a visionary project.</a:t>
+            </a:r>
+            <a:endParaRPr lang="en-US" b="0" i="0" u="none" strike="noStrike" baseline="30000" dirty="0">
+              <a:solidFill>
+                <a:srgbClr val="0645AD"/>
+              </a:solidFill>
+              <a:effectLst/>
+              <a:latin typeface="Arial" panose="020B0604020202020204" pitchFamily="34" charset="0"/>
+            </a:endParaRPr>
+          </a:p>
+          <a:p>
+            <a:pPr algn="l"/>
+            <a:endParaRPr lang="en-US" b="0" i="0" dirty="0">
+              <a:solidFill>
+                <a:srgbClr val="202122"/>
+              </a:solidFill>
+              <a:effectLst/>
+              <a:latin typeface="Arial" panose="020B0604020202020204" pitchFamily="34" charset="0"/>
+            </a:endParaRPr>
+          </a:p>
+          <a:p>
+            <a:pPr algn="l"/>
+            <a:r>
+              <a:rPr lang="en-US" b="0" i="0" dirty="0">
+                <a:solidFill>
+                  <a:srgbClr val="202122"/>
+                </a:solidFill>
+                <a:effectLst/>
+                <a:latin typeface="Arial" panose="020B0604020202020204" pitchFamily="34" charset="0"/>
+              </a:rPr>
+              <a:t>On September 2, 1955, the project was formally proposed by McCarthy, </a:t>
+            </a:r>
+            <a:r>
+              <a:rPr lang="en-US" b="0" i="0" u="none" strike="noStrike" dirty="0">
+                <a:solidFill>
+                  <a:srgbClr val="0645AD"/>
+                </a:solidFill>
+                <a:effectLst/>
+                <a:latin typeface="Arial" panose="020B0604020202020204" pitchFamily="34" charset="0"/>
+                <a:hlinkClick r:id="rId10" tooltip="Marvin Minsky"/>
+              </a:rPr>
+              <a:t>Marvin Minsky</a:t>
+            </a:r>
+            <a:r>
+              <a:rPr lang="en-US" b="0" i="0" dirty="0">
+                <a:solidFill>
+                  <a:srgbClr val="202122"/>
+                </a:solidFill>
+                <a:effectLst/>
+                <a:latin typeface="Arial" panose="020B0604020202020204" pitchFamily="34" charset="0"/>
+              </a:rPr>
+              <a:t>, </a:t>
+            </a:r>
+            <a:r>
+              <a:rPr lang="en-US" b="0" i="0" u="none" strike="noStrike" dirty="0">
+                <a:solidFill>
+                  <a:srgbClr val="0645AD"/>
+                </a:solidFill>
+                <a:effectLst/>
+                <a:latin typeface="Arial" panose="020B0604020202020204" pitchFamily="34" charset="0"/>
+                <a:hlinkClick r:id="rId11" tooltip="Nathaniel Rochester (computer scientist)"/>
+              </a:rPr>
+              <a:t>Nathaniel Rochester</a:t>
+            </a:r>
+            <a:r>
+              <a:rPr lang="en-US" b="0" i="0" dirty="0">
+                <a:solidFill>
+                  <a:srgbClr val="202122"/>
+                </a:solidFill>
+                <a:effectLst/>
+                <a:latin typeface="Arial" panose="020B0604020202020204" pitchFamily="34" charset="0"/>
+              </a:rPr>
+              <a:t> and </a:t>
+            </a:r>
+            <a:r>
+              <a:rPr lang="en-US" b="0" i="0" u="none" strike="noStrike" dirty="0">
+                <a:solidFill>
+                  <a:srgbClr val="0645AD"/>
+                </a:solidFill>
+                <a:effectLst/>
+                <a:latin typeface="Arial" panose="020B0604020202020204" pitchFamily="34" charset="0"/>
+                <a:hlinkClick r:id="rId7" tooltip="Claude Shannon"/>
+              </a:rPr>
+              <a:t>Claude Shannon</a:t>
+            </a:r>
+            <a:r>
+              <a:rPr lang="en-US" b="0" i="0" dirty="0">
+                <a:solidFill>
+                  <a:srgbClr val="202122"/>
+                </a:solidFill>
+                <a:effectLst/>
+                <a:latin typeface="Arial" panose="020B0604020202020204" pitchFamily="34" charset="0"/>
+              </a:rPr>
+              <a:t>. The proposal is credited with introducing the term 'artificial intelligence’.  The Rockefeller Foundation funded the proposal and the rest, as they say, “is history…”</a:t>
+            </a:r>
+          </a:p>
           <a:p>
             <a:endParaRPr lang="en-US" dirty="0"/>
           </a:p>
@@ -1763,18 +2334,10 @@
           <a:bodyPr/>
           <a:lstStyle/>
           <a:p>
-            <a:endParaRPr lang="en-US" sz="1200" b="0" i="0" kern="1200" dirty="0">
-              <a:solidFill>
-                <a:schemeClr val="tx1"/>
-              </a:solidFill>
-              <a:effectLst/>
-              <a:latin typeface="+mn-lt"/>
-              <a:ea typeface="+mn-ea"/>
-              <a:cs typeface="+mn-cs"/>
-            </a:endParaRPr>
-          </a:p>
-          <a:p>
-            <a:endParaRPr lang="en-US" dirty="0"/>
+            <a:r>
+              <a:rPr lang="en-US" dirty="0"/>
+              <a:t>With that history in place, let’s consider some other definitions – starting with the one advanced in the Dartmouth Proposal…</a:t>
+            </a:r>
           </a:p>
         </p:txBody>
       </p:sp>
@@ -1804,7 +2367,7 @@
     </p:spTree>
     <p:extLst>
       <p:ext uri="{BB962C8B-B14F-4D97-AF65-F5344CB8AC3E}">
-        <p14:creationId xmlns:p14="http://schemas.microsoft.com/office/powerpoint/2010/main" val="4028108833"/>
+        <p14:creationId xmlns:p14="http://schemas.microsoft.com/office/powerpoint/2010/main" val="1011519860"/>
       </p:ext>
     </p:extLst>
   </p:cSld>
@@ -1858,36 +2421,6 @@
           <a:bodyPr/>
           <a:lstStyle/>
           <a:p>
-            <a:pPr marL="0" marR="0" lvl="0" indent="0" algn="l" defTabSz="914400" rtl="0" eaLnBrk="1" fontAlgn="auto" latinLnBrk="0" hangingPunct="1">
-              <a:lnSpc>
-                <a:spcPct val="100000"/>
-              </a:lnSpc>
-              <a:spcBef>
-                <a:spcPts val="0"/>
-              </a:spcBef>
-              <a:spcAft>
-                <a:spcPts val="0"/>
-              </a:spcAft>
-              <a:buClrTx/>
-              <a:buSzTx/>
-              <a:buFontTx/>
-              <a:buNone/>
-              <a:tabLst/>
-              <a:defRPr/>
-            </a:pPr>
-            <a:r>
-              <a:rPr lang="en-US" sz="1200" b="0" i="0" u="none" strike="noStrike" kern="1200" cap="none" dirty="0">
-                <a:ln>
-                  <a:noFill/>
-                </a:ln>
-                <a:latin typeface="Arial" pitchFamily="34"/>
-                <a:ea typeface="Arial" pitchFamily="34"/>
-                <a:cs typeface="Arial" pitchFamily="34"/>
-              </a:rPr>
-              <a:t>Have students go to breakout sessions and recorded notes from the sessions here.</a:t>
-            </a:r>
-          </a:p>
-          <a:p>
             <a:endParaRPr lang="en-US" sz="1200" b="0" i="0" kern="1200" dirty="0">
               <a:solidFill>
                 <a:schemeClr val="tx1"/>
@@ -1899,7 +2432,10 @@
             </a:endParaRPr>
           </a:p>
           <a:p>
-            <a:endParaRPr lang="en-US" dirty="0"/>
+            <a:r>
+              <a:rPr lang="en-US" dirty="0"/>
+              <a:t>… and some more definitions to consider.</a:t>
+            </a:r>
           </a:p>
         </p:txBody>
       </p:sp>
@@ -1929,7 +2465,7 @@
     </p:spTree>
     <p:extLst>
       <p:ext uri="{BB962C8B-B14F-4D97-AF65-F5344CB8AC3E}">
-        <p14:creationId xmlns:p14="http://schemas.microsoft.com/office/powerpoint/2010/main" val="3136242698"/>
+        <p14:creationId xmlns:p14="http://schemas.microsoft.com/office/powerpoint/2010/main" val="4028108833"/>
       </p:ext>
     </p:extLst>
   </p:cSld>
@@ -1983,43 +2519,94 @@
           <a:bodyPr/>
           <a:lstStyle/>
           <a:p>
-            <a:pPr marL="0" indent="0">
+            <a:pPr marL="0" marR="0" lvl="0" indent="0" algn="l" defTabSz="914400" rtl="0" eaLnBrk="1" fontAlgn="auto" latinLnBrk="0" hangingPunct="1">
+              <a:lnSpc>
+                <a:spcPct val="100000"/>
+              </a:lnSpc>
+              <a:spcBef>
+                <a:spcPts val="0"/>
+              </a:spcBef>
+              <a:spcAft>
+                <a:spcPts val="0"/>
+              </a:spcAft>
+              <a:buClrTx/>
+              <a:buSzTx/>
+              <a:buFontTx/>
               <a:buNone/>
+              <a:tabLst/>
+              <a:defRPr/>
             </a:pPr>
             <a:r>
               <a:rPr lang="en-US" sz="1200" b="0" i="0" u="none" strike="noStrike" kern="1200" cap="none" dirty="0">
                 <a:ln>
                   <a:noFill/>
                 </a:ln>
-                <a:latin typeface="Arial" pitchFamily="18"/>
+                <a:latin typeface="Arial" pitchFamily="34"/>
                 <a:ea typeface="Arial" pitchFamily="34"/>
                 <a:cs typeface="Arial" pitchFamily="34"/>
               </a:rPr>
-              <a:t>Turing, AM (1950) Computing Machinery and Intelligence. </a:t>
-            </a:r>
-            <a:r>
-              <a:rPr lang="en-US" sz="1200" b="0" i="1" u="none" strike="noStrike" kern="1200" cap="none" dirty="0">
-                <a:ln>
-                  <a:noFill/>
-                </a:ln>
-                <a:latin typeface="Arial" pitchFamily="18"/>
-                <a:ea typeface="Arial" pitchFamily="34"/>
-                <a:cs typeface="Arial" pitchFamily="34"/>
-              </a:rPr>
-              <a:t>Mind</a:t>
-            </a:r>
+              <a:t>Okay – given these definitions and the assigned reading for this week – has your initial definition of A.I. changed?  </a:t>
+            </a:r>
+          </a:p>
+          <a:p>
+            <a:pPr marL="0" marR="0" lvl="0" indent="0" algn="l" defTabSz="914400" rtl="0" eaLnBrk="1" fontAlgn="auto" latinLnBrk="0" hangingPunct="1">
+              <a:lnSpc>
+                <a:spcPct val="100000"/>
+              </a:lnSpc>
+              <a:spcBef>
+                <a:spcPts val="0"/>
+              </a:spcBef>
+              <a:spcAft>
+                <a:spcPts val="0"/>
+              </a:spcAft>
+              <a:buClrTx/>
+              <a:buSzTx/>
+              <a:buFontTx/>
+              <a:buNone/>
+              <a:tabLst/>
+              <a:defRPr/>
+            </a:pPr>
+            <a:endParaRPr lang="en-US" sz="1200" b="0" i="0" u="none" strike="noStrike" kern="1200" cap="none" dirty="0">
+              <a:ln>
+                <a:noFill/>
+              </a:ln>
+              <a:latin typeface="Arial" pitchFamily="34"/>
+              <a:ea typeface="Arial" pitchFamily="34"/>
+              <a:cs typeface="Arial" pitchFamily="34"/>
+            </a:endParaRPr>
+          </a:p>
+          <a:p>
+            <a:pPr marL="0" marR="0" lvl="0" indent="0" algn="l" defTabSz="914400" rtl="0" eaLnBrk="1" fontAlgn="auto" latinLnBrk="0" hangingPunct="1">
+              <a:lnSpc>
+                <a:spcPct val="100000"/>
+              </a:lnSpc>
+              <a:spcBef>
+                <a:spcPts val="0"/>
+              </a:spcBef>
+              <a:spcAft>
+                <a:spcPts val="0"/>
+              </a:spcAft>
+              <a:buClrTx/>
+              <a:buSzTx/>
+              <a:buFontTx/>
+              <a:buNone/>
+              <a:tabLst/>
+              <a:defRPr/>
+            </a:pPr>
             <a:r>
               <a:rPr lang="en-US" sz="1200" b="0" i="0" u="none" strike="noStrike" kern="1200" cap="none" dirty="0">
                 <a:ln>
                   <a:noFill/>
                 </a:ln>
-                <a:latin typeface="Arial" pitchFamily="18"/>
+                <a:latin typeface="Arial" pitchFamily="34"/>
                 <a:ea typeface="Arial" pitchFamily="34"/>
                 <a:cs typeface="Arial" pitchFamily="34"/>
               </a:rPr>
-              <a:t>: 54</a:t>
-            </a:r>
-            <a:endParaRPr lang="en-US" b="1" dirty="0"/>
+              <a:t>Let’s discuss these questions in the breakout rooms. </a:t>
+            </a:r>
+          </a:p>
+          <a:p>
+            <a:endParaRPr lang="en-US" dirty="0"/>
           </a:p>
         </p:txBody>
       </p:sp>
@@ -2049,7 +2636,7 @@
     </p:spTree>
     <p:extLst>
       <p:ext uri="{BB962C8B-B14F-4D97-AF65-F5344CB8AC3E}">
-        <p14:creationId xmlns:p14="http://schemas.microsoft.com/office/powerpoint/2010/main" val="1860523921"/>
+        <p14:creationId xmlns:p14="http://schemas.microsoft.com/office/powerpoint/2010/main" val="3136242698"/>
       </p:ext>
     </p:extLst>
   </p:cSld>
@@ -2206,7 +2793,7 @@
           <a:p>
             <a:fld id="{C3F78080-8D0A-4BE8-A5B4-CB115102D524}" type="datetimeFigureOut">
               <a:rPr lang="en-US" smtClean="0"/>
-              <a:t>8/20/2021</a:t>
+              <a:t>8/23/2021</a:t>
             </a:fld>
             <a:endParaRPr lang="en-US"/>
           </a:p>
@@ -2404,7 +2991,7 @@
           <a:p>
             <a:fld id="{C3F78080-8D0A-4BE8-A5B4-CB115102D524}" type="datetimeFigureOut">
               <a:rPr lang="en-US" smtClean="0"/>
-              <a:t>8/20/2021</a:t>
+              <a:t>8/23/2021</a:t>
             </a:fld>
             <a:endParaRPr lang="en-US"/>
           </a:p>
@@ -2612,7 +3199,7 @@
           <a:p>
             <a:fld id="{C3F78080-8D0A-4BE8-A5B4-CB115102D524}" type="datetimeFigureOut">
               <a:rPr lang="en-US" smtClean="0"/>
-              <a:t>8/20/2021</a:t>
+              <a:t>8/23/2021</a:t>
             </a:fld>
             <a:endParaRPr lang="en-US"/>
           </a:p>
@@ -2810,7 +3397,7 @@
           <a:p>
             <a:fld id="{C3F78080-8D0A-4BE8-A5B4-CB115102D524}" type="datetimeFigureOut">
               <a:rPr lang="en-US" smtClean="0"/>
-              <a:t>8/20/2021</a:t>
+              <a:t>8/23/2021</a:t>
             </a:fld>
             <a:endParaRPr lang="en-US"/>
           </a:p>
@@ -3085,7 +3672,7 @@
           <a:p>
             <a:fld id="{C3F78080-8D0A-4BE8-A5B4-CB115102D524}" type="datetimeFigureOut">
               <a:rPr lang="en-US" smtClean="0"/>
-              <a:t>8/20/2021</a:t>
+              <a:t>8/23/2021</a:t>
             </a:fld>
             <a:endParaRPr lang="en-US"/>
           </a:p>
@@ -3350,7 +3937,7 @@
           <a:p>
             <a:fld id="{C3F78080-8D0A-4BE8-A5B4-CB115102D524}" type="datetimeFigureOut">
               <a:rPr lang="en-US" smtClean="0"/>
-              <a:t>8/20/2021</a:t>
+              <a:t>8/23/2021</a:t>
             </a:fld>
             <a:endParaRPr lang="en-US"/>
           </a:p>
@@ -3762,7 +4349,7 @@
           <a:p>
             <a:fld id="{C3F78080-8D0A-4BE8-A5B4-CB115102D524}" type="datetimeFigureOut">
               <a:rPr lang="en-US" smtClean="0"/>
-              <a:t>8/20/2021</a:t>
+              <a:t>8/23/2021</a:t>
             </a:fld>
             <a:endParaRPr lang="en-US"/>
           </a:p>
@@ -3903,7 +4490,7 @@
           <a:p>
             <a:fld id="{C3F78080-8D0A-4BE8-A5B4-CB115102D524}" type="datetimeFigureOut">
               <a:rPr lang="en-US" smtClean="0"/>
-              <a:t>8/20/2021</a:t>
+              <a:t>8/23/2021</a:t>
             </a:fld>
             <a:endParaRPr lang="en-US"/>
           </a:p>
@@ -4016,7 +4603,7 @@
           <a:p>
             <a:fld id="{C3F78080-8D0A-4BE8-A5B4-CB115102D524}" type="datetimeFigureOut">
               <a:rPr lang="en-US" smtClean="0"/>
-              <a:t>8/20/2021</a:t>
+              <a:t>8/23/2021</a:t>
             </a:fld>
             <a:endParaRPr lang="en-US"/>
           </a:p>
@@ -4327,7 +4914,7 @@
           <a:p>
             <a:fld id="{C3F78080-8D0A-4BE8-A5B4-CB115102D524}" type="datetimeFigureOut">
               <a:rPr lang="en-US" smtClean="0"/>
-              <a:t>8/20/2021</a:t>
+              <a:t>8/23/2021</a:t>
             </a:fld>
             <a:endParaRPr lang="en-US"/>
           </a:p>
@@ -4615,7 +5202,7 @@
           <a:p>
             <a:fld id="{C3F78080-8D0A-4BE8-A5B4-CB115102D524}" type="datetimeFigureOut">
               <a:rPr lang="en-US" smtClean="0"/>
-              <a:t>8/20/2021</a:t>
+              <a:t>8/23/2021</a:t>
             </a:fld>
             <a:endParaRPr lang="en-US"/>
           </a:p>
@@ -4856,7 +5443,7 @@
           <a:p>
             <a:fld id="{C3F78080-8D0A-4BE8-A5B4-CB115102D524}" type="datetimeFigureOut">
               <a:rPr lang="en-US" smtClean="0"/>
-              <a:t>8/20/2021</a:t>
+              <a:t>8/23/2021</a:t>
             </a:fld>
             <a:endParaRPr lang="en-US"/>
           </a:p>
@@ -5275,55 +5862,6 @@
       </p:grpSpPr>
       <p:sp>
         <p:nvSpPr>
-          <p:cNvPr id="2" name="Title 1">
-            <a:extLst>
-              <a:ext uri="{FF2B5EF4-FFF2-40B4-BE49-F238E27FC236}">
-                <a16:creationId xmlns:a16="http://schemas.microsoft.com/office/drawing/2014/main" id="{0F853981-B13F-4917-804F-EBF0D4819E7E}"/>
-              </a:ext>
-            </a:extLst>
-          </p:cNvPr>
-          <p:cNvSpPr>
-            <a:spLocks noGrp="1"/>
-          </p:cNvSpPr>
-          <p:nvPr>
-            <p:ph type="title"/>
-          </p:nvPr>
-        </p:nvSpPr>
-        <p:spPr>
-          <a:xfrm>
-            <a:off x="831850" y="1709739"/>
-            <a:ext cx="10515600" cy="1500188"/>
-          </a:xfrm>
-          <a:noFill/>
-        </p:spPr>
-        <p:txBody>
-          <a:bodyPr>
-            <a:normAutofit/>
-          </a:bodyPr>
-          <a:lstStyle/>
-          <a:p>
-            <a:r>
-              <a:rPr lang="en-US" sz="5400">
-                <a:solidFill>
-                  <a:srgbClr val="6C9AC3"/>
-                </a:solidFill>
-                <a:latin typeface="Palatino Linotype" panose="02040502050505030304" pitchFamily="18" charset="0"/>
-                <a:cs typeface="Segoe UI Light" panose="020B0502040204020203" pitchFamily="34" charset="0"/>
-              </a:rPr>
-              <a:t>What is AI?</a:t>
-            </a:r>
-            <a:endParaRPr lang="en-US" sz="5400" dirty="0">
-              <a:solidFill>
-                <a:srgbClr val="6C9AC3"/>
-              </a:solidFill>
-              <a:latin typeface="Palatino Linotype" panose="02040502050505030304" pitchFamily="18" charset="0"/>
-              <a:cs typeface="Segoe UI Light" panose="020B0502040204020203" pitchFamily="34" charset="0"/>
-            </a:endParaRPr>
-          </a:p>
-        </p:txBody>
-      </p:sp>
-      <p:sp>
-        <p:nvSpPr>
           <p:cNvPr id="3" name="Text Placeholder 2">
             <a:extLst>
               <a:ext uri="{FF2B5EF4-FFF2-40B4-BE49-F238E27FC236}">
@@ -5353,11 +5891,47 @@
                 <a:latin typeface="Palatino Linotype" panose="02040502050505030304" pitchFamily="18" charset="0"/>
                 <a:cs typeface="Segoe UI" panose="020B0502040204020203" pitchFamily="34" charset="0"/>
               </a:rPr>
-              <a:t>Welcome</a:t>
-            </a:r>
-          </a:p>
-        </p:txBody>
-      </p:sp>
+              <a:t>What is AI – Part I</a:t>
+            </a:r>
+          </a:p>
+        </p:txBody>
+      </p:sp>
+      <p:pic>
+        <p:nvPicPr>
+          <p:cNvPr id="5" name="Picture 4">
+            <a:extLst>
+              <a:ext uri="{FF2B5EF4-FFF2-40B4-BE49-F238E27FC236}">
+                <a16:creationId xmlns:a16="http://schemas.microsoft.com/office/drawing/2014/main" id="{438EE269-1815-4C57-9623-CF2B9A6B7FB8}"/>
+              </a:ext>
+            </a:extLst>
+          </p:cNvPr>
+          <p:cNvPicPr>
+            <a:picLocks noChangeAspect="1"/>
+          </p:cNvPicPr>
+          <p:nvPr/>
+        </p:nvPicPr>
+        <p:blipFill>
+          <a:blip r:embed="rId3">
+            <a:extLst>
+              <a:ext uri="{28A0092B-C50C-407E-A947-70E740481C1C}">
+                <a14:useLocalDpi xmlns:a14="http://schemas.microsoft.com/office/drawing/2010/main" val="0"/>
+              </a:ext>
+            </a:extLst>
+          </a:blip>
+          <a:stretch>
+            <a:fillRect/>
+          </a:stretch>
+        </p:blipFill>
+        <p:spPr>
+          <a:xfrm>
+            <a:off x="844550" y="2219814"/>
+            <a:ext cx="4606424" cy="1209186"/>
+          </a:xfrm>
+          <a:prstGeom prst="rect">
+            <a:avLst/>
+          </a:prstGeom>
+        </p:spPr>
+      </p:pic>
     </p:spTree>
     <p:extLst>
       <p:ext uri="{BB962C8B-B14F-4D97-AF65-F5344CB8AC3E}">
@@ -5384,6 +5958,108 @@
 </file>
 
 <file path=ppt/slides/slide10.xml><?xml version="1.0" encoding="utf-8"?>
+<p:sld xmlns:a="http://schemas.openxmlformats.org/drawingml/2006/main" xmlns:r="http://schemas.openxmlformats.org/officeDocument/2006/relationships" xmlns:p="http://schemas.openxmlformats.org/presentationml/2006/main">
+  <p:cSld>
+    <p:spTree>
+      <p:nvGrpSpPr>
+        <p:cNvPr id="1" name=""/>
+        <p:cNvGrpSpPr/>
+        <p:nvPr/>
+      </p:nvGrpSpPr>
+      <p:grpSpPr>
+        <a:xfrm>
+          <a:off x="0" y="0"/>
+          <a:ext cx="0" cy="0"/>
+          <a:chOff x="0" y="0"/>
+          <a:chExt cx="0" cy="0"/>
+        </a:xfrm>
+      </p:grpSpPr>
+      <p:pic>
+        <p:nvPicPr>
+          <p:cNvPr id="6" name="Content Placeholder 5">
+            <a:extLst>
+              <a:ext uri="{FF2B5EF4-FFF2-40B4-BE49-F238E27FC236}">
+                <a16:creationId xmlns:a16="http://schemas.microsoft.com/office/drawing/2014/main" id="{0F37756A-9B35-4F19-B2A5-2E41774808F9}"/>
+              </a:ext>
+            </a:extLst>
+          </p:cNvPr>
+          <p:cNvPicPr>
+            <a:picLocks noGrp="1" noChangeAspect="1"/>
+          </p:cNvPicPr>
+          <p:nvPr>
+            <p:ph idx="1"/>
+          </p:nvPr>
+        </p:nvPicPr>
+        <p:blipFill>
+          <a:blip r:embed="rId3">
+            <a:extLst>
+              <a:ext uri="{28A0092B-C50C-407E-A947-70E740481C1C}">
+                <a14:useLocalDpi xmlns:a14="http://schemas.microsoft.com/office/drawing/2010/main" val="0"/>
+              </a:ext>
+            </a:extLst>
+          </a:blip>
+          <a:stretch>
+            <a:fillRect/>
+          </a:stretch>
+        </p:blipFill>
+        <p:spPr>
+          <a:xfrm>
+            <a:off x="4645908" y="1900858"/>
+            <a:ext cx="2900183" cy="3056284"/>
+          </a:xfrm>
+        </p:spPr>
+      </p:pic>
+      <p:sp>
+        <p:nvSpPr>
+          <p:cNvPr id="3" name="Title 2">
+            <a:extLst>
+              <a:ext uri="{FF2B5EF4-FFF2-40B4-BE49-F238E27FC236}">
+                <a16:creationId xmlns:a16="http://schemas.microsoft.com/office/drawing/2014/main" id="{C204E8C3-6FEB-4D36-A61E-FE422C89B2D6}"/>
+              </a:ext>
+            </a:extLst>
+          </p:cNvPr>
+          <p:cNvSpPr>
+            <a:spLocks noGrp="1"/>
+          </p:cNvSpPr>
+          <p:nvPr>
+            <p:ph type="title"/>
+          </p:nvPr>
+        </p:nvSpPr>
+        <p:spPr/>
+        <p:txBody>
+          <a:bodyPr/>
+          <a:lstStyle/>
+          <a:p>
+            <a:endParaRPr lang="en-US"/>
+          </a:p>
+        </p:txBody>
+      </p:sp>
+    </p:spTree>
+    <p:extLst>
+      <p:ext uri="{BB962C8B-B14F-4D97-AF65-F5344CB8AC3E}">
+        <p14:creationId xmlns:p14="http://schemas.microsoft.com/office/powerpoint/2010/main" val="3529707185"/>
+      </p:ext>
+    </p:extLst>
+  </p:cSld>
+  <p:clrMapOvr>
+    <a:masterClrMapping/>
+  </p:clrMapOvr>
+  <mc:AlternateContent xmlns:mc="http://schemas.openxmlformats.org/markup-compatibility/2006" xmlns:p14="http://schemas.microsoft.com/office/powerpoint/2010/main">
+    <mc:Choice Requires="p14">
+      <p:transition spd="med" p14:dur="700">
+        <p:fade/>
+      </p:transition>
+    </mc:Choice>
+    <mc:Fallback xmlns="">
+      <p:transition spd="med">
+        <p:fade/>
+      </p:transition>
+    </mc:Fallback>
+  </mc:AlternateContent>
+</p:sld>
+</file>
+
+<file path=ppt/slides/slide11.xml><?xml version="1.0" encoding="utf-8"?>
 <p:sld xmlns:a="http://schemas.openxmlformats.org/drawingml/2006/main" xmlns:r="http://schemas.openxmlformats.org/officeDocument/2006/relationships" xmlns:p="http://schemas.openxmlformats.org/presentationml/2006/main">
   <p:cSld>
     <p:spTree>
@@ -5476,7 +6152,7 @@
 </p:sld>
 </file>
 
-<file path=ppt/slides/slide11.xml><?xml version="1.0" encoding="utf-8"?>
+<file path=ppt/slides/slide12.xml><?xml version="1.0" encoding="utf-8"?>
 <p:sld xmlns:a="http://schemas.openxmlformats.org/drawingml/2006/main" xmlns:r="http://schemas.openxmlformats.org/officeDocument/2006/relationships" xmlns:p="http://schemas.openxmlformats.org/presentationml/2006/main">
   <p:cSld>
     <p:spTree>
@@ -5584,172 +6260,6 @@
     <p:extLst>
       <p:ext uri="{BB962C8B-B14F-4D97-AF65-F5344CB8AC3E}">
         <p14:creationId xmlns:p14="http://schemas.microsoft.com/office/powerpoint/2010/main" val="1226819478"/>
-      </p:ext>
-    </p:extLst>
-  </p:cSld>
-  <p:clrMapOvr>
-    <a:masterClrMapping/>
-  </p:clrMapOvr>
-  <mc:AlternateContent xmlns:mc="http://schemas.openxmlformats.org/markup-compatibility/2006" xmlns:p14="http://schemas.microsoft.com/office/powerpoint/2010/main">
-    <mc:Choice Requires="p14">
-      <p:transition spd="med" p14:dur="700">
-        <p:fade/>
-      </p:transition>
-    </mc:Choice>
-    <mc:Fallback xmlns="">
-      <p:transition spd="med">
-        <p:fade/>
-      </p:transition>
-    </mc:Fallback>
-  </mc:AlternateContent>
-</p:sld>
-</file>
-
-<file path=ppt/slides/slide12.xml><?xml version="1.0" encoding="utf-8"?>
-<p:sld xmlns:a="http://schemas.openxmlformats.org/drawingml/2006/main" xmlns:r="http://schemas.openxmlformats.org/officeDocument/2006/relationships" xmlns:p="http://schemas.openxmlformats.org/presentationml/2006/main">
-  <p:cSld>
-    <p:spTree>
-      <p:nvGrpSpPr>
-        <p:cNvPr id="1" name=""/>
-        <p:cNvGrpSpPr/>
-        <p:nvPr/>
-      </p:nvGrpSpPr>
-      <p:grpSpPr>
-        <a:xfrm>
-          <a:off x="0" y="0"/>
-          <a:ext cx="0" cy="0"/>
-          <a:chOff x="0" y="0"/>
-          <a:chExt cx="0" cy="0"/>
-        </a:xfrm>
-      </p:grpSpPr>
-      <p:sp>
-        <p:nvSpPr>
-          <p:cNvPr id="7" name="Title 6">
-            <a:extLst>
-              <a:ext uri="{FF2B5EF4-FFF2-40B4-BE49-F238E27FC236}">
-                <a16:creationId xmlns:a16="http://schemas.microsoft.com/office/drawing/2014/main" id="{BC039510-9FB4-4DE2-BBA1-1246681F0104}"/>
-              </a:ext>
-            </a:extLst>
-          </p:cNvPr>
-          <p:cNvSpPr>
-            <a:spLocks noGrp="1"/>
-          </p:cNvSpPr>
-          <p:nvPr>
-            <p:ph type="title"/>
-          </p:nvPr>
-        </p:nvSpPr>
-        <p:spPr/>
-        <p:txBody>
-          <a:bodyPr/>
-          <a:lstStyle/>
-          <a:p>
-            <a:pPr algn="ctr"/>
-            <a:endParaRPr lang="en-US" dirty="0">
-              <a:latin typeface="Palatino Linotype" panose="02040502050505030304" pitchFamily="18" charset="0"/>
-            </a:endParaRPr>
-          </a:p>
-        </p:txBody>
-      </p:sp>
-      <p:sp>
-        <p:nvSpPr>
-          <p:cNvPr id="3" name="Content Placeholder 2">
-            <a:extLst>
-              <a:ext uri="{FF2B5EF4-FFF2-40B4-BE49-F238E27FC236}">
-                <a16:creationId xmlns:a16="http://schemas.microsoft.com/office/drawing/2014/main" id="{5E3B4FD5-17E5-444B-94C8-CD1174E8FBB6}"/>
-              </a:ext>
-            </a:extLst>
-          </p:cNvPr>
-          <p:cNvSpPr>
-            <a:spLocks noGrp="1"/>
-          </p:cNvSpPr>
-          <p:nvPr>
-            <p:ph idx="1"/>
-          </p:nvPr>
-        </p:nvSpPr>
-        <p:spPr/>
-        <p:txBody>
-          <a:bodyPr/>
-          <a:lstStyle/>
-          <a:p>
-            <a:pPr marL="0" indent="0">
-              <a:buNone/>
-            </a:pPr>
-            <a:endParaRPr lang="en-US" dirty="0"/>
-          </a:p>
-          <a:p>
-            <a:pPr marL="0" indent="0">
-              <a:buNone/>
-            </a:pPr>
-            <a:endParaRPr lang="en-US" dirty="0"/>
-          </a:p>
-        </p:txBody>
-      </p:sp>
-      <p:sp>
-        <p:nvSpPr>
-          <p:cNvPr id="8" name="Title 1">
-            <a:extLst>
-              <a:ext uri="{FF2B5EF4-FFF2-40B4-BE49-F238E27FC236}">
-                <a16:creationId xmlns:a16="http://schemas.microsoft.com/office/drawing/2014/main" id="{17A758CD-2125-4598-B9A5-52FB7CBBAED3}"/>
-              </a:ext>
-            </a:extLst>
-          </p:cNvPr>
-          <p:cNvSpPr txBox="1">
-            <a:spLocks/>
-          </p:cNvSpPr>
-          <p:nvPr/>
-        </p:nvSpPr>
-        <p:spPr>
-          <a:xfrm>
-            <a:off x="838200" y="2678906"/>
-            <a:ext cx="10515600" cy="1500188"/>
-          </a:xfrm>
-          <a:prstGeom prst="rect">
-            <a:avLst/>
-          </a:prstGeom>
-          <a:noFill/>
-        </p:spPr>
-        <p:txBody>
-          <a:bodyPr vert="horz" lIns="91440" tIns="45720" rIns="91440" bIns="45720" rtlCol="0" anchor="ctr">
-            <a:normAutofit/>
-          </a:bodyPr>
-          <a:lstStyle>
-            <a:lvl1pPr algn="l" defTabSz="914400" rtl="0" eaLnBrk="1" latinLnBrk="0" hangingPunct="1">
-              <a:lnSpc>
-                <a:spcPct val="90000"/>
-              </a:lnSpc>
-              <a:spcBef>
-                <a:spcPct val="0"/>
-              </a:spcBef>
-              <a:buNone/>
-              <a:defRPr sz="4400" kern="1200">
-                <a:solidFill>
-                  <a:schemeClr val="tx1"/>
-                </a:solidFill>
-                <a:latin typeface="+mj-lt"/>
-                <a:ea typeface="+mj-ea"/>
-                <a:cs typeface="+mj-cs"/>
-              </a:defRPr>
-            </a:lvl1pPr>
-          </a:lstStyle>
-          <a:p>
-            <a:pPr algn="ctr"/>
-            <a:r>
-              <a:rPr lang="en-US" sz="5400" dirty="0">
-                <a:solidFill>
-                  <a:srgbClr val="4B83B5"/>
-                </a:solidFill>
-                <a:latin typeface="Palatino Linotype" panose="02040502050505030304" pitchFamily="18" charset="0"/>
-                <a:cs typeface="Segoe UI Light" panose="020B0502040204020203" pitchFamily="34" charset="0"/>
-              </a:rPr>
-              <a:t>kuki.ai</a:t>
-            </a:r>
-          </a:p>
-        </p:txBody>
-      </p:sp>
-    </p:spTree>
-    <p:extLst>
-      <p:ext uri="{BB962C8B-B14F-4D97-AF65-F5344CB8AC3E}">
-        <p14:creationId xmlns:p14="http://schemas.microsoft.com/office/powerpoint/2010/main" val="1543091714"/>
       </p:ext>
     </p:extLst>
   </p:cSld>
@@ -5790,10 +6300,72 @@
       </p:grpSpPr>
       <p:sp>
         <p:nvSpPr>
-          <p:cNvPr id="5" name="Title 1">
+          <p:cNvPr id="7" name="Title 6">
             <a:extLst>
               <a:ext uri="{FF2B5EF4-FFF2-40B4-BE49-F238E27FC236}">
-                <a16:creationId xmlns:a16="http://schemas.microsoft.com/office/drawing/2014/main" id="{8BABBCD2-7D2C-459F-9C42-17A2338F39A5}"/>
+                <a16:creationId xmlns:a16="http://schemas.microsoft.com/office/drawing/2014/main" id="{BC039510-9FB4-4DE2-BBA1-1246681F0104}"/>
+              </a:ext>
+            </a:extLst>
+          </p:cNvPr>
+          <p:cNvSpPr>
+            <a:spLocks noGrp="1"/>
+          </p:cNvSpPr>
+          <p:nvPr>
+            <p:ph type="title"/>
+          </p:nvPr>
+        </p:nvSpPr>
+        <p:spPr/>
+        <p:txBody>
+          <a:bodyPr/>
+          <a:lstStyle/>
+          <a:p>
+            <a:pPr algn="ctr"/>
+            <a:endParaRPr lang="en-US" dirty="0">
+              <a:latin typeface="Palatino Linotype" panose="02040502050505030304" pitchFamily="18" charset="0"/>
+            </a:endParaRPr>
+          </a:p>
+        </p:txBody>
+      </p:sp>
+      <p:sp>
+        <p:nvSpPr>
+          <p:cNvPr id="3" name="Content Placeholder 2">
+            <a:extLst>
+              <a:ext uri="{FF2B5EF4-FFF2-40B4-BE49-F238E27FC236}">
+                <a16:creationId xmlns:a16="http://schemas.microsoft.com/office/drawing/2014/main" id="{5E3B4FD5-17E5-444B-94C8-CD1174E8FBB6}"/>
+              </a:ext>
+            </a:extLst>
+          </p:cNvPr>
+          <p:cNvSpPr>
+            <a:spLocks noGrp="1"/>
+          </p:cNvSpPr>
+          <p:nvPr>
+            <p:ph idx="1"/>
+          </p:nvPr>
+        </p:nvSpPr>
+        <p:spPr/>
+        <p:txBody>
+          <a:bodyPr/>
+          <a:lstStyle/>
+          <a:p>
+            <a:pPr marL="0" indent="0">
+              <a:buNone/>
+            </a:pPr>
+            <a:endParaRPr lang="en-US" dirty="0"/>
+          </a:p>
+          <a:p>
+            <a:pPr marL="0" indent="0">
+              <a:buNone/>
+            </a:pPr>
+            <a:endParaRPr lang="en-US" dirty="0"/>
+          </a:p>
+        </p:txBody>
+      </p:sp>
+      <p:sp>
+        <p:nvSpPr>
+          <p:cNvPr id="8" name="Title 1">
+            <a:extLst>
+              <a:ext uri="{FF2B5EF4-FFF2-40B4-BE49-F238E27FC236}">
+                <a16:creationId xmlns:a16="http://schemas.microsoft.com/office/drawing/2014/main" id="{17A758CD-2125-4598-B9A5-52FB7CBBAED3}"/>
               </a:ext>
             </a:extLst>
           </p:cNvPr>
@@ -5804,15 +6376,13 @@
         </p:nvSpPr>
         <p:spPr>
           <a:xfrm>
-            <a:off x="518616" y="447014"/>
-            <a:ext cx="11054686" cy="767638"/>
+            <a:off x="838200" y="2678906"/>
+            <a:ext cx="10515600" cy="1500188"/>
           </a:xfrm>
           <a:prstGeom prst="rect">
             <a:avLst/>
           </a:prstGeom>
-          <a:ln>
-            <a:noFill/>
-          </a:ln>
+          <a:noFill/>
         </p:spPr>
         <p:txBody>
           <a:bodyPr vert="horz" lIns="91440" tIns="45720" rIns="91440" bIns="45720" rtlCol="0" anchor="ctr">
@@ -5840,157 +6410,22 @@
           <a:p>
             <a:pPr algn="ctr"/>
             <a:r>
-              <a:rPr lang="en-US" dirty="0">
+              <a:rPr lang="en-US" sz="5400" dirty="0">
+                <a:solidFill>
+                  <a:srgbClr val="4B83B5"/>
+                </a:solidFill>
                 <a:latin typeface="Palatino Linotype" panose="02040502050505030304" pitchFamily="18" charset="0"/>
                 <a:cs typeface="Segoe UI Light" panose="020B0502040204020203" pitchFamily="34" charset="0"/>
               </a:rPr>
-              <a:t>Summary</a:t>
-            </a:r>
-          </a:p>
-        </p:txBody>
-      </p:sp>
-      <p:sp>
-        <p:nvSpPr>
-          <p:cNvPr id="4" name="Content Placeholder 3">
-            <a:extLst>
-              <a:ext uri="{FF2B5EF4-FFF2-40B4-BE49-F238E27FC236}">
-                <a16:creationId xmlns:a16="http://schemas.microsoft.com/office/drawing/2014/main" id="{20414504-ECEC-4701-8B42-B13F0354C16C}"/>
-              </a:ext>
-            </a:extLst>
-          </p:cNvPr>
-          <p:cNvSpPr>
-            <a:spLocks noGrp="1"/>
-          </p:cNvSpPr>
-          <p:nvPr>
-            <p:ph sz="half" idx="1"/>
-          </p:nvPr>
-        </p:nvSpPr>
-        <p:spPr>
-          <a:xfrm>
-            <a:off x="838200" y="1364105"/>
-            <a:ext cx="10546582" cy="5046881"/>
-          </a:xfrm>
-        </p:spPr>
-        <p:txBody>
-          <a:bodyPr>
-            <a:normAutofit/>
-          </a:bodyPr>
-          <a:lstStyle/>
-          <a:p>
-            <a:pPr marL="0" indent="0">
-              <a:buNone/>
-            </a:pPr>
-            <a:r>
-              <a:rPr lang="en-US" sz="2400" i="1" dirty="0">
-                <a:latin typeface="Palatino Linotype" panose="02040502050505030304" pitchFamily="18" charset="0"/>
-              </a:rPr>
-              <a:t>      </a:t>
-            </a:r>
-          </a:p>
-          <a:p>
-            <a:pPr marL="0" indent="0">
-              <a:buNone/>
-            </a:pPr>
-            <a:endParaRPr lang="en-US" sz="2400" dirty="0">
-              <a:latin typeface="Palatino Linotype" panose="02040502050505030304" pitchFamily="18" charset="0"/>
-            </a:endParaRPr>
-          </a:p>
-          <a:p>
-            <a:pPr>
-              <a:lnSpc>
-                <a:spcPct val="100000"/>
-              </a:lnSpc>
-              <a:spcBef>
-                <a:spcPts val="0"/>
-              </a:spcBef>
-              <a:buFont typeface="Courier New" panose="02070309020205020404" pitchFamily="49" charset="0"/>
-              <a:buChar char="o"/>
-            </a:pPr>
-            <a:r>
-              <a:rPr lang="en-US" sz="2400" dirty="0">
-                <a:latin typeface="Palatino Linotype" panose="02040502050505030304" pitchFamily="18" charset="0"/>
-              </a:rPr>
-              <a:t> </a:t>
-            </a:r>
-          </a:p>
-          <a:p>
-            <a:pPr>
-              <a:lnSpc>
-                <a:spcPct val="100000"/>
-              </a:lnSpc>
-              <a:spcBef>
-                <a:spcPts val="0"/>
-              </a:spcBef>
-              <a:buFont typeface="Courier New" panose="02070309020205020404" pitchFamily="49" charset="0"/>
-              <a:buChar char="o"/>
-            </a:pPr>
-            <a:r>
-              <a:rPr lang="en-US" sz="2400" dirty="0">
-                <a:latin typeface="Palatino Linotype" panose="02040502050505030304" pitchFamily="18" charset="0"/>
-              </a:rPr>
-              <a:t> </a:t>
-            </a:r>
-          </a:p>
-          <a:p>
-            <a:pPr>
-              <a:lnSpc>
-                <a:spcPct val="100000"/>
-              </a:lnSpc>
-              <a:spcBef>
-                <a:spcPts val="0"/>
-              </a:spcBef>
-              <a:buFont typeface="Courier New" panose="02070309020205020404" pitchFamily="49" charset="0"/>
-              <a:buChar char="o"/>
-            </a:pPr>
-            <a:r>
-              <a:rPr lang="en-US" sz="2400" dirty="0">
-                <a:latin typeface="Palatino Linotype" panose="02040502050505030304" pitchFamily="18" charset="0"/>
-              </a:rPr>
-              <a:t> </a:t>
-            </a:r>
-          </a:p>
-          <a:p>
-            <a:pPr>
-              <a:lnSpc>
-                <a:spcPct val="100000"/>
-              </a:lnSpc>
-              <a:spcBef>
-                <a:spcPts val="0"/>
-              </a:spcBef>
-              <a:buFont typeface="Courier New" panose="02070309020205020404" pitchFamily="49" charset="0"/>
-              <a:buChar char="o"/>
-            </a:pPr>
-            <a:r>
-              <a:rPr lang="en-US" sz="2400" dirty="0">
-                <a:latin typeface="Palatino Linotype" panose="02040502050505030304" pitchFamily="18" charset="0"/>
-              </a:rPr>
-              <a:t> </a:t>
-            </a:r>
-            <a:endParaRPr lang="en-US" dirty="0">
-              <a:latin typeface="Palatino Linotype" panose="02040502050505030304" pitchFamily="18" charset="0"/>
-            </a:endParaRPr>
-          </a:p>
-          <a:p>
-            <a:pPr marL="0" indent="0">
-              <a:lnSpc>
-                <a:spcPct val="100000"/>
-              </a:lnSpc>
-              <a:spcBef>
-                <a:spcPts val="0"/>
-              </a:spcBef>
-              <a:buNone/>
-            </a:pPr>
-            <a:br>
-              <a:rPr lang="en-US" dirty="0"/>
-            </a:br>
-            <a:endParaRPr lang="en-US" dirty="0"/>
+              <a:t>kuki.ai</a:t>
+            </a:r>
           </a:p>
         </p:txBody>
       </p:sp>
     </p:spTree>
     <p:extLst>
       <p:ext uri="{BB962C8B-B14F-4D97-AF65-F5344CB8AC3E}">
-        <p14:creationId xmlns:p14="http://schemas.microsoft.com/office/powerpoint/2010/main" val="2018001033"/>
+        <p14:creationId xmlns:p14="http://schemas.microsoft.com/office/powerpoint/2010/main" val="1543091714"/>
       </p:ext>
     </p:extLst>
   </p:cSld>
@@ -5999,12 +6434,12 @@
   </p:clrMapOvr>
   <mc:AlternateContent xmlns:mc="http://schemas.openxmlformats.org/markup-compatibility/2006" xmlns:p14="http://schemas.microsoft.com/office/powerpoint/2010/main">
     <mc:Choice Requires="p14">
-      <p:transition spd="slow" p14:dur="3400">
-        <p14:reveal/>
+      <p:transition spd="med" p14:dur="700">
+        <p:fade/>
       </p:transition>
     </mc:Choice>
     <mc:Fallback xmlns="">
-      <p:transition spd="slow">
+      <p:transition spd="med">
         <p:fade/>
       </p:transition>
     </mc:Fallback>
@@ -6228,6 +6663,289 @@
     </mc:Choice>
     <mc:Fallback xmlns="">
       <p:transition spd="med">
+        <p:fade/>
+      </p:transition>
+    </mc:Fallback>
+  </mc:AlternateContent>
+</p:sld>
+</file>
+
+<file path=ppt/slides/slide15.xml><?xml version="1.0" encoding="utf-8"?>
+<p:sld xmlns:a="http://schemas.openxmlformats.org/drawingml/2006/main" xmlns:r="http://schemas.openxmlformats.org/officeDocument/2006/relationships" xmlns:p="http://schemas.openxmlformats.org/presentationml/2006/main">
+  <p:cSld>
+    <p:spTree>
+      <p:nvGrpSpPr>
+        <p:cNvPr id="1" name=""/>
+        <p:cNvGrpSpPr/>
+        <p:nvPr/>
+      </p:nvGrpSpPr>
+      <p:grpSpPr>
+        <a:xfrm>
+          <a:off x="0" y="0"/>
+          <a:ext cx="0" cy="0"/>
+          <a:chOff x="0" y="0"/>
+          <a:chExt cx="0" cy="0"/>
+        </a:xfrm>
+      </p:grpSpPr>
+    </p:spTree>
+    <p:extLst>
+      <p:ext uri="{BB962C8B-B14F-4D97-AF65-F5344CB8AC3E}">
+        <p14:creationId xmlns:p14="http://schemas.microsoft.com/office/powerpoint/2010/main" val="2417116910"/>
+      </p:ext>
+    </p:extLst>
+  </p:cSld>
+  <p:clrMapOvr>
+    <a:masterClrMapping/>
+  </p:clrMapOvr>
+  <mc:AlternateContent xmlns:mc="http://schemas.openxmlformats.org/markup-compatibility/2006" xmlns:p14="http://schemas.microsoft.com/office/powerpoint/2010/main">
+    <mc:Choice Requires="p14">
+      <p:transition spd="med" p14:dur="700">
+        <p:fade/>
+      </p:transition>
+    </mc:Choice>
+    <mc:Fallback xmlns="">
+      <p:transition spd="med">
+        <p:fade/>
+      </p:transition>
+    </mc:Fallback>
+  </mc:AlternateContent>
+</p:sld>
+</file>
+
+<file path=ppt/slides/slide16.xml><?xml version="1.0" encoding="utf-8"?>
+<p:sld xmlns:a="http://schemas.openxmlformats.org/drawingml/2006/main" xmlns:r="http://schemas.openxmlformats.org/officeDocument/2006/relationships" xmlns:p="http://schemas.openxmlformats.org/presentationml/2006/main">
+  <p:cSld>
+    <p:spTree>
+      <p:nvGrpSpPr>
+        <p:cNvPr id="1" name=""/>
+        <p:cNvGrpSpPr/>
+        <p:nvPr/>
+      </p:nvGrpSpPr>
+      <p:grpSpPr>
+        <a:xfrm>
+          <a:off x="0" y="0"/>
+          <a:ext cx="0" cy="0"/>
+          <a:chOff x="0" y="0"/>
+          <a:chExt cx="0" cy="0"/>
+        </a:xfrm>
+      </p:grpSpPr>
+      <p:sp>
+        <p:nvSpPr>
+          <p:cNvPr id="5" name="Title 1">
+            <a:extLst>
+              <a:ext uri="{FF2B5EF4-FFF2-40B4-BE49-F238E27FC236}">
+                <a16:creationId xmlns:a16="http://schemas.microsoft.com/office/drawing/2014/main" id="{8BABBCD2-7D2C-459F-9C42-17A2338F39A5}"/>
+              </a:ext>
+            </a:extLst>
+          </p:cNvPr>
+          <p:cNvSpPr txBox="1">
+            <a:spLocks/>
+          </p:cNvSpPr>
+          <p:nvPr/>
+        </p:nvSpPr>
+        <p:spPr>
+          <a:xfrm>
+            <a:off x="518616" y="447014"/>
+            <a:ext cx="11054686" cy="767638"/>
+          </a:xfrm>
+          <a:prstGeom prst="rect">
+            <a:avLst/>
+          </a:prstGeom>
+          <a:ln>
+            <a:noFill/>
+          </a:ln>
+        </p:spPr>
+        <p:txBody>
+          <a:bodyPr vert="horz" lIns="91440" tIns="45720" rIns="91440" bIns="45720" rtlCol="0" anchor="ctr">
+            <a:normAutofit/>
+          </a:bodyPr>
+          <a:lstStyle>
+            <a:lvl1pPr algn="l" defTabSz="914400" rtl="0" eaLnBrk="1" latinLnBrk="0" hangingPunct="1">
+              <a:lnSpc>
+                <a:spcPct val="90000"/>
+              </a:lnSpc>
+              <a:spcBef>
+                <a:spcPct val="0"/>
+              </a:spcBef>
+              <a:buNone/>
+              <a:defRPr sz="4400" kern="1200">
+                <a:solidFill>
+                  <a:schemeClr val="tx1"/>
+                </a:solidFill>
+                <a:latin typeface="+mj-lt"/>
+                <a:ea typeface="+mj-ea"/>
+                <a:cs typeface="+mj-cs"/>
+              </a:defRPr>
+            </a:lvl1pPr>
+          </a:lstStyle>
+          <a:p>
+            <a:pPr algn="ctr"/>
+            <a:r>
+              <a:rPr lang="en-US" dirty="0">
+                <a:latin typeface="Palatino Linotype" panose="02040502050505030304" pitchFamily="18" charset="0"/>
+                <a:cs typeface="Segoe UI Light" panose="020B0502040204020203" pitchFamily="34" charset="0"/>
+              </a:rPr>
+              <a:t>Summary</a:t>
+            </a:r>
+          </a:p>
+        </p:txBody>
+      </p:sp>
+      <p:sp>
+        <p:nvSpPr>
+          <p:cNvPr id="4" name="Content Placeholder 3">
+            <a:extLst>
+              <a:ext uri="{FF2B5EF4-FFF2-40B4-BE49-F238E27FC236}">
+                <a16:creationId xmlns:a16="http://schemas.microsoft.com/office/drawing/2014/main" id="{20414504-ECEC-4701-8B42-B13F0354C16C}"/>
+              </a:ext>
+            </a:extLst>
+          </p:cNvPr>
+          <p:cNvSpPr>
+            <a:spLocks noGrp="1"/>
+          </p:cNvSpPr>
+          <p:nvPr>
+            <p:ph sz="half" idx="1"/>
+          </p:nvPr>
+        </p:nvSpPr>
+        <p:spPr>
+          <a:xfrm>
+            <a:off x="838200" y="1364105"/>
+            <a:ext cx="10546582" cy="5046881"/>
+          </a:xfrm>
+        </p:spPr>
+        <p:txBody>
+          <a:bodyPr>
+            <a:normAutofit/>
+          </a:bodyPr>
+          <a:lstStyle/>
+          <a:p>
+            <a:pPr marL="0" indent="0">
+              <a:buNone/>
+            </a:pPr>
+            <a:r>
+              <a:rPr lang="en-US" sz="2400" i="1" dirty="0">
+                <a:latin typeface="Palatino Linotype" panose="02040502050505030304" pitchFamily="18" charset="0"/>
+              </a:rPr>
+              <a:t>      </a:t>
+            </a:r>
+          </a:p>
+          <a:p>
+            <a:pPr marL="0" indent="0">
+              <a:buNone/>
+            </a:pPr>
+            <a:endParaRPr lang="en-US" sz="2400" dirty="0">
+              <a:latin typeface="Palatino Linotype" panose="02040502050505030304" pitchFamily="18" charset="0"/>
+            </a:endParaRPr>
+          </a:p>
+          <a:p>
+            <a:pPr>
+              <a:lnSpc>
+                <a:spcPct val="100000"/>
+              </a:lnSpc>
+              <a:spcBef>
+                <a:spcPts val="0"/>
+              </a:spcBef>
+              <a:buFont typeface="Courier New" panose="02070309020205020404" pitchFamily="49" charset="0"/>
+              <a:buChar char="o"/>
+            </a:pPr>
+            <a:r>
+              <a:rPr lang="en-US" sz="2400" dirty="0">
+                <a:latin typeface="Palatino Linotype" panose="02040502050505030304" pitchFamily="18" charset="0"/>
+              </a:rPr>
+              <a:t> </a:t>
+            </a:r>
+          </a:p>
+          <a:p>
+            <a:pPr>
+              <a:lnSpc>
+                <a:spcPct val="100000"/>
+              </a:lnSpc>
+              <a:spcBef>
+                <a:spcPts val="0"/>
+              </a:spcBef>
+              <a:buFont typeface="Courier New" panose="02070309020205020404" pitchFamily="49" charset="0"/>
+              <a:buChar char="o"/>
+            </a:pPr>
+            <a:r>
+              <a:rPr lang="en-US" sz="2400" dirty="0">
+                <a:latin typeface="Palatino Linotype" panose="02040502050505030304" pitchFamily="18" charset="0"/>
+              </a:rPr>
+              <a:t> </a:t>
+            </a:r>
+          </a:p>
+          <a:p>
+            <a:pPr>
+              <a:lnSpc>
+                <a:spcPct val="100000"/>
+              </a:lnSpc>
+              <a:spcBef>
+                <a:spcPts val="0"/>
+              </a:spcBef>
+              <a:buFont typeface="Courier New" panose="02070309020205020404" pitchFamily="49" charset="0"/>
+              <a:buChar char="o"/>
+            </a:pPr>
+            <a:r>
+              <a:rPr lang="en-US" sz="2400" dirty="0">
+                <a:latin typeface="Palatino Linotype" panose="02040502050505030304" pitchFamily="18" charset="0"/>
+              </a:rPr>
+              <a:t> </a:t>
+            </a:r>
+          </a:p>
+          <a:p>
+            <a:pPr>
+              <a:lnSpc>
+                <a:spcPct val="100000"/>
+              </a:lnSpc>
+              <a:spcBef>
+                <a:spcPts val="0"/>
+              </a:spcBef>
+              <a:buFont typeface="Courier New" panose="02070309020205020404" pitchFamily="49" charset="0"/>
+              <a:buChar char="o"/>
+            </a:pPr>
+            <a:r>
+              <a:rPr lang="en-US" sz="2400" dirty="0">
+                <a:latin typeface="Palatino Linotype" panose="02040502050505030304" pitchFamily="18" charset="0"/>
+              </a:rPr>
+              <a:t> </a:t>
+            </a:r>
+            <a:endParaRPr lang="en-US" dirty="0">
+              <a:latin typeface="Palatino Linotype" panose="02040502050505030304" pitchFamily="18" charset="0"/>
+            </a:endParaRPr>
+          </a:p>
+          <a:p>
+            <a:pPr marL="0" indent="0">
+              <a:lnSpc>
+                <a:spcPct val="100000"/>
+              </a:lnSpc>
+              <a:spcBef>
+                <a:spcPts val="0"/>
+              </a:spcBef>
+              <a:buNone/>
+            </a:pPr>
+            <a:br>
+              <a:rPr lang="en-US" dirty="0"/>
+            </a:br>
+            <a:endParaRPr lang="en-US" dirty="0"/>
+          </a:p>
+        </p:txBody>
+      </p:sp>
+    </p:spTree>
+    <p:extLst>
+      <p:ext uri="{BB962C8B-B14F-4D97-AF65-F5344CB8AC3E}">
+        <p14:creationId xmlns:p14="http://schemas.microsoft.com/office/powerpoint/2010/main" val="2018001033"/>
+      </p:ext>
+    </p:extLst>
+  </p:cSld>
+  <p:clrMapOvr>
+    <a:masterClrMapping/>
+  </p:clrMapOvr>
+  <mc:AlternateContent xmlns:mc="http://schemas.openxmlformats.org/markup-compatibility/2006" xmlns:p14="http://schemas.microsoft.com/office/powerpoint/2010/main">
+    <mc:Choice Requires="p14">
+      <p:transition spd="slow" p14:dur="3400">
+        <p14:reveal/>
+      </p:transition>
+    </mc:Choice>
+    <mc:Fallback xmlns="">
+      <p:transition spd="slow">
         <p:fade/>
       </p:transition>
     </mc:Fallback>
@@ -7446,238 +8164,80 @@
       </p:grpSpPr>
       <p:sp>
         <p:nvSpPr>
-          <p:cNvPr id="5" name="TextBox 4">
+          <p:cNvPr id="3" name="Text Placeholder 2">
             <a:extLst>
               <a:ext uri="{FF2B5EF4-FFF2-40B4-BE49-F238E27FC236}">
-                <a16:creationId xmlns:a16="http://schemas.microsoft.com/office/drawing/2014/main" id="{202BF5D3-E0FE-421D-887E-591AC19A8449}"/>
+                <a16:creationId xmlns:a16="http://schemas.microsoft.com/office/drawing/2014/main" id="{098BC2D2-CCF7-4C63-8489-B46BF394FCA2}"/>
               </a:ext>
             </a:extLst>
           </p:cNvPr>
-          <p:cNvSpPr txBox="1"/>
-          <p:nvPr/>
+          <p:cNvSpPr>
+            <a:spLocks noGrp="1"/>
+          </p:cNvSpPr>
+          <p:nvPr>
+            <p:ph type="body" idx="1"/>
+          </p:nvPr>
         </p:nvSpPr>
         <p:spPr>
           <a:xfrm>
-            <a:off x="1050878" y="1267716"/>
-            <a:ext cx="9976513" cy="3857466"/>
+            <a:off x="831850" y="3429000"/>
+            <a:ext cx="10515600" cy="2660652"/>
+          </a:xfrm>
+        </p:spPr>
+        <p:txBody>
+          <a:bodyPr/>
+          <a:lstStyle/>
+          <a:p>
+            <a:r>
+              <a:rPr lang="en-US" dirty="0">
+                <a:latin typeface="Palatino Linotype" panose="02040502050505030304" pitchFamily="18" charset="0"/>
+                <a:cs typeface="Segoe UI" panose="020B0502040204020203" pitchFamily="34" charset="0"/>
+              </a:rPr>
+              <a:t>What is AI – Part II</a:t>
+            </a:r>
+          </a:p>
+        </p:txBody>
+      </p:sp>
+      <p:pic>
+        <p:nvPicPr>
+          <p:cNvPr id="6" name="Picture 5">
+            <a:extLst>
+              <a:ext uri="{FF2B5EF4-FFF2-40B4-BE49-F238E27FC236}">
+                <a16:creationId xmlns:a16="http://schemas.microsoft.com/office/drawing/2014/main" id="{AF5DD71E-701E-41F4-A039-59B7E93974CA}"/>
+              </a:ext>
+            </a:extLst>
+          </p:cNvPr>
+          <p:cNvPicPr>
+            <a:picLocks noChangeAspect="1"/>
+          </p:cNvPicPr>
+          <p:nvPr/>
+        </p:nvPicPr>
+        <p:blipFill>
+          <a:blip r:embed="rId3">
+            <a:extLst>
+              <a:ext uri="{28A0092B-C50C-407E-A947-70E740481C1C}">
+                <a14:useLocalDpi xmlns:a14="http://schemas.microsoft.com/office/drawing/2010/main" val="0"/>
+              </a:ext>
+            </a:extLst>
+          </a:blip>
+          <a:stretch>
+            <a:fillRect/>
+          </a:stretch>
+        </p:blipFill>
+        <p:spPr>
+          <a:xfrm>
+            <a:off x="844550" y="2219814"/>
+            <a:ext cx="4606424" cy="1209186"/>
           </a:xfrm>
           <a:prstGeom prst="rect">
             <a:avLst/>
           </a:prstGeom>
-          <a:noFill/>
         </p:spPr>
-        <p:txBody>
-          <a:bodyPr wrap="square">
-            <a:spAutoFit/>
-          </a:bodyPr>
-          <a:lstStyle/>
-          <a:p>
-            <a:pPr marL="0" marR="0" lvl="0" indent="0" algn="l" hangingPunct="0">
-              <a:lnSpc>
-                <a:spcPct val="100000"/>
-              </a:lnSpc>
-              <a:spcBef>
-                <a:spcPts val="0"/>
-              </a:spcBef>
-              <a:spcAft>
-                <a:spcPts val="1440"/>
-              </a:spcAft>
-              <a:buSzPct val="45000"/>
-              <a:tabLst/>
-            </a:pPr>
-            <a:r>
-              <a:rPr lang="en-US" sz="1800" b="1" i="0" u="none" strike="noStrike" kern="1200" cap="none" dirty="0">
-                <a:ln>
-                  <a:noFill/>
-                </a:ln>
-                <a:solidFill>
-                  <a:srgbClr val="4B83B5"/>
-                </a:solidFill>
-                <a:latin typeface="Arial" pitchFamily="34"/>
-                <a:ea typeface="Arial" pitchFamily="34"/>
-                <a:cs typeface="Arial" pitchFamily="34"/>
-              </a:rPr>
-              <a:t>John McCarthy</a:t>
-            </a:r>
-            <a:r>
-              <a:rPr lang="en-US" sz="1800" b="0" i="0" u="none" strike="noStrike" kern="1200" cap="none" dirty="0">
-                <a:ln>
-                  <a:noFill/>
-                </a:ln>
-                <a:solidFill>
-                  <a:srgbClr val="4B83B5"/>
-                </a:solidFill>
-                <a:latin typeface="Arial" pitchFamily="34"/>
-                <a:ea typeface="Arial" pitchFamily="34"/>
-                <a:cs typeface="Arial" pitchFamily="34"/>
-              </a:rPr>
-              <a:t> </a:t>
-            </a:r>
-            <a:r>
-              <a:rPr lang="en-US" sz="1800" b="0" i="0" u="none" strike="noStrike" kern="1200" cap="none" dirty="0">
-                <a:ln>
-                  <a:noFill/>
-                </a:ln>
-                <a:latin typeface="Arial" pitchFamily="34"/>
-                <a:ea typeface="Arial" pitchFamily="34"/>
-                <a:cs typeface="Arial" pitchFamily="34"/>
-              </a:rPr>
-              <a:t>(2007): “It is the science and engineering of making intelligent machines, especially intelligent computer programs.” “The ultimate effort is to make computer programs that can solve problems and achieve goals in the world as well as humans.”</a:t>
-            </a:r>
-          </a:p>
-          <a:p>
-            <a:pPr marL="0" marR="0" lvl="0" indent="0" algn="l" hangingPunct="0">
-              <a:lnSpc>
-                <a:spcPct val="100000"/>
-              </a:lnSpc>
-              <a:spcBef>
-                <a:spcPts val="0"/>
-              </a:spcBef>
-              <a:spcAft>
-                <a:spcPts val="1440"/>
-              </a:spcAft>
-              <a:buSzPct val="45000"/>
-              <a:tabLst/>
-            </a:pPr>
-            <a:endParaRPr lang="en-US" sz="1800" b="0" i="0" u="none" strike="noStrike" kern="1200" cap="none" dirty="0">
-              <a:ln>
-                <a:noFill/>
-              </a:ln>
-              <a:latin typeface="Arial" pitchFamily="34"/>
-              <a:ea typeface="Arial" pitchFamily="34"/>
-              <a:cs typeface="Arial" pitchFamily="34"/>
-            </a:endParaRPr>
-          </a:p>
-          <a:p>
-            <a:pPr marL="0" marR="0" lvl="0" indent="0" algn="l" hangingPunct="0">
-              <a:lnSpc>
-                <a:spcPct val="100000"/>
-              </a:lnSpc>
-              <a:spcBef>
-                <a:spcPts val="0"/>
-              </a:spcBef>
-              <a:spcAft>
-                <a:spcPts val="1440"/>
-              </a:spcAft>
-              <a:buSzPct val="45000"/>
-              <a:tabLst/>
-            </a:pPr>
-            <a:r>
-              <a:rPr lang="en-US" sz="1800" b="1" i="0" u="none" strike="noStrike" kern="1200" cap="none" dirty="0">
-                <a:ln>
-                  <a:noFill/>
-                </a:ln>
-                <a:solidFill>
-                  <a:srgbClr val="4B83B5"/>
-                </a:solidFill>
-                <a:latin typeface="Arial" pitchFamily="34"/>
-                <a:ea typeface="Arial" pitchFamily="34"/>
-                <a:cs typeface="Arial" pitchFamily="34"/>
-              </a:rPr>
-              <a:t>Wallace Marshall</a:t>
-            </a:r>
-            <a:r>
-              <a:rPr lang="en-US" sz="1800" b="0" i="0" u="none" strike="noStrike" kern="1200" cap="none" dirty="0">
-                <a:ln>
-                  <a:noFill/>
-                </a:ln>
-                <a:solidFill>
-                  <a:srgbClr val="4B83B5"/>
-                </a:solidFill>
-                <a:latin typeface="Arial" pitchFamily="34"/>
-                <a:ea typeface="Arial" pitchFamily="34"/>
-                <a:cs typeface="Arial" pitchFamily="34"/>
-              </a:rPr>
-              <a:t> </a:t>
-            </a:r>
-            <a:r>
-              <a:rPr lang="en-US" sz="1800" b="0" i="0" u="none" strike="noStrike" kern="1200" cap="none" dirty="0">
-                <a:ln>
-                  <a:noFill/>
-                </a:ln>
-                <a:latin typeface="Arial" pitchFamily="34"/>
-                <a:ea typeface="Arial" pitchFamily="34"/>
-                <a:cs typeface="Arial" pitchFamily="34"/>
-              </a:rPr>
-              <a:t>(1987): “Artificial stupidity (AS) may be defined as the attempt by computer scientists to create computer programs capable of causing problems of a type normally associated with human thought.”</a:t>
-            </a:r>
-          </a:p>
-          <a:p>
-            <a:pPr marL="0" marR="0" lvl="0" indent="0" algn="l" hangingPunct="0">
-              <a:lnSpc>
-                <a:spcPct val="100000"/>
-              </a:lnSpc>
-              <a:spcBef>
-                <a:spcPts val="0"/>
-              </a:spcBef>
-              <a:spcAft>
-                <a:spcPts val="1440"/>
-              </a:spcAft>
-              <a:buSzPct val="45000"/>
-              <a:tabLst/>
-            </a:pPr>
-            <a:endParaRPr lang="en-US" sz="1800" b="0" i="0" u="none" strike="noStrike" kern="1200" cap="none" dirty="0">
-              <a:ln>
-                <a:noFill/>
-              </a:ln>
-              <a:latin typeface="Arial" pitchFamily="34"/>
-              <a:ea typeface="Arial" pitchFamily="34"/>
-              <a:cs typeface="Arial" pitchFamily="34"/>
-            </a:endParaRPr>
-          </a:p>
-          <a:p>
-            <a:pPr hangingPunct="0">
-              <a:spcAft>
-                <a:spcPts val="1440"/>
-              </a:spcAft>
-              <a:buSzPct val="45000"/>
-            </a:pPr>
-            <a:r>
-              <a:rPr lang="en-US" sz="1800" b="1" i="0" u="none" strike="noStrike" kern="1200" cap="none" dirty="0">
-                <a:ln>
-                  <a:noFill/>
-                </a:ln>
-                <a:solidFill>
-                  <a:srgbClr val="4B83B5"/>
-                </a:solidFill>
-                <a:latin typeface="Arial" pitchFamily="34"/>
-                <a:ea typeface="Arial" pitchFamily="34"/>
-                <a:cs typeface="Arial" pitchFamily="34"/>
-              </a:rPr>
-              <a:t>Dartmouth Proposal</a:t>
-            </a:r>
-            <a:r>
-              <a:rPr lang="en-US" sz="1800" b="0" i="0" u="none" strike="noStrike" kern="1200" cap="none" dirty="0">
-                <a:ln>
-                  <a:noFill/>
-                </a:ln>
-                <a:solidFill>
-                  <a:srgbClr val="4B83B5"/>
-                </a:solidFill>
-                <a:latin typeface="Arial" pitchFamily="34"/>
-                <a:ea typeface="Arial" pitchFamily="34"/>
-                <a:cs typeface="Arial" pitchFamily="34"/>
-              </a:rPr>
-              <a:t> </a:t>
-            </a:r>
-            <a:r>
-              <a:rPr lang="en-US" sz="1800" b="0" i="0" u="none" strike="noStrike" kern="1200" cap="none" dirty="0">
-                <a:ln>
-                  <a:noFill/>
-                </a:ln>
-                <a:latin typeface="Arial" pitchFamily="34"/>
-                <a:ea typeface="Arial" pitchFamily="34"/>
-                <a:cs typeface="Arial" pitchFamily="34"/>
-              </a:rPr>
-              <a:t>(McCarthy et al. 1955): “The study is to proceed on the basis of the conjecture that every aspect of learning or any other feature of intelligence can in principle be so precisely described that a machine can be made to simulate it.”</a:t>
-            </a:r>
-          </a:p>
-        </p:txBody>
-      </p:sp>
+      </p:pic>
     </p:spTree>
     <p:extLst>
       <p:ext uri="{BB962C8B-B14F-4D97-AF65-F5344CB8AC3E}">
-        <p14:creationId xmlns:p14="http://schemas.microsoft.com/office/powerpoint/2010/main" val="55415511"/>
+        <p14:creationId xmlns:p14="http://schemas.microsoft.com/office/powerpoint/2010/main" val="3183367864"/>
       </p:ext>
     </p:extLst>
   </p:cSld>
@@ -8458,6 +9018,304 @@
         </p:nvSpPr>
         <p:spPr>
           <a:xfrm>
+            <a:off x="1050878" y="1267716"/>
+            <a:ext cx="9976513" cy="4314001"/>
+          </a:xfrm>
+          <a:prstGeom prst="rect">
+            <a:avLst/>
+          </a:prstGeom>
+          <a:noFill/>
+        </p:spPr>
+        <p:txBody>
+          <a:bodyPr wrap="square">
+            <a:spAutoFit/>
+          </a:bodyPr>
+          <a:lstStyle/>
+          <a:p>
+            <a:pPr hangingPunct="0">
+              <a:spcAft>
+                <a:spcPts val="1440"/>
+              </a:spcAft>
+              <a:buSzPct val="45000"/>
+            </a:pPr>
+            <a:r>
+              <a:rPr lang="en-US" sz="1800" b="1" i="0" u="none" strike="noStrike" kern="1200" cap="none" dirty="0">
+                <a:ln>
+                  <a:noFill/>
+                </a:ln>
+                <a:solidFill>
+                  <a:srgbClr val="4B83B5"/>
+                </a:solidFill>
+                <a:latin typeface="Arial" pitchFamily="34"/>
+                <a:ea typeface="Arial" pitchFamily="34"/>
+                <a:cs typeface="Arial" pitchFamily="34"/>
+              </a:rPr>
+              <a:t>Dartmouth Proposal</a:t>
+            </a:r>
+            <a:r>
+              <a:rPr lang="en-US" sz="1800" b="0" i="0" u="none" strike="noStrike" kern="1200" cap="none" dirty="0">
+                <a:ln>
+                  <a:noFill/>
+                </a:ln>
+                <a:solidFill>
+                  <a:srgbClr val="4B83B5"/>
+                </a:solidFill>
+                <a:latin typeface="Arial" pitchFamily="34"/>
+                <a:ea typeface="Arial" pitchFamily="34"/>
+                <a:cs typeface="Arial" pitchFamily="34"/>
+              </a:rPr>
+              <a:t> </a:t>
+            </a:r>
+            <a:r>
+              <a:rPr lang="en-US" sz="1800" b="0" i="0" u="none" strike="noStrike" kern="1200" cap="none" dirty="0">
+                <a:ln>
+                  <a:noFill/>
+                </a:ln>
+                <a:latin typeface="Arial" pitchFamily="34"/>
+                <a:ea typeface="Arial" pitchFamily="34"/>
+                <a:cs typeface="Arial" pitchFamily="34"/>
+              </a:rPr>
+              <a:t>(McCarthy et al. 1955): “The study is to proceed on the basis of the conjecture that every aspect of learning or any other feature of intelligence can in principle be so precisely described that a machine can be made to simulate it.”</a:t>
+            </a:r>
+          </a:p>
+          <a:p>
+            <a:pPr marL="0" marR="0" lvl="0" indent="0" algn="l" hangingPunct="0">
+              <a:lnSpc>
+                <a:spcPct val="100000"/>
+              </a:lnSpc>
+              <a:spcBef>
+                <a:spcPts val="0"/>
+              </a:spcBef>
+              <a:spcAft>
+                <a:spcPts val="1440"/>
+              </a:spcAft>
+              <a:buSzPct val="45000"/>
+              <a:tabLst/>
+            </a:pPr>
+            <a:endParaRPr lang="en-US" sz="1800" b="1" i="0" u="none" strike="noStrike" kern="1200" cap="none" dirty="0">
+              <a:ln>
+                <a:noFill/>
+              </a:ln>
+              <a:solidFill>
+                <a:srgbClr val="4B83B5"/>
+              </a:solidFill>
+              <a:latin typeface="Arial" pitchFamily="34"/>
+              <a:ea typeface="Arial" pitchFamily="34"/>
+              <a:cs typeface="Arial" pitchFamily="34"/>
+            </a:endParaRPr>
+          </a:p>
+          <a:p>
+            <a:pPr marL="0" marR="0" lvl="0" indent="0" algn="l" hangingPunct="0">
+              <a:lnSpc>
+                <a:spcPct val="100000"/>
+              </a:lnSpc>
+              <a:spcBef>
+                <a:spcPts val="0"/>
+              </a:spcBef>
+              <a:spcAft>
+                <a:spcPts val="1440"/>
+              </a:spcAft>
+              <a:buSzPct val="45000"/>
+              <a:tabLst/>
+            </a:pPr>
+            <a:r>
+              <a:rPr lang="en-US" sz="1800" b="1" i="0" u="none" strike="noStrike" kern="1200" cap="none" dirty="0">
+                <a:ln>
+                  <a:noFill/>
+                </a:ln>
+                <a:solidFill>
+                  <a:srgbClr val="4B83B5"/>
+                </a:solidFill>
+                <a:latin typeface="Arial" pitchFamily="34"/>
+                <a:ea typeface="Arial" pitchFamily="34"/>
+                <a:cs typeface="Arial" pitchFamily="34"/>
+              </a:rPr>
+              <a:t>John McCarthy</a:t>
+            </a:r>
+            <a:r>
+              <a:rPr lang="en-US" sz="1800" b="0" i="0" u="none" strike="noStrike" kern="1200" cap="none" dirty="0">
+                <a:ln>
+                  <a:noFill/>
+                </a:ln>
+                <a:solidFill>
+                  <a:srgbClr val="4B83B5"/>
+                </a:solidFill>
+                <a:latin typeface="Arial" pitchFamily="34"/>
+                <a:ea typeface="Arial" pitchFamily="34"/>
+                <a:cs typeface="Arial" pitchFamily="34"/>
+              </a:rPr>
+              <a:t> </a:t>
+            </a:r>
+            <a:r>
+              <a:rPr lang="en-US" sz="1800" b="0" i="0" u="none" strike="noStrike" kern="1200" cap="none" dirty="0">
+                <a:ln>
+                  <a:noFill/>
+                </a:ln>
+                <a:latin typeface="Arial" pitchFamily="34"/>
+                <a:ea typeface="Arial" pitchFamily="34"/>
+                <a:cs typeface="Arial" pitchFamily="34"/>
+              </a:rPr>
+              <a:t>(2007): “It is the science and engineering of making intelligent machines, especially intelligent computer programs.” “The ultimate effort is to make computer programs that can solve problems and achieve goals in the world as well as humans.”</a:t>
+            </a:r>
+          </a:p>
+          <a:p>
+            <a:pPr marL="0" marR="0" lvl="0" indent="0" algn="l" hangingPunct="0">
+              <a:lnSpc>
+                <a:spcPct val="100000"/>
+              </a:lnSpc>
+              <a:spcBef>
+                <a:spcPts val="0"/>
+              </a:spcBef>
+              <a:spcAft>
+                <a:spcPts val="1440"/>
+              </a:spcAft>
+              <a:buSzPct val="45000"/>
+              <a:tabLst/>
+            </a:pPr>
+            <a:endParaRPr lang="en-US" sz="1800" b="0" i="0" u="none" strike="noStrike" kern="1200" cap="none" dirty="0">
+              <a:ln>
+                <a:noFill/>
+              </a:ln>
+              <a:latin typeface="Arial" pitchFamily="34"/>
+              <a:ea typeface="Arial" pitchFamily="34"/>
+              <a:cs typeface="Arial" pitchFamily="34"/>
+            </a:endParaRPr>
+          </a:p>
+          <a:p>
+            <a:pPr marL="0" marR="0" lvl="0" indent="0" algn="l" hangingPunct="0">
+              <a:lnSpc>
+                <a:spcPct val="100000"/>
+              </a:lnSpc>
+              <a:spcBef>
+                <a:spcPts val="0"/>
+              </a:spcBef>
+              <a:spcAft>
+                <a:spcPts val="1440"/>
+              </a:spcAft>
+              <a:buSzPct val="45000"/>
+              <a:tabLst/>
+            </a:pPr>
+            <a:r>
+              <a:rPr lang="en-US" sz="1800" b="1" i="0" u="none" strike="noStrike" kern="1200" cap="none" dirty="0">
+                <a:ln>
+                  <a:noFill/>
+                </a:ln>
+                <a:solidFill>
+                  <a:srgbClr val="4B83B5"/>
+                </a:solidFill>
+                <a:latin typeface="Arial" pitchFamily="34"/>
+                <a:ea typeface="Arial" pitchFamily="34"/>
+                <a:cs typeface="Arial" pitchFamily="34"/>
+              </a:rPr>
+              <a:t>Wallace Marshall</a:t>
+            </a:r>
+            <a:r>
+              <a:rPr lang="en-US" sz="1800" b="0" i="0" u="none" strike="noStrike" kern="1200" cap="none" dirty="0">
+                <a:ln>
+                  <a:noFill/>
+                </a:ln>
+                <a:solidFill>
+                  <a:srgbClr val="4B83B5"/>
+                </a:solidFill>
+                <a:latin typeface="Arial" pitchFamily="34"/>
+                <a:ea typeface="Arial" pitchFamily="34"/>
+                <a:cs typeface="Arial" pitchFamily="34"/>
+              </a:rPr>
+              <a:t> </a:t>
+            </a:r>
+            <a:r>
+              <a:rPr lang="en-US" sz="1800" b="0" i="0" u="none" strike="noStrike" kern="1200" cap="none" dirty="0">
+                <a:ln>
+                  <a:noFill/>
+                </a:ln>
+                <a:latin typeface="Arial" pitchFamily="34"/>
+                <a:ea typeface="Arial" pitchFamily="34"/>
+                <a:cs typeface="Arial" pitchFamily="34"/>
+              </a:rPr>
+              <a:t>(1987): “Artificial stupidity (AS) may be defined as the attempt by computer scientists to create computer programs capable of causing problems of a type normally associated with human thought.”</a:t>
+            </a:r>
+          </a:p>
+          <a:p>
+            <a:pPr marL="0" marR="0" lvl="0" indent="0" algn="l" hangingPunct="0">
+              <a:lnSpc>
+                <a:spcPct val="100000"/>
+              </a:lnSpc>
+              <a:spcBef>
+                <a:spcPts val="0"/>
+              </a:spcBef>
+              <a:spcAft>
+                <a:spcPts val="1440"/>
+              </a:spcAft>
+              <a:buSzPct val="45000"/>
+              <a:tabLst/>
+            </a:pPr>
+            <a:endParaRPr lang="en-US" sz="1800" b="0" i="0" u="none" strike="noStrike" kern="1200" cap="none" dirty="0">
+              <a:ln>
+                <a:noFill/>
+              </a:ln>
+              <a:latin typeface="Arial" pitchFamily="34"/>
+              <a:ea typeface="Arial" pitchFamily="34"/>
+              <a:cs typeface="Arial" pitchFamily="34"/>
+            </a:endParaRPr>
+          </a:p>
+        </p:txBody>
+      </p:sp>
+    </p:spTree>
+    <p:extLst>
+      <p:ext uri="{BB962C8B-B14F-4D97-AF65-F5344CB8AC3E}">
+        <p14:creationId xmlns:p14="http://schemas.microsoft.com/office/powerpoint/2010/main" val="55415511"/>
+      </p:ext>
+    </p:extLst>
+  </p:cSld>
+  <p:clrMapOvr>
+    <a:masterClrMapping/>
+  </p:clrMapOvr>
+  <mc:AlternateContent xmlns:mc="http://schemas.openxmlformats.org/markup-compatibility/2006" xmlns:p14="http://schemas.microsoft.com/office/powerpoint/2010/main">
+    <mc:Choice Requires="p14">
+      <p:transition spd="slow" p14:dur="3400">
+        <p14:reveal/>
+      </p:transition>
+    </mc:Choice>
+    <mc:Fallback xmlns="">
+      <p:transition spd="slow">
+        <p:fade/>
+      </p:transition>
+    </mc:Fallback>
+  </mc:AlternateContent>
+</p:sld>
+</file>
+
+<file path=ppt/slides/slide8.xml><?xml version="1.0" encoding="utf-8"?>
+<p:sld xmlns:a="http://schemas.openxmlformats.org/drawingml/2006/main" xmlns:r="http://schemas.openxmlformats.org/officeDocument/2006/relationships" xmlns:p="http://schemas.openxmlformats.org/presentationml/2006/main">
+  <p:cSld>
+    <p:spTree>
+      <p:nvGrpSpPr>
+        <p:cNvPr id="1" name=""/>
+        <p:cNvGrpSpPr/>
+        <p:nvPr/>
+      </p:nvGrpSpPr>
+      <p:grpSpPr>
+        <a:xfrm>
+          <a:off x="0" y="0"/>
+          <a:ext cx="0" cy="0"/>
+          <a:chOff x="0" y="0"/>
+          <a:chExt cx="0" cy="0"/>
+        </a:xfrm>
+      </p:grpSpPr>
+      <p:sp>
+        <p:nvSpPr>
+          <p:cNvPr id="5" name="TextBox 4">
+            <a:extLst>
+              <a:ext uri="{FF2B5EF4-FFF2-40B4-BE49-F238E27FC236}">
+                <a16:creationId xmlns:a16="http://schemas.microsoft.com/office/drawing/2014/main" id="{202BF5D3-E0FE-421D-887E-591AC19A8449}"/>
+              </a:ext>
+            </a:extLst>
+          </p:cNvPr>
+          <p:cNvSpPr txBox="1"/>
+          <p:nvPr/>
+        </p:nvSpPr>
+        <p:spPr>
+          <a:xfrm>
             <a:off x="1107743" y="905232"/>
             <a:ext cx="9976513" cy="5047536"/>
           </a:xfrm>
@@ -8805,7 +9663,7 @@
 </p:sld>
 </file>
 
-<file path=ppt/slides/slide8.xml><?xml version="1.0" encoding="utf-8"?>
+<file path=ppt/slides/slide9.xml><?xml version="1.0" encoding="utf-8"?>
 <p:sld xmlns:a="http://schemas.openxmlformats.org/drawingml/2006/main" xmlns:r="http://schemas.openxmlformats.org/officeDocument/2006/relationships" xmlns:p="http://schemas.openxmlformats.org/presentationml/2006/main">
   <p:cSld>
     <p:spTree>
@@ -8932,108 +9790,6 @@
     </mc:Choice>
     <mc:Fallback xmlns="">
       <p:transition spd="slow">
-        <p:fade/>
-      </p:transition>
-    </mc:Fallback>
-  </mc:AlternateContent>
-</p:sld>
-</file>
-
-<file path=ppt/slides/slide9.xml><?xml version="1.0" encoding="utf-8"?>
-<p:sld xmlns:a="http://schemas.openxmlformats.org/drawingml/2006/main" xmlns:r="http://schemas.openxmlformats.org/officeDocument/2006/relationships" xmlns:p="http://schemas.openxmlformats.org/presentationml/2006/main">
-  <p:cSld>
-    <p:spTree>
-      <p:nvGrpSpPr>
-        <p:cNvPr id="1" name=""/>
-        <p:cNvGrpSpPr/>
-        <p:nvPr/>
-      </p:nvGrpSpPr>
-      <p:grpSpPr>
-        <a:xfrm>
-          <a:off x="0" y="0"/>
-          <a:ext cx="0" cy="0"/>
-          <a:chOff x="0" y="0"/>
-          <a:chExt cx="0" cy="0"/>
-        </a:xfrm>
-      </p:grpSpPr>
-      <p:pic>
-        <p:nvPicPr>
-          <p:cNvPr id="6" name="Content Placeholder 5">
-            <a:extLst>
-              <a:ext uri="{FF2B5EF4-FFF2-40B4-BE49-F238E27FC236}">
-                <a16:creationId xmlns:a16="http://schemas.microsoft.com/office/drawing/2014/main" id="{0F37756A-9B35-4F19-B2A5-2E41774808F9}"/>
-              </a:ext>
-            </a:extLst>
-          </p:cNvPr>
-          <p:cNvPicPr>
-            <a:picLocks noGrp="1" noChangeAspect="1"/>
-          </p:cNvPicPr>
-          <p:nvPr>
-            <p:ph idx="1"/>
-          </p:nvPr>
-        </p:nvPicPr>
-        <p:blipFill>
-          <a:blip r:embed="rId3">
-            <a:extLst>
-              <a:ext uri="{28A0092B-C50C-407E-A947-70E740481C1C}">
-                <a14:useLocalDpi xmlns:a14="http://schemas.microsoft.com/office/drawing/2010/main" val="0"/>
-              </a:ext>
-            </a:extLst>
-          </a:blip>
-          <a:stretch>
-            <a:fillRect/>
-          </a:stretch>
-        </p:blipFill>
-        <p:spPr>
-          <a:xfrm>
-            <a:off x="4645908" y="1900858"/>
-            <a:ext cx="2900183" cy="3056284"/>
-          </a:xfrm>
-        </p:spPr>
-      </p:pic>
-      <p:sp>
-        <p:nvSpPr>
-          <p:cNvPr id="3" name="Title 2">
-            <a:extLst>
-              <a:ext uri="{FF2B5EF4-FFF2-40B4-BE49-F238E27FC236}">
-                <a16:creationId xmlns:a16="http://schemas.microsoft.com/office/drawing/2014/main" id="{C204E8C3-6FEB-4D36-A61E-FE422C89B2D6}"/>
-              </a:ext>
-            </a:extLst>
-          </p:cNvPr>
-          <p:cNvSpPr>
-            <a:spLocks noGrp="1"/>
-          </p:cNvSpPr>
-          <p:nvPr>
-            <p:ph type="title"/>
-          </p:nvPr>
-        </p:nvSpPr>
-        <p:spPr/>
-        <p:txBody>
-          <a:bodyPr/>
-          <a:lstStyle/>
-          <a:p>
-            <a:endParaRPr lang="en-US"/>
-          </a:p>
-        </p:txBody>
-      </p:sp>
-    </p:spTree>
-    <p:extLst>
-      <p:ext uri="{BB962C8B-B14F-4D97-AF65-F5344CB8AC3E}">
-        <p14:creationId xmlns:p14="http://schemas.microsoft.com/office/powerpoint/2010/main" val="3529707185"/>
-      </p:ext>
-    </p:extLst>
-  </p:cSld>
-  <p:clrMapOvr>
-    <a:masterClrMapping/>
-  </p:clrMapOvr>
-  <mc:AlternateContent xmlns:mc="http://schemas.openxmlformats.org/markup-compatibility/2006" xmlns:p14="http://schemas.microsoft.com/office/powerpoint/2010/main">
-    <mc:Choice Requires="p14">
-      <p:transition spd="med" p14:dur="700">
-        <p:fade/>
-      </p:transition>
-    </mc:Choice>
-    <mc:Fallback xmlns="">
-      <p:transition spd="med">
         <p:fade/>
       </p:transition>
     </mc:Fallback>

</xml_diff>

<commit_message>
Added Star Trek android (Lt. Data) slide.
</commit_message>
<xml_diff>
--- a/ai_getting_started.pptx
+++ b/ai_getting_started.pptx
@@ -5,7 +5,7 @@
     <p:sldMasterId id="2147483648" r:id="rId1"/>
   </p:sldMasterIdLst>
   <p:notesMasterIdLst>
-    <p:notesMasterId r:id="rId18"/>
+    <p:notesMasterId r:id="rId19"/>
   </p:notesMasterIdLst>
   <p:sldIdLst>
     <p:sldId id="257" r:id="rId2"/>
@@ -13,17 +13,18 @@
     <p:sldId id="311" r:id="rId4"/>
     <p:sldId id="301" r:id="rId5"/>
     <p:sldId id="313" r:id="rId6"/>
-    <p:sldId id="307" r:id="rId7"/>
-    <p:sldId id="308" r:id="rId8"/>
-    <p:sldId id="309" r:id="rId9"/>
-    <p:sldId id="310" r:id="rId10"/>
-    <p:sldId id="303" r:id="rId11"/>
-    <p:sldId id="312" r:id="rId12"/>
-    <p:sldId id="305" r:id="rId13"/>
-    <p:sldId id="304" r:id="rId14"/>
-    <p:sldId id="306" r:id="rId15"/>
-    <p:sldId id="314" r:id="rId16"/>
-    <p:sldId id="262" r:id="rId17"/>
+    <p:sldId id="310" r:id="rId7"/>
+    <p:sldId id="307" r:id="rId8"/>
+    <p:sldId id="308" r:id="rId9"/>
+    <p:sldId id="309" r:id="rId10"/>
+    <p:sldId id="315" r:id="rId11"/>
+    <p:sldId id="303" r:id="rId12"/>
+    <p:sldId id="312" r:id="rId13"/>
+    <p:sldId id="305" r:id="rId14"/>
+    <p:sldId id="304" r:id="rId15"/>
+    <p:sldId id="306" r:id="rId16"/>
+    <p:sldId id="314" r:id="rId17"/>
+    <p:sldId id="262" r:id="rId18"/>
   </p:sldIdLst>
   <p:sldSz cx="12192000" cy="6858000"/>
   <p:notesSz cx="6858000" cy="9144000"/>
@@ -223,7 +224,7 @@
           <a:p>
             <a:fld id="{FD93C9B2-20F6-4DB1-B471-224337D0AC79}" type="datetimeFigureOut">
               <a:rPr lang="en-US" smtClean="0"/>
-              <a:t>8/23/2021</a:t>
+              <a:t>8/26/2021</a:t>
             </a:fld>
             <a:endParaRPr lang="en-US"/>
           </a:p>
@@ -623,102 +624,94 @@
           <a:bodyPr/>
           <a:lstStyle/>
           <a:p>
-            <a:pPr marL="0" indent="0">
+            <a:pPr marL="0" marR="0" lvl="0" indent="0" algn="l" defTabSz="914400" rtl="0" eaLnBrk="1" fontAlgn="auto" latinLnBrk="0" hangingPunct="1">
+              <a:lnSpc>
+                <a:spcPct val="100000"/>
+              </a:lnSpc>
+              <a:spcBef>
+                <a:spcPts val="0"/>
+              </a:spcBef>
+              <a:spcAft>
+                <a:spcPts val="0"/>
+              </a:spcAft>
+              <a:buClrTx/>
+              <a:buSzTx/>
+              <a:buFontTx/>
               <a:buNone/>
+              <a:tabLst/>
+              <a:defRPr/>
             </a:pPr>
             <a:r>
               <a:rPr lang="en-US" sz="1200" b="0" i="0" u="none" strike="noStrike" kern="1200" cap="none" dirty="0">
                 <a:ln>
                   <a:noFill/>
                 </a:ln>
-                <a:latin typeface="Arial" pitchFamily="18"/>
+                <a:latin typeface="Arial" pitchFamily="34"/>
                 <a:ea typeface="Arial" pitchFamily="34"/>
                 <a:cs typeface="Arial" pitchFamily="34"/>
               </a:rPr>
-              <a:t>This week’s reading introduced you to Alan Turing and the foundational work he did in the field of artificial intelligence.  The Turing test of intelligence was first proposed in 1950, in an article entitled, </a:t>
-            </a:r>
-            <a:r>
-              <a:rPr lang="en-US" sz="1200" b="0" i="1" u="none" strike="noStrike" kern="1200" cap="none" dirty="0">
-                <a:ln>
-                  <a:noFill/>
-                </a:ln>
-                <a:latin typeface="Arial" pitchFamily="18"/>
-                <a:ea typeface="Arial" pitchFamily="34"/>
-                <a:cs typeface="Arial" pitchFamily="34"/>
-              </a:rPr>
-              <a:t>Computing Machinery and Intelligence.  </a:t>
-            </a:r>
-            <a:r>
-              <a:rPr lang="en-US" sz="1200" b="0" i="0" u="none" strike="noStrike" kern="1200" cap="none" dirty="0">
-                <a:ln>
-                  <a:noFill/>
-                </a:ln>
-                <a:latin typeface="Arial" pitchFamily="18"/>
-                <a:ea typeface="Arial" pitchFamily="34"/>
-                <a:cs typeface="Arial" pitchFamily="34"/>
-              </a:rPr>
-              <a:t>This is a foundational document…  Let’s review the Turing test.</a:t>
-            </a:r>
-            <a:endParaRPr lang="en-US" sz="1200" b="0" i="1" u="none" strike="noStrike" kern="1200" cap="none" dirty="0">
-              <a:ln>
-                <a:noFill/>
-              </a:ln>
-              <a:latin typeface="Arial" pitchFamily="18"/>
-              <a:ea typeface="Arial" pitchFamily="34"/>
-              <a:cs typeface="Arial" pitchFamily="34"/>
-            </a:endParaRPr>
-          </a:p>
-          <a:p>
-            <a:pPr marL="0" indent="0">
+              <a:t>Okay – given these definitions and the assigned reading for this week – has your initial definition of A.I. changed?  </a:t>
+            </a:r>
+          </a:p>
+          <a:p>
+            <a:pPr marL="0" marR="0" lvl="0" indent="0" algn="l" defTabSz="914400" rtl="0" eaLnBrk="1" fontAlgn="auto" latinLnBrk="0" hangingPunct="1">
+              <a:lnSpc>
+                <a:spcPct val="100000"/>
+              </a:lnSpc>
+              <a:spcBef>
+                <a:spcPts val="0"/>
+              </a:spcBef>
+              <a:spcAft>
+                <a:spcPts val="0"/>
+              </a:spcAft>
+              <a:buClrTx/>
+              <a:buSzTx/>
+              <a:buFontTx/>
               <a:buNone/>
+              <a:tabLst/>
+              <a:defRPr/>
             </a:pPr>
             <a:endParaRPr lang="en-US" sz="1200" b="0" i="0" u="none" strike="noStrike" kern="1200" cap="none" dirty="0">
               <a:ln>
                 <a:noFill/>
               </a:ln>
-              <a:latin typeface="Arial" pitchFamily="18"/>
+              <a:latin typeface="Arial" pitchFamily="34"/>
               <a:ea typeface="Arial" pitchFamily="34"/>
               <a:cs typeface="Arial" pitchFamily="34"/>
             </a:endParaRPr>
           </a:p>
           <a:p>
-            <a:pPr marL="0" indent="0">
+            <a:pPr marL="0" marR="0" lvl="0" indent="0" algn="l" defTabSz="914400" rtl="0" eaLnBrk="1" fontAlgn="auto" latinLnBrk="0" hangingPunct="1">
+              <a:lnSpc>
+                <a:spcPct val="100000"/>
+              </a:lnSpc>
+              <a:spcBef>
+                <a:spcPts val="0"/>
+              </a:spcBef>
+              <a:spcAft>
+                <a:spcPts val="0"/>
+              </a:spcAft>
+              <a:buClrTx/>
+              <a:buSzTx/>
+              <a:buFontTx/>
               <a:buNone/>
+              <a:tabLst/>
+              <a:defRPr/>
             </a:pPr>
             <a:r>
               <a:rPr lang="en-US" sz="1200" b="0" i="0" u="none" strike="noStrike" kern="1200" cap="none" dirty="0">
                 <a:ln>
                   <a:noFill/>
                 </a:ln>
-                <a:latin typeface="Arial" pitchFamily="18"/>
+                <a:latin typeface="Arial" pitchFamily="34"/>
                 <a:ea typeface="Arial" pitchFamily="34"/>
                 <a:cs typeface="Arial" pitchFamily="34"/>
               </a:rPr>
-              <a:t>Turing, AM (1950) Computing Machinery and Intelligence. </a:t>
-            </a:r>
-            <a:r>
-              <a:rPr lang="en-US" sz="1200" b="0" i="1" u="none" strike="noStrike" kern="1200" cap="none" dirty="0">
-                <a:ln>
-                  <a:noFill/>
-                </a:ln>
-                <a:latin typeface="Arial" pitchFamily="18"/>
-                <a:ea typeface="Arial" pitchFamily="34"/>
-                <a:cs typeface="Arial" pitchFamily="34"/>
-              </a:rPr>
-              <a:t>Mind</a:t>
-            </a:r>
-            <a:r>
-              <a:rPr lang="en-US" sz="1200" b="0" i="0" u="none" strike="noStrike" kern="1200" cap="none" dirty="0">
-                <a:ln>
-                  <a:noFill/>
-                </a:ln>
-                <a:latin typeface="Arial" pitchFamily="18"/>
-                <a:ea typeface="Arial" pitchFamily="34"/>
-                <a:cs typeface="Arial" pitchFamily="34"/>
-              </a:rPr>
-              <a:t>: 54</a:t>
-            </a:r>
-            <a:endParaRPr lang="en-US" b="1" dirty="0"/>
+              <a:t>Let’s discuss these questions in the breakout rooms. </a:t>
+            </a:r>
+          </a:p>
+          <a:p>
+            <a:endParaRPr lang="en-US" dirty="0"/>
           </a:p>
         </p:txBody>
       </p:sp>
@@ -748,7 +741,7 @@
     </p:spTree>
     <p:extLst>
       <p:ext uri="{BB962C8B-B14F-4D97-AF65-F5344CB8AC3E}">
-        <p14:creationId xmlns:p14="http://schemas.microsoft.com/office/powerpoint/2010/main" val="1860523921"/>
+        <p14:creationId xmlns:p14="http://schemas.microsoft.com/office/powerpoint/2010/main" val="1284256817"/>
       </p:ext>
     </p:extLst>
   </p:cSld>
@@ -802,57 +795,102 @@
           <a:bodyPr/>
           <a:lstStyle/>
           <a:p>
-            <a:r>
-              <a:rPr lang="en-US" dirty="0"/>
-              <a:t>At the heart of our reading this week is the Turing test.  In fact, the entire chapter is named after Turing.  This test has been hugely influential since 1950 since he first described it.  </a:t>
-            </a:r>
-          </a:p>
-          <a:p>
-            <a:endParaRPr lang="en-US" dirty="0"/>
-          </a:p>
-          <a:p>
-            <a:pPr marL="228600" indent="-228600">
-              <a:buAutoNum type="arabicPeriod"/>
+            <a:pPr marL="0" indent="0">
+              <a:buNone/>
             </a:pPr>
             <a:r>
-              <a:rPr lang="en-US" dirty="0"/>
-              <a:t>Victorian parlor game – someone tries to tell if another person is a man or a woman simply on the basis of answers they gave to questions posed to them.</a:t>
-            </a:r>
-          </a:p>
-          <a:p>
-            <a:pPr marL="228600" indent="-228600">
-              <a:buAutoNum type="arabicPeriod"/>
+              <a:rPr lang="en-US" sz="1200" b="0" i="0" u="none" strike="noStrike" kern="1200" cap="none" dirty="0">
+                <a:ln>
+                  <a:noFill/>
+                </a:ln>
+                <a:latin typeface="Arial" pitchFamily="18"/>
+                <a:ea typeface="Arial" pitchFamily="34"/>
+                <a:cs typeface="Arial" pitchFamily="34"/>
+              </a:rPr>
+              <a:t>This week’s reading introduced you to Alan Turing and the foundational work he did in the field of artificial intelligence.  The Turing test of intelligence was first proposed in 1950, in an article entitled, </a:t>
+            </a:r>
+            <a:r>
+              <a:rPr lang="en-US" sz="1200" b="0" i="1" u="none" strike="noStrike" kern="1200" cap="none" dirty="0">
+                <a:ln>
+                  <a:noFill/>
+                </a:ln>
+                <a:latin typeface="Arial" pitchFamily="18"/>
+                <a:ea typeface="Arial" pitchFamily="34"/>
+                <a:cs typeface="Arial" pitchFamily="34"/>
+              </a:rPr>
+              <a:t>Computing Machinery and Intelligence.  </a:t>
+            </a:r>
+            <a:r>
+              <a:rPr lang="en-US" sz="1200" b="0" i="0" u="none" strike="noStrike" kern="1200" cap="none" dirty="0">
+                <a:ln>
+                  <a:noFill/>
+                </a:ln>
+                <a:latin typeface="Arial" pitchFamily="18"/>
+                <a:ea typeface="Arial" pitchFamily="34"/>
+                <a:cs typeface="Arial" pitchFamily="34"/>
+              </a:rPr>
+              <a:t>This is a foundational document…  Let’s review the Turing test.</a:t>
+            </a:r>
+            <a:endParaRPr lang="en-US" sz="1200" b="0" i="1" u="none" strike="noStrike" kern="1200" cap="none" dirty="0">
+              <a:ln>
+                <a:noFill/>
+              </a:ln>
+              <a:latin typeface="Arial" pitchFamily="18"/>
+              <a:ea typeface="Arial" pitchFamily="34"/>
+              <a:cs typeface="Arial" pitchFamily="34"/>
+            </a:endParaRPr>
+          </a:p>
+          <a:p>
+            <a:pPr marL="0" indent="0">
+              <a:buNone/>
             </a:pPr>
-            <a:r>
-              <a:rPr lang="en-US" dirty="0"/>
-              <a:t>Human interacts with a computer – does not know if it is another human or an intelligent system.  The interaction is purely in the form of textual questions and answers: the interrogator types a question, and a response is displayed.  The task of the interrogator is to determine whether the thing being interrogated is a person or a computer program.</a:t>
-            </a:r>
-          </a:p>
-          <a:p>
-            <a:pPr marL="228600" indent="-228600">
-              <a:buAutoNum type="arabicPeriod"/>
+            <a:endParaRPr lang="en-US" sz="1200" b="0" i="0" u="none" strike="noStrike" kern="1200" cap="none" dirty="0">
+              <a:ln>
+                <a:noFill/>
+              </a:ln>
+              <a:latin typeface="Arial" pitchFamily="18"/>
+              <a:ea typeface="Arial" pitchFamily="34"/>
+              <a:cs typeface="Arial" pitchFamily="34"/>
+            </a:endParaRPr>
+          </a:p>
+          <a:p>
+            <a:pPr marL="0" indent="0">
+              <a:buNone/>
             </a:pPr>
             <a:r>
-              <a:rPr lang="en-US" dirty="0"/>
-              <a:t>Now, suppose that the thing being interrogated is indeed a computer program, but after some reasonable amount of time, the interrogators cannot reliably tell whether they are interacting with a program or a person.  Then surely, Turing argued, you should accept that the program has some sort of human level intelligence because the system is doing something that makes it </a:t>
-            </a:r>
-            <a:r>
-              <a:rPr lang="en-US" b="1" dirty="0"/>
-              <a:t>indistinguishable </a:t>
-            </a:r>
-            <a:r>
-              <a:rPr lang="en-US" b="0" dirty="0"/>
-              <a:t>from the real thing.  The key word here is indistinguishable…</a:t>
-            </a:r>
-          </a:p>
-          <a:p>
-            <a:pPr marL="228600" indent="-228600">
-              <a:buAutoNum type="arabicPeriod"/>
-            </a:pPr>
-            <a:endParaRPr lang="en-US" b="0" dirty="0"/>
-          </a:p>
-          <a:p>
-            <a:endParaRPr lang="en-US" dirty="0"/>
+              <a:rPr lang="en-US" sz="1200" b="0" i="0" u="none" strike="noStrike" kern="1200" cap="none" dirty="0">
+                <a:ln>
+                  <a:noFill/>
+                </a:ln>
+                <a:latin typeface="Arial" pitchFamily="18"/>
+                <a:ea typeface="Arial" pitchFamily="34"/>
+                <a:cs typeface="Arial" pitchFamily="34"/>
+              </a:rPr>
+              <a:t>Turing, AM (1950) Computing Machinery and Intelligence. </a:t>
+            </a:r>
+            <a:r>
+              <a:rPr lang="en-US" sz="1200" b="0" i="1" u="none" strike="noStrike" kern="1200" cap="none" dirty="0">
+                <a:ln>
+                  <a:noFill/>
+                </a:ln>
+                <a:latin typeface="Arial" pitchFamily="18"/>
+                <a:ea typeface="Arial" pitchFamily="34"/>
+                <a:cs typeface="Arial" pitchFamily="34"/>
+              </a:rPr>
+              <a:t>Mind</a:t>
+            </a:r>
+            <a:r>
+              <a:rPr lang="en-US" sz="1200" b="0" i="0" u="none" strike="noStrike" kern="1200" cap="none" dirty="0">
+                <a:ln>
+                  <a:noFill/>
+                </a:ln>
+                <a:latin typeface="Arial" pitchFamily="18"/>
+                <a:ea typeface="Arial" pitchFamily="34"/>
+                <a:cs typeface="Arial" pitchFamily="34"/>
+              </a:rPr>
+              <a:t>: 54</a:t>
+            </a:r>
+            <a:endParaRPr lang="en-US" b="1" dirty="0"/>
           </a:p>
         </p:txBody>
       </p:sp>
@@ -882,7 +920,7 @@
     </p:spTree>
     <p:extLst>
       <p:ext uri="{BB962C8B-B14F-4D97-AF65-F5344CB8AC3E}">
-        <p14:creationId xmlns:p14="http://schemas.microsoft.com/office/powerpoint/2010/main" val="2968338234"/>
+        <p14:creationId xmlns:p14="http://schemas.microsoft.com/office/powerpoint/2010/main" val="1860523921"/>
       </p:ext>
     </p:extLst>
   </p:cSld>
@@ -937,36 +975,56 @@
           <a:lstStyle/>
           <a:p>
             <a:r>
+              <a:rPr lang="en-US" dirty="0"/>
+              <a:t>At the heart of our reading this week is the Turing test.  In fact, the entire chapter is named after Turing.  This test has been hugely influential since 1950 since he first described it.  </a:t>
+            </a:r>
+          </a:p>
+          <a:p>
+            <a:endParaRPr lang="en-US" dirty="0"/>
+          </a:p>
+          <a:p>
+            <a:pPr marL="228600" indent="-228600">
+              <a:buAutoNum type="arabicPeriod"/>
+            </a:pPr>
+            <a:r>
+              <a:rPr lang="en-US" dirty="0"/>
+              <a:t>Victorian parlor game – someone tries to tell if another person is a man or a woman simply on the basis of answers they gave to questions posed to them.</a:t>
+            </a:r>
+          </a:p>
+          <a:p>
+            <a:pPr marL="228600" indent="-228600">
+              <a:buAutoNum type="arabicPeriod"/>
+            </a:pPr>
+            <a:r>
+              <a:rPr lang="en-US" dirty="0"/>
+              <a:t>Human interacts with a computer – does not know if it is another human or an intelligent system.  The interaction is purely in the form of textual questions and answers: the interrogator types a question, and a response is displayed.  The task of the interrogator is to determine whether the thing being interrogated is a person or a computer program.</a:t>
+            </a:r>
+          </a:p>
+          <a:p>
+            <a:pPr marL="228600" indent="-228600">
+              <a:buAutoNum type="arabicPeriod"/>
+            </a:pPr>
+            <a:r>
+              <a:rPr lang="en-US" dirty="0"/>
+              <a:t>Now, suppose that the thing being interrogated is indeed a computer program, but after some reasonable amount of time, the interrogators cannot reliably tell whether they are interacting with a program or a person.  Then surely, Turing argued, you should accept that the program has some sort of human level intelligence because the system is doing something that makes it </a:t>
+            </a:r>
+            <a:r>
+              <a:rPr lang="en-US" b="1" dirty="0"/>
+              <a:t>indistinguishable </a:t>
+            </a:r>
+            <a:r>
               <a:rPr lang="en-US" b="0" dirty="0"/>
-              <a:t>Woolridge discusses ELIZA, a computer program written in the 1960’s by the German MIT computer scientist Joseph Weizenbaum.  Eliza takes the role of a psychiatrist talking to a patient to get the interviewee to contemplate themselves.</a:t>
-            </a:r>
-          </a:p>
-          <a:p>
+              <a:t>from the real thing.  The key word here is indistinguishable…</a:t>
+            </a:r>
+          </a:p>
+          <a:p>
+            <a:pPr marL="228600" indent="-228600">
+              <a:buAutoNum type="arabicPeriod"/>
+            </a:pPr>
             <a:endParaRPr lang="en-US" b="0" dirty="0"/>
           </a:p>
           <a:p>
-            <a:r>
-              <a:rPr lang="en-US" b="0" dirty="0"/>
-              <a:t>ELIZA’s legacy lives on to this day, in the form of the annual Loebner Prize competition.  It is unclear whether Turing imagined that anyone would ever actually try out his test for real, but in 1990 that is precisely what American millionaire inventory Hugh Loebner decided to do.  Every year, the Loebner Prize invites the submission of computer programs to engage in the Turing test, attempting to convince a panel of judges that they are in fact people.  </a:t>
-            </a:r>
-          </a:p>
-          <a:p>
-            <a:endParaRPr lang="en-US" b="0" dirty="0"/>
-          </a:p>
-          <a:p>
-            <a:r>
-              <a:rPr lang="en-US" b="0" dirty="0"/>
-              <a:t>We’re going to give you time to chat with this year’s winner of the Loebner prize.  Her name is Kuki…</a:t>
-            </a:r>
-          </a:p>
-          <a:p>
-            <a:endParaRPr lang="en-US" b="0" dirty="0"/>
-          </a:p>
-          <a:p>
-            <a:r>
-              <a:rPr lang="en-US" b="0" dirty="0"/>
-              <a:t>Woolridge concludes, “ELIZA is the direct ancestor of a phenomenon that makes AI researchers groan whenever it is mentioned: the internet chatbot.</a:t>
-            </a:r>
+            <a:endParaRPr lang="en-US" dirty="0"/>
           </a:p>
         </p:txBody>
       </p:sp>
@@ -996,7 +1054,7 @@
     </p:spTree>
     <p:extLst>
       <p:ext uri="{BB962C8B-B14F-4D97-AF65-F5344CB8AC3E}">
-        <p14:creationId xmlns:p14="http://schemas.microsoft.com/office/powerpoint/2010/main" val="4034031462"/>
+        <p14:creationId xmlns:p14="http://schemas.microsoft.com/office/powerpoint/2010/main" val="2968338234"/>
       </p:ext>
     </p:extLst>
   </p:cSld>
@@ -1050,92 +1108,36 @@
           <a:bodyPr/>
           <a:lstStyle/>
           <a:p>
-            <a:pPr marL="0" marR="0" indent="0">
-              <a:spcBef>
-                <a:spcPts val="0"/>
-              </a:spcBef>
-              <a:spcAft>
-                <a:spcPts val="0"/>
-              </a:spcAft>
-              <a:buNone/>
-            </a:pPr>
-            <a:r>
-              <a:rPr lang="en-US" sz="1200" dirty="0">
-                <a:effectLst/>
-                <a:latin typeface="Palatino Linotype" panose="02040502050505030304" pitchFamily="18" charset="0"/>
-                <a:ea typeface="Calibri" panose="020F0502020204030204" pitchFamily="34" charset="0"/>
-              </a:rPr>
-              <a:t>Students engage in a 10-minute conversation with Kuki.ai</a:t>
-            </a:r>
-          </a:p>
-          <a:p>
-            <a:pPr marL="0" marR="0" indent="0">
-              <a:spcBef>
-                <a:spcPts val="0"/>
-              </a:spcBef>
-              <a:spcAft>
-                <a:spcPts val="0"/>
-              </a:spcAft>
-              <a:buNone/>
-            </a:pPr>
-            <a:endParaRPr lang="en-US" sz="1200" dirty="0">
-              <a:effectLst/>
-              <a:latin typeface="Palatino Linotype" panose="02040502050505030304" pitchFamily="18" charset="0"/>
-              <a:ea typeface="Calibri" panose="020F0502020204030204" pitchFamily="34" charset="0"/>
-            </a:endParaRPr>
-          </a:p>
-          <a:p>
-            <a:pPr marL="0" marR="0" indent="0">
-              <a:spcBef>
-                <a:spcPts val="0"/>
-              </a:spcBef>
-              <a:spcAft>
-                <a:spcPts val="0"/>
-              </a:spcAft>
-              <a:buNone/>
-            </a:pPr>
-            <a:r>
-              <a:rPr lang="en-US" sz="1200" dirty="0">
-                <a:effectLst/>
-                <a:latin typeface="Palatino Linotype" panose="02040502050505030304" pitchFamily="18" charset="0"/>
-                <a:ea typeface="Calibri" panose="020F0502020204030204" pitchFamily="34" charset="0"/>
-              </a:rPr>
-              <a:t>Breakout conversations – Is Kuki exhibiting intelligent behavior, is this intelligence? (Yes/No)</a:t>
-            </a:r>
-          </a:p>
-          <a:p>
-            <a:pPr marL="0" marR="0" indent="0">
-              <a:spcBef>
-                <a:spcPts val="0"/>
-              </a:spcBef>
-              <a:spcAft>
-                <a:spcPts val="0"/>
-              </a:spcAft>
-              <a:buNone/>
-            </a:pPr>
-            <a:endParaRPr lang="en-US" sz="1200" dirty="0">
-              <a:effectLst/>
-              <a:latin typeface="Palatino Linotype" panose="02040502050505030304" pitchFamily="18" charset="0"/>
-              <a:ea typeface="Calibri" panose="020F0502020204030204" pitchFamily="34" charset="0"/>
-            </a:endParaRPr>
-          </a:p>
-          <a:p>
-            <a:pPr marL="0" marR="0" indent="0">
-              <a:spcBef>
-                <a:spcPts val="0"/>
-              </a:spcBef>
-              <a:spcAft>
-                <a:spcPts val="0"/>
-              </a:spcAft>
-              <a:buNone/>
-            </a:pPr>
-            <a:r>
-              <a:rPr lang="en-US" sz="1200" dirty="0">
-                <a:effectLst/>
-                <a:latin typeface="Palatino Linotype" panose="02040502050505030304" pitchFamily="18" charset="0"/>
-                <a:ea typeface="Calibri" panose="020F0502020204030204" pitchFamily="34" charset="0"/>
-              </a:rPr>
-              <a:t>Team debate </a:t>
+            <a:r>
+              <a:rPr lang="en-US" b="0" dirty="0"/>
+              <a:t>Woolridge discusses ELIZA, a computer program written in the 1960’s by the German MIT computer scientist Joseph Weizenbaum.  Eliza takes the role of a psychiatrist talking to a patient to get the interviewee to contemplate themselves.</a:t>
+            </a:r>
+          </a:p>
+          <a:p>
+            <a:endParaRPr lang="en-US" b="0" dirty="0"/>
+          </a:p>
+          <a:p>
+            <a:r>
+              <a:rPr lang="en-US" b="0" dirty="0"/>
+              <a:t>ELIZA’s legacy lives on to this day, in the form of the annual Loebner Prize competition.  It is unclear whether Turing imagined that anyone would ever actually try out his test for real, but in 1990 that is precisely what American millionaire inventory Hugh Loebner decided to do.  Every year, the Loebner Prize invites the submission of computer programs to engage in the Turing test, attempting to convince a panel of judges that they are in fact people.  </a:t>
+            </a:r>
+          </a:p>
+          <a:p>
+            <a:endParaRPr lang="en-US" b="0" dirty="0"/>
+          </a:p>
+          <a:p>
+            <a:r>
+              <a:rPr lang="en-US" b="0" dirty="0"/>
+              <a:t>We’re going to give you time to chat with this year’s winner of the Loebner prize.  Her name is Kuki…</a:t>
+            </a:r>
+          </a:p>
+          <a:p>
+            <a:endParaRPr lang="en-US" b="0" dirty="0"/>
+          </a:p>
+          <a:p>
+            <a:r>
+              <a:rPr lang="en-US" b="0" dirty="0"/>
+              <a:t>Woolridge concludes, “ELIZA is the direct ancestor of a phenomenon that makes AI researchers groan whenever it is mentioned: the internet chatbot.</a:t>
             </a:r>
           </a:p>
         </p:txBody>
@@ -1166,7 +1168,7 @@
     </p:spTree>
     <p:extLst>
       <p:ext uri="{BB962C8B-B14F-4D97-AF65-F5344CB8AC3E}">
-        <p14:creationId xmlns:p14="http://schemas.microsoft.com/office/powerpoint/2010/main" val="1066522800"/>
+        <p14:creationId xmlns:p14="http://schemas.microsoft.com/office/powerpoint/2010/main" val="4034031462"/>
       </p:ext>
     </p:extLst>
   </p:cSld>
@@ -1220,7 +1222,93 @@
           <a:bodyPr/>
           <a:lstStyle/>
           <a:p>
-            <a:endParaRPr lang="en-US" dirty="0"/>
+            <a:pPr marL="0" marR="0" indent="0">
+              <a:spcBef>
+                <a:spcPts val="0"/>
+              </a:spcBef>
+              <a:spcAft>
+                <a:spcPts val="0"/>
+              </a:spcAft>
+              <a:buNone/>
+            </a:pPr>
+            <a:r>
+              <a:rPr lang="en-US" sz="1200" dirty="0">
+                <a:effectLst/>
+                <a:latin typeface="Palatino Linotype" panose="02040502050505030304" pitchFamily="18" charset="0"/>
+                <a:ea typeface="Calibri" panose="020F0502020204030204" pitchFamily="34" charset="0"/>
+              </a:rPr>
+              <a:t>Students engage in a 10-minute conversation with Kuki.ai</a:t>
+            </a:r>
+          </a:p>
+          <a:p>
+            <a:pPr marL="0" marR="0" indent="0">
+              <a:spcBef>
+                <a:spcPts val="0"/>
+              </a:spcBef>
+              <a:spcAft>
+                <a:spcPts val="0"/>
+              </a:spcAft>
+              <a:buNone/>
+            </a:pPr>
+            <a:endParaRPr lang="en-US" sz="1200" dirty="0">
+              <a:effectLst/>
+              <a:latin typeface="Palatino Linotype" panose="02040502050505030304" pitchFamily="18" charset="0"/>
+              <a:ea typeface="Calibri" panose="020F0502020204030204" pitchFamily="34" charset="0"/>
+            </a:endParaRPr>
+          </a:p>
+          <a:p>
+            <a:pPr marL="0" marR="0" indent="0">
+              <a:spcBef>
+                <a:spcPts val="0"/>
+              </a:spcBef>
+              <a:spcAft>
+                <a:spcPts val="0"/>
+              </a:spcAft>
+              <a:buNone/>
+            </a:pPr>
+            <a:r>
+              <a:rPr lang="en-US" sz="1200" dirty="0">
+                <a:effectLst/>
+                <a:latin typeface="Palatino Linotype" panose="02040502050505030304" pitchFamily="18" charset="0"/>
+                <a:ea typeface="Calibri" panose="020F0502020204030204" pitchFamily="34" charset="0"/>
+              </a:rPr>
+              <a:t>Breakout conversations – Is Kuki exhibiting intelligent behavior, is this intelligence? (Yes/No)</a:t>
+            </a:r>
+          </a:p>
+          <a:p>
+            <a:pPr marL="0" marR="0" indent="0">
+              <a:spcBef>
+                <a:spcPts val="0"/>
+              </a:spcBef>
+              <a:spcAft>
+                <a:spcPts val="0"/>
+              </a:spcAft>
+              <a:buNone/>
+            </a:pPr>
+            <a:endParaRPr lang="en-US" sz="1200" dirty="0">
+              <a:effectLst/>
+              <a:latin typeface="Palatino Linotype" panose="02040502050505030304" pitchFamily="18" charset="0"/>
+              <a:ea typeface="Calibri" panose="020F0502020204030204" pitchFamily="34" charset="0"/>
+            </a:endParaRPr>
+          </a:p>
+          <a:p>
+            <a:pPr marL="0" marR="0" indent="0">
+              <a:spcBef>
+                <a:spcPts val="0"/>
+              </a:spcBef>
+              <a:spcAft>
+                <a:spcPts val="0"/>
+              </a:spcAft>
+              <a:buNone/>
+            </a:pPr>
+            <a:r>
+              <a:rPr lang="en-US" sz="1200" dirty="0">
+                <a:effectLst/>
+                <a:latin typeface="Palatino Linotype" panose="02040502050505030304" pitchFamily="18" charset="0"/>
+                <a:ea typeface="Calibri" panose="020F0502020204030204" pitchFamily="34" charset="0"/>
+              </a:rPr>
+              <a:t>Team debate </a:t>
+            </a:r>
           </a:p>
         </p:txBody>
       </p:sp>
@@ -1250,7 +1338,7 @@
     </p:spTree>
     <p:extLst>
       <p:ext uri="{BB962C8B-B14F-4D97-AF65-F5344CB8AC3E}">
-        <p14:creationId xmlns:p14="http://schemas.microsoft.com/office/powerpoint/2010/main" val="4007547773"/>
+        <p14:creationId xmlns:p14="http://schemas.microsoft.com/office/powerpoint/2010/main" val="1066522800"/>
       </p:ext>
     </p:extLst>
   </p:cSld>
@@ -1334,7 +1422,7 @@
     </p:spTree>
     <p:extLst>
       <p:ext uri="{BB962C8B-B14F-4D97-AF65-F5344CB8AC3E}">
-        <p14:creationId xmlns:p14="http://schemas.microsoft.com/office/powerpoint/2010/main" val="253102611"/>
+        <p14:creationId xmlns:p14="http://schemas.microsoft.com/office/powerpoint/2010/main" val="4007547773"/>
       </p:ext>
     </p:extLst>
   </p:cSld>
@@ -1388,10 +1476,7 @@
           <a:bodyPr/>
           <a:lstStyle/>
           <a:p>
-            <a:r>
-              <a:rPr lang="en-US" dirty="0"/>
-              <a:t>Okay – let’s quickly summarize what we covered in today’s learning experience.</a:t>
-            </a:r>
+            <a:endParaRPr lang="en-US" dirty="0"/>
           </a:p>
         </p:txBody>
       </p:sp>
@@ -1413,6 +1498,93 @@
             <a:fld id="{3148858F-F1DB-4027-9C85-CCA6849540DD}" type="slidenum">
               <a:rPr lang="en-US" smtClean="0"/>
               <a:t>16</a:t>
+            </a:fld>
+            <a:endParaRPr lang="en-US"/>
+          </a:p>
+        </p:txBody>
+      </p:sp>
+    </p:spTree>
+    <p:extLst>
+      <p:ext uri="{BB962C8B-B14F-4D97-AF65-F5344CB8AC3E}">
+        <p14:creationId xmlns:p14="http://schemas.microsoft.com/office/powerpoint/2010/main" val="253102611"/>
+      </p:ext>
+    </p:extLst>
+  </p:cSld>
+  <p:clrMapOvr>
+    <a:masterClrMapping/>
+  </p:clrMapOvr>
+</p:notes>
+</file>
+
+<file path=ppt/notesSlides/notesSlide17.xml><?xml version="1.0" encoding="utf-8"?>
+<p:notes xmlns:a="http://schemas.openxmlformats.org/drawingml/2006/main" xmlns:r="http://schemas.openxmlformats.org/officeDocument/2006/relationships" xmlns:p="http://schemas.openxmlformats.org/presentationml/2006/main">
+  <p:cSld>
+    <p:spTree>
+      <p:nvGrpSpPr>
+        <p:cNvPr id="1" name=""/>
+        <p:cNvGrpSpPr/>
+        <p:nvPr/>
+      </p:nvGrpSpPr>
+      <p:grpSpPr>
+        <a:xfrm>
+          <a:off x="0" y="0"/>
+          <a:ext cx="0" cy="0"/>
+          <a:chOff x="0" y="0"/>
+          <a:chExt cx="0" cy="0"/>
+        </a:xfrm>
+      </p:grpSpPr>
+      <p:sp>
+        <p:nvSpPr>
+          <p:cNvPr id="2" name="Slide Image Placeholder 1"/>
+          <p:cNvSpPr>
+            <a:spLocks noGrp="1" noRot="1" noChangeAspect="1"/>
+          </p:cNvSpPr>
+          <p:nvPr>
+            <p:ph type="sldImg"/>
+          </p:nvPr>
+        </p:nvSpPr>
+        <p:spPr/>
+      </p:sp>
+      <p:sp>
+        <p:nvSpPr>
+          <p:cNvPr id="3" name="Notes Placeholder 2"/>
+          <p:cNvSpPr>
+            <a:spLocks noGrp="1"/>
+          </p:cNvSpPr>
+          <p:nvPr>
+            <p:ph type="body" idx="1"/>
+          </p:nvPr>
+        </p:nvSpPr>
+        <p:spPr/>
+        <p:txBody>
+          <a:bodyPr/>
+          <a:lstStyle/>
+          <a:p>
+            <a:r>
+              <a:rPr lang="en-US" dirty="0"/>
+              <a:t>Okay – let’s quickly summarize what we covered in today’s learning experience.</a:t>
+            </a:r>
+          </a:p>
+        </p:txBody>
+      </p:sp>
+      <p:sp>
+        <p:nvSpPr>
+          <p:cNvPr id="4" name="Slide Number Placeholder 3"/>
+          <p:cNvSpPr>
+            <a:spLocks noGrp="1"/>
+          </p:cNvSpPr>
+          <p:nvPr>
+            <p:ph type="sldNum" sz="quarter" idx="5"/>
+          </p:nvPr>
+        </p:nvSpPr>
+        <p:spPr/>
+        <p:txBody>
+          <a:bodyPr/>
+          <a:lstStyle/>
+          <a:p>
+            <a:fld id="{3148858F-F1DB-4027-9C85-CCA6849540DD}" type="slidenum">
+              <a:rPr lang="en-US" smtClean="0"/>
+              <a:t>17</a:t>
             </a:fld>
             <a:endParaRPr lang="en-US"/>
           </a:p>
@@ -1597,7 +1769,7 @@
                 <a:ea typeface="+mn-ea"/>
                 <a:cs typeface="+mn-cs"/>
               </a:rPr>
-              <a:t>Here’s the question I’d like for you to focus on in today’s class.  A prerequisite of any understanding is a definition of terms.  What are we talking about?</a:t>
+              <a:t>Here’s the question we will focus on in our first set of presentations.  What are we talking about?</a:t>
             </a:r>
           </a:p>
           <a:p>
@@ -1863,90 +2035,29 @@
       </p:grpSpPr>
       <p:sp>
         <p:nvSpPr>
-          <p:cNvPr id="7" name="Slide Number Placeholder 6">
-            <a:extLst>
-              <a:ext uri="{FF2B5EF4-FFF2-40B4-BE49-F238E27FC236}">
-                <a16:creationId xmlns:a16="http://schemas.microsoft.com/office/drawing/2014/main" id="{5B543A9C-E520-124D-A26C-727E7A91B5A6}"/>
-              </a:ext>
-            </a:extLst>
-          </p:cNvPr>
-          <p:cNvSpPr txBox="1">
-            <a:spLocks noGrp="1"/>
-          </p:cNvSpPr>
-          <p:nvPr>
-            <p:ph type="sldNum" sz="quarter" idx="5"/>
-          </p:nvPr>
-        </p:nvSpPr>
-        <p:spPr>
-          <a:ln/>
-        </p:spPr>
-        <p:txBody>
-          <a:bodyPr lIns="0" tIns="0" rIns="0" bIns="0" anchor="b" anchorCtr="0">
-            <a:noAutofit/>
-          </a:bodyPr>
-          <a:lstStyle/>
-          <a:p>
-            <a:pPr lvl="0"/>
-            <a:fld id="{F26ADB32-8A69-2C4E-BA54-385F30C1B140}" type="slidenum">
-              <a:t>6</a:t>
-            </a:fld>
-            <a:endParaRPr lang="en-US"/>
-          </a:p>
-        </p:txBody>
-      </p:sp>
-      <p:sp>
-        <p:nvSpPr>
-          <p:cNvPr id="2" name="Slide Image Placeholder 1">
-            <a:extLst>
-              <a:ext uri="{FF2B5EF4-FFF2-40B4-BE49-F238E27FC236}">
-                <a16:creationId xmlns:a16="http://schemas.microsoft.com/office/drawing/2014/main" id="{A02321D2-BA00-8D41-B3B0-CF9117442E2A}"/>
-              </a:ext>
-            </a:extLst>
-          </p:cNvPr>
-          <p:cNvSpPr>
-            <a:spLocks noGrp="1" noRot="1" noChangeAspect="1" noResize="1"/>
+          <p:cNvPr id="2" name="Slide Image Placeholder 1"/>
+          <p:cNvSpPr>
+            <a:spLocks noGrp="1" noRot="1" noChangeAspect="1"/>
           </p:cNvSpPr>
           <p:nvPr>
             <p:ph type="sldImg"/>
           </p:nvPr>
         </p:nvSpPr>
-        <p:spPr>
-          <a:xfrm>
-            <a:off x="533400" y="763588"/>
-            <a:ext cx="6704013" cy="3771900"/>
-          </a:xfrm>
-          <a:solidFill>
-            <a:srgbClr val="729FCF"/>
-          </a:solidFill>
-          <a:ln w="25400">
-            <a:solidFill>
-              <a:srgbClr val="3465A4"/>
-            </a:solidFill>
-            <a:prstDash val="solid"/>
-          </a:ln>
-        </p:spPr>
-      </p:sp>
-      <p:sp>
-        <p:nvSpPr>
-          <p:cNvPr id="3" name="Notes Placeholder 2">
-            <a:extLst>
-              <a:ext uri="{FF2B5EF4-FFF2-40B4-BE49-F238E27FC236}">
-                <a16:creationId xmlns:a16="http://schemas.microsoft.com/office/drawing/2014/main" id="{A04CBDCA-B8FC-AE47-9EA8-9C1755746D8B}"/>
-              </a:ext>
-            </a:extLst>
-          </p:cNvPr>
-          <p:cNvSpPr txBox="1">
-            <a:spLocks noGrp="1"/>
-          </p:cNvSpPr>
-          <p:nvPr>
-            <p:ph type="body" sz="quarter" idx="1"/>
-          </p:nvPr>
-        </p:nvSpPr>
         <p:spPr/>
-        <p:txBody>
-          <a:bodyPr>
-            <a:spAutoFit/>
-          </a:bodyPr>
+      </p:sp>
+      <p:sp>
+        <p:nvSpPr>
+          <p:cNvPr id="3" name="Notes Placeholder 2"/>
+          <p:cNvSpPr>
+            <a:spLocks noGrp="1"/>
+          </p:cNvSpPr>
+          <p:nvPr>
+            <p:ph type="body" idx="1"/>
+          </p:nvPr>
+        </p:nvSpPr>
+        <p:spPr/>
+        <p:txBody>
+          <a:bodyPr/>
           <a:lstStyle/>
           <a:p>
             <a:pPr marL="0" marR="0" lvl="0" indent="0" algn="l" defTabSz="914400" rtl="0" eaLnBrk="1" fontAlgn="auto" latinLnBrk="0" hangingPunct="1">
@@ -1967,6 +2078,107 @@
               <a:defRPr/>
             </a:pPr>
             <a:r>
+              <a:rPr lang="en-US" sz="1200" b="0" i="0" u="none" strike="noStrike" kern="1200" cap="none" dirty="0">
+                <a:ln>
+                  <a:noFill/>
+                </a:ln>
+                <a:latin typeface="Arial" pitchFamily="34"/>
+                <a:ea typeface="Arial" pitchFamily="34"/>
+                <a:cs typeface="Arial" pitchFamily="34"/>
+              </a:rPr>
+              <a:t>In our first class, I asked the question, “What is intelligence?  And what criteria would you use to assess whether an entity is intelligent?  Back in the day, I was a fan of Star Trek: The Next Generation.  And this is a painting of Lieutenant Commander Data, the resident Android.  I remember one episode in particular.  In it, the main story raised the question of what constitutes intelligence in relation to one’s self-determination.  Should Data be allowed to refuse a reverse engineering experiment and be accorded the same privileges extended to humans making a </a:t>
+            </a:r>
+            <a:r>
+              <a:rPr lang="en-US" sz="1200" b="0" i="1" u="none" strike="noStrike" kern="1200" cap="none" dirty="0">
+                <a:ln>
+                  <a:noFill/>
+                </a:ln>
+                <a:latin typeface="Arial" pitchFamily="34"/>
+                <a:ea typeface="Arial" pitchFamily="34"/>
+                <a:cs typeface="Arial" pitchFamily="34"/>
+              </a:rPr>
+              <a:t>medical</a:t>
+            </a:r>
+            <a:r>
+              <a:rPr lang="en-US" sz="1200" b="0" i="0" u="none" strike="noStrike" kern="1200" cap="none" dirty="0">
+                <a:ln>
+                  <a:noFill/>
+                </a:ln>
+                <a:latin typeface="Arial" pitchFamily="34"/>
+                <a:ea typeface="Arial" pitchFamily="34"/>
+                <a:cs typeface="Arial" pitchFamily="34"/>
+              </a:rPr>
+              <a:t> decision?  Or was he an </a:t>
+            </a:r>
+            <a:r>
+              <a:rPr lang="en-US" sz="1200" b="0" i="1" u="none" strike="noStrike" kern="1200" cap="none" dirty="0">
+                <a:ln>
+                  <a:noFill/>
+                </a:ln>
+                <a:latin typeface="Arial" pitchFamily="34"/>
+                <a:ea typeface="Arial" pitchFamily="34"/>
+                <a:cs typeface="Arial" pitchFamily="34"/>
+              </a:rPr>
+              <a:t>unthinking </a:t>
+            </a:r>
+            <a:r>
+              <a:rPr lang="en-US" sz="1200" b="0" i="0" u="none" strike="noStrike" kern="1200" cap="none" dirty="0">
+                <a:ln>
+                  <a:noFill/>
+                </a:ln>
+                <a:latin typeface="Arial" pitchFamily="34"/>
+                <a:ea typeface="Arial" pitchFamily="34"/>
+                <a:cs typeface="Arial" pitchFamily="34"/>
+              </a:rPr>
+              <a:t>machine, a different class of being who must obey directives no matter what.  As you can see, one’s definition of intelligence is important, and it lies at the heart of this emerging field.  For without a clear definition of intelligence, how will we know when we have succeeded?</a:t>
+            </a:r>
+          </a:p>
+          <a:p>
+            <a:pPr marL="0" marR="0" lvl="0" indent="0" algn="l" defTabSz="914400" rtl="0" eaLnBrk="1" fontAlgn="auto" latinLnBrk="0" hangingPunct="1">
+              <a:lnSpc>
+                <a:spcPct val="100000"/>
+              </a:lnSpc>
+              <a:spcBef>
+                <a:spcPts val="0"/>
+              </a:spcBef>
+              <a:spcAft>
+                <a:spcPts val="0"/>
+              </a:spcAft>
+              <a:buClrTx/>
+              <a:buSzTx/>
+              <a:buFontTx/>
+              <a:buNone/>
+              <a:tabLst/>
+              <a:defRPr/>
+            </a:pPr>
+            <a:endParaRPr lang="en-US" sz="1200" b="0" i="0" u="none" strike="noStrike" kern="1200" cap="none" dirty="0">
+              <a:ln>
+                <a:noFill/>
+              </a:ln>
+              <a:latin typeface="Arial" pitchFamily="34"/>
+              <a:ea typeface="Arial" pitchFamily="34"/>
+              <a:cs typeface="Arial" pitchFamily="34"/>
+            </a:endParaRPr>
+          </a:p>
+          <a:p>
+            <a:pPr marL="0" marR="0" lvl="0" indent="0" algn="l" defTabSz="914400" rtl="0" eaLnBrk="1" fontAlgn="auto" latinLnBrk="0" hangingPunct="1">
+              <a:lnSpc>
+                <a:spcPct val="100000"/>
+              </a:lnSpc>
+              <a:spcBef>
+                <a:spcPts val="0"/>
+              </a:spcBef>
+              <a:spcAft>
+                <a:spcPts val="0"/>
+              </a:spcAft>
+              <a:buClrTx/>
+              <a:buSzTx/>
+              <a:buFontTx/>
+              <a:buNone/>
+              <a:tabLst/>
+              <a:defRPr/>
+            </a:pPr>
+            <a:r>
               <a:rPr lang="en-US" sz="1200" b="0" i="0" kern="1200" dirty="0">
                 <a:solidFill>
                   <a:schemeClr val="tx1"/>
@@ -1976,7 +2188,7 @@
                 <a:ea typeface="+mn-ea"/>
                 <a:cs typeface="+mn-cs"/>
               </a:rPr>
-              <a:t>So, in last week’s class, you took a poll in which you provided a phrase to describe artificial intelligence.  We did that because we wanted to get a sense of what you currently know about AI.  Today, we want to continue that conversation and provide some historical background.</a:t>
+              <a:t>So, in last week’s class, you took a poll in which you provided a phrase to describe artificial intelligence.   Today, we want to continue that conversation. Let’s begin with some history.</a:t>
             </a:r>
           </a:p>
           <a:p>
@@ -1990,297 +2202,91 @@
             </a:endParaRPr>
           </a:p>
           <a:p>
-            <a:pPr algn="l"/>
-            <a:r>
-              <a:rPr lang="en-US" b="0" i="0" dirty="0">
-                <a:solidFill>
-                  <a:srgbClr val="202122"/>
-                </a:solidFill>
-                <a:effectLst/>
-                <a:latin typeface="Arial" panose="020B0604020202020204" pitchFamily="34" charset="0"/>
-              </a:rPr>
-              <a:t>In 1955, </a:t>
-            </a:r>
-            <a:r>
-              <a:rPr lang="en-US" b="0" i="0" u="none" strike="noStrike" dirty="0">
-                <a:solidFill>
-                  <a:srgbClr val="0645AD"/>
-                </a:solidFill>
-                <a:effectLst/>
-                <a:latin typeface="Arial" panose="020B0604020202020204" pitchFamily="34" charset="0"/>
-                <a:hlinkClick r:id="rId3" tooltip="John McCarthy (computer scientist)"/>
-              </a:rPr>
-              <a:t>John McCarthy</a:t>
-            </a:r>
-            <a:r>
-              <a:rPr lang="en-US" b="0" i="0" dirty="0">
-                <a:solidFill>
-                  <a:srgbClr val="202122"/>
-                </a:solidFill>
-                <a:effectLst/>
-                <a:latin typeface="Arial" panose="020B0604020202020204" pitchFamily="34" charset="0"/>
-              </a:rPr>
-              <a:t>, then a young Assistant Professor of Mathematics at </a:t>
-            </a:r>
-            <a:r>
-              <a:rPr lang="en-US" b="0" i="0" u="none" strike="noStrike" dirty="0">
-                <a:solidFill>
-                  <a:srgbClr val="0645AD"/>
-                </a:solidFill>
-                <a:effectLst/>
-                <a:latin typeface="Arial" panose="020B0604020202020204" pitchFamily="34" charset="0"/>
-                <a:hlinkClick r:id="rId4" tooltip="Dartmouth College"/>
-              </a:rPr>
-              <a:t>Dartmouth College</a:t>
-            </a:r>
-            <a:r>
-              <a:rPr lang="en-US" b="0" i="0" dirty="0">
-                <a:solidFill>
-                  <a:srgbClr val="202122"/>
-                </a:solidFill>
-                <a:effectLst/>
-                <a:latin typeface="Arial" panose="020B0604020202020204" pitchFamily="34" charset="0"/>
-              </a:rPr>
-              <a:t>, decided to organize a group to clarify and develop ideas about thinking machines. He picked the name 'Artificial Intelligence' for the new field. He chose the name partly for its neutrality; avoiding a focus on narrow automata theory while avoiding cybernetics which was heavily focused on analog feedback, as well as him potentially having to accept the assertive </a:t>
-            </a:r>
-            <a:r>
-              <a:rPr lang="en-US" b="0" i="0" u="none" strike="noStrike" dirty="0">
-                <a:solidFill>
-                  <a:srgbClr val="0645AD"/>
-                </a:solidFill>
-                <a:effectLst/>
-                <a:latin typeface="Arial" panose="020B0604020202020204" pitchFamily="34" charset="0"/>
-                <a:hlinkClick r:id="rId5" tooltip="Norbert Wiener"/>
-              </a:rPr>
-              <a:t>Norbert Wiener</a:t>
-            </a:r>
-            <a:r>
-              <a:rPr lang="en-US" b="0" i="0" dirty="0">
-                <a:solidFill>
-                  <a:srgbClr val="202122"/>
-                </a:solidFill>
-                <a:effectLst/>
-                <a:latin typeface="Arial" panose="020B0604020202020204" pitchFamily="34" charset="0"/>
-              </a:rPr>
-              <a:t> as guru or having to argue with him.</a:t>
-            </a:r>
-            <a:endParaRPr lang="en-US" b="0" i="0" u="none" strike="noStrike" baseline="30000" dirty="0">
-              <a:solidFill>
-                <a:srgbClr val="0645AD"/>
-              </a:solidFill>
-              <a:effectLst/>
-              <a:latin typeface="Arial" panose="020B0604020202020204" pitchFamily="34" charset="0"/>
+            <a:pPr marL="0" marR="0" lvl="0" indent="0" algn="l" defTabSz="914400" rtl="0" eaLnBrk="1" fontAlgn="auto" latinLnBrk="0" hangingPunct="1">
+              <a:lnSpc>
+                <a:spcPct val="100000"/>
+              </a:lnSpc>
+              <a:spcBef>
+                <a:spcPts val="0"/>
+              </a:spcBef>
+              <a:spcAft>
+                <a:spcPts val="0"/>
+              </a:spcAft>
+              <a:buClrTx/>
+              <a:buSzTx/>
+              <a:buFontTx/>
+              <a:buNone/>
+              <a:tabLst/>
+              <a:defRPr/>
+            </a:pPr>
+            <a:endParaRPr lang="en-US" sz="1200" b="0" i="0" u="none" strike="noStrike" kern="1200" cap="none" dirty="0">
+              <a:ln>
+                <a:noFill/>
+              </a:ln>
+              <a:latin typeface="Arial" pitchFamily="34"/>
+              <a:ea typeface="Arial" pitchFamily="34"/>
+              <a:cs typeface="Arial" pitchFamily="34"/>
             </a:endParaRPr>
           </a:p>
           <a:p>
-            <a:pPr algn="l"/>
-            <a:endParaRPr lang="en-US" b="0" i="0" dirty="0">
-              <a:solidFill>
-                <a:srgbClr val="202122"/>
-              </a:solidFill>
-              <a:effectLst/>
-              <a:latin typeface="Arial" panose="020B0604020202020204" pitchFamily="34" charset="0"/>
+            <a:pPr marL="0" marR="0" lvl="0" indent="0" algn="l" defTabSz="914400" rtl="0" eaLnBrk="1" fontAlgn="auto" latinLnBrk="0" hangingPunct="1">
+              <a:lnSpc>
+                <a:spcPct val="100000"/>
+              </a:lnSpc>
+              <a:spcBef>
+                <a:spcPts val="0"/>
+              </a:spcBef>
+              <a:spcAft>
+                <a:spcPts val="0"/>
+              </a:spcAft>
+              <a:buClrTx/>
+              <a:buSzTx/>
+              <a:buFontTx/>
+              <a:buNone/>
+              <a:tabLst/>
+              <a:defRPr/>
+            </a:pPr>
+            <a:endParaRPr lang="en-US" sz="1200" b="0" i="0" u="none" strike="noStrike" kern="1200" cap="none" dirty="0">
+              <a:ln>
+                <a:noFill/>
+              </a:ln>
+              <a:latin typeface="Arial" pitchFamily="34"/>
+              <a:ea typeface="Arial" pitchFamily="34"/>
+              <a:cs typeface="Arial" pitchFamily="34"/>
             </a:endParaRPr>
           </a:p>
           <a:p>
-            <a:pPr algn="l"/>
-            <a:r>
-              <a:rPr lang="en-US" b="0" i="0" dirty="0">
-                <a:solidFill>
-                  <a:srgbClr val="202122"/>
-                </a:solidFill>
-                <a:effectLst/>
-                <a:latin typeface="Arial" panose="020B0604020202020204" pitchFamily="34" charset="0"/>
-              </a:rPr>
-              <a:t>In early 1955, McCarthy approached the </a:t>
-            </a:r>
-            <a:r>
-              <a:rPr lang="en-US" b="0" i="0" u="none" strike="noStrike" dirty="0">
-                <a:solidFill>
-                  <a:srgbClr val="0645AD"/>
-                </a:solidFill>
-                <a:effectLst/>
-                <a:latin typeface="Arial" panose="020B0604020202020204" pitchFamily="34" charset="0"/>
-                <a:hlinkClick r:id="rId6" tooltip="Rockefeller Foundation"/>
-              </a:rPr>
-              <a:t>Rockefeller Foundation</a:t>
-            </a:r>
-            <a:r>
-              <a:rPr lang="en-US" b="0" i="0" dirty="0">
-                <a:solidFill>
-                  <a:srgbClr val="202122"/>
-                </a:solidFill>
-                <a:effectLst/>
-                <a:latin typeface="Arial" panose="020B0604020202020204" pitchFamily="34" charset="0"/>
-              </a:rPr>
-              <a:t> to request funding for a summer seminar at Dartmouth for about 10 participants. In June, he and </a:t>
-            </a:r>
-            <a:r>
-              <a:rPr lang="en-US" b="0" i="0" u="none" strike="noStrike" dirty="0">
-                <a:solidFill>
-                  <a:srgbClr val="0645AD"/>
-                </a:solidFill>
-                <a:effectLst/>
-                <a:latin typeface="Arial" panose="020B0604020202020204" pitchFamily="34" charset="0"/>
-                <a:hlinkClick r:id="rId7" tooltip="Claude Shannon"/>
-              </a:rPr>
-              <a:t>Claude Shannon</a:t>
-            </a:r>
-            <a:r>
-              <a:rPr lang="en-US" b="0" i="0" dirty="0">
-                <a:solidFill>
-                  <a:srgbClr val="202122"/>
-                </a:solidFill>
-                <a:effectLst/>
-                <a:latin typeface="Arial" panose="020B0604020202020204" pitchFamily="34" charset="0"/>
-              </a:rPr>
-              <a:t>, a founder of </a:t>
-            </a:r>
-            <a:r>
-              <a:rPr lang="en-US" b="0" i="0" u="none" strike="noStrike" dirty="0">
-                <a:solidFill>
-                  <a:srgbClr val="0645AD"/>
-                </a:solidFill>
-                <a:effectLst/>
-                <a:latin typeface="Arial" panose="020B0604020202020204" pitchFamily="34" charset="0"/>
-                <a:hlinkClick r:id="rId8" tooltip="Information theory"/>
-              </a:rPr>
-              <a:t>information theory</a:t>
-            </a:r>
-            <a:r>
-              <a:rPr lang="en-US" b="0" i="0" dirty="0">
-                <a:solidFill>
-                  <a:srgbClr val="202122"/>
-                </a:solidFill>
-                <a:effectLst/>
-                <a:latin typeface="Arial" panose="020B0604020202020204" pitchFamily="34" charset="0"/>
-              </a:rPr>
-              <a:t> then at </a:t>
-            </a:r>
-            <a:r>
-              <a:rPr lang="en-US" b="0" i="0" u="none" strike="noStrike" dirty="0">
-                <a:solidFill>
-                  <a:srgbClr val="0645AD"/>
-                </a:solidFill>
-                <a:effectLst/>
-                <a:latin typeface="Arial" panose="020B0604020202020204" pitchFamily="34" charset="0"/>
-                <a:hlinkClick r:id="rId9" tooltip="Bell Labs"/>
-              </a:rPr>
-              <a:t>Bell Labs</a:t>
-            </a:r>
-            <a:r>
-              <a:rPr lang="en-US" b="0" i="0" dirty="0">
-                <a:solidFill>
-                  <a:srgbClr val="202122"/>
-                </a:solidFill>
-                <a:effectLst/>
-                <a:latin typeface="Arial" panose="020B0604020202020204" pitchFamily="34" charset="0"/>
-              </a:rPr>
-              <a:t>, met with Robert Morison, Director of Biological and Medical Research to discuss the idea and possible funding, though Morison was unsure whether money would be made available for such a visionary project.</a:t>
-            </a:r>
-            <a:endParaRPr lang="en-US" b="0" i="0" u="none" strike="noStrike" baseline="30000" dirty="0">
-              <a:solidFill>
-                <a:srgbClr val="0645AD"/>
-              </a:solidFill>
-              <a:effectLst/>
-              <a:latin typeface="Arial" panose="020B0604020202020204" pitchFamily="34" charset="0"/>
-            </a:endParaRPr>
-          </a:p>
-          <a:p>
-            <a:pPr algn="l"/>
-            <a:endParaRPr lang="en-US" b="0" i="0" dirty="0">
-              <a:solidFill>
-                <a:srgbClr val="202122"/>
-              </a:solidFill>
-              <a:effectLst/>
-              <a:latin typeface="Arial" panose="020B0604020202020204" pitchFamily="34" charset="0"/>
-            </a:endParaRPr>
-          </a:p>
-          <a:p>
-            <a:pPr algn="l"/>
-            <a:r>
-              <a:rPr lang="en-US" b="0" i="0" dirty="0">
-                <a:solidFill>
-                  <a:srgbClr val="202122"/>
-                </a:solidFill>
-                <a:effectLst/>
-                <a:latin typeface="Arial" panose="020B0604020202020204" pitchFamily="34" charset="0"/>
-              </a:rPr>
-              <a:t>On September 2, 1955, the project was formally proposed by McCarthy, </a:t>
-            </a:r>
-            <a:r>
-              <a:rPr lang="en-US" b="0" i="0" u="none" strike="noStrike" dirty="0">
-                <a:solidFill>
-                  <a:srgbClr val="0645AD"/>
-                </a:solidFill>
-                <a:effectLst/>
-                <a:latin typeface="Arial" panose="020B0604020202020204" pitchFamily="34" charset="0"/>
-                <a:hlinkClick r:id="rId10" tooltip="Marvin Minsky"/>
-              </a:rPr>
-              <a:t>Marvin Minsky</a:t>
-            </a:r>
-            <a:r>
-              <a:rPr lang="en-US" b="0" i="0" dirty="0">
-                <a:solidFill>
-                  <a:srgbClr val="202122"/>
-                </a:solidFill>
-                <a:effectLst/>
-                <a:latin typeface="Arial" panose="020B0604020202020204" pitchFamily="34" charset="0"/>
-              </a:rPr>
-              <a:t>, </a:t>
-            </a:r>
-            <a:r>
-              <a:rPr lang="en-US" b="0" i="0" u="none" strike="noStrike" dirty="0">
-                <a:solidFill>
-                  <a:srgbClr val="0645AD"/>
-                </a:solidFill>
-                <a:effectLst/>
-                <a:latin typeface="Arial" panose="020B0604020202020204" pitchFamily="34" charset="0"/>
-                <a:hlinkClick r:id="rId11" tooltip="Nathaniel Rochester (computer scientist)"/>
-              </a:rPr>
-              <a:t>Nathaniel Rochester</a:t>
-            </a:r>
-            <a:r>
-              <a:rPr lang="en-US" b="0" i="0" dirty="0">
-                <a:solidFill>
-                  <a:srgbClr val="202122"/>
-                </a:solidFill>
-                <a:effectLst/>
-                <a:latin typeface="Arial" panose="020B0604020202020204" pitchFamily="34" charset="0"/>
-              </a:rPr>
-              <a:t> and </a:t>
-            </a:r>
-            <a:r>
-              <a:rPr lang="en-US" b="0" i="0" u="none" strike="noStrike" dirty="0">
-                <a:solidFill>
-                  <a:srgbClr val="0645AD"/>
-                </a:solidFill>
-                <a:effectLst/>
-                <a:latin typeface="Arial" panose="020B0604020202020204" pitchFamily="34" charset="0"/>
-                <a:hlinkClick r:id="rId7" tooltip="Claude Shannon"/>
-              </a:rPr>
-              <a:t>Claude Shannon</a:t>
-            </a:r>
-            <a:r>
-              <a:rPr lang="en-US" b="0" i="0" dirty="0">
-                <a:solidFill>
-                  <a:srgbClr val="202122"/>
-                </a:solidFill>
-                <a:effectLst/>
-                <a:latin typeface="Arial" panose="020B0604020202020204" pitchFamily="34" charset="0"/>
-              </a:rPr>
-              <a:t>. The proposal is credited with introducing the term 'artificial intelligence’.  The Rockefeller Foundation funded the proposal and the rest, as they say, “is history…”</a:t>
-            </a:r>
-          </a:p>
-          <a:p>
             <a:endParaRPr lang="en-US" dirty="0"/>
+          </a:p>
+        </p:txBody>
+      </p:sp>
+      <p:sp>
+        <p:nvSpPr>
+          <p:cNvPr id="4" name="Slide Number Placeholder 3"/>
+          <p:cNvSpPr>
+            <a:spLocks noGrp="1"/>
+          </p:cNvSpPr>
+          <p:nvPr>
+            <p:ph type="sldNum" sz="quarter" idx="5"/>
+          </p:nvPr>
+        </p:nvSpPr>
+        <p:spPr/>
+        <p:txBody>
+          <a:bodyPr/>
+          <a:lstStyle/>
+          <a:p>
+            <a:fld id="{3148858F-F1DB-4027-9C85-CCA6849540DD}" type="slidenum">
+              <a:rPr lang="en-US" smtClean="0"/>
+              <a:t>6</a:t>
+            </a:fld>
+            <a:endParaRPr lang="en-US"/>
           </a:p>
         </p:txBody>
       </p:sp>
     </p:spTree>
     <p:extLst>
       <p:ext uri="{BB962C8B-B14F-4D97-AF65-F5344CB8AC3E}">
-        <p14:creationId xmlns:p14="http://schemas.microsoft.com/office/powerpoint/2010/main" val="2400027281"/>
+        <p14:creationId xmlns:p14="http://schemas.microsoft.com/office/powerpoint/2010/main" val="3136242698"/>
       </p:ext>
     </p:extLst>
   </p:cSld>
@@ -2309,65 +2315,383 @@
       </p:grpSpPr>
       <p:sp>
         <p:nvSpPr>
-          <p:cNvPr id="2" name="Slide Image Placeholder 1"/>
-          <p:cNvSpPr>
-            <a:spLocks noGrp="1" noRot="1" noChangeAspect="1"/>
-          </p:cNvSpPr>
-          <p:nvPr>
-            <p:ph type="sldImg"/>
-          </p:nvPr>
-        </p:nvSpPr>
-        <p:spPr/>
-      </p:sp>
-      <p:sp>
-        <p:nvSpPr>
-          <p:cNvPr id="3" name="Notes Placeholder 2"/>
-          <p:cNvSpPr>
-            <a:spLocks noGrp="1"/>
-          </p:cNvSpPr>
-          <p:nvPr>
-            <p:ph type="body" idx="1"/>
-          </p:nvPr>
-        </p:nvSpPr>
-        <p:spPr/>
-        <p:txBody>
-          <a:bodyPr/>
+          <p:cNvPr id="7" name="Slide Number Placeholder 6">
+            <a:extLst>
+              <a:ext uri="{FF2B5EF4-FFF2-40B4-BE49-F238E27FC236}">
+                <a16:creationId xmlns:a16="http://schemas.microsoft.com/office/drawing/2014/main" id="{5B543A9C-E520-124D-A26C-727E7A91B5A6}"/>
+              </a:ext>
+            </a:extLst>
+          </p:cNvPr>
+          <p:cNvSpPr txBox="1">
+            <a:spLocks noGrp="1"/>
+          </p:cNvSpPr>
+          <p:nvPr>
+            <p:ph type="sldNum" sz="quarter" idx="5"/>
+          </p:nvPr>
+        </p:nvSpPr>
+        <p:spPr>
+          <a:ln/>
+        </p:spPr>
+        <p:txBody>
+          <a:bodyPr lIns="0" tIns="0" rIns="0" bIns="0" anchor="b" anchorCtr="0">
+            <a:noAutofit/>
+          </a:bodyPr>
           <a:lstStyle/>
           <a:p>
-            <a:r>
-              <a:rPr lang="en-US" dirty="0"/>
-              <a:t>With that history in place, let’s consider some other definitions – starting with the one advanced in the Dartmouth Proposal…</a:t>
-            </a:r>
-          </a:p>
-        </p:txBody>
-      </p:sp>
-      <p:sp>
-        <p:nvSpPr>
-          <p:cNvPr id="4" name="Slide Number Placeholder 3"/>
-          <p:cNvSpPr>
-            <a:spLocks noGrp="1"/>
-          </p:cNvSpPr>
-          <p:nvPr>
-            <p:ph type="sldNum" sz="quarter" idx="5"/>
-          </p:nvPr>
-        </p:nvSpPr>
-        <p:spPr/>
-        <p:txBody>
-          <a:bodyPr/>
-          <a:lstStyle/>
-          <a:p>
-            <a:fld id="{3148858F-F1DB-4027-9C85-CCA6849540DD}" type="slidenum">
-              <a:rPr lang="en-US" smtClean="0"/>
+            <a:pPr lvl="0"/>
+            <a:fld id="{F26ADB32-8A69-2C4E-BA54-385F30C1B140}" type="slidenum">
               <a:t>7</a:t>
             </a:fld>
             <a:endParaRPr lang="en-US"/>
           </a:p>
         </p:txBody>
       </p:sp>
+      <p:sp>
+        <p:nvSpPr>
+          <p:cNvPr id="2" name="Slide Image Placeholder 1">
+            <a:extLst>
+              <a:ext uri="{FF2B5EF4-FFF2-40B4-BE49-F238E27FC236}">
+                <a16:creationId xmlns:a16="http://schemas.microsoft.com/office/drawing/2014/main" id="{A02321D2-BA00-8D41-B3B0-CF9117442E2A}"/>
+              </a:ext>
+            </a:extLst>
+          </p:cNvPr>
+          <p:cNvSpPr>
+            <a:spLocks noGrp="1" noRot="1" noChangeAspect="1" noResize="1"/>
+          </p:cNvSpPr>
+          <p:nvPr>
+            <p:ph type="sldImg"/>
+          </p:nvPr>
+        </p:nvSpPr>
+        <p:spPr>
+          <a:xfrm>
+            <a:off x="533400" y="763588"/>
+            <a:ext cx="6704013" cy="3771900"/>
+          </a:xfrm>
+          <a:solidFill>
+            <a:srgbClr val="729FCF"/>
+          </a:solidFill>
+          <a:ln w="25400">
+            <a:solidFill>
+              <a:srgbClr val="3465A4"/>
+            </a:solidFill>
+            <a:prstDash val="solid"/>
+          </a:ln>
+        </p:spPr>
+      </p:sp>
+      <p:sp>
+        <p:nvSpPr>
+          <p:cNvPr id="3" name="Notes Placeholder 2">
+            <a:extLst>
+              <a:ext uri="{FF2B5EF4-FFF2-40B4-BE49-F238E27FC236}">
+                <a16:creationId xmlns:a16="http://schemas.microsoft.com/office/drawing/2014/main" id="{A04CBDCA-B8FC-AE47-9EA8-9C1755746D8B}"/>
+              </a:ext>
+            </a:extLst>
+          </p:cNvPr>
+          <p:cNvSpPr txBox="1">
+            <a:spLocks noGrp="1"/>
+          </p:cNvSpPr>
+          <p:nvPr>
+            <p:ph type="body" sz="quarter" idx="1"/>
+          </p:nvPr>
+        </p:nvSpPr>
+        <p:spPr/>
+        <p:txBody>
+          <a:bodyPr>
+            <a:spAutoFit/>
+          </a:bodyPr>
+          <a:lstStyle/>
+          <a:p>
+            <a:pPr algn="l"/>
+            <a:r>
+              <a:rPr lang="en-US" b="0" i="0" dirty="0">
+                <a:solidFill>
+                  <a:srgbClr val="202122"/>
+                </a:solidFill>
+                <a:effectLst/>
+                <a:latin typeface="Arial" panose="020B0604020202020204" pitchFamily="34" charset="0"/>
+              </a:rPr>
+              <a:t>In 1955, </a:t>
+            </a:r>
+            <a:r>
+              <a:rPr lang="en-US" b="0" i="0" u="none" strike="noStrike" dirty="0">
+                <a:solidFill>
+                  <a:srgbClr val="0645AD"/>
+                </a:solidFill>
+                <a:effectLst/>
+                <a:latin typeface="Arial" panose="020B0604020202020204" pitchFamily="34" charset="0"/>
+                <a:hlinkClick r:id="rId3" tooltip="John McCarthy (computer scientist)"/>
+              </a:rPr>
+              <a:t>John McCarthy</a:t>
+            </a:r>
+            <a:r>
+              <a:rPr lang="en-US" b="0" i="0" dirty="0">
+                <a:solidFill>
+                  <a:srgbClr val="202122"/>
+                </a:solidFill>
+                <a:effectLst/>
+                <a:latin typeface="Arial" panose="020B0604020202020204" pitchFamily="34" charset="0"/>
+              </a:rPr>
+              <a:t>, then a young Assistant Professor of Mathematics at </a:t>
+            </a:r>
+            <a:r>
+              <a:rPr lang="en-US" b="0" i="0" u="none" strike="noStrike" dirty="0">
+                <a:solidFill>
+                  <a:srgbClr val="0645AD"/>
+                </a:solidFill>
+                <a:effectLst/>
+                <a:latin typeface="Arial" panose="020B0604020202020204" pitchFamily="34" charset="0"/>
+                <a:hlinkClick r:id="rId4" tooltip="Dartmouth College"/>
+              </a:rPr>
+              <a:t>Dartmouth College</a:t>
+            </a:r>
+            <a:r>
+              <a:rPr lang="en-US" b="0" i="0" dirty="0">
+                <a:solidFill>
+                  <a:srgbClr val="202122"/>
+                </a:solidFill>
+                <a:effectLst/>
+                <a:latin typeface="Arial" panose="020B0604020202020204" pitchFamily="34" charset="0"/>
+              </a:rPr>
+              <a:t>, decided to organize a group to clarify and develop ideas about thinking machines. He picked the name 'Artificial Intelligence' for the new field. He chose the name partly for its neutrality; avoiding a focus on narrow automata theory while avoiding cybernetics which was heavily focused on analog feedback, as well as him potentially having to accept the assertive </a:t>
+            </a:r>
+            <a:r>
+              <a:rPr lang="en-US" b="0" i="0" u="none" strike="noStrike" dirty="0">
+                <a:solidFill>
+                  <a:srgbClr val="0645AD"/>
+                </a:solidFill>
+                <a:effectLst/>
+                <a:latin typeface="Arial" panose="020B0604020202020204" pitchFamily="34" charset="0"/>
+                <a:hlinkClick r:id="rId5" tooltip="Norbert Wiener"/>
+              </a:rPr>
+              <a:t>Norbert Wiener</a:t>
+            </a:r>
+            <a:r>
+              <a:rPr lang="en-US" b="0" i="0" dirty="0">
+                <a:solidFill>
+                  <a:srgbClr val="202122"/>
+                </a:solidFill>
+                <a:effectLst/>
+                <a:latin typeface="Arial" panose="020B0604020202020204" pitchFamily="34" charset="0"/>
+              </a:rPr>
+              <a:t> as guru or having to argue with him.</a:t>
+            </a:r>
+            <a:endParaRPr lang="en-US" b="0" i="0" u="none" strike="noStrike" baseline="30000" dirty="0">
+              <a:solidFill>
+                <a:srgbClr val="0645AD"/>
+              </a:solidFill>
+              <a:effectLst/>
+              <a:latin typeface="Arial" panose="020B0604020202020204" pitchFamily="34" charset="0"/>
+            </a:endParaRPr>
+          </a:p>
+          <a:p>
+            <a:pPr algn="l"/>
+            <a:endParaRPr lang="en-US" b="0" i="0" dirty="0">
+              <a:solidFill>
+                <a:srgbClr val="202122"/>
+              </a:solidFill>
+              <a:effectLst/>
+              <a:latin typeface="Arial" panose="020B0604020202020204" pitchFamily="34" charset="0"/>
+            </a:endParaRPr>
+          </a:p>
+          <a:p>
+            <a:pPr algn="l"/>
+            <a:r>
+              <a:rPr lang="en-US" b="0" i="0" dirty="0">
+                <a:solidFill>
+                  <a:srgbClr val="202122"/>
+                </a:solidFill>
+                <a:effectLst/>
+                <a:latin typeface="Arial" panose="020B0604020202020204" pitchFamily="34" charset="0"/>
+              </a:rPr>
+              <a:t>In early 1955, McCarthy approached the </a:t>
+            </a:r>
+            <a:r>
+              <a:rPr lang="en-US" b="0" i="0" u="none" strike="noStrike" dirty="0">
+                <a:solidFill>
+                  <a:srgbClr val="0645AD"/>
+                </a:solidFill>
+                <a:effectLst/>
+                <a:latin typeface="Arial" panose="020B0604020202020204" pitchFamily="34" charset="0"/>
+                <a:hlinkClick r:id="rId6" tooltip="Rockefeller Foundation"/>
+              </a:rPr>
+              <a:t>Rockefeller Foundation</a:t>
+            </a:r>
+            <a:r>
+              <a:rPr lang="en-US" b="0" i="0" dirty="0">
+                <a:solidFill>
+                  <a:srgbClr val="202122"/>
+                </a:solidFill>
+                <a:effectLst/>
+                <a:latin typeface="Arial" panose="020B0604020202020204" pitchFamily="34" charset="0"/>
+              </a:rPr>
+              <a:t> to request funding for a summer seminar at Dartmouth for about 10 participants. In June, he and </a:t>
+            </a:r>
+            <a:r>
+              <a:rPr lang="en-US" b="0" i="0" u="none" strike="noStrike" dirty="0">
+                <a:solidFill>
+                  <a:srgbClr val="0645AD"/>
+                </a:solidFill>
+                <a:effectLst/>
+                <a:latin typeface="Arial" panose="020B0604020202020204" pitchFamily="34" charset="0"/>
+                <a:hlinkClick r:id="rId7" tooltip="Claude Shannon"/>
+              </a:rPr>
+              <a:t>Claude Shannon</a:t>
+            </a:r>
+            <a:r>
+              <a:rPr lang="en-US" b="0" i="0" dirty="0">
+                <a:solidFill>
+                  <a:srgbClr val="202122"/>
+                </a:solidFill>
+                <a:effectLst/>
+                <a:latin typeface="Arial" panose="020B0604020202020204" pitchFamily="34" charset="0"/>
+              </a:rPr>
+              <a:t>, a founder of </a:t>
+            </a:r>
+            <a:r>
+              <a:rPr lang="en-US" b="0" i="0" u="none" strike="noStrike" dirty="0">
+                <a:solidFill>
+                  <a:srgbClr val="0645AD"/>
+                </a:solidFill>
+                <a:effectLst/>
+                <a:latin typeface="Arial" panose="020B0604020202020204" pitchFamily="34" charset="0"/>
+                <a:hlinkClick r:id="rId8" tooltip="Information theory"/>
+              </a:rPr>
+              <a:t>information theory</a:t>
+            </a:r>
+            <a:r>
+              <a:rPr lang="en-US" b="0" i="0" dirty="0">
+                <a:solidFill>
+                  <a:srgbClr val="202122"/>
+                </a:solidFill>
+                <a:effectLst/>
+                <a:latin typeface="Arial" panose="020B0604020202020204" pitchFamily="34" charset="0"/>
+              </a:rPr>
+              <a:t> then at </a:t>
+            </a:r>
+            <a:r>
+              <a:rPr lang="en-US" b="0" i="0" u="none" strike="noStrike" dirty="0">
+                <a:solidFill>
+                  <a:srgbClr val="0645AD"/>
+                </a:solidFill>
+                <a:effectLst/>
+                <a:latin typeface="Arial" panose="020B0604020202020204" pitchFamily="34" charset="0"/>
+                <a:hlinkClick r:id="rId9" tooltip="Bell Labs"/>
+              </a:rPr>
+              <a:t>Bell Labs</a:t>
+            </a:r>
+            <a:r>
+              <a:rPr lang="en-US" b="0" i="0" dirty="0">
+                <a:solidFill>
+                  <a:srgbClr val="202122"/>
+                </a:solidFill>
+                <a:effectLst/>
+                <a:latin typeface="Arial" panose="020B0604020202020204" pitchFamily="34" charset="0"/>
+              </a:rPr>
+              <a:t>, met with Robert Morison, Director of Biological and Medical Research to discuss the idea and possible funding, though Morison was unsure whether money would be made available for such a visionary project.</a:t>
+            </a:r>
+            <a:endParaRPr lang="en-US" b="0" i="0" u="none" strike="noStrike" baseline="30000" dirty="0">
+              <a:solidFill>
+                <a:srgbClr val="0645AD"/>
+              </a:solidFill>
+              <a:effectLst/>
+              <a:latin typeface="Arial" panose="020B0604020202020204" pitchFamily="34" charset="0"/>
+            </a:endParaRPr>
+          </a:p>
+          <a:p>
+            <a:pPr algn="l"/>
+            <a:endParaRPr lang="en-US" b="0" i="0" dirty="0">
+              <a:solidFill>
+                <a:srgbClr val="202122"/>
+              </a:solidFill>
+              <a:effectLst/>
+              <a:latin typeface="Arial" panose="020B0604020202020204" pitchFamily="34" charset="0"/>
+            </a:endParaRPr>
+          </a:p>
+          <a:p>
+            <a:pPr algn="l"/>
+            <a:r>
+              <a:rPr lang="en-US" b="0" i="0" dirty="0">
+                <a:solidFill>
+                  <a:srgbClr val="202122"/>
+                </a:solidFill>
+                <a:effectLst/>
+                <a:latin typeface="Arial" panose="020B0604020202020204" pitchFamily="34" charset="0"/>
+              </a:rPr>
+              <a:t>On September 2, 1955, the project was formally proposed by McCarthy, </a:t>
+            </a:r>
+            <a:r>
+              <a:rPr lang="en-US" b="0" i="0" u="none" strike="noStrike" dirty="0">
+                <a:solidFill>
+                  <a:srgbClr val="0645AD"/>
+                </a:solidFill>
+                <a:effectLst/>
+                <a:latin typeface="Arial" panose="020B0604020202020204" pitchFamily="34" charset="0"/>
+                <a:hlinkClick r:id="rId10" tooltip="Marvin Minsky"/>
+              </a:rPr>
+              <a:t>Marvin Minsky</a:t>
+            </a:r>
+            <a:r>
+              <a:rPr lang="en-US" b="0" i="0" dirty="0">
+                <a:solidFill>
+                  <a:srgbClr val="202122"/>
+                </a:solidFill>
+                <a:effectLst/>
+                <a:latin typeface="Arial" panose="020B0604020202020204" pitchFamily="34" charset="0"/>
+              </a:rPr>
+              <a:t>, </a:t>
+            </a:r>
+            <a:r>
+              <a:rPr lang="en-US" b="0" i="0" u="none" strike="noStrike" dirty="0">
+                <a:solidFill>
+                  <a:srgbClr val="0645AD"/>
+                </a:solidFill>
+                <a:effectLst/>
+                <a:latin typeface="Arial" panose="020B0604020202020204" pitchFamily="34" charset="0"/>
+                <a:hlinkClick r:id="rId11" tooltip="Nathaniel Rochester (computer scientist)"/>
+              </a:rPr>
+              <a:t>Nathaniel Rochester</a:t>
+            </a:r>
+            <a:r>
+              <a:rPr lang="en-US" b="0" i="0" dirty="0">
+                <a:solidFill>
+                  <a:srgbClr val="202122"/>
+                </a:solidFill>
+                <a:effectLst/>
+                <a:latin typeface="Arial" panose="020B0604020202020204" pitchFamily="34" charset="0"/>
+              </a:rPr>
+              <a:t> and </a:t>
+            </a:r>
+            <a:r>
+              <a:rPr lang="en-US" b="0" i="0" u="none" strike="noStrike" dirty="0">
+                <a:solidFill>
+                  <a:srgbClr val="0645AD"/>
+                </a:solidFill>
+                <a:effectLst/>
+                <a:latin typeface="Arial" panose="020B0604020202020204" pitchFamily="34" charset="0"/>
+                <a:hlinkClick r:id="rId7" tooltip="Claude Shannon"/>
+              </a:rPr>
+              <a:t>Claude Shannon</a:t>
+            </a:r>
+            <a:r>
+              <a:rPr lang="en-US" b="0" i="0" dirty="0">
+                <a:solidFill>
+                  <a:srgbClr val="202122"/>
+                </a:solidFill>
+                <a:effectLst/>
+                <a:latin typeface="Arial" panose="020B0604020202020204" pitchFamily="34" charset="0"/>
+              </a:rPr>
+              <a:t>. The proposal is credited with introducing the term 'artificial intelligence’.  The Rockefeller Foundation funded the proposal and the rest, as they say, “is history…”</a:t>
+            </a:r>
+          </a:p>
+          <a:p>
+            <a:endParaRPr lang="en-US" dirty="0"/>
+          </a:p>
+        </p:txBody>
+      </p:sp>
     </p:spTree>
     <p:extLst>
       <p:ext uri="{BB962C8B-B14F-4D97-AF65-F5344CB8AC3E}">
-        <p14:creationId xmlns:p14="http://schemas.microsoft.com/office/powerpoint/2010/main" val="1011519860"/>
+        <p14:creationId xmlns:p14="http://schemas.microsoft.com/office/powerpoint/2010/main" val="2400027281"/>
       </p:ext>
     </p:extLst>
   </p:cSld>
@@ -2421,20 +2745,9 @@
           <a:bodyPr/>
           <a:lstStyle/>
           <a:p>
-            <a:endParaRPr lang="en-US" sz="1200" b="0" i="0" kern="1200" dirty="0">
-              <a:solidFill>
-                <a:schemeClr val="tx1"/>
-              </a:solidFill>
-              <a:effectLst/>
-              <a:latin typeface="+mn-lt"/>
-              <a:ea typeface="+mn-ea"/>
-              <a:cs typeface="+mn-cs"/>
-            </a:endParaRPr>
-          </a:p>
-          <a:p>
             <a:r>
               <a:rPr lang="en-US" dirty="0"/>
-              <a:t>… and some more definitions to consider.</a:t>
+              <a:t>With that history in place, let’s consider some other definitions – starting with the one advanced in the Dartmouth Proposal…</a:t>
             </a:r>
           </a:p>
         </p:txBody>
@@ -2465,7 +2778,7 @@
     </p:spTree>
     <p:extLst>
       <p:ext uri="{BB962C8B-B14F-4D97-AF65-F5344CB8AC3E}">
-        <p14:creationId xmlns:p14="http://schemas.microsoft.com/office/powerpoint/2010/main" val="4028108833"/>
+        <p14:creationId xmlns:p14="http://schemas.microsoft.com/office/powerpoint/2010/main" val="1011519860"/>
       </p:ext>
     </p:extLst>
   </p:cSld>
@@ -2519,94 +2832,21 @@
           <a:bodyPr/>
           <a:lstStyle/>
           <a:p>
-            <a:pPr marL="0" marR="0" lvl="0" indent="0" algn="l" defTabSz="914400" rtl="0" eaLnBrk="1" fontAlgn="auto" latinLnBrk="0" hangingPunct="1">
-              <a:lnSpc>
-                <a:spcPct val="100000"/>
-              </a:lnSpc>
-              <a:spcBef>
-                <a:spcPts val="0"/>
-              </a:spcBef>
-              <a:spcAft>
-                <a:spcPts val="0"/>
-              </a:spcAft>
-              <a:buClrTx/>
-              <a:buSzTx/>
-              <a:buFontTx/>
-              <a:buNone/>
-              <a:tabLst/>
-              <a:defRPr/>
-            </a:pPr>
-            <a:r>
-              <a:rPr lang="en-US" sz="1200" b="0" i="0" u="none" strike="noStrike" kern="1200" cap="none" dirty="0">
-                <a:ln>
-                  <a:noFill/>
-                </a:ln>
-                <a:latin typeface="Arial" pitchFamily="34"/>
-                <a:ea typeface="Arial" pitchFamily="34"/>
-                <a:cs typeface="Arial" pitchFamily="34"/>
-              </a:rPr>
-              <a:t>Okay – given these definitions and the assigned reading for this week – has your initial definition of A.I. changed?  </a:t>
-            </a:r>
-          </a:p>
-          <a:p>
-            <a:pPr marL="0" marR="0" lvl="0" indent="0" algn="l" defTabSz="914400" rtl="0" eaLnBrk="1" fontAlgn="auto" latinLnBrk="0" hangingPunct="1">
-              <a:lnSpc>
-                <a:spcPct val="100000"/>
-              </a:lnSpc>
-              <a:spcBef>
-                <a:spcPts val="0"/>
-              </a:spcBef>
-              <a:spcAft>
-                <a:spcPts val="0"/>
-              </a:spcAft>
-              <a:buClrTx/>
-              <a:buSzTx/>
-              <a:buFontTx/>
-              <a:buNone/>
-              <a:tabLst/>
-              <a:defRPr/>
-            </a:pPr>
-            <a:endParaRPr lang="en-US" sz="1200" b="0" i="0" u="none" strike="noStrike" kern="1200" cap="none" dirty="0">
-              <a:ln>
-                <a:noFill/>
-              </a:ln>
-              <a:latin typeface="Arial" pitchFamily="34"/>
-              <a:ea typeface="Arial" pitchFamily="34"/>
-              <a:cs typeface="Arial" pitchFamily="34"/>
+            <a:endParaRPr lang="en-US" sz="1200" b="0" i="0" kern="1200" dirty="0">
+              <a:solidFill>
+                <a:schemeClr val="tx1"/>
+              </a:solidFill>
+              <a:effectLst/>
+              <a:latin typeface="+mn-lt"/>
+              <a:ea typeface="+mn-ea"/>
+              <a:cs typeface="+mn-cs"/>
             </a:endParaRPr>
           </a:p>
           <a:p>
-            <a:pPr marL="0" marR="0" lvl="0" indent="0" algn="l" defTabSz="914400" rtl="0" eaLnBrk="1" fontAlgn="auto" latinLnBrk="0" hangingPunct="1">
-              <a:lnSpc>
-                <a:spcPct val="100000"/>
-              </a:lnSpc>
-              <a:spcBef>
-                <a:spcPts val="0"/>
-              </a:spcBef>
-              <a:spcAft>
-                <a:spcPts val="0"/>
-              </a:spcAft>
-              <a:buClrTx/>
-              <a:buSzTx/>
-              <a:buFontTx/>
-              <a:buNone/>
-              <a:tabLst/>
-              <a:defRPr/>
-            </a:pPr>
-            <a:r>
-              <a:rPr lang="en-US" sz="1200" b="0" i="0" u="none" strike="noStrike" kern="1200" cap="none" dirty="0">
-                <a:ln>
-                  <a:noFill/>
-                </a:ln>
-                <a:latin typeface="Arial" pitchFamily="34"/>
-                <a:ea typeface="Arial" pitchFamily="34"/>
-                <a:cs typeface="Arial" pitchFamily="34"/>
-              </a:rPr>
-              <a:t>Let’s discuss these questions in the breakout rooms. </a:t>
-            </a:r>
-          </a:p>
-          <a:p>
-            <a:endParaRPr lang="en-US" dirty="0"/>
+            <a:r>
+              <a:rPr lang="en-US" dirty="0"/>
+              <a:t>… and some more definitions to consider.</a:t>
+            </a:r>
           </a:p>
         </p:txBody>
       </p:sp>
@@ -2636,7 +2876,7 @@
     </p:spTree>
     <p:extLst>
       <p:ext uri="{BB962C8B-B14F-4D97-AF65-F5344CB8AC3E}">
-        <p14:creationId xmlns:p14="http://schemas.microsoft.com/office/powerpoint/2010/main" val="3136242698"/>
+        <p14:creationId xmlns:p14="http://schemas.microsoft.com/office/powerpoint/2010/main" val="4028108833"/>
       </p:ext>
     </p:extLst>
   </p:cSld>
@@ -2793,7 +3033,7 @@
           <a:p>
             <a:fld id="{C3F78080-8D0A-4BE8-A5B4-CB115102D524}" type="datetimeFigureOut">
               <a:rPr lang="en-US" smtClean="0"/>
-              <a:t>8/23/2021</a:t>
+              <a:t>8/26/2021</a:t>
             </a:fld>
             <a:endParaRPr lang="en-US"/>
           </a:p>
@@ -2991,7 +3231,7 @@
           <a:p>
             <a:fld id="{C3F78080-8D0A-4BE8-A5B4-CB115102D524}" type="datetimeFigureOut">
               <a:rPr lang="en-US" smtClean="0"/>
-              <a:t>8/23/2021</a:t>
+              <a:t>8/26/2021</a:t>
             </a:fld>
             <a:endParaRPr lang="en-US"/>
           </a:p>
@@ -3199,7 +3439,7 @@
           <a:p>
             <a:fld id="{C3F78080-8D0A-4BE8-A5B4-CB115102D524}" type="datetimeFigureOut">
               <a:rPr lang="en-US" smtClean="0"/>
-              <a:t>8/23/2021</a:t>
+              <a:t>8/26/2021</a:t>
             </a:fld>
             <a:endParaRPr lang="en-US"/>
           </a:p>
@@ -3397,7 +3637,7 @@
           <a:p>
             <a:fld id="{C3F78080-8D0A-4BE8-A5B4-CB115102D524}" type="datetimeFigureOut">
               <a:rPr lang="en-US" smtClean="0"/>
-              <a:t>8/23/2021</a:t>
+              <a:t>8/26/2021</a:t>
             </a:fld>
             <a:endParaRPr lang="en-US"/>
           </a:p>
@@ -3672,7 +3912,7 @@
           <a:p>
             <a:fld id="{C3F78080-8D0A-4BE8-A5B4-CB115102D524}" type="datetimeFigureOut">
               <a:rPr lang="en-US" smtClean="0"/>
-              <a:t>8/23/2021</a:t>
+              <a:t>8/26/2021</a:t>
             </a:fld>
             <a:endParaRPr lang="en-US"/>
           </a:p>
@@ -3937,7 +4177,7 @@
           <a:p>
             <a:fld id="{C3F78080-8D0A-4BE8-A5B4-CB115102D524}" type="datetimeFigureOut">
               <a:rPr lang="en-US" smtClean="0"/>
-              <a:t>8/23/2021</a:t>
+              <a:t>8/26/2021</a:t>
             </a:fld>
             <a:endParaRPr lang="en-US"/>
           </a:p>
@@ -4349,7 +4589,7 @@
           <a:p>
             <a:fld id="{C3F78080-8D0A-4BE8-A5B4-CB115102D524}" type="datetimeFigureOut">
               <a:rPr lang="en-US" smtClean="0"/>
-              <a:t>8/23/2021</a:t>
+              <a:t>8/26/2021</a:t>
             </a:fld>
             <a:endParaRPr lang="en-US"/>
           </a:p>
@@ -4490,7 +4730,7 @@
           <a:p>
             <a:fld id="{C3F78080-8D0A-4BE8-A5B4-CB115102D524}" type="datetimeFigureOut">
               <a:rPr lang="en-US" smtClean="0"/>
-              <a:t>8/23/2021</a:t>
+              <a:t>8/26/2021</a:t>
             </a:fld>
             <a:endParaRPr lang="en-US"/>
           </a:p>
@@ -4603,7 +4843,7 @@
           <a:p>
             <a:fld id="{C3F78080-8D0A-4BE8-A5B4-CB115102D524}" type="datetimeFigureOut">
               <a:rPr lang="en-US" smtClean="0"/>
-              <a:t>8/23/2021</a:t>
+              <a:t>8/26/2021</a:t>
             </a:fld>
             <a:endParaRPr lang="en-US"/>
           </a:p>
@@ -4914,7 +5154,7 @@
           <a:p>
             <a:fld id="{C3F78080-8D0A-4BE8-A5B4-CB115102D524}" type="datetimeFigureOut">
               <a:rPr lang="en-US" smtClean="0"/>
-              <a:t>8/23/2021</a:t>
+              <a:t>8/26/2021</a:t>
             </a:fld>
             <a:endParaRPr lang="en-US"/>
           </a:p>
@@ -5202,7 +5442,7 @@
           <a:p>
             <a:fld id="{C3F78080-8D0A-4BE8-A5B4-CB115102D524}" type="datetimeFigureOut">
               <a:rPr lang="en-US" smtClean="0"/>
-              <a:t>8/23/2021</a:t>
+              <a:t>8/26/2021</a:t>
             </a:fld>
             <a:endParaRPr lang="en-US"/>
           </a:p>
@@ -5443,7 +5683,7 @@
           <a:p>
             <a:fld id="{C3F78080-8D0A-4BE8-A5B4-CB115102D524}" type="datetimeFigureOut">
               <a:rPr lang="en-US" smtClean="0"/>
-              <a:t>8/23/2021</a:t>
+              <a:t>8/26/2021</a:t>
             </a:fld>
             <a:endParaRPr lang="en-US"/>
           </a:p>
@@ -5944,12 +6184,12 @@
   </p:clrMapOvr>
   <mc:AlternateContent xmlns:mc="http://schemas.openxmlformats.org/markup-compatibility/2006" xmlns:p14="http://schemas.microsoft.com/office/powerpoint/2010/main">
     <mc:Choice Requires="p14">
-      <p:transition spd="slow" p14:dur="3400">
-        <p14:reveal/>
+      <p:transition spd="med" p14:dur="700">
+        <p:fade/>
       </p:transition>
     </mc:Choice>
     <mc:Fallback xmlns="">
-      <p:transition spd="slow">
+      <p:transition spd="med">
         <p:fade/>
       </p:transition>
     </mc:Fallback>
@@ -5958,6 +6198,140 @@
 </file>
 
 <file path=ppt/slides/slide10.xml><?xml version="1.0" encoding="utf-8"?>
+<p:sld xmlns:a="http://schemas.openxmlformats.org/drawingml/2006/main" xmlns:r="http://schemas.openxmlformats.org/officeDocument/2006/relationships" xmlns:p="http://schemas.openxmlformats.org/presentationml/2006/main">
+  <p:cSld>
+    <p:spTree>
+      <p:nvGrpSpPr>
+        <p:cNvPr id="1" name=""/>
+        <p:cNvGrpSpPr/>
+        <p:nvPr/>
+      </p:nvGrpSpPr>
+      <p:grpSpPr>
+        <a:xfrm>
+          <a:off x="0" y="0"/>
+          <a:ext cx="0" cy="0"/>
+          <a:chOff x="0" y="0"/>
+          <a:chExt cx="0" cy="0"/>
+        </a:xfrm>
+      </p:grpSpPr>
+      <p:sp>
+        <p:nvSpPr>
+          <p:cNvPr id="4" name="Title 1">
+            <a:extLst>
+              <a:ext uri="{FF2B5EF4-FFF2-40B4-BE49-F238E27FC236}">
+                <a16:creationId xmlns:a16="http://schemas.microsoft.com/office/drawing/2014/main" id="{6680213F-0526-4F87-BFD0-77AFE4C83667}"/>
+              </a:ext>
+            </a:extLst>
+          </p:cNvPr>
+          <p:cNvSpPr>
+            <a:spLocks noGrp="1"/>
+          </p:cNvSpPr>
+          <p:nvPr>
+            <p:ph type="title"/>
+          </p:nvPr>
+        </p:nvSpPr>
+        <p:spPr>
+          <a:xfrm>
+            <a:off x="0" y="271472"/>
+            <a:ext cx="12192000" cy="1500188"/>
+          </a:xfrm>
+          <a:noFill/>
+        </p:spPr>
+        <p:txBody>
+          <a:bodyPr>
+            <a:normAutofit/>
+          </a:bodyPr>
+          <a:lstStyle/>
+          <a:p>
+            <a:pPr marL="0" marR="0" lvl="0" indent="0" algn="ctr" hangingPunct="0">
+              <a:lnSpc>
+                <a:spcPct val="100000"/>
+              </a:lnSpc>
+              <a:spcBef>
+                <a:spcPts val="0"/>
+              </a:spcBef>
+              <a:spcAft>
+                <a:spcPts val="1440"/>
+              </a:spcAft>
+              <a:buNone/>
+              <a:tabLst/>
+            </a:pPr>
+            <a:r>
+              <a:rPr lang="en-US" sz="2800" b="0" i="0" u="none" strike="noStrike" kern="1200" cap="none" dirty="0">
+                <a:ln>
+                  <a:noFill/>
+                </a:ln>
+                <a:latin typeface="Palatino Linotype" panose="02040502050505030304" pitchFamily="18" charset="0"/>
+                <a:ea typeface="Arial" pitchFamily="34"/>
+                <a:cs typeface="Arial" pitchFamily="34"/>
+              </a:rPr>
+              <a:t>What do you think?  What is the defining feature of “intelligence”?</a:t>
+            </a:r>
+          </a:p>
+        </p:txBody>
+      </p:sp>
+      <p:pic>
+        <p:nvPicPr>
+          <p:cNvPr id="7" name="Picture 6">
+            <a:extLst>
+              <a:ext uri="{FF2B5EF4-FFF2-40B4-BE49-F238E27FC236}">
+                <a16:creationId xmlns:a16="http://schemas.microsoft.com/office/drawing/2014/main" id="{D64AE8E3-29B7-4073-93F4-02E3DBB765A8}"/>
+              </a:ext>
+            </a:extLst>
+          </p:cNvPr>
+          <p:cNvPicPr>
+            <a:picLocks noChangeAspect="1"/>
+          </p:cNvPicPr>
+          <p:nvPr/>
+        </p:nvPicPr>
+        <p:blipFill>
+          <a:blip r:embed="rId3">
+            <a:extLst>
+              <a:ext uri="{28A0092B-C50C-407E-A947-70E740481C1C}">
+                <a14:useLocalDpi xmlns:a14="http://schemas.microsoft.com/office/drawing/2010/main" val="0"/>
+              </a:ext>
+            </a:extLst>
+          </a:blip>
+          <a:stretch>
+            <a:fillRect/>
+          </a:stretch>
+        </p:blipFill>
+        <p:spPr>
+          <a:xfrm>
+            <a:off x="191238" y="2018319"/>
+            <a:ext cx="11809523" cy="4825397"/>
+          </a:xfrm>
+          <a:prstGeom prst="rect">
+            <a:avLst/>
+          </a:prstGeom>
+        </p:spPr>
+      </p:pic>
+    </p:spTree>
+    <p:extLst>
+      <p:ext uri="{BB962C8B-B14F-4D97-AF65-F5344CB8AC3E}">
+        <p14:creationId xmlns:p14="http://schemas.microsoft.com/office/powerpoint/2010/main" val="2600672581"/>
+      </p:ext>
+    </p:extLst>
+  </p:cSld>
+  <p:clrMapOvr>
+    <a:masterClrMapping/>
+  </p:clrMapOvr>
+  <mc:AlternateContent xmlns:mc="http://schemas.openxmlformats.org/markup-compatibility/2006" xmlns:p14="http://schemas.microsoft.com/office/powerpoint/2010/main">
+    <mc:Choice Requires="p14">
+      <p:transition spd="med" p14:dur="700">
+        <p:fade/>
+      </p:transition>
+    </mc:Choice>
+    <mc:Fallback xmlns="">
+      <p:transition spd="med">
+        <p:fade/>
+      </p:transition>
+    </mc:Fallback>
+  </mc:AlternateContent>
+</p:sld>
+</file>
+
+<file path=ppt/slides/slide11.xml><?xml version="1.0" encoding="utf-8"?>
 <p:sld xmlns:a="http://schemas.openxmlformats.org/drawingml/2006/main" xmlns:r="http://schemas.openxmlformats.org/officeDocument/2006/relationships" xmlns:p="http://schemas.openxmlformats.org/presentationml/2006/main">
   <p:cSld>
     <p:spTree>
@@ -6059,7 +6433,7 @@
 </p:sld>
 </file>
 
-<file path=ppt/slides/slide11.xml><?xml version="1.0" encoding="utf-8"?>
+<file path=ppt/slides/slide12.xml><?xml version="1.0" encoding="utf-8"?>
 <p:sld xmlns:a="http://schemas.openxmlformats.org/drawingml/2006/main" xmlns:r="http://schemas.openxmlformats.org/officeDocument/2006/relationships" xmlns:p="http://schemas.openxmlformats.org/presentationml/2006/main">
   <p:cSld>
     <p:spTree>
@@ -6139,135 +6513,6 @@
   </p:clrMapOvr>
   <mc:AlternateContent xmlns:mc="http://schemas.openxmlformats.org/markup-compatibility/2006" xmlns:p14="http://schemas.microsoft.com/office/powerpoint/2010/main">
     <mc:Choice Requires="p14">
-      <p:transition spd="slow" p14:dur="3400">
-        <p14:reveal/>
-      </p:transition>
-    </mc:Choice>
-    <mc:Fallback xmlns="">
-      <p:transition spd="slow">
-        <p:fade/>
-      </p:transition>
-    </mc:Fallback>
-  </mc:AlternateContent>
-</p:sld>
-</file>
-
-<file path=ppt/slides/slide12.xml><?xml version="1.0" encoding="utf-8"?>
-<p:sld xmlns:a="http://schemas.openxmlformats.org/drawingml/2006/main" xmlns:r="http://schemas.openxmlformats.org/officeDocument/2006/relationships" xmlns:p="http://schemas.openxmlformats.org/presentationml/2006/main">
-  <p:cSld>
-    <p:spTree>
-      <p:nvGrpSpPr>
-        <p:cNvPr id="1" name=""/>
-        <p:cNvGrpSpPr/>
-        <p:nvPr/>
-      </p:nvGrpSpPr>
-      <p:grpSpPr>
-        <a:xfrm>
-          <a:off x="0" y="0"/>
-          <a:ext cx="0" cy="0"/>
-          <a:chOff x="0" y="0"/>
-          <a:chExt cx="0" cy="0"/>
-        </a:xfrm>
-      </p:grpSpPr>
-      <p:sp>
-        <p:nvSpPr>
-          <p:cNvPr id="8" name="Title 1">
-            <a:extLst>
-              <a:ext uri="{FF2B5EF4-FFF2-40B4-BE49-F238E27FC236}">
-                <a16:creationId xmlns:a16="http://schemas.microsoft.com/office/drawing/2014/main" id="{16C8D218-2D56-40BC-AC60-89E854D3E63B}"/>
-              </a:ext>
-            </a:extLst>
-          </p:cNvPr>
-          <p:cNvSpPr txBox="1">
-            <a:spLocks/>
-          </p:cNvSpPr>
-          <p:nvPr/>
-        </p:nvSpPr>
-        <p:spPr>
-          <a:xfrm>
-            <a:off x="838200" y="2678906"/>
-            <a:ext cx="10515600" cy="1500188"/>
-          </a:xfrm>
-          <a:prstGeom prst="rect">
-            <a:avLst/>
-          </a:prstGeom>
-          <a:noFill/>
-        </p:spPr>
-        <p:txBody>
-          <a:bodyPr vert="horz" lIns="91440" tIns="45720" rIns="91440" bIns="45720" rtlCol="0" anchor="ctr">
-            <a:normAutofit/>
-          </a:bodyPr>
-          <a:lstStyle>
-            <a:lvl1pPr algn="l" defTabSz="914400" rtl="0" eaLnBrk="1" latinLnBrk="0" hangingPunct="1">
-              <a:lnSpc>
-                <a:spcPct val="90000"/>
-              </a:lnSpc>
-              <a:spcBef>
-                <a:spcPct val="0"/>
-              </a:spcBef>
-              <a:buNone/>
-              <a:defRPr sz="4400" kern="1200">
-                <a:solidFill>
-                  <a:schemeClr val="tx1"/>
-                </a:solidFill>
-                <a:latin typeface="+mj-lt"/>
-                <a:ea typeface="+mj-ea"/>
-                <a:cs typeface="+mj-cs"/>
-              </a:defRPr>
-            </a:lvl1pPr>
-          </a:lstStyle>
-          <a:p>
-            <a:pPr algn="ctr"/>
-            <a:r>
-              <a:rPr lang="en-US" sz="5400" dirty="0">
-                <a:solidFill>
-                  <a:srgbClr val="4B83B5"/>
-                </a:solidFill>
-                <a:latin typeface="Palatino Linotype" panose="02040502050505030304" pitchFamily="18" charset="0"/>
-                <a:cs typeface="Segoe UI Light" panose="020B0502040204020203" pitchFamily="34" charset="0"/>
-              </a:rPr>
-              <a:t>ELIZA</a:t>
-            </a:r>
-          </a:p>
-        </p:txBody>
-      </p:sp>
-      <p:sp>
-        <p:nvSpPr>
-          <p:cNvPr id="5" name="Title 4">
-            <a:extLst>
-              <a:ext uri="{FF2B5EF4-FFF2-40B4-BE49-F238E27FC236}">
-                <a16:creationId xmlns:a16="http://schemas.microsoft.com/office/drawing/2014/main" id="{D2C58B67-0AB1-4C0E-9AC7-05C4FEFA7EDA}"/>
-              </a:ext>
-            </a:extLst>
-          </p:cNvPr>
-          <p:cNvSpPr>
-            <a:spLocks noGrp="1"/>
-          </p:cNvSpPr>
-          <p:nvPr>
-            <p:ph type="title"/>
-          </p:nvPr>
-        </p:nvSpPr>
-        <p:spPr/>
-        <p:txBody>
-          <a:bodyPr/>
-          <a:lstStyle/>
-          <a:p>
-            <a:endParaRPr lang="en-US"/>
-          </a:p>
-        </p:txBody>
-      </p:sp>
-    </p:spTree>
-    <p:extLst>
-      <p:ext uri="{BB962C8B-B14F-4D97-AF65-F5344CB8AC3E}">
-        <p14:creationId xmlns:p14="http://schemas.microsoft.com/office/powerpoint/2010/main" val="1226819478"/>
-      </p:ext>
-    </p:extLst>
-  </p:cSld>
-  <p:clrMapOvr>
-    <a:masterClrMapping/>
-  </p:clrMapOvr>
-  <mc:AlternateContent xmlns:mc="http://schemas.openxmlformats.org/markup-compatibility/2006" xmlns:p14="http://schemas.microsoft.com/office/powerpoint/2010/main">
-    <mc:Choice Requires="p14">
       <p:transition spd="med" p14:dur="700">
         <p:fade/>
       </p:transition>
@@ -6300,72 +6545,10 @@
       </p:grpSpPr>
       <p:sp>
         <p:nvSpPr>
-          <p:cNvPr id="7" name="Title 6">
-            <a:extLst>
-              <a:ext uri="{FF2B5EF4-FFF2-40B4-BE49-F238E27FC236}">
-                <a16:creationId xmlns:a16="http://schemas.microsoft.com/office/drawing/2014/main" id="{BC039510-9FB4-4DE2-BBA1-1246681F0104}"/>
-              </a:ext>
-            </a:extLst>
-          </p:cNvPr>
-          <p:cNvSpPr>
-            <a:spLocks noGrp="1"/>
-          </p:cNvSpPr>
-          <p:nvPr>
-            <p:ph type="title"/>
-          </p:nvPr>
-        </p:nvSpPr>
-        <p:spPr/>
-        <p:txBody>
-          <a:bodyPr/>
-          <a:lstStyle/>
-          <a:p>
-            <a:pPr algn="ctr"/>
-            <a:endParaRPr lang="en-US" dirty="0">
-              <a:latin typeface="Palatino Linotype" panose="02040502050505030304" pitchFamily="18" charset="0"/>
-            </a:endParaRPr>
-          </a:p>
-        </p:txBody>
-      </p:sp>
-      <p:sp>
-        <p:nvSpPr>
-          <p:cNvPr id="3" name="Content Placeholder 2">
-            <a:extLst>
-              <a:ext uri="{FF2B5EF4-FFF2-40B4-BE49-F238E27FC236}">
-                <a16:creationId xmlns:a16="http://schemas.microsoft.com/office/drawing/2014/main" id="{5E3B4FD5-17E5-444B-94C8-CD1174E8FBB6}"/>
-              </a:ext>
-            </a:extLst>
-          </p:cNvPr>
-          <p:cNvSpPr>
-            <a:spLocks noGrp="1"/>
-          </p:cNvSpPr>
-          <p:nvPr>
-            <p:ph idx="1"/>
-          </p:nvPr>
-        </p:nvSpPr>
-        <p:spPr/>
-        <p:txBody>
-          <a:bodyPr/>
-          <a:lstStyle/>
-          <a:p>
-            <a:pPr marL="0" indent="0">
-              <a:buNone/>
-            </a:pPr>
-            <a:endParaRPr lang="en-US" dirty="0"/>
-          </a:p>
-          <a:p>
-            <a:pPr marL="0" indent="0">
-              <a:buNone/>
-            </a:pPr>
-            <a:endParaRPr lang="en-US" dirty="0"/>
-          </a:p>
-        </p:txBody>
-      </p:sp>
-      <p:sp>
-        <p:nvSpPr>
           <p:cNvPr id="8" name="Title 1">
             <a:extLst>
               <a:ext uri="{FF2B5EF4-FFF2-40B4-BE49-F238E27FC236}">
-                <a16:creationId xmlns:a16="http://schemas.microsoft.com/office/drawing/2014/main" id="{17A758CD-2125-4598-B9A5-52FB7CBBAED3}"/>
+                <a16:creationId xmlns:a16="http://schemas.microsoft.com/office/drawing/2014/main" id="{16C8D218-2D56-40BC-AC60-89E854D3E63B}"/>
               </a:ext>
             </a:extLst>
           </p:cNvPr>
@@ -6417,15 +6600,40 @@
                 <a:latin typeface="Palatino Linotype" panose="02040502050505030304" pitchFamily="18" charset="0"/>
                 <a:cs typeface="Segoe UI Light" panose="020B0502040204020203" pitchFamily="34" charset="0"/>
               </a:rPr>
-              <a:t>kuki.ai</a:t>
-            </a:r>
+              <a:t>ELIZA</a:t>
+            </a:r>
+          </a:p>
+        </p:txBody>
+      </p:sp>
+      <p:sp>
+        <p:nvSpPr>
+          <p:cNvPr id="5" name="Title 4">
+            <a:extLst>
+              <a:ext uri="{FF2B5EF4-FFF2-40B4-BE49-F238E27FC236}">
+                <a16:creationId xmlns:a16="http://schemas.microsoft.com/office/drawing/2014/main" id="{D2C58B67-0AB1-4C0E-9AC7-05C4FEFA7EDA}"/>
+              </a:ext>
+            </a:extLst>
+          </p:cNvPr>
+          <p:cNvSpPr>
+            <a:spLocks noGrp="1"/>
+          </p:cNvSpPr>
+          <p:nvPr>
+            <p:ph type="title"/>
+          </p:nvPr>
+        </p:nvSpPr>
+        <p:spPr/>
+        <p:txBody>
+          <a:bodyPr/>
+          <a:lstStyle/>
+          <a:p>
+            <a:endParaRPr lang="en-US"/>
           </a:p>
         </p:txBody>
       </p:sp>
     </p:spTree>
     <p:extLst>
       <p:ext uri="{BB962C8B-B14F-4D97-AF65-F5344CB8AC3E}">
-        <p14:creationId xmlns:p14="http://schemas.microsoft.com/office/powerpoint/2010/main" val="1543091714"/>
+        <p14:creationId xmlns:p14="http://schemas.microsoft.com/office/powerpoint/2010/main" val="1226819478"/>
       </p:ext>
     </p:extLst>
   </p:cSld>
@@ -6466,6 +6674,172 @@
       </p:grpSpPr>
       <p:sp>
         <p:nvSpPr>
+          <p:cNvPr id="7" name="Title 6">
+            <a:extLst>
+              <a:ext uri="{FF2B5EF4-FFF2-40B4-BE49-F238E27FC236}">
+                <a16:creationId xmlns:a16="http://schemas.microsoft.com/office/drawing/2014/main" id="{BC039510-9FB4-4DE2-BBA1-1246681F0104}"/>
+              </a:ext>
+            </a:extLst>
+          </p:cNvPr>
+          <p:cNvSpPr>
+            <a:spLocks noGrp="1"/>
+          </p:cNvSpPr>
+          <p:nvPr>
+            <p:ph type="title"/>
+          </p:nvPr>
+        </p:nvSpPr>
+        <p:spPr/>
+        <p:txBody>
+          <a:bodyPr/>
+          <a:lstStyle/>
+          <a:p>
+            <a:pPr algn="ctr"/>
+            <a:endParaRPr lang="en-US" dirty="0">
+              <a:latin typeface="Palatino Linotype" panose="02040502050505030304" pitchFamily="18" charset="0"/>
+            </a:endParaRPr>
+          </a:p>
+        </p:txBody>
+      </p:sp>
+      <p:sp>
+        <p:nvSpPr>
+          <p:cNvPr id="3" name="Content Placeholder 2">
+            <a:extLst>
+              <a:ext uri="{FF2B5EF4-FFF2-40B4-BE49-F238E27FC236}">
+                <a16:creationId xmlns:a16="http://schemas.microsoft.com/office/drawing/2014/main" id="{5E3B4FD5-17E5-444B-94C8-CD1174E8FBB6}"/>
+              </a:ext>
+            </a:extLst>
+          </p:cNvPr>
+          <p:cNvSpPr>
+            <a:spLocks noGrp="1"/>
+          </p:cNvSpPr>
+          <p:nvPr>
+            <p:ph idx="1"/>
+          </p:nvPr>
+        </p:nvSpPr>
+        <p:spPr/>
+        <p:txBody>
+          <a:bodyPr/>
+          <a:lstStyle/>
+          <a:p>
+            <a:pPr marL="0" indent="0">
+              <a:buNone/>
+            </a:pPr>
+            <a:endParaRPr lang="en-US" dirty="0"/>
+          </a:p>
+          <a:p>
+            <a:pPr marL="0" indent="0">
+              <a:buNone/>
+            </a:pPr>
+            <a:endParaRPr lang="en-US" dirty="0"/>
+          </a:p>
+        </p:txBody>
+      </p:sp>
+      <p:sp>
+        <p:nvSpPr>
+          <p:cNvPr id="8" name="Title 1">
+            <a:extLst>
+              <a:ext uri="{FF2B5EF4-FFF2-40B4-BE49-F238E27FC236}">
+                <a16:creationId xmlns:a16="http://schemas.microsoft.com/office/drawing/2014/main" id="{17A758CD-2125-4598-B9A5-52FB7CBBAED3}"/>
+              </a:ext>
+            </a:extLst>
+          </p:cNvPr>
+          <p:cNvSpPr txBox="1">
+            <a:spLocks/>
+          </p:cNvSpPr>
+          <p:nvPr/>
+        </p:nvSpPr>
+        <p:spPr>
+          <a:xfrm>
+            <a:off x="838200" y="2678906"/>
+            <a:ext cx="10515600" cy="1500188"/>
+          </a:xfrm>
+          <a:prstGeom prst="rect">
+            <a:avLst/>
+          </a:prstGeom>
+          <a:noFill/>
+        </p:spPr>
+        <p:txBody>
+          <a:bodyPr vert="horz" lIns="91440" tIns="45720" rIns="91440" bIns="45720" rtlCol="0" anchor="ctr">
+            <a:normAutofit/>
+          </a:bodyPr>
+          <a:lstStyle>
+            <a:lvl1pPr algn="l" defTabSz="914400" rtl="0" eaLnBrk="1" latinLnBrk="0" hangingPunct="1">
+              <a:lnSpc>
+                <a:spcPct val="90000"/>
+              </a:lnSpc>
+              <a:spcBef>
+                <a:spcPct val="0"/>
+              </a:spcBef>
+              <a:buNone/>
+              <a:defRPr sz="4400" kern="1200">
+                <a:solidFill>
+                  <a:schemeClr val="tx1"/>
+                </a:solidFill>
+                <a:latin typeface="+mj-lt"/>
+                <a:ea typeface="+mj-ea"/>
+                <a:cs typeface="+mj-cs"/>
+              </a:defRPr>
+            </a:lvl1pPr>
+          </a:lstStyle>
+          <a:p>
+            <a:pPr algn="ctr"/>
+            <a:r>
+              <a:rPr lang="en-US" sz="5400" dirty="0">
+                <a:solidFill>
+                  <a:srgbClr val="4B83B5"/>
+                </a:solidFill>
+                <a:latin typeface="Palatino Linotype" panose="02040502050505030304" pitchFamily="18" charset="0"/>
+                <a:cs typeface="Segoe UI Light" panose="020B0502040204020203" pitchFamily="34" charset="0"/>
+              </a:rPr>
+              <a:t>kuki.ai</a:t>
+            </a:r>
+          </a:p>
+        </p:txBody>
+      </p:sp>
+    </p:spTree>
+    <p:extLst>
+      <p:ext uri="{BB962C8B-B14F-4D97-AF65-F5344CB8AC3E}">
+        <p14:creationId xmlns:p14="http://schemas.microsoft.com/office/powerpoint/2010/main" val="1543091714"/>
+      </p:ext>
+    </p:extLst>
+  </p:cSld>
+  <p:clrMapOvr>
+    <a:masterClrMapping/>
+  </p:clrMapOvr>
+  <mc:AlternateContent xmlns:mc="http://schemas.openxmlformats.org/markup-compatibility/2006" xmlns:p14="http://schemas.microsoft.com/office/powerpoint/2010/main">
+    <mc:Choice Requires="p14">
+      <p:transition spd="med" p14:dur="700">
+        <p:fade/>
+      </p:transition>
+    </mc:Choice>
+    <mc:Fallback xmlns="">
+      <p:transition spd="med">
+        <p:fade/>
+      </p:transition>
+    </mc:Fallback>
+  </mc:AlternateContent>
+</p:sld>
+</file>
+
+<file path=ppt/slides/slide15.xml><?xml version="1.0" encoding="utf-8"?>
+<p:sld xmlns:a="http://schemas.openxmlformats.org/drawingml/2006/main" xmlns:r="http://schemas.openxmlformats.org/officeDocument/2006/relationships" xmlns:p="http://schemas.openxmlformats.org/presentationml/2006/main">
+  <p:cSld>
+    <p:spTree>
+      <p:nvGrpSpPr>
+        <p:cNvPr id="1" name=""/>
+        <p:cNvGrpSpPr/>
+        <p:nvPr/>
+      </p:nvGrpSpPr>
+      <p:grpSpPr>
+        <a:xfrm>
+          <a:off x="0" y="0"/>
+          <a:ext cx="0" cy="0"/>
+          <a:chOff x="0" y="0"/>
+          <a:chExt cx="0" cy="0"/>
+        </a:xfrm>
+      </p:grpSpPr>
+      <p:sp>
+        <p:nvSpPr>
           <p:cNvPr id="5" name="Title 1">
             <a:extLst>
               <a:ext uri="{FF2B5EF4-FFF2-40B4-BE49-F238E27FC236}">
@@ -6670,7 +7044,7 @@
 </p:sld>
 </file>
 
-<file path=ppt/slides/slide15.xml><?xml version="1.0" encoding="utf-8"?>
+<file path=ppt/slides/slide16.xml><?xml version="1.0" encoding="utf-8"?>
 <p:sld xmlns:a="http://schemas.openxmlformats.org/drawingml/2006/main" xmlns:r="http://schemas.openxmlformats.org/officeDocument/2006/relationships" xmlns:p="http://schemas.openxmlformats.org/presentationml/2006/main">
   <p:cSld>
     <p:spTree>
@@ -6712,7 +7086,7 @@
 </p:sld>
 </file>
 
-<file path=ppt/slides/slide16.xml><?xml version="1.0" encoding="utf-8"?>
+<file path=ppt/slides/slide17.xml><?xml version="1.0" encoding="utf-8"?>
 <p:sld xmlns:a="http://schemas.openxmlformats.org/drawingml/2006/main" xmlns:r="http://schemas.openxmlformats.org/officeDocument/2006/relationships" xmlns:p="http://schemas.openxmlformats.org/presentationml/2006/main">
   <p:cSld>
     <p:spTree>
@@ -7250,12 +7624,12 @@
   </p:clrMapOvr>
   <mc:AlternateContent xmlns:mc="http://schemas.openxmlformats.org/markup-compatibility/2006" xmlns:p14="http://schemas.microsoft.com/office/powerpoint/2010/main">
     <mc:Choice Requires="p14">
-      <p:transition spd="slow" p14:dur="3400">
-        <p14:reveal/>
+      <p:transition spd="med" p14:dur="700">
+        <p:fade/>
       </p:transition>
     </mc:Choice>
     <mc:Fallback xmlns="">
-      <p:transition spd="slow">
+      <p:transition spd="med">
         <p:fade/>
       </p:transition>
     </mc:Fallback>
@@ -8050,98 +8424,16 @@
   </p:clrMapOvr>
   <mc:AlternateContent xmlns:mc="http://schemas.openxmlformats.org/markup-compatibility/2006" xmlns:p14="http://schemas.microsoft.com/office/powerpoint/2010/main">
     <mc:Choice Requires="p14">
-      <p:transition spd="slow" p14:dur="3400">
-        <p14:reveal/>
+      <p:transition spd="med" p14:dur="700">
+        <p:fade/>
       </p:transition>
     </mc:Choice>
     <mc:Fallback xmlns="">
-      <p:transition spd="slow">
+      <p:transition spd="med">
         <p:fade/>
       </p:transition>
     </mc:Fallback>
   </mc:AlternateContent>
-  <p:timing>
-    <p:tnLst>
-      <p:par>
-        <p:cTn id="1" dur="indefinite" restart="never" nodeType="tmRoot">
-          <p:childTnLst>
-            <p:seq concurrent="1" nextAc="seek">
-              <p:cTn id="2" dur="indefinite" nodeType="mainSeq">
-                <p:childTnLst>
-                  <p:par>
-                    <p:cTn id="3" fill="hold">
-                      <p:stCondLst>
-                        <p:cond delay="indefinite"/>
-                      </p:stCondLst>
-                      <p:childTnLst>
-                        <p:par>
-                          <p:cTn id="4" fill="hold">
-                            <p:stCondLst>
-                              <p:cond delay="0"/>
-                            </p:stCondLst>
-                            <p:childTnLst>
-                              <p:par>
-                                <p:cTn id="5" presetClass="entr" fill="hold" grpId="0" nodeType="clickEffect">
-                                  <p:stCondLst>
-                                    <p:cond delay="0"/>
-                                  </p:stCondLst>
-                                  <p:childTnLst>
-                                    <p:set>
-                                      <p:cBhvr>
-                                        <p:cTn id="6" dur="1" fill="hold">
-                                          <p:stCondLst>
-                                            <p:cond delay="0"/>
-                                          </p:stCondLst>
-                                        </p:cTn>
-                                        <p:tgtEl>
-                                          <p:spTgt spid="3">
-                                            <p:txEl>
-                                              <p:pRg st="2" end="2"/>
-                                            </p:txEl>
-                                          </p:spTgt>
-                                        </p:tgtEl>
-                                        <p:attrNameLst>
-                                          <p:attrName>style.visibility</p:attrName>
-                                        </p:attrNameLst>
-                                      </p:cBhvr>
-                                      <p:to>
-                                        <p:strVal val="visible"/>
-                                      </p:to>
-                                    </p:set>
-                                  </p:childTnLst>
-                                </p:cTn>
-                              </p:par>
-                            </p:childTnLst>
-                          </p:cTn>
-                        </p:par>
-                      </p:childTnLst>
-                    </p:cTn>
-                  </p:par>
-                </p:childTnLst>
-              </p:cTn>
-              <p:prevCondLst>
-                <p:cond evt="onPrev" delay="0">
-                  <p:tgtEl>
-                    <p:sldTgt/>
-                  </p:tgtEl>
-                </p:cond>
-              </p:prevCondLst>
-              <p:nextCondLst>
-                <p:cond evt="onNext" delay="0">
-                  <p:tgtEl>
-                    <p:sldTgt/>
-                  </p:tgtEl>
-                </p:cond>
-              </p:nextCondLst>
-            </p:seq>
-          </p:childTnLst>
-        </p:cTn>
-      </p:par>
-    </p:tnLst>
-    <p:bldLst>
-      <p:bldP spid="3" grpId="0" build="p"/>
-    </p:bldLst>
-  </p:timing>
 </p:sld>
 </file>
 
@@ -8246,12 +8538,12 @@
   </p:clrMapOvr>
   <mc:AlternateContent xmlns:mc="http://schemas.openxmlformats.org/markup-compatibility/2006" xmlns:p14="http://schemas.microsoft.com/office/powerpoint/2010/main">
     <mc:Choice Requires="p14">
-      <p:transition spd="slow" p14:dur="3400">
-        <p14:reveal/>
+      <p:transition spd="med" p14:dur="700">
+        <p:fade/>
       </p:transition>
     </mc:Choice>
     <mc:Fallback xmlns="">
-      <p:transition spd="slow">
+      <p:transition spd="med">
         <p:fade/>
       </p:transition>
     </mc:Fallback>
@@ -8260,6 +8552,110 @@
 </file>
 
 <file path=ppt/slides/slide6.xml><?xml version="1.0" encoding="utf-8"?>
+<p:sld xmlns:a="http://schemas.openxmlformats.org/drawingml/2006/main" xmlns:r="http://schemas.openxmlformats.org/officeDocument/2006/relationships" xmlns:p="http://schemas.openxmlformats.org/presentationml/2006/main">
+  <p:cSld>
+    <p:spTree>
+      <p:nvGrpSpPr>
+        <p:cNvPr id="1" name=""/>
+        <p:cNvGrpSpPr/>
+        <p:nvPr/>
+      </p:nvGrpSpPr>
+      <p:grpSpPr>
+        <a:xfrm>
+          <a:off x="0" y="0"/>
+          <a:ext cx="0" cy="0"/>
+          <a:chOff x="0" y="0"/>
+          <a:chExt cx="0" cy="0"/>
+        </a:xfrm>
+      </p:grpSpPr>
+      <p:pic>
+        <p:nvPicPr>
+          <p:cNvPr id="1026" name="Picture 2" descr="Lieutenant Commander Data Star Trek TNG Painting by Giulia Riva">
+            <a:extLst>
+              <a:ext uri="{FF2B5EF4-FFF2-40B4-BE49-F238E27FC236}">
+                <a16:creationId xmlns:a16="http://schemas.microsoft.com/office/drawing/2014/main" id="{45BE35C2-1ED3-4D78-A810-01C2B3D30A45}"/>
+              </a:ext>
+            </a:extLst>
+          </p:cNvPr>
+          <p:cNvPicPr>
+            <a:picLocks noChangeAspect="1" noChangeArrowheads="1"/>
+          </p:cNvPicPr>
+          <p:nvPr/>
+        </p:nvPicPr>
+        <p:blipFill>
+          <a:blip r:embed="rId3">
+            <a:extLst>
+              <a:ext uri="{28A0092B-C50C-407E-A947-70E740481C1C}">
+                <a14:useLocalDpi xmlns:a14="http://schemas.microsoft.com/office/drawing/2010/main" val="0"/>
+              </a:ext>
+            </a:extLst>
+          </a:blip>
+          <a:srcRect/>
+          <a:stretch>
+            <a:fillRect/>
+          </a:stretch>
+        </p:blipFill>
+        <p:spPr bwMode="auto">
+          <a:xfrm>
+            <a:off x="4258922" y="950494"/>
+            <a:ext cx="3674155" cy="4957011"/>
+          </a:xfrm>
+          <a:prstGeom prst="rect">
+            <a:avLst/>
+          </a:prstGeom>
+          <a:noFill/>
+          <a:ln w="6350">
+            <a:solidFill>
+              <a:schemeClr val="tx1">
+                <a:lumMod val="75000"/>
+                <a:lumOff val="25000"/>
+              </a:schemeClr>
+            </a:solidFill>
+          </a:ln>
+          <a:effectLst>
+            <a:outerShdw blurRad="50800" dist="38100" dir="2700000" algn="tl" rotWithShape="0">
+              <a:prstClr val="black">
+                <a:alpha val="40000"/>
+              </a:prstClr>
+            </a:outerShdw>
+          </a:effectLst>
+          <a:extLst>
+            <a:ext uri="{909E8E84-426E-40DD-AFC4-6F175D3DCCD1}">
+              <a14:hiddenFill xmlns:a14="http://schemas.microsoft.com/office/drawing/2010/main">
+                <a:solidFill>
+                  <a:srgbClr val="FFFFFF"/>
+                </a:solidFill>
+              </a14:hiddenFill>
+            </a:ext>
+          </a:extLst>
+        </p:spPr>
+      </p:pic>
+    </p:spTree>
+    <p:extLst>
+      <p:ext uri="{BB962C8B-B14F-4D97-AF65-F5344CB8AC3E}">
+        <p14:creationId xmlns:p14="http://schemas.microsoft.com/office/powerpoint/2010/main" val="1820102820"/>
+      </p:ext>
+    </p:extLst>
+  </p:cSld>
+  <p:clrMapOvr>
+    <a:masterClrMapping/>
+  </p:clrMapOvr>
+  <mc:AlternateContent xmlns:mc="http://schemas.openxmlformats.org/markup-compatibility/2006" xmlns:p14="http://schemas.microsoft.com/office/powerpoint/2010/main">
+    <mc:Choice Requires="p14">
+      <p:transition spd="med" p14:dur="700">
+        <p:fade/>
+      </p:transition>
+    </mc:Choice>
+    <mc:Fallback xmlns="">
+      <p:transition spd="med">
+        <p:fade/>
+      </p:transition>
+    </mc:Fallback>
+  </mc:AlternateContent>
+</p:sld>
+</file>
+
+<file path=ppt/slides/slide7.xml><?xml version="1.0" encoding="utf-8"?>
 <p:sld xmlns:a="http://schemas.openxmlformats.org/drawingml/2006/main" xmlns:r="http://schemas.openxmlformats.org/officeDocument/2006/relationships" xmlns:p="http://schemas.openxmlformats.org/presentationml/2006/main">
   <p:cSld>
     <p:spTree>
@@ -8810,6 +9206,18 @@
   <p:clrMapOvr>
     <a:masterClrMapping/>
   </p:clrMapOvr>
+  <mc:AlternateContent xmlns:mc="http://schemas.openxmlformats.org/markup-compatibility/2006" xmlns:p14="http://schemas.microsoft.com/office/powerpoint/2010/main">
+    <mc:Choice Requires="p14">
+      <p:transition spd="med" p14:dur="700">
+        <p:fade/>
+      </p:transition>
+    </mc:Choice>
+    <mc:Fallback xmlns="">
+      <p:transition spd="med">
+        <p:fade/>
+      </p:transition>
+    </mc:Fallback>
+  </mc:AlternateContent>
   <p:timing>
     <p:tnLst>
       <p:par>
@@ -8987,7 +9395,7 @@
 </p:sld>
 </file>
 
-<file path=ppt/slides/slide7.xml><?xml version="1.0" encoding="utf-8"?>
+<file path=ppt/slides/slide8.xml><?xml version="1.0" encoding="utf-8"?>
 <p:sld xmlns:a="http://schemas.openxmlformats.org/drawingml/2006/main" xmlns:r="http://schemas.openxmlformats.org/officeDocument/2006/relationships" xmlns:p="http://schemas.openxmlformats.org/presentationml/2006/main">
   <p:cSld>
     <p:spTree>
@@ -9272,390 +9680,12 @@
   </p:clrMapOvr>
   <mc:AlternateContent xmlns:mc="http://schemas.openxmlformats.org/markup-compatibility/2006" xmlns:p14="http://schemas.microsoft.com/office/powerpoint/2010/main">
     <mc:Choice Requires="p14">
-      <p:transition spd="slow" p14:dur="3400">
-        <p14:reveal/>
+      <p:transition spd="med" p14:dur="700">
+        <p:fade/>
       </p:transition>
     </mc:Choice>
     <mc:Fallback xmlns="">
-      <p:transition spd="slow">
-        <p:fade/>
-      </p:transition>
-    </mc:Fallback>
-  </mc:AlternateContent>
-</p:sld>
-</file>
-
-<file path=ppt/slides/slide8.xml><?xml version="1.0" encoding="utf-8"?>
-<p:sld xmlns:a="http://schemas.openxmlformats.org/drawingml/2006/main" xmlns:r="http://schemas.openxmlformats.org/officeDocument/2006/relationships" xmlns:p="http://schemas.openxmlformats.org/presentationml/2006/main">
-  <p:cSld>
-    <p:spTree>
-      <p:nvGrpSpPr>
-        <p:cNvPr id="1" name=""/>
-        <p:cNvGrpSpPr/>
-        <p:nvPr/>
-      </p:nvGrpSpPr>
-      <p:grpSpPr>
-        <a:xfrm>
-          <a:off x="0" y="0"/>
-          <a:ext cx="0" cy="0"/>
-          <a:chOff x="0" y="0"/>
-          <a:chExt cx="0" cy="0"/>
-        </a:xfrm>
-      </p:grpSpPr>
-      <p:sp>
-        <p:nvSpPr>
-          <p:cNvPr id="5" name="TextBox 4">
-            <a:extLst>
-              <a:ext uri="{FF2B5EF4-FFF2-40B4-BE49-F238E27FC236}">
-                <a16:creationId xmlns:a16="http://schemas.microsoft.com/office/drawing/2014/main" id="{202BF5D3-E0FE-421D-887E-591AC19A8449}"/>
-              </a:ext>
-            </a:extLst>
-          </p:cNvPr>
-          <p:cNvSpPr txBox="1"/>
-          <p:nvPr/>
-        </p:nvSpPr>
-        <p:spPr>
-          <a:xfrm>
-            <a:off x="1107743" y="905232"/>
-            <a:ext cx="9976513" cy="5047536"/>
-          </a:xfrm>
-          <a:prstGeom prst="rect">
-            <a:avLst/>
-          </a:prstGeom>
-          <a:noFill/>
-        </p:spPr>
-        <p:txBody>
-          <a:bodyPr wrap="square">
-            <a:spAutoFit/>
-          </a:bodyPr>
-          <a:lstStyle/>
-          <a:p>
-            <a:pPr marL="0" marR="0" lvl="0" indent="0" algn="l" hangingPunct="0">
-              <a:lnSpc>
-                <a:spcPct val="100000"/>
-              </a:lnSpc>
-              <a:spcBef>
-                <a:spcPts val="0"/>
-              </a:spcBef>
-              <a:spcAft>
-                <a:spcPts val="1440"/>
-              </a:spcAft>
-              <a:buSzPct val="45000"/>
-              <a:tabLst/>
-            </a:pPr>
-            <a:r>
-              <a:rPr lang="en-US" sz="1800" b="1" i="0" u="none" strike="noStrike" kern="1200" cap="none" dirty="0">
-                <a:ln>
-                  <a:noFill/>
-                </a:ln>
-                <a:solidFill>
-                  <a:srgbClr val="4B83B5"/>
-                </a:solidFill>
-                <a:latin typeface="Arial" pitchFamily="34"/>
-                <a:ea typeface="Arial" pitchFamily="34"/>
-                <a:cs typeface="Arial" pitchFamily="34"/>
-              </a:rPr>
-              <a:t>McCarthy</a:t>
-            </a:r>
-            <a:r>
-              <a:rPr lang="en-US" sz="1800" b="0" i="0" u="none" strike="noStrike" kern="1200" cap="none" dirty="0">
-                <a:ln>
-                  <a:noFill/>
-                </a:ln>
-                <a:solidFill>
-                  <a:srgbClr val="4B83B5"/>
-                </a:solidFill>
-                <a:latin typeface="Arial" pitchFamily="34"/>
-                <a:ea typeface="Arial" pitchFamily="34"/>
-                <a:cs typeface="Arial" pitchFamily="34"/>
-              </a:rPr>
-              <a:t> </a:t>
-            </a:r>
-            <a:r>
-              <a:rPr lang="en-US" sz="1800" b="0" i="0" u="none" strike="noStrike" kern="1200" cap="none" dirty="0">
-                <a:ln>
-                  <a:noFill/>
-                </a:ln>
-                <a:latin typeface="Arial" pitchFamily="34"/>
-                <a:ea typeface="Arial" pitchFamily="34"/>
-                <a:cs typeface="Arial" pitchFamily="34"/>
-              </a:rPr>
-              <a:t>(2007): “Intelligence is the computational part of the ability to achieve goals in the world. Varying kinds and degrees of intelligence occur in people, many animals and some machines.”</a:t>
-            </a:r>
-          </a:p>
-          <a:p>
-            <a:pPr marL="0" marR="0" lvl="0" indent="0" algn="l" hangingPunct="0">
-              <a:lnSpc>
-                <a:spcPct val="100000"/>
-              </a:lnSpc>
-              <a:spcBef>
-                <a:spcPts val="0"/>
-              </a:spcBef>
-              <a:spcAft>
-                <a:spcPts val="1440"/>
-              </a:spcAft>
-              <a:buSzPct val="45000"/>
-              <a:tabLst/>
-            </a:pPr>
-            <a:endParaRPr lang="en-US" sz="1800" b="0" i="0" u="none" strike="noStrike" kern="1200" cap="none" dirty="0">
-              <a:ln>
-                <a:noFill/>
-              </a:ln>
-              <a:latin typeface="Arial" pitchFamily="34"/>
-              <a:ea typeface="Arial" pitchFamily="34"/>
-              <a:cs typeface="Arial" pitchFamily="34"/>
-            </a:endParaRPr>
-          </a:p>
-          <a:p>
-            <a:pPr marL="0" marR="0" lvl="0" indent="0" algn="l" hangingPunct="0">
-              <a:lnSpc>
-                <a:spcPct val="100000"/>
-              </a:lnSpc>
-              <a:spcBef>
-                <a:spcPts val="0"/>
-              </a:spcBef>
-              <a:spcAft>
-                <a:spcPts val="1440"/>
-              </a:spcAft>
-              <a:buSzPct val="45000"/>
-              <a:tabLst/>
-            </a:pPr>
-            <a:r>
-              <a:rPr lang="en-US" sz="1800" b="1" i="0" u="none" strike="noStrike" kern="1200" cap="none" dirty="0">
-                <a:ln>
-                  <a:noFill/>
-                </a:ln>
-                <a:solidFill>
-                  <a:srgbClr val="4B83B5"/>
-                </a:solidFill>
-                <a:latin typeface="Arial" pitchFamily="34"/>
-                <a:ea typeface="Arial" pitchFamily="34"/>
-                <a:cs typeface="Arial" pitchFamily="34"/>
-              </a:rPr>
-              <a:t>Allen Newell</a:t>
-            </a:r>
-            <a:r>
-              <a:rPr lang="en-US" sz="1800" b="0" i="0" u="none" strike="noStrike" kern="1200" cap="none" dirty="0">
-                <a:ln>
-                  <a:noFill/>
-                </a:ln>
-                <a:solidFill>
-                  <a:srgbClr val="4B83B5"/>
-                </a:solidFill>
-                <a:latin typeface="Arial" pitchFamily="34"/>
-                <a:ea typeface="Arial" pitchFamily="34"/>
-                <a:cs typeface="Arial" pitchFamily="34"/>
-              </a:rPr>
-              <a:t> </a:t>
-            </a:r>
-            <a:r>
-              <a:rPr lang="en-US" sz="1800" b="0" i="0" u="none" strike="noStrike" kern="1200" cap="none" dirty="0">
-                <a:ln>
-                  <a:noFill/>
-                </a:ln>
-                <a:latin typeface="Arial" pitchFamily="34"/>
-                <a:ea typeface="Arial" pitchFamily="34"/>
-                <a:cs typeface="Arial" pitchFamily="34"/>
-              </a:rPr>
-              <a:t>(1990): An intelligent system “operates in real-time; exploits vast amounts of knowledge; tolerates erroneous, unexpected, and possibly unknown inputs; uses symbols and abstractions; communicates using some form of natural language; learns from the environment; and exhibits adaptive goal-oriented behavior.”</a:t>
-            </a:r>
-          </a:p>
-          <a:p>
-            <a:pPr marL="0" marR="0" lvl="0" indent="0" algn="l" hangingPunct="0">
-              <a:lnSpc>
-                <a:spcPct val="100000"/>
-              </a:lnSpc>
-              <a:spcBef>
-                <a:spcPts val="0"/>
-              </a:spcBef>
-              <a:spcAft>
-                <a:spcPts val="1440"/>
-              </a:spcAft>
-              <a:buSzPct val="45000"/>
-              <a:tabLst/>
-            </a:pPr>
-            <a:endParaRPr lang="en-US" sz="1800" b="0" i="0" u="none" strike="noStrike" kern="1200" cap="none" dirty="0">
-              <a:ln>
-                <a:noFill/>
-              </a:ln>
-              <a:latin typeface="Arial" pitchFamily="34"/>
-              <a:ea typeface="Arial" pitchFamily="34"/>
-              <a:cs typeface="Arial" pitchFamily="34"/>
-            </a:endParaRPr>
-          </a:p>
-          <a:p>
-            <a:pPr marL="0" marR="0" lvl="0" indent="0" algn="l" hangingPunct="0">
-              <a:lnSpc>
-                <a:spcPct val="100000"/>
-              </a:lnSpc>
-              <a:spcBef>
-                <a:spcPts val="0"/>
-              </a:spcBef>
-              <a:spcAft>
-                <a:spcPts val="1440"/>
-              </a:spcAft>
-              <a:buSzPct val="45000"/>
-              <a:tabLst/>
-            </a:pPr>
-            <a:r>
-              <a:rPr lang="en-US" sz="1800" b="1" i="0" u="none" strike="noStrike" kern="1200" cap="none" dirty="0">
-                <a:ln>
-                  <a:noFill/>
-                </a:ln>
-                <a:solidFill>
-                  <a:srgbClr val="4B83B5"/>
-                </a:solidFill>
-                <a:latin typeface="Arial" pitchFamily="34"/>
-                <a:ea typeface="Arial" pitchFamily="34"/>
-                <a:cs typeface="Arial" pitchFamily="34"/>
-              </a:rPr>
-              <a:t>Kurzweil</a:t>
-            </a:r>
-            <a:r>
-              <a:rPr lang="en-US" sz="1800" b="0" i="0" u="none" strike="noStrike" kern="1200" cap="none" dirty="0">
-                <a:ln>
-                  <a:noFill/>
-                </a:ln>
-                <a:solidFill>
-                  <a:srgbClr val="4B83B5"/>
-                </a:solidFill>
-                <a:latin typeface="Arial" pitchFamily="34"/>
-                <a:ea typeface="Arial" pitchFamily="34"/>
-                <a:cs typeface="Arial" pitchFamily="34"/>
-              </a:rPr>
-              <a:t> </a:t>
-            </a:r>
-            <a:r>
-              <a:rPr lang="en-US" sz="1800" b="0" i="0" u="none" strike="noStrike" kern="1200" cap="none" dirty="0">
-                <a:ln>
-                  <a:noFill/>
-                </a:ln>
-                <a:latin typeface="Arial" pitchFamily="34"/>
-                <a:ea typeface="Arial" pitchFamily="34"/>
-                <a:cs typeface="Arial" pitchFamily="34"/>
-              </a:rPr>
-              <a:t>(1990): “In summary, there appears to be no </a:t>
-            </a:r>
-            <a:r>
-              <a:rPr lang="en-US" sz="1800" b="0" i="1" u="none" strike="noStrike" kern="1200" cap="none" dirty="0">
-                <a:ln>
-                  <a:noFill/>
-                </a:ln>
-                <a:latin typeface="Arial" pitchFamily="34"/>
-                <a:ea typeface="Arial" pitchFamily="34"/>
-                <a:cs typeface="Arial" pitchFamily="34"/>
-              </a:rPr>
-              <a:t>simple</a:t>
-            </a:r>
-            <a:r>
-              <a:rPr lang="en-US" sz="1800" b="0" i="0" u="none" strike="noStrike" kern="1200" cap="none" dirty="0">
-                <a:ln>
-                  <a:noFill/>
-                </a:ln>
-                <a:latin typeface="Arial" pitchFamily="34"/>
-                <a:ea typeface="Arial" pitchFamily="34"/>
-                <a:cs typeface="Arial" pitchFamily="34"/>
-              </a:rPr>
-              <a:t> definition of intelligence that is satisfactory to most observers, and most would-be definers of intelligence end up with long checklists of its attributes.”</a:t>
-            </a:r>
-          </a:p>
-          <a:p>
-            <a:pPr marL="0" marR="0" lvl="0" indent="0" algn="l" hangingPunct="0">
-              <a:lnSpc>
-                <a:spcPct val="100000"/>
-              </a:lnSpc>
-              <a:spcBef>
-                <a:spcPts val="0"/>
-              </a:spcBef>
-              <a:spcAft>
-                <a:spcPts val="1440"/>
-              </a:spcAft>
-              <a:buSzPct val="45000"/>
-              <a:tabLst/>
-            </a:pPr>
-            <a:endParaRPr lang="en-US" sz="1800" b="0" i="0" u="none" strike="noStrike" kern="1200" cap="none" dirty="0">
-              <a:ln>
-                <a:noFill/>
-              </a:ln>
-              <a:latin typeface="Arial" pitchFamily="34"/>
-              <a:ea typeface="Arial" pitchFamily="34"/>
-              <a:cs typeface="Arial" pitchFamily="34"/>
-            </a:endParaRPr>
-          </a:p>
-          <a:p>
-            <a:pPr marL="0" marR="0" lvl="0" indent="0" algn="l" hangingPunct="0">
-              <a:lnSpc>
-                <a:spcPct val="100000"/>
-              </a:lnSpc>
-              <a:spcBef>
-                <a:spcPts val="0"/>
-              </a:spcBef>
-              <a:spcAft>
-                <a:spcPts val="1440"/>
-              </a:spcAft>
-              <a:buSzPct val="45000"/>
-              <a:tabLst/>
-            </a:pPr>
-            <a:r>
-              <a:rPr lang="en-US" sz="1800" b="1" i="0" u="none" strike="noStrike" kern="1200" cap="none" dirty="0">
-                <a:ln>
-                  <a:noFill/>
-                </a:ln>
-                <a:solidFill>
-                  <a:srgbClr val="4B83B5"/>
-                </a:solidFill>
-                <a:latin typeface="Arial" pitchFamily="34"/>
-                <a:ea typeface="Arial" pitchFamily="34"/>
-                <a:cs typeface="Arial" pitchFamily="34"/>
-              </a:rPr>
-              <a:t>Alan Turing</a:t>
-            </a:r>
-            <a:r>
-              <a:rPr lang="en-US" sz="1800" b="0" i="0" u="none" strike="noStrike" kern="1200" cap="none" dirty="0">
-                <a:ln>
-                  <a:noFill/>
-                </a:ln>
-                <a:solidFill>
-                  <a:srgbClr val="4B83B5"/>
-                </a:solidFill>
-                <a:latin typeface="Arial" pitchFamily="34"/>
-                <a:ea typeface="Arial" pitchFamily="34"/>
-                <a:cs typeface="Arial" pitchFamily="34"/>
-              </a:rPr>
-              <a:t> </a:t>
-            </a:r>
-            <a:r>
-              <a:rPr lang="en-US" sz="1800" b="0" i="0" u="none" strike="noStrike" kern="1200" cap="none" dirty="0">
-                <a:ln>
-                  <a:noFill/>
-                </a:ln>
-                <a:latin typeface="Arial" pitchFamily="34"/>
-                <a:ea typeface="Arial" pitchFamily="34"/>
-                <a:cs typeface="Arial" pitchFamily="34"/>
-              </a:rPr>
-              <a:t>(1950): The “imitation game” (now called the “Turing test”).</a:t>
-            </a:r>
-          </a:p>
-        </p:txBody>
-      </p:sp>
-    </p:spTree>
-    <p:extLst>
-      <p:ext uri="{BB962C8B-B14F-4D97-AF65-F5344CB8AC3E}">
-        <p14:creationId xmlns:p14="http://schemas.microsoft.com/office/powerpoint/2010/main" val="2498052185"/>
-      </p:ext>
-    </p:extLst>
-  </p:cSld>
-  <p:clrMapOvr>
-    <a:masterClrMapping/>
-  </p:clrMapOvr>
-  <mc:AlternateContent xmlns:mc="http://schemas.openxmlformats.org/markup-compatibility/2006" xmlns:p14="http://schemas.microsoft.com/office/powerpoint/2010/main">
-    <mc:Choice Requires="p14">
-      <p:transition spd="slow" p14:dur="3400">
-        <p14:reveal/>
-      </p:transition>
-    </mc:Choice>
-    <mc:Fallback xmlns="">
-      <p:transition spd="slow">
+      <p:transition spd="med">
         <p:fade/>
       </p:transition>
     </mc:Fallback>
@@ -9682,34 +9712,33 @@
       </p:grpSpPr>
       <p:sp>
         <p:nvSpPr>
-          <p:cNvPr id="4" name="Title 1">
+          <p:cNvPr id="5" name="TextBox 4">
             <a:extLst>
               <a:ext uri="{FF2B5EF4-FFF2-40B4-BE49-F238E27FC236}">
-                <a16:creationId xmlns:a16="http://schemas.microsoft.com/office/drawing/2014/main" id="{6680213F-0526-4F87-BFD0-77AFE4C83667}"/>
+                <a16:creationId xmlns:a16="http://schemas.microsoft.com/office/drawing/2014/main" id="{202BF5D3-E0FE-421D-887E-591AC19A8449}"/>
               </a:ext>
             </a:extLst>
           </p:cNvPr>
-          <p:cNvSpPr>
-            <a:spLocks noGrp="1"/>
-          </p:cNvSpPr>
-          <p:nvPr>
-            <p:ph type="title"/>
-          </p:nvPr>
+          <p:cNvSpPr txBox="1"/>
+          <p:nvPr/>
         </p:nvSpPr>
         <p:spPr>
           <a:xfrm>
-            <a:off x="0" y="271472"/>
-            <a:ext cx="12192000" cy="1500188"/>
+            <a:off x="1107743" y="905232"/>
+            <a:ext cx="9976513" cy="5047536"/>
           </a:xfrm>
+          <a:prstGeom prst="rect">
+            <a:avLst/>
+          </a:prstGeom>
           <a:noFill/>
         </p:spPr>
         <p:txBody>
-          <a:bodyPr>
-            <a:normAutofit/>
+          <a:bodyPr wrap="square">
+            <a:spAutoFit/>
           </a:bodyPr>
           <a:lstStyle/>
           <a:p>
-            <a:pPr marL="0" marR="0" lvl="0" indent="0" algn="ctr" hangingPunct="0">
+            <a:pPr marL="0" marR="0" lvl="0" indent="0" algn="l" hangingPunct="0">
               <a:lnSpc>
                 <a:spcPct val="100000"/>
               </a:lnSpc>
@@ -9719,63 +9748,308 @@
               <a:spcAft>
                 <a:spcPts val="1440"/>
               </a:spcAft>
-              <a:buNone/>
+              <a:buSzPct val="45000"/>
               <a:tabLst/>
             </a:pPr>
             <a:r>
-              <a:rPr lang="en-US" sz="2800" b="0" i="0" u="none" strike="noStrike" kern="1200" cap="none" dirty="0">
+              <a:rPr lang="en-US" sz="1800" b="1" i="0" u="none" strike="noStrike" kern="1200" cap="none" dirty="0">
                 <a:ln>
                   <a:noFill/>
                 </a:ln>
-                <a:latin typeface="Palatino Linotype" panose="02040502050505030304" pitchFamily="18" charset="0"/>
+                <a:solidFill>
+                  <a:srgbClr val="4B83B5"/>
+                </a:solidFill>
+                <a:latin typeface="Arial" pitchFamily="34"/>
                 <a:ea typeface="Arial" pitchFamily="34"/>
                 <a:cs typeface="Arial" pitchFamily="34"/>
               </a:rPr>
-              <a:t>What do you think?  What is the defining feature of “intelligence”?</a:t>
-            </a:r>
-          </a:p>
-        </p:txBody>
-      </p:sp>
-      <p:pic>
-        <p:nvPicPr>
-          <p:cNvPr id="7" name="Picture 6">
-            <a:extLst>
-              <a:ext uri="{FF2B5EF4-FFF2-40B4-BE49-F238E27FC236}">
-                <a16:creationId xmlns:a16="http://schemas.microsoft.com/office/drawing/2014/main" id="{D64AE8E3-29B7-4073-93F4-02E3DBB765A8}"/>
-              </a:ext>
-            </a:extLst>
-          </p:cNvPr>
-          <p:cNvPicPr>
-            <a:picLocks noChangeAspect="1"/>
-          </p:cNvPicPr>
-          <p:nvPr/>
-        </p:nvPicPr>
-        <p:blipFill>
-          <a:blip r:embed="rId3">
-            <a:extLst>
-              <a:ext uri="{28A0092B-C50C-407E-A947-70E740481C1C}">
-                <a14:useLocalDpi xmlns:a14="http://schemas.microsoft.com/office/drawing/2010/main" val="0"/>
-              </a:ext>
-            </a:extLst>
-          </a:blip>
-          <a:stretch>
-            <a:fillRect/>
-          </a:stretch>
-        </p:blipFill>
-        <p:spPr>
-          <a:xfrm>
-            <a:off x="191238" y="2018319"/>
-            <a:ext cx="11809523" cy="4825397"/>
-          </a:xfrm>
-          <a:prstGeom prst="rect">
-            <a:avLst/>
-          </a:prstGeom>
-        </p:spPr>
-      </p:pic>
+              <a:t>McCarthy</a:t>
+            </a:r>
+            <a:r>
+              <a:rPr lang="en-US" sz="1800" b="0" i="0" u="none" strike="noStrike" kern="1200" cap="none" dirty="0">
+                <a:ln>
+                  <a:noFill/>
+                </a:ln>
+                <a:solidFill>
+                  <a:srgbClr val="4B83B5"/>
+                </a:solidFill>
+                <a:latin typeface="Arial" pitchFamily="34"/>
+                <a:ea typeface="Arial" pitchFamily="34"/>
+                <a:cs typeface="Arial" pitchFamily="34"/>
+              </a:rPr>
+              <a:t> </a:t>
+            </a:r>
+            <a:r>
+              <a:rPr lang="en-US" sz="1800" b="0" i="0" u="none" strike="noStrike" kern="1200" cap="none" dirty="0">
+                <a:ln>
+                  <a:noFill/>
+                </a:ln>
+                <a:latin typeface="Arial" pitchFamily="34"/>
+                <a:ea typeface="Arial" pitchFamily="34"/>
+                <a:cs typeface="Arial" pitchFamily="34"/>
+              </a:rPr>
+              <a:t>(2007): “Intelligence is the computational part of the ability to achieve goals in the world. Varying kinds and degrees of intelligence occur in people, many animals and some machines.”</a:t>
+            </a:r>
+          </a:p>
+          <a:p>
+            <a:pPr marL="0" marR="0" lvl="0" indent="0" algn="l" hangingPunct="0">
+              <a:lnSpc>
+                <a:spcPct val="100000"/>
+              </a:lnSpc>
+              <a:spcBef>
+                <a:spcPts val="0"/>
+              </a:spcBef>
+              <a:spcAft>
+                <a:spcPts val="1440"/>
+              </a:spcAft>
+              <a:buSzPct val="45000"/>
+              <a:tabLst/>
+            </a:pPr>
+            <a:endParaRPr lang="en-US" sz="1800" b="0" i="0" u="none" strike="noStrike" kern="1200" cap="none" dirty="0">
+              <a:ln>
+                <a:noFill/>
+              </a:ln>
+              <a:latin typeface="Arial" pitchFamily="34"/>
+              <a:ea typeface="Arial" pitchFamily="34"/>
+              <a:cs typeface="Arial" pitchFamily="34"/>
+            </a:endParaRPr>
+          </a:p>
+          <a:p>
+            <a:pPr marL="0" marR="0" lvl="0" indent="0" algn="l" hangingPunct="0">
+              <a:lnSpc>
+                <a:spcPct val="100000"/>
+              </a:lnSpc>
+              <a:spcBef>
+                <a:spcPts val="0"/>
+              </a:spcBef>
+              <a:spcAft>
+                <a:spcPts val="1440"/>
+              </a:spcAft>
+              <a:buSzPct val="45000"/>
+              <a:tabLst/>
+            </a:pPr>
+            <a:r>
+              <a:rPr lang="en-US" sz="1800" b="1" i="0" u="none" strike="noStrike" kern="1200" cap="none" dirty="0">
+                <a:ln>
+                  <a:noFill/>
+                </a:ln>
+                <a:solidFill>
+                  <a:srgbClr val="4B83B5"/>
+                </a:solidFill>
+                <a:latin typeface="Arial" pitchFamily="34"/>
+                <a:ea typeface="Arial" pitchFamily="34"/>
+                <a:cs typeface="Arial" pitchFamily="34"/>
+              </a:rPr>
+              <a:t>Allen Newell</a:t>
+            </a:r>
+            <a:r>
+              <a:rPr lang="en-US" sz="1800" b="0" i="0" u="none" strike="noStrike" kern="1200" cap="none" dirty="0">
+                <a:ln>
+                  <a:noFill/>
+                </a:ln>
+                <a:solidFill>
+                  <a:srgbClr val="4B83B5"/>
+                </a:solidFill>
+                <a:latin typeface="Arial" pitchFamily="34"/>
+                <a:ea typeface="Arial" pitchFamily="34"/>
+                <a:cs typeface="Arial" pitchFamily="34"/>
+              </a:rPr>
+              <a:t> </a:t>
+            </a:r>
+            <a:r>
+              <a:rPr lang="en-US" sz="1800" b="0" i="0" u="none" strike="noStrike" kern="1200" cap="none" dirty="0">
+                <a:ln>
+                  <a:noFill/>
+                </a:ln>
+                <a:latin typeface="Arial" pitchFamily="34"/>
+                <a:ea typeface="Arial" pitchFamily="34"/>
+                <a:cs typeface="Arial" pitchFamily="34"/>
+              </a:rPr>
+              <a:t>(1990): An intelligent system “operates in real-time; exploits vast amounts of knowledge; tolerates erroneous, unexpected, and possibly unknown inputs; uses symbols and abstractions; communicates using some form of natural language; learns from the environment; and exhibits adaptive goal-oriented behavior.”</a:t>
+            </a:r>
+          </a:p>
+          <a:p>
+            <a:pPr marL="0" marR="0" lvl="0" indent="0" algn="l" hangingPunct="0">
+              <a:lnSpc>
+                <a:spcPct val="100000"/>
+              </a:lnSpc>
+              <a:spcBef>
+                <a:spcPts val="0"/>
+              </a:spcBef>
+              <a:spcAft>
+                <a:spcPts val="1440"/>
+              </a:spcAft>
+              <a:buSzPct val="45000"/>
+              <a:tabLst/>
+            </a:pPr>
+            <a:endParaRPr lang="en-US" sz="1800" b="0" i="0" u="none" strike="noStrike" kern="1200" cap="none" dirty="0">
+              <a:ln>
+                <a:noFill/>
+              </a:ln>
+              <a:latin typeface="Arial" pitchFamily="34"/>
+              <a:ea typeface="Arial" pitchFamily="34"/>
+              <a:cs typeface="Arial" pitchFamily="34"/>
+            </a:endParaRPr>
+          </a:p>
+          <a:p>
+            <a:pPr marL="0" marR="0" lvl="0" indent="0" algn="l" hangingPunct="0">
+              <a:lnSpc>
+                <a:spcPct val="100000"/>
+              </a:lnSpc>
+              <a:spcBef>
+                <a:spcPts val="0"/>
+              </a:spcBef>
+              <a:spcAft>
+                <a:spcPts val="1440"/>
+              </a:spcAft>
+              <a:buSzPct val="45000"/>
+              <a:tabLst/>
+            </a:pPr>
+            <a:r>
+              <a:rPr lang="en-US" sz="1800" b="1" i="0" u="none" strike="noStrike" kern="1200" cap="none" dirty="0">
+                <a:ln>
+                  <a:noFill/>
+                </a:ln>
+                <a:solidFill>
+                  <a:srgbClr val="4B83B5"/>
+                </a:solidFill>
+                <a:latin typeface="Arial" pitchFamily="34"/>
+                <a:ea typeface="Arial" pitchFamily="34"/>
+                <a:cs typeface="Arial" pitchFamily="34"/>
+              </a:rPr>
+              <a:t>Kurzweil</a:t>
+            </a:r>
+            <a:r>
+              <a:rPr lang="en-US" sz="1800" b="0" i="0" u="none" strike="noStrike" kern="1200" cap="none" dirty="0">
+                <a:ln>
+                  <a:noFill/>
+                </a:ln>
+                <a:solidFill>
+                  <a:srgbClr val="4B83B5"/>
+                </a:solidFill>
+                <a:latin typeface="Arial" pitchFamily="34"/>
+                <a:ea typeface="Arial" pitchFamily="34"/>
+                <a:cs typeface="Arial" pitchFamily="34"/>
+              </a:rPr>
+              <a:t> </a:t>
+            </a:r>
+            <a:r>
+              <a:rPr lang="en-US" sz="1800" b="0" i="0" u="none" strike="noStrike" kern="1200" cap="none" dirty="0">
+                <a:ln>
+                  <a:noFill/>
+                </a:ln>
+                <a:latin typeface="Arial" pitchFamily="34"/>
+                <a:ea typeface="Arial" pitchFamily="34"/>
+                <a:cs typeface="Arial" pitchFamily="34"/>
+              </a:rPr>
+              <a:t>(1990): “In summary, there appears to be no </a:t>
+            </a:r>
+            <a:r>
+              <a:rPr lang="en-US" sz="1800" b="0" i="1" u="none" strike="noStrike" kern="1200" cap="none" dirty="0">
+                <a:ln>
+                  <a:noFill/>
+                </a:ln>
+                <a:latin typeface="Arial" pitchFamily="34"/>
+                <a:ea typeface="Arial" pitchFamily="34"/>
+                <a:cs typeface="Arial" pitchFamily="34"/>
+              </a:rPr>
+              <a:t>simple</a:t>
+            </a:r>
+            <a:r>
+              <a:rPr lang="en-US" sz="1800" b="0" i="0" u="none" strike="noStrike" kern="1200" cap="none" dirty="0">
+                <a:ln>
+                  <a:noFill/>
+                </a:ln>
+                <a:latin typeface="Arial" pitchFamily="34"/>
+                <a:ea typeface="Arial" pitchFamily="34"/>
+                <a:cs typeface="Arial" pitchFamily="34"/>
+              </a:rPr>
+              <a:t> definition of intelligence that is satisfactory to most observers, and most would-be definers of intelligence end up with long checklists of its attributes.”</a:t>
+            </a:r>
+          </a:p>
+          <a:p>
+            <a:pPr marL="0" marR="0" lvl="0" indent="0" algn="l" hangingPunct="0">
+              <a:lnSpc>
+                <a:spcPct val="100000"/>
+              </a:lnSpc>
+              <a:spcBef>
+                <a:spcPts val="0"/>
+              </a:spcBef>
+              <a:spcAft>
+                <a:spcPts val="1440"/>
+              </a:spcAft>
+              <a:buSzPct val="45000"/>
+              <a:tabLst/>
+            </a:pPr>
+            <a:endParaRPr lang="en-US" sz="1800" b="0" i="0" u="none" strike="noStrike" kern="1200" cap="none" dirty="0">
+              <a:ln>
+                <a:noFill/>
+              </a:ln>
+              <a:latin typeface="Arial" pitchFamily="34"/>
+              <a:ea typeface="Arial" pitchFamily="34"/>
+              <a:cs typeface="Arial" pitchFamily="34"/>
+            </a:endParaRPr>
+          </a:p>
+          <a:p>
+            <a:pPr marL="0" marR="0" lvl="0" indent="0" algn="l" hangingPunct="0">
+              <a:lnSpc>
+                <a:spcPct val="100000"/>
+              </a:lnSpc>
+              <a:spcBef>
+                <a:spcPts val="0"/>
+              </a:spcBef>
+              <a:spcAft>
+                <a:spcPts val="1440"/>
+              </a:spcAft>
+              <a:buSzPct val="45000"/>
+              <a:tabLst/>
+            </a:pPr>
+            <a:r>
+              <a:rPr lang="en-US" sz="1800" b="1" i="0" u="none" strike="noStrike" kern="1200" cap="none" dirty="0">
+                <a:ln>
+                  <a:noFill/>
+                </a:ln>
+                <a:solidFill>
+                  <a:srgbClr val="4B83B5"/>
+                </a:solidFill>
+                <a:latin typeface="Arial" pitchFamily="34"/>
+                <a:ea typeface="Arial" pitchFamily="34"/>
+                <a:cs typeface="Arial" pitchFamily="34"/>
+              </a:rPr>
+              <a:t>Alan Turing</a:t>
+            </a:r>
+            <a:r>
+              <a:rPr lang="en-US" sz="1800" b="0" i="0" u="none" strike="noStrike" kern="1200" cap="none" dirty="0">
+                <a:ln>
+                  <a:noFill/>
+                </a:ln>
+                <a:solidFill>
+                  <a:srgbClr val="4B83B5"/>
+                </a:solidFill>
+                <a:latin typeface="Arial" pitchFamily="34"/>
+                <a:ea typeface="Arial" pitchFamily="34"/>
+                <a:cs typeface="Arial" pitchFamily="34"/>
+              </a:rPr>
+              <a:t> </a:t>
+            </a:r>
+            <a:r>
+              <a:rPr lang="en-US" sz="1800" b="0" i="0" u="none" strike="noStrike" kern="1200" cap="none" dirty="0">
+                <a:ln>
+                  <a:noFill/>
+                </a:ln>
+                <a:latin typeface="Arial" pitchFamily="34"/>
+                <a:ea typeface="Arial" pitchFamily="34"/>
+                <a:cs typeface="Arial" pitchFamily="34"/>
+              </a:rPr>
+              <a:t>(1950): The “imitation game” (now called the “Turing test”).</a:t>
+            </a:r>
+          </a:p>
+        </p:txBody>
+      </p:sp>
     </p:spTree>
     <p:extLst>
       <p:ext uri="{BB962C8B-B14F-4D97-AF65-F5344CB8AC3E}">
-        <p14:creationId xmlns:p14="http://schemas.microsoft.com/office/powerpoint/2010/main" val="1820102820"/>
+        <p14:creationId xmlns:p14="http://schemas.microsoft.com/office/powerpoint/2010/main" val="2498052185"/>
       </p:ext>
     </p:extLst>
   </p:cSld>
@@ -9784,12 +10058,12 @@
   </p:clrMapOvr>
   <mc:AlternateContent xmlns:mc="http://schemas.openxmlformats.org/markup-compatibility/2006" xmlns:p14="http://schemas.microsoft.com/office/powerpoint/2010/main">
     <mc:Choice Requires="p14">
-      <p:transition spd="slow" p14:dur="3400">
-        <p14:reveal/>
+      <p:transition spd="med" p14:dur="700">
+        <p:fade/>
       </p:transition>
     </mc:Choice>
     <mc:Fallback xmlns="">
-      <p:transition spd="slow">
+      <p:transition spd="med">
         <p:fade/>
       </p:transition>
     </mc:Fallback>

</xml_diff>

<commit_message>
Added Perusall slide + updates to Star-Trek slide.
</commit_message>
<xml_diff>
--- a/ai_getting_started.pptx
+++ b/ai_getting_started.pptx
@@ -5,7 +5,7 @@
     <p:sldMasterId id="2147483648" r:id="rId1"/>
   </p:sldMasterIdLst>
   <p:notesMasterIdLst>
-    <p:notesMasterId r:id="rId19"/>
+    <p:notesMasterId r:id="rId20"/>
   </p:notesMasterIdLst>
   <p:sldIdLst>
     <p:sldId id="257" r:id="rId2"/>
@@ -13,18 +13,19 @@
     <p:sldId id="311" r:id="rId4"/>
     <p:sldId id="301" r:id="rId5"/>
     <p:sldId id="313" r:id="rId6"/>
-    <p:sldId id="310" r:id="rId7"/>
-    <p:sldId id="307" r:id="rId8"/>
-    <p:sldId id="308" r:id="rId9"/>
-    <p:sldId id="309" r:id="rId10"/>
-    <p:sldId id="315" r:id="rId11"/>
-    <p:sldId id="303" r:id="rId12"/>
-    <p:sldId id="312" r:id="rId13"/>
-    <p:sldId id="305" r:id="rId14"/>
-    <p:sldId id="304" r:id="rId15"/>
-    <p:sldId id="306" r:id="rId16"/>
-    <p:sldId id="314" r:id="rId17"/>
-    <p:sldId id="262" r:id="rId18"/>
+    <p:sldId id="316" r:id="rId7"/>
+    <p:sldId id="310" r:id="rId8"/>
+    <p:sldId id="307" r:id="rId9"/>
+    <p:sldId id="308" r:id="rId10"/>
+    <p:sldId id="309" r:id="rId11"/>
+    <p:sldId id="315" r:id="rId12"/>
+    <p:sldId id="303" r:id="rId13"/>
+    <p:sldId id="312" r:id="rId14"/>
+    <p:sldId id="305" r:id="rId15"/>
+    <p:sldId id="304" r:id="rId16"/>
+    <p:sldId id="306" r:id="rId17"/>
+    <p:sldId id="314" r:id="rId18"/>
+    <p:sldId id="262" r:id="rId19"/>
   </p:sldIdLst>
   <p:sldSz cx="12192000" cy="6858000"/>
   <p:notesSz cx="6858000" cy="9144000"/>
@@ -224,7 +225,7 @@
           <a:p>
             <a:fld id="{FD93C9B2-20F6-4DB1-B471-224337D0AC79}" type="datetimeFigureOut">
               <a:rPr lang="en-US" smtClean="0"/>
-              <a:t>8/26/2021</a:t>
+              <a:t>8/30/2021</a:t>
             </a:fld>
             <a:endParaRPr lang="en-US"/>
           </a:p>
@@ -624,94 +625,21 @@
           <a:bodyPr/>
           <a:lstStyle/>
           <a:p>
-            <a:pPr marL="0" marR="0" lvl="0" indent="0" algn="l" defTabSz="914400" rtl="0" eaLnBrk="1" fontAlgn="auto" latinLnBrk="0" hangingPunct="1">
-              <a:lnSpc>
-                <a:spcPct val="100000"/>
-              </a:lnSpc>
-              <a:spcBef>
-                <a:spcPts val="0"/>
-              </a:spcBef>
-              <a:spcAft>
-                <a:spcPts val="0"/>
-              </a:spcAft>
-              <a:buClrTx/>
-              <a:buSzTx/>
-              <a:buFontTx/>
-              <a:buNone/>
-              <a:tabLst/>
-              <a:defRPr/>
-            </a:pPr>
-            <a:r>
-              <a:rPr lang="en-US" sz="1200" b="0" i="0" u="none" strike="noStrike" kern="1200" cap="none" dirty="0">
-                <a:ln>
-                  <a:noFill/>
-                </a:ln>
-                <a:latin typeface="Arial" pitchFamily="34"/>
-                <a:ea typeface="Arial" pitchFamily="34"/>
-                <a:cs typeface="Arial" pitchFamily="34"/>
-              </a:rPr>
-              <a:t>Okay – given these definitions and the assigned reading for this week – has your initial definition of A.I. changed?  </a:t>
-            </a:r>
-          </a:p>
-          <a:p>
-            <a:pPr marL="0" marR="0" lvl="0" indent="0" algn="l" defTabSz="914400" rtl="0" eaLnBrk="1" fontAlgn="auto" latinLnBrk="0" hangingPunct="1">
-              <a:lnSpc>
-                <a:spcPct val="100000"/>
-              </a:lnSpc>
-              <a:spcBef>
-                <a:spcPts val="0"/>
-              </a:spcBef>
-              <a:spcAft>
-                <a:spcPts val="0"/>
-              </a:spcAft>
-              <a:buClrTx/>
-              <a:buSzTx/>
-              <a:buFontTx/>
-              <a:buNone/>
-              <a:tabLst/>
-              <a:defRPr/>
-            </a:pPr>
-            <a:endParaRPr lang="en-US" sz="1200" b="0" i="0" u="none" strike="noStrike" kern="1200" cap="none" dirty="0">
-              <a:ln>
-                <a:noFill/>
-              </a:ln>
-              <a:latin typeface="Arial" pitchFamily="34"/>
-              <a:ea typeface="Arial" pitchFamily="34"/>
-              <a:cs typeface="Arial" pitchFamily="34"/>
+            <a:endParaRPr lang="en-US" sz="1200" b="0" i="0" kern="1200" dirty="0">
+              <a:solidFill>
+                <a:schemeClr val="tx1"/>
+              </a:solidFill>
+              <a:effectLst/>
+              <a:latin typeface="+mn-lt"/>
+              <a:ea typeface="+mn-ea"/>
+              <a:cs typeface="+mn-cs"/>
             </a:endParaRPr>
           </a:p>
           <a:p>
-            <a:pPr marL="0" marR="0" lvl="0" indent="0" algn="l" defTabSz="914400" rtl="0" eaLnBrk="1" fontAlgn="auto" latinLnBrk="0" hangingPunct="1">
-              <a:lnSpc>
-                <a:spcPct val="100000"/>
-              </a:lnSpc>
-              <a:spcBef>
-                <a:spcPts val="0"/>
-              </a:spcBef>
-              <a:spcAft>
-                <a:spcPts val="0"/>
-              </a:spcAft>
-              <a:buClrTx/>
-              <a:buSzTx/>
-              <a:buFontTx/>
-              <a:buNone/>
-              <a:tabLst/>
-              <a:defRPr/>
-            </a:pPr>
-            <a:r>
-              <a:rPr lang="en-US" sz="1200" b="0" i="0" u="none" strike="noStrike" kern="1200" cap="none" dirty="0">
-                <a:ln>
-                  <a:noFill/>
-                </a:ln>
-                <a:latin typeface="Arial" pitchFamily="34"/>
-                <a:ea typeface="Arial" pitchFamily="34"/>
-                <a:cs typeface="Arial" pitchFamily="34"/>
-              </a:rPr>
-              <a:t>Let’s discuss these questions in the breakout rooms. </a:t>
-            </a:r>
-          </a:p>
-          <a:p>
-            <a:endParaRPr lang="en-US" dirty="0"/>
+            <a:r>
+              <a:rPr lang="en-US" dirty="0"/>
+              <a:t>… and some more definitions to consider.</a:t>
+            </a:r>
           </a:p>
         </p:txBody>
       </p:sp>
@@ -741,7 +669,7 @@
     </p:spTree>
     <p:extLst>
       <p:ext uri="{BB962C8B-B14F-4D97-AF65-F5344CB8AC3E}">
-        <p14:creationId xmlns:p14="http://schemas.microsoft.com/office/powerpoint/2010/main" val="1284256817"/>
+        <p14:creationId xmlns:p14="http://schemas.microsoft.com/office/powerpoint/2010/main" val="4028108833"/>
       </p:ext>
     </p:extLst>
   </p:cSld>
@@ -795,102 +723,94 @@
           <a:bodyPr/>
           <a:lstStyle/>
           <a:p>
-            <a:pPr marL="0" indent="0">
+            <a:pPr marL="0" marR="0" lvl="0" indent="0" algn="l" defTabSz="914400" rtl="0" eaLnBrk="1" fontAlgn="auto" latinLnBrk="0" hangingPunct="1">
+              <a:lnSpc>
+                <a:spcPct val="100000"/>
+              </a:lnSpc>
+              <a:spcBef>
+                <a:spcPts val="0"/>
+              </a:spcBef>
+              <a:spcAft>
+                <a:spcPts val="0"/>
+              </a:spcAft>
+              <a:buClrTx/>
+              <a:buSzTx/>
+              <a:buFontTx/>
               <a:buNone/>
+              <a:tabLst/>
+              <a:defRPr/>
             </a:pPr>
             <a:r>
               <a:rPr lang="en-US" sz="1200" b="0" i="0" u="none" strike="noStrike" kern="1200" cap="none" dirty="0">
                 <a:ln>
                   <a:noFill/>
                 </a:ln>
-                <a:latin typeface="Arial" pitchFamily="18"/>
+                <a:latin typeface="Arial" pitchFamily="34"/>
                 <a:ea typeface="Arial" pitchFamily="34"/>
                 <a:cs typeface="Arial" pitchFamily="34"/>
               </a:rPr>
-              <a:t>This week’s reading introduced you to Alan Turing and the foundational work he did in the field of artificial intelligence.  The Turing test of intelligence was first proposed in 1950, in an article entitled, </a:t>
-            </a:r>
-            <a:r>
-              <a:rPr lang="en-US" sz="1200" b="0" i="1" u="none" strike="noStrike" kern="1200" cap="none" dirty="0">
-                <a:ln>
-                  <a:noFill/>
-                </a:ln>
-                <a:latin typeface="Arial" pitchFamily="18"/>
-                <a:ea typeface="Arial" pitchFamily="34"/>
-                <a:cs typeface="Arial" pitchFamily="34"/>
-              </a:rPr>
-              <a:t>Computing Machinery and Intelligence.  </a:t>
-            </a:r>
-            <a:r>
-              <a:rPr lang="en-US" sz="1200" b="0" i="0" u="none" strike="noStrike" kern="1200" cap="none" dirty="0">
-                <a:ln>
-                  <a:noFill/>
-                </a:ln>
-                <a:latin typeface="Arial" pitchFamily="18"/>
-                <a:ea typeface="Arial" pitchFamily="34"/>
-                <a:cs typeface="Arial" pitchFamily="34"/>
-              </a:rPr>
-              <a:t>This is a foundational document…  Let’s review the Turing test.</a:t>
-            </a:r>
-            <a:endParaRPr lang="en-US" sz="1200" b="0" i="1" u="none" strike="noStrike" kern="1200" cap="none" dirty="0">
-              <a:ln>
-                <a:noFill/>
-              </a:ln>
-              <a:latin typeface="Arial" pitchFamily="18"/>
-              <a:ea typeface="Arial" pitchFamily="34"/>
-              <a:cs typeface="Arial" pitchFamily="34"/>
-            </a:endParaRPr>
-          </a:p>
-          <a:p>
-            <a:pPr marL="0" indent="0">
+              <a:t>Okay – given these definitions and the assigned reading for this week – has your initial definition of A.I. changed?  </a:t>
+            </a:r>
+          </a:p>
+          <a:p>
+            <a:pPr marL="0" marR="0" lvl="0" indent="0" algn="l" defTabSz="914400" rtl="0" eaLnBrk="1" fontAlgn="auto" latinLnBrk="0" hangingPunct="1">
+              <a:lnSpc>
+                <a:spcPct val="100000"/>
+              </a:lnSpc>
+              <a:spcBef>
+                <a:spcPts val="0"/>
+              </a:spcBef>
+              <a:spcAft>
+                <a:spcPts val="0"/>
+              </a:spcAft>
+              <a:buClrTx/>
+              <a:buSzTx/>
+              <a:buFontTx/>
               <a:buNone/>
+              <a:tabLst/>
+              <a:defRPr/>
             </a:pPr>
             <a:endParaRPr lang="en-US" sz="1200" b="0" i="0" u="none" strike="noStrike" kern="1200" cap="none" dirty="0">
               <a:ln>
                 <a:noFill/>
               </a:ln>
-              <a:latin typeface="Arial" pitchFamily="18"/>
+              <a:latin typeface="Arial" pitchFamily="34"/>
               <a:ea typeface="Arial" pitchFamily="34"/>
               <a:cs typeface="Arial" pitchFamily="34"/>
             </a:endParaRPr>
           </a:p>
           <a:p>
-            <a:pPr marL="0" indent="0">
+            <a:pPr marL="0" marR="0" lvl="0" indent="0" algn="l" defTabSz="914400" rtl="0" eaLnBrk="1" fontAlgn="auto" latinLnBrk="0" hangingPunct="1">
+              <a:lnSpc>
+                <a:spcPct val="100000"/>
+              </a:lnSpc>
+              <a:spcBef>
+                <a:spcPts val="0"/>
+              </a:spcBef>
+              <a:spcAft>
+                <a:spcPts val="0"/>
+              </a:spcAft>
+              <a:buClrTx/>
+              <a:buSzTx/>
+              <a:buFontTx/>
               <a:buNone/>
+              <a:tabLst/>
+              <a:defRPr/>
             </a:pPr>
             <a:r>
               <a:rPr lang="en-US" sz="1200" b="0" i="0" u="none" strike="noStrike" kern="1200" cap="none" dirty="0">
                 <a:ln>
                   <a:noFill/>
                 </a:ln>
-                <a:latin typeface="Arial" pitchFamily="18"/>
+                <a:latin typeface="Arial" pitchFamily="34"/>
                 <a:ea typeface="Arial" pitchFamily="34"/>
                 <a:cs typeface="Arial" pitchFamily="34"/>
               </a:rPr>
-              <a:t>Turing, AM (1950) Computing Machinery and Intelligence. </a:t>
-            </a:r>
-            <a:r>
-              <a:rPr lang="en-US" sz="1200" b="0" i="1" u="none" strike="noStrike" kern="1200" cap="none" dirty="0">
-                <a:ln>
-                  <a:noFill/>
-                </a:ln>
-                <a:latin typeface="Arial" pitchFamily="18"/>
-                <a:ea typeface="Arial" pitchFamily="34"/>
-                <a:cs typeface="Arial" pitchFamily="34"/>
-              </a:rPr>
-              <a:t>Mind</a:t>
-            </a:r>
-            <a:r>
-              <a:rPr lang="en-US" sz="1200" b="0" i="0" u="none" strike="noStrike" kern="1200" cap="none" dirty="0">
-                <a:ln>
-                  <a:noFill/>
-                </a:ln>
-                <a:latin typeface="Arial" pitchFamily="18"/>
-                <a:ea typeface="Arial" pitchFamily="34"/>
-                <a:cs typeface="Arial" pitchFamily="34"/>
-              </a:rPr>
-              <a:t>: 54</a:t>
-            </a:r>
-            <a:endParaRPr lang="en-US" b="1" dirty="0"/>
+              <a:t>Let’s discuss these questions in the breakout rooms. </a:t>
+            </a:r>
+          </a:p>
+          <a:p>
+            <a:endParaRPr lang="en-US" dirty="0"/>
           </a:p>
         </p:txBody>
       </p:sp>
@@ -920,7 +840,7 @@
     </p:spTree>
     <p:extLst>
       <p:ext uri="{BB962C8B-B14F-4D97-AF65-F5344CB8AC3E}">
-        <p14:creationId xmlns:p14="http://schemas.microsoft.com/office/powerpoint/2010/main" val="1860523921"/>
+        <p14:creationId xmlns:p14="http://schemas.microsoft.com/office/powerpoint/2010/main" val="1284256817"/>
       </p:ext>
     </p:extLst>
   </p:cSld>
@@ -974,57 +894,102 @@
           <a:bodyPr/>
           <a:lstStyle/>
           <a:p>
-            <a:r>
-              <a:rPr lang="en-US" dirty="0"/>
-              <a:t>At the heart of our reading this week is the Turing test.  In fact, the entire chapter is named after Turing.  This test has been hugely influential since 1950 since he first described it.  </a:t>
-            </a:r>
-          </a:p>
-          <a:p>
-            <a:endParaRPr lang="en-US" dirty="0"/>
-          </a:p>
-          <a:p>
-            <a:pPr marL="228600" indent="-228600">
-              <a:buAutoNum type="arabicPeriod"/>
+            <a:pPr marL="0" indent="0">
+              <a:buNone/>
             </a:pPr>
             <a:r>
-              <a:rPr lang="en-US" dirty="0"/>
-              <a:t>Victorian parlor game – someone tries to tell if another person is a man or a woman simply on the basis of answers they gave to questions posed to them.</a:t>
-            </a:r>
-          </a:p>
-          <a:p>
-            <a:pPr marL="228600" indent="-228600">
-              <a:buAutoNum type="arabicPeriod"/>
+              <a:rPr lang="en-US" sz="1200" b="0" i="0" u="none" strike="noStrike" kern="1200" cap="none" dirty="0">
+                <a:ln>
+                  <a:noFill/>
+                </a:ln>
+                <a:latin typeface="Arial" pitchFamily="18"/>
+                <a:ea typeface="Arial" pitchFamily="34"/>
+                <a:cs typeface="Arial" pitchFamily="34"/>
+              </a:rPr>
+              <a:t>This week’s reading introduced you to Alan Turing and the foundational work he did in the field of artificial intelligence.  The Turing test of intelligence was first proposed in 1950, in an article entitled, </a:t>
+            </a:r>
+            <a:r>
+              <a:rPr lang="en-US" sz="1200" b="0" i="1" u="none" strike="noStrike" kern="1200" cap="none" dirty="0">
+                <a:ln>
+                  <a:noFill/>
+                </a:ln>
+                <a:latin typeface="Arial" pitchFamily="18"/>
+                <a:ea typeface="Arial" pitchFamily="34"/>
+                <a:cs typeface="Arial" pitchFamily="34"/>
+              </a:rPr>
+              <a:t>Computing Machinery and Intelligence.  </a:t>
+            </a:r>
+            <a:r>
+              <a:rPr lang="en-US" sz="1200" b="0" i="0" u="none" strike="noStrike" kern="1200" cap="none" dirty="0">
+                <a:ln>
+                  <a:noFill/>
+                </a:ln>
+                <a:latin typeface="Arial" pitchFamily="18"/>
+                <a:ea typeface="Arial" pitchFamily="34"/>
+                <a:cs typeface="Arial" pitchFamily="34"/>
+              </a:rPr>
+              <a:t>This is a foundational document…  Let’s review the Turing test.</a:t>
+            </a:r>
+            <a:endParaRPr lang="en-US" sz="1200" b="0" i="1" u="none" strike="noStrike" kern="1200" cap="none" dirty="0">
+              <a:ln>
+                <a:noFill/>
+              </a:ln>
+              <a:latin typeface="Arial" pitchFamily="18"/>
+              <a:ea typeface="Arial" pitchFamily="34"/>
+              <a:cs typeface="Arial" pitchFamily="34"/>
+            </a:endParaRPr>
+          </a:p>
+          <a:p>
+            <a:pPr marL="0" indent="0">
+              <a:buNone/>
             </a:pPr>
-            <a:r>
-              <a:rPr lang="en-US" dirty="0"/>
-              <a:t>Human interacts with a computer – does not know if it is another human or an intelligent system.  The interaction is purely in the form of textual questions and answers: the interrogator types a question, and a response is displayed.  The task of the interrogator is to determine whether the thing being interrogated is a person or a computer program.</a:t>
-            </a:r>
-          </a:p>
-          <a:p>
-            <a:pPr marL="228600" indent="-228600">
-              <a:buAutoNum type="arabicPeriod"/>
+            <a:endParaRPr lang="en-US" sz="1200" b="0" i="0" u="none" strike="noStrike" kern="1200" cap="none" dirty="0">
+              <a:ln>
+                <a:noFill/>
+              </a:ln>
+              <a:latin typeface="Arial" pitchFamily="18"/>
+              <a:ea typeface="Arial" pitchFamily="34"/>
+              <a:cs typeface="Arial" pitchFamily="34"/>
+            </a:endParaRPr>
+          </a:p>
+          <a:p>
+            <a:pPr marL="0" indent="0">
+              <a:buNone/>
             </a:pPr>
             <a:r>
-              <a:rPr lang="en-US" dirty="0"/>
-              <a:t>Now, suppose that the thing being interrogated is indeed a computer program, but after some reasonable amount of time, the interrogators cannot reliably tell whether they are interacting with a program or a person.  Then surely, Turing argued, you should accept that the program has some sort of human level intelligence because the system is doing something that makes it </a:t>
-            </a:r>
-            <a:r>
-              <a:rPr lang="en-US" b="1" dirty="0"/>
-              <a:t>indistinguishable </a:t>
-            </a:r>
-            <a:r>
-              <a:rPr lang="en-US" b="0" dirty="0"/>
-              <a:t>from the real thing.  The key word here is indistinguishable…</a:t>
-            </a:r>
-          </a:p>
-          <a:p>
-            <a:pPr marL="228600" indent="-228600">
-              <a:buAutoNum type="arabicPeriod"/>
-            </a:pPr>
-            <a:endParaRPr lang="en-US" b="0" dirty="0"/>
-          </a:p>
-          <a:p>
-            <a:endParaRPr lang="en-US" dirty="0"/>
+              <a:rPr lang="en-US" sz="1200" b="0" i="0" u="none" strike="noStrike" kern="1200" cap="none" dirty="0">
+                <a:ln>
+                  <a:noFill/>
+                </a:ln>
+                <a:latin typeface="Arial" pitchFamily="18"/>
+                <a:ea typeface="Arial" pitchFamily="34"/>
+                <a:cs typeface="Arial" pitchFamily="34"/>
+              </a:rPr>
+              <a:t>Turing, AM (1950) Computing Machinery and Intelligence. </a:t>
+            </a:r>
+            <a:r>
+              <a:rPr lang="en-US" sz="1200" b="0" i="1" u="none" strike="noStrike" kern="1200" cap="none" dirty="0">
+                <a:ln>
+                  <a:noFill/>
+                </a:ln>
+                <a:latin typeface="Arial" pitchFamily="18"/>
+                <a:ea typeface="Arial" pitchFamily="34"/>
+                <a:cs typeface="Arial" pitchFamily="34"/>
+              </a:rPr>
+              <a:t>Mind</a:t>
+            </a:r>
+            <a:r>
+              <a:rPr lang="en-US" sz="1200" b="0" i="0" u="none" strike="noStrike" kern="1200" cap="none" dirty="0">
+                <a:ln>
+                  <a:noFill/>
+                </a:ln>
+                <a:latin typeface="Arial" pitchFamily="18"/>
+                <a:ea typeface="Arial" pitchFamily="34"/>
+                <a:cs typeface="Arial" pitchFamily="34"/>
+              </a:rPr>
+              <a:t>: 54</a:t>
+            </a:r>
+            <a:endParaRPr lang="en-US" b="1" dirty="0"/>
           </a:p>
         </p:txBody>
       </p:sp>
@@ -1054,7 +1019,7 @@
     </p:spTree>
     <p:extLst>
       <p:ext uri="{BB962C8B-B14F-4D97-AF65-F5344CB8AC3E}">
-        <p14:creationId xmlns:p14="http://schemas.microsoft.com/office/powerpoint/2010/main" val="2968338234"/>
+        <p14:creationId xmlns:p14="http://schemas.microsoft.com/office/powerpoint/2010/main" val="1860523921"/>
       </p:ext>
     </p:extLst>
   </p:cSld>
@@ -1109,36 +1074,56 @@
           <a:lstStyle/>
           <a:p>
             <a:r>
+              <a:rPr lang="en-US" dirty="0"/>
+              <a:t>At the heart of our reading this week is the Turing test.  In fact, the entire chapter is named after Turing.  This test has been hugely influential since 1950 since he first described it.  </a:t>
+            </a:r>
+          </a:p>
+          <a:p>
+            <a:endParaRPr lang="en-US" dirty="0"/>
+          </a:p>
+          <a:p>
+            <a:pPr marL="228600" indent="-228600">
+              <a:buAutoNum type="arabicPeriod"/>
+            </a:pPr>
+            <a:r>
+              <a:rPr lang="en-US" dirty="0"/>
+              <a:t>Victorian parlor game – someone tries to tell if another person is a man or a woman simply on the basis of answers they gave to questions posed to them.</a:t>
+            </a:r>
+          </a:p>
+          <a:p>
+            <a:pPr marL="228600" indent="-228600">
+              <a:buAutoNum type="arabicPeriod"/>
+            </a:pPr>
+            <a:r>
+              <a:rPr lang="en-US" dirty="0"/>
+              <a:t>Human interacts with a computer – does not know if it is another human or an intelligent system.  The interaction is purely in the form of textual questions and answers: the interrogator types a question, and a response is displayed.  The task of the interrogator is to determine whether the thing being interrogated is a person or a computer program.</a:t>
+            </a:r>
+          </a:p>
+          <a:p>
+            <a:pPr marL="228600" indent="-228600">
+              <a:buAutoNum type="arabicPeriod"/>
+            </a:pPr>
+            <a:r>
+              <a:rPr lang="en-US" dirty="0"/>
+              <a:t>Now, suppose that the thing being interrogated is indeed a computer program, but after some reasonable amount of time, the interrogators cannot reliably tell whether they are interacting with a program or a person.  Then surely, Turing argued, you should accept that the program has some sort of human level intelligence because the system is doing something that makes it </a:t>
+            </a:r>
+            <a:r>
+              <a:rPr lang="en-US" b="1" dirty="0"/>
+              <a:t>indistinguishable </a:t>
+            </a:r>
+            <a:r>
               <a:rPr lang="en-US" b="0" dirty="0"/>
-              <a:t>Woolridge discusses ELIZA, a computer program written in the 1960’s by the German MIT computer scientist Joseph Weizenbaum.  Eliza takes the role of a psychiatrist talking to a patient to get the interviewee to contemplate themselves.</a:t>
-            </a:r>
-          </a:p>
-          <a:p>
+              <a:t>from the real thing.  The key word here is indistinguishable…</a:t>
+            </a:r>
+          </a:p>
+          <a:p>
+            <a:pPr marL="228600" indent="-228600">
+              <a:buAutoNum type="arabicPeriod"/>
+            </a:pPr>
             <a:endParaRPr lang="en-US" b="0" dirty="0"/>
           </a:p>
           <a:p>
-            <a:r>
-              <a:rPr lang="en-US" b="0" dirty="0"/>
-              <a:t>ELIZA’s legacy lives on to this day, in the form of the annual Loebner Prize competition.  It is unclear whether Turing imagined that anyone would ever actually try out his test for real, but in 1990 that is precisely what American millionaire inventory Hugh Loebner decided to do.  Every year, the Loebner Prize invites the submission of computer programs to engage in the Turing test, attempting to convince a panel of judges that they are in fact people.  </a:t>
-            </a:r>
-          </a:p>
-          <a:p>
-            <a:endParaRPr lang="en-US" b="0" dirty="0"/>
-          </a:p>
-          <a:p>
-            <a:r>
-              <a:rPr lang="en-US" b="0" dirty="0"/>
-              <a:t>We’re going to give you time to chat with this year’s winner of the Loebner prize.  Her name is Kuki…</a:t>
-            </a:r>
-          </a:p>
-          <a:p>
-            <a:endParaRPr lang="en-US" b="0" dirty="0"/>
-          </a:p>
-          <a:p>
-            <a:r>
-              <a:rPr lang="en-US" b="0" dirty="0"/>
-              <a:t>Woolridge concludes, “ELIZA is the direct ancestor of a phenomenon that makes AI researchers groan whenever it is mentioned: the internet chatbot.</a:t>
-            </a:r>
+            <a:endParaRPr lang="en-US" dirty="0"/>
           </a:p>
         </p:txBody>
       </p:sp>
@@ -1168,7 +1153,7 @@
     </p:spTree>
     <p:extLst>
       <p:ext uri="{BB962C8B-B14F-4D97-AF65-F5344CB8AC3E}">
-        <p14:creationId xmlns:p14="http://schemas.microsoft.com/office/powerpoint/2010/main" val="4034031462"/>
+        <p14:creationId xmlns:p14="http://schemas.microsoft.com/office/powerpoint/2010/main" val="2968338234"/>
       </p:ext>
     </p:extLst>
   </p:cSld>
@@ -1222,92 +1207,36 @@
           <a:bodyPr/>
           <a:lstStyle/>
           <a:p>
-            <a:pPr marL="0" marR="0" indent="0">
-              <a:spcBef>
-                <a:spcPts val="0"/>
-              </a:spcBef>
-              <a:spcAft>
-                <a:spcPts val="0"/>
-              </a:spcAft>
-              <a:buNone/>
-            </a:pPr>
-            <a:r>
-              <a:rPr lang="en-US" sz="1200" dirty="0">
-                <a:effectLst/>
-                <a:latin typeface="Palatino Linotype" panose="02040502050505030304" pitchFamily="18" charset="0"/>
-                <a:ea typeface="Calibri" panose="020F0502020204030204" pitchFamily="34" charset="0"/>
-              </a:rPr>
-              <a:t>Students engage in a 10-minute conversation with Kuki.ai</a:t>
-            </a:r>
-          </a:p>
-          <a:p>
-            <a:pPr marL="0" marR="0" indent="0">
-              <a:spcBef>
-                <a:spcPts val="0"/>
-              </a:spcBef>
-              <a:spcAft>
-                <a:spcPts val="0"/>
-              </a:spcAft>
-              <a:buNone/>
-            </a:pPr>
-            <a:endParaRPr lang="en-US" sz="1200" dirty="0">
-              <a:effectLst/>
-              <a:latin typeface="Palatino Linotype" panose="02040502050505030304" pitchFamily="18" charset="0"/>
-              <a:ea typeface="Calibri" panose="020F0502020204030204" pitchFamily="34" charset="0"/>
-            </a:endParaRPr>
-          </a:p>
-          <a:p>
-            <a:pPr marL="0" marR="0" indent="0">
-              <a:spcBef>
-                <a:spcPts val="0"/>
-              </a:spcBef>
-              <a:spcAft>
-                <a:spcPts val="0"/>
-              </a:spcAft>
-              <a:buNone/>
-            </a:pPr>
-            <a:r>
-              <a:rPr lang="en-US" sz="1200" dirty="0">
-                <a:effectLst/>
-                <a:latin typeface="Palatino Linotype" panose="02040502050505030304" pitchFamily="18" charset="0"/>
-                <a:ea typeface="Calibri" panose="020F0502020204030204" pitchFamily="34" charset="0"/>
-              </a:rPr>
-              <a:t>Breakout conversations – Is Kuki exhibiting intelligent behavior, is this intelligence? (Yes/No)</a:t>
-            </a:r>
-          </a:p>
-          <a:p>
-            <a:pPr marL="0" marR="0" indent="0">
-              <a:spcBef>
-                <a:spcPts val="0"/>
-              </a:spcBef>
-              <a:spcAft>
-                <a:spcPts val="0"/>
-              </a:spcAft>
-              <a:buNone/>
-            </a:pPr>
-            <a:endParaRPr lang="en-US" sz="1200" dirty="0">
-              <a:effectLst/>
-              <a:latin typeface="Palatino Linotype" panose="02040502050505030304" pitchFamily="18" charset="0"/>
-              <a:ea typeface="Calibri" panose="020F0502020204030204" pitchFamily="34" charset="0"/>
-            </a:endParaRPr>
-          </a:p>
-          <a:p>
-            <a:pPr marL="0" marR="0" indent="0">
-              <a:spcBef>
-                <a:spcPts val="0"/>
-              </a:spcBef>
-              <a:spcAft>
-                <a:spcPts val="0"/>
-              </a:spcAft>
-              <a:buNone/>
-            </a:pPr>
-            <a:r>
-              <a:rPr lang="en-US" sz="1200" dirty="0">
-                <a:effectLst/>
-                <a:latin typeface="Palatino Linotype" panose="02040502050505030304" pitchFamily="18" charset="0"/>
-                <a:ea typeface="Calibri" panose="020F0502020204030204" pitchFamily="34" charset="0"/>
-              </a:rPr>
-              <a:t>Team debate </a:t>
+            <a:r>
+              <a:rPr lang="en-US" b="0" dirty="0"/>
+              <a:t>Woolridge discusses ELIZA, a computer program written in the 1960’s by the German MIT computer scientist Joseph Weizenbaum.  Eliza takes the role of a psychiatrist talking to a patient to get the interviewee to contemplate themselves.</a:t>
+            </a:r>
+          </a:p>
+          <a:p>
+            <a:endParaRPr lang="en-US" b="0" dirty="0"/>
+          </a:p>
+          <a:p>
+            <a:r>
+              <a:rPr lang="en-US" b="0" dirty="0"/>
+              <a:t>ELIZA’s legacy lives on to this day, in the form of the annual Loebner Prize competition.  It is unclear whether Turing imagined that anyone would ever actually try out his test for real, but in 1990 that is precisely what American millionaire inventory Hugh Loebner decided to do.  Every year, the Loebner Prize invites the submission of computer programs to engage in the Turing test, attempting to convince a panel of judges that they are in fact people.  </a:t>
+            </a:r>
+          </a:p>
+          <a:p>
+            <a:endParaRPr lang="en-US" b="0" dirty="0"/>
+          </a:p>
+          <a:p>
+            <a:r>
+              <a:rPr lang="en-US" b="0" dirty="0"/>
+              <a:t>We’re going to give you time to chat with this year’s winner of the Loebner prize.  Her name is Kuki…</a:t>
+            </a:r>
+          </a:p>
+          <a:p>
+            <a:endParaRPr lang="en-US" b="0" dirty="0"/>
+          </a:p>
+          <a:p>
+            <a:r>
+              <a:rPr lang="en-US" b="0" dirty="0"/>
+              <a:t>Woolridge concludes, “ELIZA is the direct ancestor of a phenomenon that makes AI researchers groan whenever it is mentioned: the internet chatbot.</a:t>
             </a:r>
           </a:p>
         </p:txBody>
@@ -1338,7 +1267,7 @@
     </p:spTree>
     <p:extLst>
       <p:ext uri="{BB962C8B-B14F-4D97-AF65-F5344CB8AC3E}">
-        <p14:creationId xmlns:p14="http://schemas.microsoft.com/office/powerpoint/2010/main" val="1066522800"/>
+        <p14:creationId xmlns:p14="http://schemas.microsoft.com/office/powerpoint/2010/main" val="4034031462"/>
       </p:ext>
     </p:extLst>
   </p:cSld>
@@ -1392,7 +1321,58 @@
           <a:bodyPr/>
           <a:lstStyle/>
           <a:p>
-            <a:endParaRPr lang="en-US" dirty="0"/>
+            <a:pPr marL="0" marR="0" indent="0">
+              <a:spcBef>
+                <a:spcPts val="0"/>
+              </a:spcBef>
+              <a:spcAft>
+                <a:spcPts val="0"/>
+              </a:spcAft>
+              <a:buNone/>
+            </a:pPr>
+            <a:r>
+              <a:rPr lang="en-US" sz="1200" dirty="0">
+                <a:effectLst/>
+                <a:latin typeface="Palatino Linotype" panose="02040502050505030304" pitchFamily="18" charset="0"/>
+                <a:ea typeface="Calibri" panose="020F0502020204030204" pitchFamily="34" charset="0"/>
+              </a:rPr>
+              <a:t>Breakout conversations – Is Kuki exhibiting intelligent behavior, is this intelligence? (Yes/No)</a:t>
+            </a:r>
+          </a:p>
+          <a:p>
+            <a:pPr marL="0" marR="0" indent="0">
+              <a:spcBef>
+                <a:spcPts val="0"/>
+              </a:spcBef>
+              <a:spcAft>
+                <a:spcPts val="0"/>
+              </a:spcAft>
+              <a:buNone/>
+            </a:pPr>
+            <a:endParaRPr lang="en-US" sz="1200" dirty="0">
+              <a:effectLst/>
+              <a:latin typeface="Palatino Linotype" panose="02040502050505030304" pitchFamily="18" charset="0"/>
+              <a:ea typeface="Calibri" panose="020F0502020204030204" pitchFamily="34" charset="0"/>
+            </a:endParaRPr>
+          </a:p>
+          <a:p>
+            <a:pPr marL="0" marR="0" indent="0">
+              <a:spcBef>
+                <a:spcPts val="0"/>
+              </a:spcBef>
+              <a:spcAft>
+                <a:spcPts val="0"/>
+              </a:spcAft>
+              <a:buNone/>
+            </a:pPr>
+            <a:r>
+              <a:rPr lang="en-US" sz="1200" dirty="0">
+                <a:effectLst/>
+                <a:latin typeface="Palatino Linotype" panose="02040502050505030304" pitchFamily="18" charset="0"/>
+                <a:ea typeface="Calibri" panose="020F0502020204030204" pitchFamily="34" charset="0"/>
+              </a:rPr>
+              <a:t>Team debate </a:t>
+            </a:r>
           </a:p>
         </p:txBody>
       </p:sp>
@@ -1422,7 +1402,7 @@
     </p:spTree>
     <p:extLst>
       <p:ext uri="{BB962C8B-B14F-4D97-AF65-F5344CB8AC3E}">
-        <p14:creationId xmlns:p14="http://schemas.microsoft.com/office/powerpoint/2010/main" val="4007547773"/>
+        <p14:creationId xmlns:p14="http://schemas.microsoft.com/office/powerpoint/2010/main" val="1066522800"/>
       </p:ext>
     </p:extLst>
   </p:cSld>
@@ -1506,7 +1486,7 @@
     </p:spTree>
     <p:extLst>
       <p:ext uri="{BB962C8B-B14F-4D97-AF65-F5344CB8AC3E}">
-        <p14:creationId xmlns:p14="http://schemas.microsoft.com/office/powerpoint/2010/main" val="253102611"/>
+        <p14:creationId xmlns:p14="http://schemas.microsoft.com/office/powerpoint/2010/main" val="4007547773"/>
       </p:ext>
     </p:extLst>
   </p:cSld>
@@ -1560,10 +1540,7 @@
           <a:bodyPr/>
           <a:lstStyle/>
           <a:p>
-            <a:r>
-              <a:rPr lang="en-US" dirty="0"/>
-              <a:t>Okay – let’s quickly summarize what we covered in today’s learning experience.</a:t>
-            </a:r>
+            <a:endParaRPr lang="en-US" dirty="0"/>
           </a:p>
         </p:txBody>
       </p:sp>
@@ -1585,6 +1562,93 @@
             <a:fld id="{3148858F-F1DB-4027-9C85-CCA6849540DD}" type="slidenum">
               <a:rPr lang="en-US" smtClean="0"/>
               <a:t>17</a:t>
+            </a:fld>
+            <a:endParaRPr lang="en-US"/>
+          </a:p>
+        </p:txBody>
+      </p:sp>
+    </p:spTree>
+    <p:extLst>
+      <p:ext uri="{BB962C8B-B14F-4D97-AF65-F5344CB8AC3E}">
+        <p14:creationId xmlns:p14="http://schemas.microsoft.com/office/powerpoint/2010/main" val="253102611"/>
+      </p:ext>
+    </p:extLst>
+  </p:cSld>
+  <p:clrMapOvr>
+    <a:masterClrMapping/>
+  </p:clrMapOvr>
+</p:notes>
+</file>
+
+<file path=ppt/notesSlides/notesSlide18.xml><?xml version="1.0" encoding="utf-8"?>
+<p:notes xmlns:a="http://schemas.openxmlformats.org/drawingml/2006/main" xmlns:r="http://schemas.openxmlformats.org/officeDocument/2006/relationships" xmlns:p="http://schemas.openxmlformats.org/presentationml/2006/main">
+  <p:cSld>
+    <p:spTree>
+      <p:nvGrpSpPr>
+        <p:cNvPr id="1" name=""/>
+        <p:cNvGrpSpPr/>
+        <p:nvPr/>
+      </p:nvGrpSpPr>
+      <p:grpSpPr>
+        <a:xfrm>
+          <a:off x="0" y="0"/>
+          <a:ext cx="0" cy="0"/>
+          <a:chOff x="0" y="0"/>
+          <a:chExt cx="0" cy="0"/>
+        </a:xfrm>
+      </p:grpSpPr>
+      <p:sp>
+        <p:nvSpPr>
+          <p:cNvPr id="2" name="Slide Image Placeholder 1"/>
+          <p:cNvSpPr>
+            <a:spLocks noGrp="1" noRot="1" noChangeAspect="1"/>
+          </p:cNvSpPr>
+          <p:nvPr>
+            <p:ph type="sldImg"/>
+          </p:nvPr>
+        </p:nvSpPr>
+        <p:spPr/>
+      </p:sp>
+      <p:sp>
+        <p:nvSpPr>
+          <p:cNvPr id="3" name="Notes Placeholder 2"/>
+          <p:cNvSpPr>
+            <a:spLocks noGrp="1"/>
+          </p:cNvSpPr>
+          <p:nvPr>
+            <p:ph type="body" idx="1"/>
+          </p:nvPr>
+        </p:nvSpPr>
+        <p:spPr/>
+        <p:txBody>
+          <a:bodyPr/>
+          <a:lstStyle/>
+          <a:p>
+            <a:r>
+              <a:rPr lang="en-US" dirty="0"/>
+              <a:t>Okay – let’s quickly summarize what we covered in today’s learning experience.</a:t>
+            </a:r>
+          </a:p>
+        </p:txBody>
+      </p:sp>
+      <p:sp>
+        <p:nvSpPr>
+          <p:cNvPr id="4" name="Slide Number Placeholder 3"/>
+          <p:cNvSpPr>
+            <a:spLocks noGrp="1"/>
+          </p:cNvSpPr>
+          <p:nvPr>
+            <p:ph type="sldNum" sz="quarter" idx="5"/>
+          </p:nvPr>
+        </p:nvSpPr>
+        <p:spPr/>
+        <p:txBody>
+          <a:bodyPr/>
+          <a:lstStyle/>
+          <a:p>
+            <a:fld id="{3148858F-F1DB-4027-9C85-CCA6849540DD}" type="slidenum">
+              <a:rPr lang="en-US" smtClean="0"/>
+              <a:t>18</a:t>
             </a:fld>
             <a:endParaRPr lang="en-US"/>
           </a:p>
@@ -2060,124 +2124,6 @@
           <a:bodyPr/>
           <a:lstStyle/>
           <a:p>
-            <a:pPr marL="0" marR="0" lvl="0" indent="0" algn="l" defTabSz="914400" rtl="0" eaLnBrk="1" fontAlgn="auto" latinLnBrk="0" hangingPunct="1">
-              <a:lnSpc>
-                <a:spcPct val="100000"/>
-              </a:lnSpc>
-              <a:spcBef>
-                <a:spcPts val="0"/>
-              </a:spcBef>
-              <a:spcAft>
-                <a:spcPts val="0"/>
-              </a:spcAft>
-              <a:buClrTx/>
-              <a:buSzTx/>
-              <a:buFontTx/>
-              <a:buNone/>
-              <a:tabLst/>
-              <a:defRPr/>
-            </a:pPr>
-            <a:r>
-              <a:rPr lang="en-US" sz="1200" b="0" i="0" u="none" strike="noStrike" kern="1200" cap="none" dirty="0">
-                <a:ln>
-                  <a:noFill/>
-                </a:ln>
-                <a:latin typeface="Arial" pitchFamily="34"/>
-                <a:ea typeface="Arial" pitchFamily="34"/>
-                <a:cs typeface="Arial" pitchFamily="34"/>
-              </a:rPr>
-              <a:t>In our first class, I asked the question, “What is intelligence?  And what criteria would you use to assess whether an entity is intelligent?  Back in the day, I was a fan of Star Trek: The Next Generation.  And this is a painting of Lieutenant Commander Data, the resident Android.  I remember one episode in particular.  In it, the main story raised the question of what constitutes intelligence in relation to one’s self-determination.  Should Data be allowed to refuse a reverse engineering experiment and be accorded the same privileges extended to humans making a </a:t>
-            </a:r>
-            <a:r>
-              <a:rPr lang="en-US" sz="1200" b="0" i="1" u="none" strike="noStrike" kern="1200" cap="none" dirty="0">
-                <a:ln>
-                  <a:noFill/>
-                </a:ln>
-                <a:latin typeface="Arial" pitchFamily="34"/>
-                <a:ea typeface="Arial" pitchFamily="34"/>
-                <a:cs typeface="Arial" pitchFamily="34"/>
-              </a:rPr>
-              <a:t>medical</a:t>
-            </a:r>
-            <a:r>
-              <a:rPr lang="en-US" sz="1200" b="0" i="0" u="none" strike="noStrike" kern="1200" cap="none" dirty="0">
-                <a:ln>
-                  <a:noFill/>
-                </a:ln>
-                <a:latin typeface="Arial" pitchFamily="34"/>
-                <a:ea typeface="Arial" pitchFamily="34"/>
-                <a:cs typeface="Arial" pitchFamily="34"/>
-              </a:rPr>
-              <a:t> decision?  Or was he an </a:t>
-            </a:r>
-            <a:r>
-              <a:rPr lang="en-US" sz="1200" b="0" i="1" u="none" strike="noStrike" kern="1200" cap="none" dirty="0">
-                <a:ln>
-                  <a:noFill/>
-                </a:ln>
-                <a:latin typeface="Arial" pitchFamily="34"/>
-                <a:ea typeface="Arial" pitchFamily="34"/>
-                <a:cs typeface="Arial" pitchFamily="34"/>
-              </a:rPr>
-              <a:t>unthinking </a:t>
-            </a:r>
-            <a:r>
-              <a:rPr lang="en-US" sz="1200" b="0" i="0" u="none" strike="noStrike" kern="1200" cap="none" dirty="0">
-                <a:ln>
-                  <a:noFill/>
-                </a:ln>
-                <a:latin typeface="Arial" pitchFamily="34"/>
-                <a:ea typeface="Arial" pitchFamily="34"/>
-                <a:cs typeface="Arial" pitchFamily="34"/>
-              </a:rPr>
-              <a:t>machine, a different class of being who must obey directives no matter what.  As you can see, one’s definition of intelligence is important, and it lies at the heart of this emerging field.  For without a clear definition of intelligence, how will we know when we have succeeded?</a:t>
-            </a:r>
-          </a:p>
-          <a:p>
-            <a:pPr marL="0" marR="0" lvl="0" indent="0" algn="l" defTabSz="914400" rtl="0" eaLnBrk="1" fontAlgn="auto" latinLnBrk="0" hangingPunct="1">
-              <a:lnSpc>
-                <a:spcPct val="100000"/>
-              </a:lnSpc>
-              <a:spcBef>
-                <a:spcPts val="0"/>
-              </a:spcBef>
-              <a:spcAft>
-                <a:spcPts val="0"/>
-              </a:spcAft>
-              <a:buClrTx/>
-              <a:buSzTx/>
-              <a:buFontTx/>
-              <a:buNone/>
-              <a:tabLst/>
-              <a:defRPr/>
-            </a:pPr>
-            <a:endParaRPr lang="en-US" sz="1200" b="0" i="0" u="none" strike="noStrike" kern="1200" cap="none" dirty="0">
-              <a:ln>
-                <a:noFill/>
-              </a:ln>
-              <a:latin typeface="Arial" pitchFamily="34"/>
-              <a:ea typeface="Arial" pitchFamily="34"/>
-              <a:cs typeface="Arial" pitchFamily="34"/>
-            </a:endParaRPr>
-          </a:p>
-          <a:p>
-            <a:pPr marL="0" marR="0" lvl="0" indent="0" algn="l" defTabSz="914400" rtl="0" eaLnBrk="1" fontAlgn="auto" latinLnBrk="0" hangingPunct="1">
-              <a:lnSpc>
-                <a:spcPct val="100000"/>
-              </a:lnSpc>
-              <a:spcBef>
-                <a:spcPts val="0"/>
-              </a:spcBef>
-              <a:spcAft>
-                <a:spcPts val="0"/>
-              </a:spcAft>
-              <a:buClrTx/>
-              <a:buSzTx/>
-              <a:buFontTx/>
-              <a:buNone/>
-              <a:tabLst/>
-              <a:defRPr/>
-            </a:pPr>
             <a:r>
               <a:rPr lang="en-US" sz="1200" b="0" i="0" kern="1200" dirty="0">
                 <a:solidFill>
@@ -2188,75 +2134,8 @@
                 <a:ea typeface="+mn-ea"/>
                 <a:cs typeface="+mn-cs"/>
               </a:rPr>
-              <a:t>So, in last week’s class, you took a poll in which you provided a phrase to describe artificial intelligence.   Today, we want to continue that conversation. Let’s begin with some history.</a:t>
-            </a:r>
-          </a:p>
-          <a:p>
-            <a:pPr algn="l"/>
-            <a:endParaRPr lang="en-US" b="0" i="0" dirty="0">
-              <a:solidFill>
-                <a:srgbClr val="202122"/>
-              </a:solidFill>
-              <a:effectLst/>
-              <a:latin typeface="Arial" panose="020B0604020202020204" pitchFamily="34" charset="0"/>
-            </a:endParaRPr>
-          </a:p>
-          <a:p>
-            <a:pPr marL="0" marR="0" lvl="0" indent="0" algn="l" defTabSz="914400" rtl="0" eaLnBrk="1" fontAlgn="auto" latinLnBrk="0" hangingPunct="1">
-              <a:lnSpc>
-                <a:spcPct val="100000"/>
-              </a:lnSpc>
-              <a:spcBef>
-                <a:spcPts val="0"/>
-              </a:spcBef>
-              <a:spcAft>
-                <a:spcPts val="0"/>
-              </a:spcAft>
-              <a:buClrTx/>
-              <a:buSzTx/>
-              <a:buFontTx/>
-              <a:buNone/>
-              <a:tabLst/>
-              <a:defRPr/>
-            </a:pPr>
-            <a:endParaRPr lang="en-US" sz="1200" b="0" i="0" u="none" strike="noStrike" kern="1200" cap="none" dirty="0">
-              <a:ln>
-                <a:noFill/>
-              </a:ln>
-              <a:latin typeface="Arial" pitchFamily="34"/>
-              <a:ea typeface="Arial" pitchFamily="34"/>
-              <a:cs typeface="Arial" pitchFamily="34"/>
-            </a:endParaRPr>
-          </a:p>
-          <a:p>
-            <a:pPr marL="0" marR="0" lvl="0" indent="0" algn="l" defTabSz="914400" rtl="0" eaLnBrk="1" fontAlgn="auto" latinLnBrk="0" hangingPunct="1">
-              <a:lnSpc>
-                <a:spcPct val="100000"/>
-              </a:lnSpc>
-              <a:spcBef>
-                <a:spcPts val="0"/>
-              </a:spcBef>
-              <a:spcAft>
-                <a:spcPts val="0"/>
-              </a:spcAft>
-              <a:buClrTx/>
-              <a:buSzTx/>
-              <a:buFontTx/>
-              <a:buNone/>
-              <a:tabLst/>
-              <a:defRPr/>
-            </a:pPr>
-            <a:endParaRPr lang="en-US" sz="1200" b="0" i="0" u="none" strike="noStrike" kern="1200" cap="none" dirty="0">
-              <a:ln>
-                <a:noFill/>
-              </a:ln>
-              <a:latin typeface="Arial" pitchFamily="34"/>
-              <a:ea typeface="Arial" pitchFamily="34"/>
-              <a:cs typeface="Arial" pitchFamily="34"/>
-            </a:endParaRPr>
-          </a:p>
-          <a:p>
-            <a:endParaRPr lang="en-US" dirty="0"/>
+              <a:t>Surprise!  Perusall uses an AI algorithm to grade the quality of your written posts.  How does it feel to have an algorithm and not a human grading your work?  It’s largely a black box, though the software does allow the instructors to adjust multiple settings.</a:t>
+            </a:r>
           </a:p>
         </p:txBody>
       </p:sp>
@@ -2286,7 +2165,7 @@
     </p:spTree>
     <p:extLst>
       <p:ext uri="{BB962C8B-B14F-4D97-AF65-F5344CB8AC3E}">
-        <p14:creationId xmlns:p14="http://schemas.microsoft.com/office/powerpoint/2010/main" val="3136242698"/>
+        <p14:creationId xmlns:p14="http://schemas.microsoft.com/office/powerpoint/2010/main" val="3220379977"/>
       </p:ext>
     </p:extLst>
   </p:cSld>
@@ -2315,173 +2194,117 @@
       </p:grpSpPr>
       <p:sp>
         <p:nvSpPr>
-          <p:cNvPr id="7" name="Slide Number Placeholder 6">
-            <a:extLst>
-              <a:ext uri="{FF2B5EF4-FFF2-40B4-BE49-F238E27FC236}">
-                <a16:creationId xmlns:a16="http://schemas.microsoft.com/office/drawing/2014/main" id="{5B543A9C-E520-124D-A26C-727E7A91B5A6}"/>
-              </a:ext>
-            </a:extLst>
-          </p:cNvPr>
-          <p:cNvSpPr txBox="1">
-            <a:spLocks noGrp="1"/>
-          </p:cNvSpPr>
-          <p:nvPr>
-            <p:ph type="sldNum" sz="quarter" idx="5"/>
-          </p:nvPr>
-        </p:nvSpPr>
-        <p:spPr>
-          <a:ln/>
-        </p:spPr>
-        <p:txBody>
-          <a:bodyPr lIns="0" tIns="0" rIns="0" bIns="0" anchor="b" anchorCtr="0">
-            <a:noAutofit/>
-          </a:bodyPr>
+          <p:cNvPr id="2" name="Slide Image Placeholder 1"/>
+          <p:cNvSpPr>
+            <a:spLocks noGrp="1" noRot="1" noChangeAspect="1"/>
+          </p:cNvSpPr>
+          <p:nvPr>
+            <p:ph type="sldImg"/>
+          </p:nvPr>
+        </p:nvSpPr>
+        <p:spPr/>
+      </p:sp>
+      <p:sp>
+        <p:nvSpPr>
+          <p:cNvPr id="3" name="Notes Placeholder 2"/>
+          <p:cNvSpPr>
+            <a:spLocks noGrp="1"/>
+          </p:cNvSpPr>
+          <p:nvPr>
+            <p:ph type="body" idx="1"/>
+          </p:nvPr>
+        </p:nvSpPr>
+        <p:spPr/>
+        <p:txBody>
+          <a:bodyPr/>
           <a:lstStyle/>
           <a:p>
-            <a:pPr lvl="0"/>
-            <a:fld id="{F26ADB32-8A69-2C4E-BA54-385F30C1B140}" type="slidenum">
-              <a:t>7</a:t>
-            </a:fld>
-            <a:endParaRPr lang="en-US"/>
-          </a:p>
-        </p:txBody>
-      </p:sp>
-      <p:sp>
-        <p:nvSpPr>
-          <p:cNvPr id="2" name="Slide Image Placeholder 1">
-            <a:extLst>
-              <a:ext uri="{FF2B5EF4-FFF2-40B4-BE49-F238E27FC236}">
-                <a16:creationId xmlns:a16="http://schemas.microsoft.com/office/drawing/2014/main" id="{A02321D2-BA00-8D41-B3B0-CF9117442E2A}"/>
-              </a:ext>
-            </a:extLst>
-          </p:cNvPr>
-          <p:cNvSpPr>
-            <a:spLocks noGrp="1" noRot="1" noChangeAspect="1" noResize="1"/>
-          </p:cNvSpPr>
-          <p:nvPr>
-            <p:ph type="sldImg"/>
-          </p:nvPr>
-        </p:nvSpPr>
-        <p:spPr>
-          <a:xfrm>
-            <a:off x="533400" y="763588"/>
-            <a:ext cx="6704013" cy="3771900"/>
-          </a:xfrm>
-          <a:solidFill>
-            <a:srgbClr val="729FCF"/>
-          </a:solidFill>
-          <a:ln w="25400">
-            <a:solidFill>
-              <a:srgbClr val="3465A4"/>
-            </a:solidFill>
-            <a:prstDash val="solid"/>
-          </a:ln>
-        </p:spPr>
-      </p:sp>
-      <p:sp>
-        <p:nvSpPr>
-          <p:cNvPr id="3" name="Notes Placeholder 2">
-            <a:extLst>
-              <a:ext uri="{FF2B5EF4-FFF2-40B4-BE49-F238E27FC236}">
-                <a16:creationId xmlns:a16="http://schemas.microsoft.com/office/drawing/2014/main" id="{A04CBDCA-B8FC-AE47-9EA8-9C1755746D8B}"/>
-              </a:ext>
-            </a:extLst>
-          </p:cNvPr>
-          <p:cNvSpPr txBox="1">
-            <a:spLocks noGrp="1"/>
-          </p:cNvSpPr>
-          <p:nvPr>
-            <p:ph type="body" sz="quarter" idx="1"/>
-          </p:nvPr>
-        </p:nvSpPr>
-        <p:spPr/>
-        <p:txBody>
-          <a:bodyPr>
-            <a:spAutoFit/>
-          </a:bodyPr>
-          <a:lstStyle/>
-          <a:p>
-            <a:pPr algn="l"/>
-            <a:r>
-              <a:rPr lang="en-US" b="0" i="0" dirty="0">
+            <a:pPr marL="0" marR="0" lvl="0" indent="0" algn="l" defTabSz="914400" rtl="0" eaLnBrk="1" fontAlgn="auto" latinLnBrk="0" hangingPunct="1">
+              <a:lnSpc>
+                <a:spcPct val="100000"/>
+              </a:lnSpc>
+              <a:spcBef>
+                <a:spcPts val="0"/>
+              </a:spcBef>
+              <a:spcAft>
+                <a:spcPts val="0"/>
+              </a:spcAft>
+              <a:buClrTx/>
+              <a:buSzTx/>
+              <a:buFontTx/>
+              <a:buNone/>
+              <a:tabLst/>
+              <a:defRPr/>
+            </a:pPr>
+            <a:r>
+              <a:rPr lang="en-US" sz="1200" b="0" i="0" u="none" strike="noStrike" kern="1200" cap="none" dirty="0">
+                <a:ln>
+                  <a:noFill/>
+                </a:ln>
+                <a:latin typeface="Arial" pitchFamily="34"/>
+                <a:ea typeface="Arial" pitchFamily="34"/>
+                <a:cs typeface="Arial" pitchFamily="34"/>
+              </a:rPr>
+              <a:t>In last week’s class, we asked the question, “What is intelligence?  And what criteria would you use to assess whether an entity is intelligent?   Back in the day, I was a fan of Star Trek: The Next Generation.  And this is a painting of Lieutenant Commander Data, the resident Android. Among the first two seasons of TNG, few episodes are as impressive as "The Measure of a Man," in which Data finds himself on trial for his life — not for a crime but simply for being.  Starfleet scientist Bruce Maddox (Brian Brophy) wants to perform experiments on Data, but Data is worried he won't survive them. When Maddox forces the issue, Data tries to resign his commission. Maddox argues Data is a machine, Starfleet's property and doesn't have the right to resign his commission, so Picard is forced to face-off against Riker in a legal proceeding to determine whether or not Data has sentience. He famously tells the judge, "Your Honor, Starfleet was founded to seek out new life." Then, pointing to Data, he says, "Well, there it sits.“  As you can see, one’s definition of intelligence is important, and it lies at the heart of this emerging field.  For without a clear definition of intelligence, how will we know when we have succeeded?</a:t>
+            </a:r>
+          </a:p>
+          <a:p>
+            <a:pPr marL="0" marR="0" lvl="0" indent="0" algn="l" defTabSz="914400" rtl="0" eaLnBrk="1" fontAlgn="auto" latinLnBrk="0" hangingPunct="1">
+              <a:lnSpc>
+                <a:spcPct val="100000"/>
+              </a:lnSpc>
+              <a:spcBef>
+                <a:spcPts val="0"/>
+              </a:spcBef>
+              <a:spcAft>
+                <a:spcPts val="0"/>
+              </a:spcAft>
+              <a:buClrTx/>
+              <a:buSzTx/>
+              <a:buFontTx/>
+              <a:buNone/>
+              <a:tabLst/>
+              <a:defRPr/>
+            </a:pPr>
+            <a:endParaRPr lang="en-US" sz="1200" b="0" i="0" u="none" strike="noStrike" kern="1200" cap="none" dirty="0">
+              <a:ln>
+                <a:noFill/>
+              </a:ln>
+              <a:latin typeface="Arial" pitchFamily="34"/>
+              <a:ea typeface="Arial" pitchFamily="34"/>
+              <a:cs typeface="Arial" pitchFamily="34"/>
+            </a:endParaRPr>
+          </a:p>
+          <a:p>
+            <a:pPr marL="0" marR="0" lvl="0" indent="0" algn="l" defTabSz="914400" rtl="0" eaLnBrk="1" fontAlgn="auto" latinLnBrk="0" hangingPunct="1">
+              <a:lnSpc>
+                <a:spcPct val="100000"/>
+              </a:lnSpc>
+              <a:spcBef>
+                <a:spcPts val="0"/>
+              </a:spcBef>
+              <a:spcAft>
+                <a:spcPts val="0"/>
+              </a:spcAft>
+              <a:buClrTx/>
+              <a:buSzTx/>
+              <a:buFontTx/>
+              <a:buNone/>
+              <a:tabLst/>
+              <a:defRPr/>
+            </a:pPr>
+            <a:r>
+              <a:rPr lang="en-US" sz="1200" b="0" i="0" kern="1200" dirty="0">
                 <a:solidFill>
-                  <a:srgbClr val="202122"/>
+                  <a:schemeClr val="tx1"/>
                 </a:solidFill>
                 <a:effectLst/>
-                <a:latin typeface="Arial" panose="020B0604020202020204" pitchFamily="34" charset="0"/>
+                <a:latin typeface="+mn-lt"/>
+                <a:ea typeface="+mn-ea"/>
+                <a:cs typeface="+mn-cs"/>
               </a:rPr>
-              <a:t>In 1955, </a:t>
-            </a:r>
-            <a:r>
-              <a:rPr lang="en-US" b="0" i="0" u="none" strike="noStrike" dirty="0">
-                <a:solidFill>
-                  <a:srgbClr val="0645AD"/>
-                </a:solidFill>
-                <a:effectLst/>
-                <a:latin typeface="Arial" panose="020B0604020202020204" pitchFamily="34" charset="0"/>
-                <a:hlinkClick r:id="rId3" tooltip="John McCarthy (computer scientist)"/>
-              </a:rPr>
-              <a:t>John McCarthy</a:t>
-            </a:r>
-            <a:r>
-              <a:rPr lang="en-US" b="0" i="0" dirty="0">
-                <a:solidFill>
-                  <a:srgbClr val="202122"/>
-                </a:solidFill>
-                <a:effectLst/>
-                <a:latin typeface="Arial" panose="020B0604020202020204" pitchFamily="34" charset="0"/>
-              </a:rPr>
-              <a:t>, then a young Assistant Professor of Mathematics at </a:t>
-            </a:r>
-            <a:r>
-              <a:rPr lang="en-US" b="0" i="0" u="none" strike="noStrike" dirty="0">
-                <a:solidFill>
-                  <a:srgbClr val="0645AD"/>
-                </a:solidFill>
-                <a:effectLst/>
-                <a:latin typeface="Arial" panose="020B0604020202020204" pitchFamily="34" charset="0"/>
-                <a:hlinkClick r:id="rId4" tooltip="Dartmouth College"/>
-              </a:rPr>
-              <a:t>Dartmouth College</a:t>
-            </a:r>
-            <a:r>
-              <a:rPr lang="en-US" b="0" i="0" dirty="0">
-                <a:solidFill>
-                  <a:srgbClr val="202122"/>
-                </a:solidFill>
-                <a:effectLst/>
-                <a:latin typeface="Arial" panose="020B0604020202020204" pitchFamily="34" charset="0"/>
-              </a:rPr>
-              <a:t>, decided to organize a group to clarify and develop ideas about thinking machines. He picked the name 'Artificial Intelligence' for the new field. He chose the name partly for its neutrality; avoiding a focus on narrow automata theory while avoiding cybernetics which was heavily focused on analog feedback, as well as him potentially having to accept the assertive </a:t>
-            </a:r>
-            <a:r>
-              <a:rPr lang="en-US" b="0" i="0" u="none" strike="noStrike" dirty="0">
-                <a:solidFill>
-                  <a:srgbClr val="0645AD"/>
-                </a:solidFill>
-                <a:effectLst/>
-                <a:latin typeface="Arial" panose="020B0604020202020204" pitchFamily="34" charset="0"/>
-                <a:hlinkClick r:id="rId5" tooltip="Norbert Wiener"/>
-              </a:rPr>
-              <a:t>Norbert Wiener</a:t>
-            </a:r>
-            <a:r>
-              <a:rPr lang="en-US" b="0" i="0" dirty="0">
-                <a:solidFill>
-                  <a:srgbClr val="202122"/>
-                </a:solidFill>
-                <a:effectLst/>
-                <a:latin typeface="Arial" panose="020B0604020202020204" pitchFamily="34" charset="0"/>
-              </a:rPr>
-              <a:t> as guru or having to argue with him.</a:t>
-            </a:r>
-            <a:endParaRPr lang="en-US" b="0" i="0" u="none" strike="noStrike" baseline="30000" dirty="0">
-              <a:solidFill>
-                <a:srgbClr val="0645AD"/>
-              </a:solidFill>
-              <a:effectLst/>
-              <a:latin typeface="Arial" panose="020B0604020202020204" pitchFamily="34" charset="0"/>
-            </a:endParaRPr>
+              <a:t>Now that we’ve got you thinking…  I’d like to take a few minutes to talk about the history of AI.</a:t>
+            </a:r>
           </a:p>
           <a:p>
             <a:pPr algn="l"/>
@@ -2494,204 +2317,91 @@
             </a:endParaRPr>
           </a:p>
           <a:p>
-            <a:pPr algn="l"/>
-            <a:r>
-              <a:rPr lang="en-US" b="0" i="0" dirty="0">
-                <a:solidFill>
-                  <a:srgbClr val="202122"/>
-                </a:solidFill>
-                <a:effectLst/>
-                <a:latin typeface="Arial" panose="020B0604020202020204" pitchFamily="34" charset="0"/>
-              </a:rPr>
-              <a:t>In early 1955, McCarthy approached the </a:t>
-            </a:r>
-            <a:r>
-              <a:rPr lang="en-US" b="0" i="0" u="none" strike="noStrike" dirty="0">
-                <a:solidFill>
-                  <a:srgbClr val="0645AD"/>
-                </a:solidFill>
-                <a:effectLst/>
-                <a:latin typeface="Arial" panose="020B0604020202020204" pitchFamily="34" charset="0"/>
-                <a:hlinkClick r:id="rId6" tooltip="Rockefeller Foundation"/>
-              </a:rPr>
-              <a:t>Rockefeller Foundation</a:t>
-            </a:r>
-            <a:r>
-              <a:rPr lang="en-US" b="0" i="0" dirty="0">
-                <a:solidFill>
-                  <a:srgbClr val="202122"/>
-                </a:solidFill>
-                <a:effectLst/>
-                <a:latin typeface="Arial" panose="020B0604020202020204" pitchFamily="34" charset="0"/>
-              </a:rPr>
-              <a:t> to request funding for a summer seminar at Dartmouth for about 10 participants. In June, he and </a:t>
-            </a:r>
-            <a:r>
-              <a:rPr lang="en-US" b="0" i="0" u="none" strike="noStrike" dirty="0">
-                <a:solidFill>
-                  <a:srgbClr val="0645AD"/>
-                </a:solidFill>
-                <a:effectLst/>
-                <a:latin typeface="Arial" panose="020B0604020202020204" pitchFamily="34" charset="0"/>
-                <a:hlinkClick r:id="rId7" tooltip="Claude Shannon"/>
-              </a:rPr>
-              <a:t>Claude Shannon</a:t>
-            </a:r>
-            <a:r>
-              <a:rPr lang="en-US" b="0" i="0" dirty="0">
-                <a:solidFill>
-                  <a:srgbClr val="202122"/>
-                </a:solidFill>
-                <a:effectLst/>
-                <a:latin typeface="Arial" panose="020B0604020202020204" pitchFamily="34" charset="0"/>
-              </a:rPr>
-              <a:t>, a founder of </a:t>
-            </a:r>
-            <a:r>
-              <a:rPr lang="en-US" b="0" i="0" u="none" strike="noStrike" dirty="0">
-                <a:solidFill>
-                  <a:srgbClr val="0645AD"/>
-                </a:solidFill>
-                <a:effectLst/>
-                <a:latin typeface="Arial" panose="020B0604020202020204" pitchFamily="34" charset="0"/>
-                <a:hlinkClick r:id="rId8" tooltip="Information theory"/>
-              </a:rPr>
-              <a:t>information theory</a:t>
-            </a:r>
-            <a:r>
-              <a:rPr lang="en-US" b="0" i="0" dirty="0">
-                <a:solidFill>
-                  <a:srgbClr val="202122"/>
-                </a:solidFill>
-                <a:effectLst/>
-                <a:latin typeface="Arial" panose="020B0604020202020204" pitchFamily="34" charset="0"/>
-              </a:rPr>
-              <a:t> then at </a:t>
-            </a:r>
-            <a:r>
-              <a:rPr lang="en-US" b="0" i="0" u="none" strike="noStrike" dirty="0">
-                <a:solidFill>
-                  <a:srgbClr val="0645AD"/>
-                </a:solidFill>
-                <a:effectLst/>
-                <a:latin typeface="Arial" panose="020B0604020202020204" pitchFamily="34" charset="0"/>
-                <a:hlinkClick r:id="rId9" tooltip="Bell Labs"/>
-              </a:rPr>
-              <a:t>Bell Labs</a:t>
-            </a:r>
-            <a:r>
-              <a:rPr lang="en-US" b="0" i="0" dirty="0">
-                <a:solidFill>
-                  <a:srgbClr val="202122"/>
-                </a:solidFill>
-                <a:effectLst/>
-                <a:latin typeface="Arial" panose="020B0604020202020204" pitchFamily="34" charset="0"/>
-              </a:rPr>
-              <a:t>, met with Robert Morison, Director of Biological and Medical Research to discuss the idea and possible funding, though Morison was unsure whether money would be made available for such a visionary project.</a:t>
-            </a:r>
-            <a:endParaRPr lang="en-US" b="0" i="0" u="none" strike="noStrike" baseline="30000" dirty="0">
-              <a:solidFill>
-                <a:srgbClr val="0645AD"/>
-              </a:solidFill>
-              <a:effectLst/>
-              <a:latin typeface="Arial" panose="020B0604020202020204" pitchFamily="34" charset="0"/>
+            <a:pPr marL="0" marR="0" lvl="0" indent="0" algn="l" defTabSz="914400" rtl="0" eaLnBrk="1" fontAlgn="auto" latinLnBrk="0" hangingPunct="1">
+              <a:lnSpc>
+                <a:spcPct val="100000"/>
+              </a:lnSpc>
+              <a:spcBef>
+                <a:spcPts val="0"/>
+              </a:spcBef>
+              <a:spcAft>
+                <a:spcPts val="0"/>
+              </a:spcAft>
+              <a:buClrTx/>
+              <a:buSzTx/>
+              <a:buFontTx/>
+              <a:buNone/>
+              <a:tabLst/>
+              <a:defRPr/>
+            </a:pPr>
+            <a:endParaRPr lang="en-US" sz="1200" b="0" i="0" u="none" strike="noStrike" kern="1200" cap="none" dirty="0">
+              <a:ln>
+                <a:noFill/>
+              </a:ln>
+              <a:latin typeface="Arial" pitchFamily="34"/>
+              <a:ea typeface="Arial" pitchFamily="34"/>
+              <a:cs typeface="Arial" pitchFamily="34"/>
             </a:endParaRPr>
           </a:p>
           <a:p>
-            <a:pPr algn="l"/>
-            <a:endParaRPr lang="en-US" b="0" i="0" dirty="0">
-              <a:solidFill>
-                <a:srgbClr val="202122"/>
-              </a:solidFill>
-              <a:effectLst/>
-              <a:latin typeface="Arial" panose="020B0604020202020204" pitchFamily="34" charset="0"/>
+            <a:pPr marL="0" marR="0" lvl="0" indent="0" algn="l" defTabSz="914400" rtl="0" eaLnBrk="1" fontAlgn="auto" latinLnBrk="0" hangingPunct="1">
+              <a:lnSpc>
+                <a:spcPct val="100000"/>
+              </a:lnSpc>
+              <a:spcBef>
+                <a:spcPts val="0"/>
+              </a:spcBef>
+              <a:spcAft>
+                <a:spcPts val="0"/>
+              </a:spcAft>
+              <a:buClrTx/>
+              <a:buSzTx/>
+              <a:buFontTx/>
+              <a:buNone/>
+              <a:tabLst/>
+              <a:defRPr/>
+            </a:pPr>
+            <a:endParaRPr lang="en-US" sz="1200" b="0" i="0" u="none" strike="noStrike" kern="1200" cap="none" dirty="0">
+              <a:ln>
+                <a:noFill/>
+              </a:ln>
+              <a:latin typeface="Arial" pitchFamily="34"/>
+              <a:ea typeface="Arial" pitchFamily="34"/>
+              <a:cs typeface="Arial" pitchFamily="34"/>
             </a:endParaRPr>
           </a:p>
           <a:p>
-            <a:pPr algn="l"/>
-            <a:r>
-              <a:rPr lang="en-US" b="0" i="0" dirty="0">
-                <a:solidFill>
-                  <a:srgbClr val="202122"/>
-                </a:solidFill>
-                <a:effectLst/>
-                <a:latin typeface="Arial" panose="020B0604020202020204" pitchFamily="34" charset="0"/>
-              </a:rPr>
-              <a:t>On September 2, 1955, the project was formally proposed by McCarthy, </a:t>
-            </a:r>
-            <a:r>
-              <a:rPr lang="en-US" b="0" i="0" u="none" strike="noStrike" dirty="0">
-                <a:solidFill>
-                  <a:srgbClr val="0645AD"/>
-                </a:solidFill>
-                <a:effectLst/>
-                <a:latin typeface="Arial" panose="020B0604020202020204" pitchFamily="34" charset="0"/>
-                <a:hlinkClick r:id="rId10" tooltip="Marvin Minsky"/>
-              </a:rPr>
-              <a:t>Marvin Minsky</a:t>
-            </a:r>
-            <a:r>
-              <a:rPr lang="en-US" b="0" i="0" dirty="0">
-                <a:solidFill>
-                  <a:srgbClr val="202122"/>
-                </a:solidFill>
-                <a:effectLst/>
-                <a:latin typeface="Arial" panose="020B0604020202020204" pitchFamily="34" charset="0"/>
-              </a:rPr>
-              <a:t>, </a:t>
-            </a:r>
-            <a:r>
-              <a:rPr lang="en-US" b="0" i="0" u="none" strike="noStrike" dirty="0">
-                <a:solidFill>
-                  <a:srgbClr val="0645AD"/>
-                </a:solidFill>
-                <a:effectLst/>
-                <a:latin typeface="Arial" panose="020B0604020202020204" pitchFamily="34" charset="0"/>
-                <a:hlinkClick r:id="rId11" tooltip="Nathaniel Rochester (computer scientist)"/>
-              </a:rPr>
-              <a:t>Nathaniel Rochester</a:t>
-            </a:r>
-            <a:r>
-              <a:rPr lang="en-US" b="0" i="0" dirty="0">
-                <a:solidFill>
-                  <a:srgbClr val="202122"/>
-                </a:solidFill>
-                <a:effectLst/>
-                <a:latin typeface="Arial" panose="020B0604020202020204" pitchFamily="34" charset="0"/>
-              </a:rPr>
-              <a:t> and </a:t>
-            </a:r>
-            <a:r>
-              <a:rPr lang="en-US" b="0" i="0" u="none" strike="noStrike" dirty="0">
-                <a:solidFill>
-                  <a:srgbClr val="0645AD"/>
-                </a:solidFill>
-                <a:effectLst/>
-                <a:latin typeface="Arial" panose="020B0604020202020204" pitchFamily="34" charset="0"/>
-                <a:hlinkClick r:id="rId7" tooltip="Claude Shannon"/>
-              </a:rPr>
-              <a:t>Claude Shannon</a:t>
-            </a:r>
-            <a:r>
-              <a:rPr lang="en-US" b="0" i="0" dirty="0">
-                <a:solidFill>
-                  <a:srgbClr val="202122"/>
-                </a:solidFill>
-                <a:effectLst/>
-                <a:latin typeface="Arial" panose="020B0604020202020204" pitchFamily="34" charset="0"/>
-              </a:rPr>
-              <a:t>. The proposal is credited with introducing the term 'artificial intelligence’.  The Rockefeller Foundation funded the proposal and the rest, as they say, “is history…”</a:t>
-            </a:r>
-          </a:p>
-          <a:p>
             <a:endParaRPr lang="en-US" dirty="0"/>
+          </a:p>
+        </p:txBody>
+      </p:sp>
+      <p:sp>
+        <p:nvSpPr>
+          <p:cNvPr id="4" name="Slide Number Placeholder 3"/>
+          <p:cNvSpPr>
+            <a:spLocks noGrp="1"/>
+          </p:cNvSpPr>
+          <p:nvPr>
+            <p:ph type="sldNum" sz="quarter" idx="5"/>
+          </p:nvPr>
+        </p:nvSpPr>
+        <p:spPr/>
+        <p:txBody>
+          <a:bodyPr/>
+          <a:lstStyle/>
+          <a:p>
+            <a:fld id="{3148858F-F1DB-4027-9C85-CCA6849540DD}" type="slidenum">
+              <a:rPr lang="en-US" smtClean="0"/>
+              <a:t>7</a:t>
+            </a:fld>
+            <a:endParaRPr lang="en-US"/>
           </a:p>
         </p:txBody>
       </p:sp>
     </p:spTree>
     <p:extLst>
       <p:ext uri="{BB962C8B-B14F-4D97-AF65-F5344CB8AC3E}">
-        <p14:creationId xmlns:p14="http://schemas.microsoft.com/office/powerpoint/2010/main" val="2400027281"/>
+        <p14:creationId xmlns:p14="http://schemas.microsoft.com/office/powerpoint/2010/main" val="3136242698"/>
       </p:ext>
     </p:extLst>
   </p:cSld>
@@ -2720,65 +2430,383 @@
       </p:grpSpPr>
       <p:sp>
         <p:nvSpPr>
-          <p:cNvPr id="2" name="Slide Image Placeholder 1"/>
-          <p:cNvSpPr>
-            <a:spLocks noGrp="1" noRot="1" noChangeAspect="1"/>
-          </p:cNvSpPr>
-          <p:nvPr>
-            <p:ph type="sldImg"/>
-          </p:nvPr>
-        </p:nvSpPr>
-        <p:spPr/>
-      </p:sp>
-      <p:sp>
-        <p:nvSpPr>
-          <p:cNvPr id="3" name="Notes Placeholder 2"/>
-          <p:cNvSpPr>
-            <a:spLocks noGrp="1"/>
-          </p:cNvSpPr>
-          <p:nvPr>
-            <p:ph type="body" idx="1"/>
-          </p:nvPr>
-        </p:nvSpPr>
-        <p:spPr/>
-        <p:txBody>
-          <a:bodyPr/>
+          <p:cNvPr id="7" name="Slide Number Placeholder 6">
+            <a:extLst>
+              <a:ext uri="{FF2B5EF4-FFF2-40B4-BE49-F238E27FC236}">
+                <a16:creationId xmlns:a16="http://schemas.microsoft.com/office/drawing/2014/main" id="{5B543A9C-E520-124D-A26C-727E7A91B5A6}"/>
+              </a:ext>
+            </a:extLst>
+          </p:cNvPr>
+          <p:cNvSpPr txBox="1">
+            <a:spLocks noGrp="1"/>
+          </p:cNvSpPr>
+          <p:nvPr>
+            <p:ph type="sldNum" sz="quarter" idx="5"/>
+          </p:nvPr>
+        </p:nvSpPr>
+        <p:spPr>
+          <a:ln/>
+        </p:spPr>
+        <p:txBody>
+          <a:bodyPr lIns="0" tIns="0" rIns="0" bIns="0" anchor="b" anchorCtr="0">
+            <a:noAutofit/>
+          </a:bodyPr>
           <a:lstStyle/>
           <a:p>
-            <a:r>
-              <a:rPr lang="en-US" dirty="0"/>
-              <a:t>With that history in place, let’s consider some other definitions – starting with the one advanced in the Dartmouth Proposal…</a:t>
-            </a:r>
-          </a:p>
-        </p:txBody>
-      </p:sp>
-      <p:sp>
-        <p:nvSpPr>
-          <p:cNvPr id="4" name="Slide Number Placeholder 3"/>
-          <p:cNvSpPr>
-            <a:spLocks noGrp="1"/>
-          </p:cNvSpPr>
-          <p:nvPr>
-            <p:ph type="sldNum" sz="quarter" idx="5"/>
-          </p:nvPr>
-        </p:nvSpPr>
-        <p:spPr/>
-        <p:txBody>
-          <a:bodyPr/>
-          <a:lstStyle/>
-          <a:p>
-            <a:fld id="{3148858F-F1DB-4027-9C85-CCA6849540DD}" type="slidenum">
-              <a:rPr lang="en-US" smtClean="0"/>
+            <a:pPr lvl="0"/>
+            <a:fld id="{F26ADB32-8A69-2C4E-BA54-385F30C1B140}" type="slidenum">
               <a:t>8</a:t>
             </a:fld>
             <a:endParaRPr lang="en-US"/>
           </a:p>
         </p:txBody>
       </p:sp>
+      <p:sp>
+        <p:nvSpPr>
+          <p:cNvPr id="2" name="Slide Image Placeholder 1">
+            <a:extLst>
+              <a:ext uri="{FF2B5EF4-FFF2-40B4-BE49-F238E27FC236}">
+                <a16:creationId xmlns:a16="http://schemas.microsoft.com/office/drawing/2014/main" id="{A02321D2-BA00-8D41-B3B0-CF9117442E2A}"/>
+              </a:ext>
+            </a:extLst>
+          </p:cNvPr>
+          <p:cNvSpPr>
+            <a:spLocks noGrp="1" noRot="1" noChangeAspect="1" noResize="1"/>
+          </p:cNvSpPr>
+          <p:nvPr>
+            <p:ph type="sldImg"/>
+          </p:nvPr>
+        </p:nvSpPr>
+        <p:spPr>
+          <a:xfrm>
+            <a:off x="533400" y="763588"/>
+            <a:ext cx="6704013" cy="3771900"/>
+          </a:xfrm>
+          <a:solidFill>
+            <a:srgbClr val="729FCF"/>
+          </a:solidFill>
+          <a:ln w="25400">
+            <a:solidFill>
+              <a:srgbClr val="3465A4"/>
+            </a:solidFill>
+            <a:prstDash val="solid"/>
+          </a:ln>
+        </p:spPr>
+      </p:sp>
+      <p:sp>
+        <p:nvSpPr>
+          <p:cNvPr id="3" name="Notes Placeholder 2">
+            <a:extLst>
+              <a:ext uri="{FF2B5EF4-FFF2-40B4-BE49-F238E27FC236}">
+                <a16:creationId xmlns:a16="http://schemas.microsoft.com/office/drawing/2014/main" id="{A04CBDCA-B8FC-AE47-9EA8-9C1755746D8B}"/>
+              </a:ext>
+            </a:extLst>
+          </p:cNvPr>
+          <p:cNvSpPr txBox="1">
+            <a:spLocks noGrp="1"/>
+          </p:cNvSpPr>
+          <p:nvPr>
+            <p:ph type="body" sz="quarter" idx="1"/>
+          </p:nvPr>
+        </p:nvSpPr>
+        <p:spPr/>
+        <p:txBody>
+          <a:bodyPr>
+            <a:spAutoFit/>
+          </a:bodyPr>
+          <a:lstStyle/>
+          <a:p>
+            <a:pPr algn="l"/>
+            <a:r>
+              <a:rPr lang="en-US" b="0" i="0" dirty="0">
+                <a:solidFill>
+                  <a:srgbClr val="202122"/>
+                </a:solidFill>
+                <a:effectLst/>
+                <a:latin typeface="Arial" panose="020B0604020202020204" pitchFamily="34" charset="0"/>
+              </a:rPr>
+              <a:t>In the mid-1950’s, </a:t>
+            </a:r>
+            <a:r>
+              <a:rPr lang="en-US" b="0" i="0" u="none" strike="noStrike" dirty="0">
+                <a:solidFill>
+                  <a:srgbClr val="0645AD"/>
+                </a:solidFill>
+                <a:effectLst/>
+                <a:latin typeface="Arial" panose="020B0604020202020204" pitchFamily="34" charset="0"/>
+                <a:hlinkClick r:id="rId3" tooltip="John McCarthy (computer scientist)"/>
+              </a:rPr>
+              <a:t>John McCarthy</a:t>
+            </a:r>
+            <a:r>
+              <a:rPr lang="en-US" b="0" i="0" dirty="0">
+                <a:solidFill>
+                  <a:srgbClr val="202122"/>
+                </a:solidFill>
+                <a:effectLst/>
+                <a:latin typeface="Arial" panose="020B0604020202020204" pitchFamily="34" charset="0"/>
+              </a:rPr>
+              <a:t>, then a young Assistant Professor of Mathematics at </a:t>
+            </a:r>
+            <a:r>
+              <a:rPr lang="en-US" b="0" i="0" u="none" strike="noStrike" dirty="0">
+                <a:solidFill>
+                  <a:srgbClr val="0645AD"/>
+                </a:solidFill>
+                <a:effectLst/>
+                <a:latin typeface="Arial" panose="020B0604020202020204" pitchFamily="34" charset="0"/>
+                <a:hlinkClick r:id="rId4" tooltip="Dartmouth College"/>
+              </a:rPr>
+              <a:t>Dartmouth College</a:t>
+            </a:r>
+            <a:r>
+              <a:rPr lang="en-US" b="0" i="0" dirty="0">
+                <a:solidFill>
+                  <a:srgbClr val="202122"/>
+                </a:solidFill>
+                <a:effectLst/>
+                <a:latin typeface="Arial" panose="020B0604020202020204" pitchFamily="34" charset="0"/>
+              </a:rPr>
+              <a:t>, decided to organize a group to clarify and develop ideas about thinking machines. He picked the name 'Artificial Intelligence' for the new field. He chose the name partly for its neutrality; avoiding a focus on narrow automata theory while avoiding cybernetics which was heavily focused on analog feedback, as well as him potentially having to accept the assertive </a:t>
+            </a:r>
+            <a:r>
+              <a:rPr lang="en-US" b="0" i="0" u="none" strike="noStrike" dirty="0">
+                <a:solidFill>
+                  <a:srgbClr val="0645AD"/>
+                </a:solidFill>
+                <a:effectLst/>
+                <a:latin typeface="Arial" panose="020B0604020202020204" pitchFamily="34" charset="0"/>
+                <a:hlinkClick r:id="rId5" tooltip="Norbert Wiener"/>
+              </a:rPr>
+              <a:t>Norbert Wiener</a:t>
+            </a:r>
+            <a:r>
+              <a:rPr lang="en-US" b="0" i="0" dirty="0">
+                <a:solidFill>
+                  <a:srgbClr val="202122"/>
+                </a:solidFill>
+                <a:effectLst/>
+                <a:latin typeface="Arial" panose="020B0604020202020204" pitchFamily="34" charset="0"/>
+              </a:rPr>
+              <a:t> as guru or having to argue with him.</a:t>
+            </a:r>
+            <a:endParaRPr lang="en-US" b="0" i="0" u="none" strike="noStrike" baseline="30000" dirty="0">
+              <a:solidFill>
+                <a:srgbClr val="0645AD"/>
+              </a:solidFill>
+              <a:effectLst/>
+              <a:latin typeface="Arial" panose="020B0604020202020204" pitchFamily="34" charset="0"/>
+            </a:endParaRPr>
+          </a:p>
+          <a:p>
+            <a:pPr algn="l"/>
+            <a:endParaRPr lang="en-US" b="0" i="0" dirty="0">
+              <a:solidFill>
+                <a:srgbClr val="202122"/>
+              </a:solidFill>
+              <a:effectLst/>
+              <a:latin typeface="Arial" panose="020B0604020202020204" pitchFamily="34" charset="0"/>
+            </a:endParaRPr>
+          </a:p>
+          <a:p>
+            <a:pPr algn="l"/>
+            <a:r>
+              <a:rPr lang="en-US" b="0" i="0" dirty="0">
+                <a:solidFill>
+                  <a:srgbClr val="202122"/>
+                </a:solidFill>
+                <a:effectLst/>
+                <a:latin typeface="Arial" panose="020B0604020202020204" pitchFamily="34" charset="0"/>
+              </a:rPr>
+              <a:t>In early 1955, McCarthy approached the </a:t>
+            </a:r>
+            <a:r>
+              <a:rPr lang="en-US" b="0" i="0" u="none" strike="noStrike" dirty="0">
+                <a:solidFill>
+                  <a:srgbClr val="0645AD"/>
+                </a:solidFill>
+                <a:effectLst/>
+                <a:latin typeface="Arial" panose="020B0604020202020204" pitchFamily="34" charset="0"/>
+                <a:hlinkClick r:id="rId6" tooltip="Rockefeller Foundation"/>
+              </a:rPr>
+              <a:t>Rockefeller Foundation</a:t>
+            </a:r>
+            <a:r>
+              <a:rPr lang="en-US" b="0" i="0" dirty="0">
+                <a:solidFill>
+                  <a:srgbClr val="202122"/>
+                </a:solidFill>
+                <a:effectLst/>
+                <a:latin typeface="Arial" panose="020B0604020202020204" pitchFamily="34" charset="0"/>
+              </a:rPr>
+              <a:t> to request funding for a summer seminar at Dartmouth for about 10 participants. In June, he and </a:t>
+            </a:r>
+            <a:r>
+              <a:rPr lang="en-US" b="0" i="0" u="none" strike="noStrike" dirty="0">
+                <a:solidFill>
+                  <a:srgbClr val="0645AD"/>
+                </a:solidFill>
+                <a:effectLst/>
+                <a:latin typeface="Arial" panose="020B0604020202020204" pitchFamily="34" charset="0"/>
+                <a:hlinkClick r:id="rId7" tooltip="Claude Shannon"/>
+              </a:rPr>
+              <a:t>Claude Shannon</a:t>
+            </a:r>
+            <a:r>
+              <a:rPr lang="en-US" b="0" i="0" dirty="0">
+                <a:solidFill>
+                  <a:srgbClr val="202122"/>
+                </a:solidFill>
+                <a:effectLst/>
+                <a:latin typeface="Arial" panose="020B0604020202020204" pitchFamily="34" charset="0"/>
+              </a:rPr>
+              <a:t>, a founder of </a:t>
+            </a:r>
+            <a:r>
+              <a:rPr lang="en-US" b="0" i="0" u="none" strike="noStrike" dirty="0">
+                <a:solidFill>
+                  <a:srgbClr val="0645AD"/>
+                </a:solidFill>
+                <a:effectLst/>
+                <a:latin typeface="Arial" panose="020B0604020202020204" pitchFamily="34" charset="0"/>
+                <a:hlinkClick r:id="rId8" tooltip="Information theory"/>
+              </a:rPr>
+              <a:t>information theory</a:t>
+            </a:r>
+            <a:r>
+              <a:rPr lang="en-US" b="0" i="0" dirty="0">
+                <a:solidFill>
+                  <a:srgbClr val="202122"/>
+                </a:solidFill>
+                <a:effectLst/>
+                <a:latin typeface="Arial" panose="020B0604020202020204" pitchFamily="34" charset="0"/>
+              </a:rPr>
+              <a:t> then at </a:t>
+            </a:r>
+            <a:r>
+              <a:rPr lang="en-US" b="0" i="0" u="none" strike="noStrike" dirty="0">
+                <a:solidFill>
+                  <a:srgbClr val="0645AD"/>
+                </a:solidFill>
+                <a:effectLst/>
+                <a:latin typeface="Arial" panose="020B0604020202020204" pitchFamily="34" charset="0"/>
+                <a:hlinkClick r:id="rId9" tooltip="Bell Labs"/>
+              </a:rPr>
+              <a:t>Bell Labs</a:t>
+            </a:r>
+            <a:r>
+              <a:rPr lang="en-US" b="0" i="0" dirty="0">
+                <a:solidFill>
+                  <a:srgbClr val="202122"/>
+                </a:solidFill>
+                <a:effectLst/>
+                <a:latin typeface="Arial" panose="020B0604020202020204" pitchFamily="34" charset="0"/>
+              </a:rPr>
+              <a:t>, met with Robert Morison, Director of Biological and Medical Research to discuss the idea and possible funding, though Morison was unsure whether money would be made available for such a visionary project.</a:t>
+            </a:r>
+            <a:endParaRPr lang="en-US" b="0" i="0" u="none" strike="noStrike" baseline="30000" dirty="0">
+              <a:solidFill>
+                <a:srgbClr val="0645AD"/>
+              </a:solidFill>
+              <a:effectLst/>
+              <a:latin typeface="Arial" panose="020B0604020202020204" pitchFamily="34" charset="0"/>
+            </a:endParaRPr>
+          </a:p>
+          <a:p>
+            <a:pPr algn="l"/>
+            <a:endParaRPr lang="en-US" b="0" i="0" dirty="0">
+              <a:solidFill>
+                <a:srgbClr val="202122"/>
+              </a:solidFill>
+              <a:effectLst/>
+              <a:latin typeface="Arial" panose="020B0604020202020204" pitchFamily="34" charset="0"/>
+            </a:endParaRPr>
+          </a:p>
+          <a:p>
+            <a:pPr algn="l"/>
+            <a:r>
+              <a:rPr lang="en-US" b="0" i="0" dirty="0">
+                <a:solidFill>
+                  <a:srgbClr val="202122"/>
+                </a:solidFill>
+                <a:effectLst/>
+                <a:latin typeface="Arial" panose="020B0604020202020204" pitchFamily="34" charset="0"/>
+              </a:rPr>
+              <a:t>On September 2, 1955, the project was formally proposed by McCarthy, </a:t>
+            </a:r>
+            <a:r>
+              <a:rPr lang="en-US" b="0" i="0" u="none" strike="noStrike" dirty="0">
+                <a:solidFill>
+                  <a:srgbClr val="0645AD"/>
+                </a:solidFill>
+                <a:effectLst/>
+                <a:latin typeface="Arial" panose="020B0604020202020204" pitchFamily="34" charset="0"/>
+                <a:hlinkClick r:id="rId10" tooltip="Marvin Minsky"/>
+              </a:rPr>
+              <a:t>Marvin Minsky</a:t>
+            </a:r>
+            <a:r>
+              <a:rPr lang="en-US" b="0" i="0" dirty="0">
+                <a:solidFill>
+                  <a:srgbClr val="202122"/>
+                </a:solidFill>
+                <a:effectLst/>
+                <a:latin typeface="Arial" panose="020B0604020202020204" pitchFamily="34" charset="0"/>
+              </a:rPr>
+              <a:t>, </a:t>
+            </a:r>
+            <a:r>
+              <a:rPr lang="en-US" b="0" i="0" u="none" strike="noStrike" dirty="0">
+                <a:solidFill>
+                  <a:srgbClr val="0645AD"/>
+                </a:solidFill>
+                <a:effectLst/>
+                <a:latin typeface="Arial" panose="020B0604020202020204" pitchFamily="34" charset="0"/>
+                <a:hlinkClick r:id="rId11" tooltip="Nathaniel Rochester (computer scientist)"/>
+              </a:rPr>
+              <a:t>Nathaniel Rochester</a:t>
+            </a:r>
+            <a:r>
+              <a:rPr lang="en-US" b="0" i="0" dirty="0">
+                <a:solidFill>
+                  <a:srgbClr val="202122"/>
+                </a:solidFill>
+                <a:effectLst/>
+                <a:latin typeface="Arial" panose="020B0604020202020204" pitchFamily="34" charset="0"/>
+              </a:rPr>
+              <a:t> and </a:t>
+            </a:r>
+            <a:r>
+              <a:rPr lang="en-US" b="0" i="0" u="none" strike="noStrike" dirty="0">
+                <a:solidFill>
+                  <a:srgbClr val="0645AD"/>
+                </a:solidFill>
+                <a:effectLst/>
+                <a:latin typeface="Arial" panose="020B0604020202020204" pitchFamily="34" charset="0"/>
+                <a:hlinkClick r:id="rId7" tooltip="Claude Shannon"/>
+              </a:rPr>
+              <a:t>Claude Shannon</a:t>
+            </a:r>
+            <a:r>
+              <a:rPr lang="en-US" b="0" i="0" dirty="0">
+                <a:solidFill>
+                  <a:srgbClr val="202122"/>
+                </a:solidFill>
+                <a:effectLst/>
+                <a:latin typeface="Arial" panose="020B0604020202020204" pitchFamily="34" charset="0"/>
+              </a:rPr>
+              <a:t>. The proposal is credited with introducing the term 'artificial intelligence’.  The Rockefeller Foundation funded the proposal and the rest, as they say, “is history…”</a:t>
+            </a:r>
+          </a:p>
+          <a:p>
+            <a:endParaRPr lang="en-US" dirty="0"/>
+          </a:p>
+        </p:txBody>
+      </p:sp>
     </p:spTree>
     <p:extLst>
       <p:ext uri="{BB962C8B-B14F-4D97-AF65-F5344CB8AC3E}">
-        <p14:creationId xmlns:p14="http://schemas.microsoft.com/office/powerpoint/2010/main" val="1011519860"/>
+        <p14:creationId xmlns:p14="http://schemas.microsoft.com/office/powerpoint/2010/main" val="2400027281"/>
       </p:ext>
     </p:extLst>
   </p:cSld>
@@ -2832,20 +2860,9 @@
           <a:bodyPr/>
           <a:lstStyle/>
           <a:p>
-            <a:endParaRPr lang="en-US" sz="1200" b="0" i="0" kern="1200" dirty="0">
-              <a:solidFill>
-                <a:schemeClr val="tx1"/>
-              </a:solidFill>
-              <a:effectLst/>
-              <a:latin typeface="+mn-lt"/>
-              <a:ea typeface="+mn-ea"/>
-              <a:cs typeface="+mn-cs"/>
-            </a:endParaRPr>
-          </a:p>
-          <a:p>
             <a:r>
               <a:rPr lang="en-US" dirty="0"/>
-              <a:t>… and some more definitions to consider.</a:t>
+              <a:t>With that history in place, let’s consider some definitions – starting with the one advanced in the Dartmouth Proposal…</a:t>
             </a:r>
           </a:p>
         </p:txBody>
@@ -2876,7 +2893,7 @@
     </p:spTree>
     <p:extLst>
       <p:ext uri="{BB962C8B-B14F-4D97-AF65-F5344CB8AC3E}">
-        <p14:creationId xmlns:p14="http://schemas.microsoft.com/office/powerpoint/2010/main" val="4028108833"/>
+        <p14:creationId xmlns:p14="http://schemas.microsoft.com/office/powerpoint/2010/main" val="1011519860"/>
       </p:ext>
     </p:extLst>
   </p:cSld>
@@ -3033,7 +3050,7 @@
           <a:p>
             <a:fld id="{C3F78080-8D0A-4BE8-A5B4-CB115102D524}" type="datetimeFigureOut">
               <a:rPr lang="en-US" smtClean="0"/>
-              <a:t>8/26/2021</a:t>
+              <a:t>8/30/2021</a:t>
             </a:fld>
             <a:endParaRPr lang="en-US"/>
           </a:p>
@@ -3231,7 +3248,7 @@
           <a:p>
             <a:fld id="{C3F78080-8D0A-4BE8-A5B4-CB115102D524}" type="datetimeFigureOut">
               <a:rPr lang="en-US" smtClean="0"/>
-              <a:t>8/26/2021</a:t>
+              <a:t>8/30/2021</a:t>
             </a:fld>
             <a:endParaRPr lang="en-US"/>
           </a:p>
@@ -3439,7 +3456,7 @@
           <a:p>
             <a:fld id="{C3F78080-8D0A-4BE8-A5B4-CB115102D524}" type="datetimeFigureOut">
               <a:rPr lang="en-US" smtClean="0"/>
-              <a:t>8/26/2021</a:t>
+              <a:t>8/30/2021</a:t>
             </a:fld>
             <a:endParaRPr lang="en-US"/>
           </a:p>
@@ -3637,7 +3654,7 @@
           <a:p>
             <a:fld id="{C3F78080-8D0A-4BE8-A5B4-CB115102D524}" type="datetimeFigureOut">
               <a:rPr lang="en-US" smtClean="0"/>
-              <a:t>8/26/2021</a:t>
+              <a:t>8/30/2021</a:t>
             </a:fld>
             <a:endParaRPr lang="en-US"/>
           </a:p>
@@ -3912,7 +3929,7 @@
           <a:p>
             <a:fld id="{C3F78080-8D0A-4BE8-A5B4-CB115102D524}" type="datetimeFigureOut">
               <a:rPr lang="en-US" smtClean="0"/>
-              <a:t>8/26/2021</a:t>
+              <a:t>8/30/2021</a:t>
             </a:fld>
             <a:endParaRPr lang="en-US"/>
           </a:p>
@@ -4177,7 +4194,7 @@
           <a:p>
             <a:fld id="{C3F78080-8D0A-4BE8-A5B4-CB115102D524}" type="datetimeFigureOut">
               <a:rPr lang="en-US" smtClean="0"/>
-              <a:t>8/26/2021</a:t>
+              <a:t>8/30/2021</a:t>
             </a:fld>
             <a:endParaRPr lang="en-US"/>
           </a:p>
@@ -4589,7 +4606,7 @@
           <a:p>
             <a:fld id="{C3F78080-8D0A-4BE8-A5B4-CB115102D524}" type="datetimeFigureOut">
               <a:rPr lang="en-US" smtClean="0"/>
-              <a:t>8/26/2021</a:t>
+              <a:t>8/30/2021</a:t>
             </a:fld>
             <a:endParaRPr lang="en-US"/>
           </a:p>
@@ -4730,7 +4747,7 @@
           <a:p>
             <a:fld id="{C3F78080-8D0A-4BE8-A5B4-CB115102D524}" type="datetimeFigureOut">
               <a:rPr lang="en-US" smtClean="0"/>
-              <a:t>8/26/2021</a:t>
+              <a:t>8/30/2021</a:t>
             </a:fld>
             <a:endParaRPr lang="en-US"/>
           </a:p>
@@ -4843,7 +4860,7 @@
           <a:p>
             <a:fld id="{C3F78080-8D0A-4BE8-A5B4-CB115102D524}" type="datetimeFigureOut">
               <a:rPr lang="en-US" smtClean="0"/>
-              <a:t>8/26/2021</a:t>
+              <a:t>8/30/2021</a:t>
             </a:fld>
             <a:endParaRPr lang="en-US"/>
           </a:p>
@@ -5154,7 +5171,7 @@
           <a:p>
             <a:fld id="{C3F78080-8D0A-4BE8-A5B4-CB115102D524}" type="datetimeFigureOut">
               <a:rPr lang="en-US" smtClean="0"/>
-              <a:t>8/26/2021</a:t>
+              <a:t>8/30/2021</a:t>
             </a:fld>
             <a:endParaRPr lang="en-US"/>
           </a:p>
@@ -5442,7 +5459,7 @@
           <a:p>
             <a:fld id="{C3F78080-8D0A-4BE8-A5B4-CB115102D524}" type="datetimeFigureOut">
               <a:rPr lang="en-US" smtClean="0"/>
-              <a:t>8/26/2021</a:t>
+              <a:t>8/30/2021</a:t>
             </a:fld>
             <a:endParaRPr lang="en-US"/>
           </a:p>
@@ -5683,7 +5700,7 @@
           <a:p>
             <a:fld id="{C3F78080-8D0A-4BE8-A5B4-CB115102D524}" type="datetimeFigureOut">
               <a:rPr lang="en-US" smtClean="0"/>
-              <a:t>8/26/2021</a:t>
+              <a:t>8/30/2021</a:t>
             </a:fld>
             <a:endParaRPr lang="en-US"/>
           </a:p>
@@ -6216,6 +6233,307 @@
       </p:grpSpPr>
       <p:sp>
         <p:nvSpPr>
+          <p:cNvPr id="5" name="TextBox 4">
+            <a:extLst>
+              <a:ext uri="{FF2B5EF4-FFF2-40B4-BE49-F238E27FC236}">
+                <a16:creationId xmlns:a16="http://schemas.microsoft.com/office/drawing/2014/main" id="{202BF5D3-E0FE-421D-887E-591AC19A8449}"/>
+              </a:ext>
+            </a:extLst>
+          </p:cNvPr>
+          <p:cNvSpPr txBox="1"/>
+          <p:nvPr/>
+        </p:nvSpPr>
+        <p:spPr>
+          <a:xfrm>
+            <a:off x="1107743" y="905232"/>
+            <a:ext cx="9976513" cy="4134465"/>
+          </a:xfrm>
+          <a:prstGeom prst="rect">
+            <a:avLst/>
+          </a:prstGeom>
+          <a:noFill/>
+        </p:spPr>
+        <p:txBody>
+          <a:bodyPr wrap="square">
+            <a:spAutoFit/>
+          </a:bodyPr>
+          <a:lstStyle/>
+          <a:p>
+            <a:pPr marL="0" marR="0" lvl="0" indent="0" algn="l" hangingPunct="0">
+              <a:lnSpc>
+                <a:spcPct val="100000"/>
+              </a:lnSpc>
+              <a:spcBef>
+                <a:spcPts val="0"/>
+              </a:spcBef>
+              <a:spcAft>
+                <a:spcPts val="1440"/>
+              </a:spcAft>
+              <a:buSzPct val="45000"/>
+              <a:tabLst/>
+            </a:pPr>
+            <a:r>
+              <a:rPr lang="en-US" sz="1800" b="1" i="0" u="none" strike="noStrike" kern="1200" cap="none" dirty="0">
+                <a:ln>
+                  <a:noFill/>
+                </a:ln>
+                <a:solidFill>
+                  <a:srgbClr val="4B83B5"/>
+                </a:solidFill>
+                <a:latin typeface="Arial" pitchFamily="34"/>
+                <a:ea typeface="Arial" pitchFamily="34"/>
+                <a:cs typeface="Arial" pitchFamily="34"/>
+              </a:rPr>
+              <a:t>McCarthy</a:t>
+            </a:r>
+            <a:r>
+              <a:rPr lang="en-US" sz="1800" b="0" i="0" u="none" strike="noStrike" kern="1200" cap="none" dirty="0">
+                <a:ln>
+                  <a:noFill/>
+                </a:ln>
+                <a:solidFill>
+                  <a:srgbClr val="4B83B5"/>
+                </a:solidFill>
+                <a:latin typeface="Arial" pitchFamily="34"/>
+                <a:ea typeface="Arial" pitchFamily="34"/>
+                <a:cs typeface="Arial" pitchFamily="34"/>
+              </a:rPr>
+              <a:t> </a:t>
+            </a:r>
+            <a:r>
+              <a:rPr lang="en-US" sz="1800" b="0" i="0" u="none" strike="noStrike" kern="1200" cap="none" dirty="0">
+                <a:ln>
+                  <a:noFill/>
+                </a:ln>
+                <a:latin typeface="Arial" pitchFamily="34"/>
+                <a:ea typeface="Arial" pitchFamily="34"/>
+                <a:cs typeface="Arial" pitchFamily="34"/>
+              </a:rPr>
+              <a:t>(2007): “Intelligence is the computational part of the ability to achieve goals in the world. Varying kinds and degrees of intelligence occur in people, many animals and some machines.”</a:t>
+            </a:r>
+          </a:p>
+          <a:p>
+            <a:pPr marL="0" marR="0" lvl="0" indent="0" algn="l" hangingPunct="0">
+              <a:lnSpc>
+                <a:spcPct val="100000"/>
+              </a:lnSpc>
+              <a:spcBef>
+                <a:spcPts val="0"/>
+              </a:spcBef>
+              <a:spcAft>
+                <a:spcPts val="1440"/>
+              </a:spcAft>
+              <a:buSzPct val="45000"/>
+              <a:tabLst/>
+            </a:pPr>
+            <a:endParaRPr lang="en-US" sz="1800" b="0" i="0" u="none" strike="noStrike" kern="1200" cap="none" dirty="0">
+              <a:ln>
+                <a:noFill/>
+              </a:ln>
+              <a:latin typeface="Arial" pitchFamily="34"/>
+              <a:ea typeface="Arial" pitchFamily="34"/>
+              <a:cs typeface="Arial" pitchFamily="34"/>
+            </a:endParaRPr>
+          </a:p>
+          <a:p>
+            <a:pPr marL="0" marR="0" lvl="0" indent="0" algn="l" hangingPunct="0">
+              <a:lnSpc>
+                <a:spcPct val="100000"/>
+              </a:lnSpc>
+              <a:spcBef>
+                <a:spcPts val="0"/>
+              </a:spcBef>
+              <a:spcAft>
+                <a:spcPts val="1440"/>
+              </a:spcAft>
+              <a:buSzPct val="45000"/>
+              <a:tabLst/>
+            </a:pPr>
+            <a:r>
+              <a:rPr lang="en-US" sz="1800" b="1" i="0" u="none" strike="noStrike" kern="1200" cap="none" dirty="0">
+                <a:ln>
+                  <a:noFill/>
+                </a:ln>
+                <a:solidFill>
+                  <a:srgbClr val="4B83B5"/>
+                </a:solidFill>
+                <a:latin typeface="Arial" pitchFamily="34"/>
+                <a:ea typeface="Arial" pitchFamily="34"/>
+                <a:cs typeface="Arial" pitchFamily="34"/>
+              </a:rPr>
+              <a:t>Allen Newell</a:t>
+            </a:r>
+            <a:r>
+              <a:rPr lang="en-US" sz="1800" b="0" i="0" u="none" strike="noStrike" kern="1200" cap="none" dirty="0">
+                <a:ln>
+                  <a:noFill/>
+                </a:ln>
+                <a:solidFill>
+                  <a:srgbClr val="4B83B5"/>
+                </a:solidFill>
+                <a:latin typeface="Arial" pitchFamily="34"/>
+                <a:ea typeface="Arial" pitchFamily="34"/>
+                <a:cs typeface="Arial" pitchFamily="34"/>
+              </a:rPr>
+              <a:t> </a:t>
+            </a:r>
+            <a:r>
+              <a:rPr lang="en-US" sz="1800" b="0" i="0" u="none" strike="noStrike" kern="1200" cap="none" dirty="0">
+                <a:ln>
+                  <a:noFill/>
+                </a:ln>
+                <a:latin typeface="Arial" pitchFamily="34"/>
+                <a:ea typeface="Arial" pitchFamily="34"/>
+                <a:cs typeface="Arial" pitchFamily="34"/>
+              </a:rPr>
+              <a:t>(1990): An intelligent system “operates in real-time; exploits vast amounts of knowledge; tolerates erroneous, unexpected, and possibly unknown inputs; uses symbols and abstractions; communicates using some form of natural language; learns from the environment; and exhibits adaptive goal-oriented behavior.”</a:t>
+            </a:r>
+          </a:p>
+          <a:p>
+            <a:pPr marL="0" marR="0" lvl="0" indent="0" algn="l" hangingPunct="0">
+              <a:lnSpc>
+                <a:spcPct val="100000"/>
+              </a:lnSpc>
+              <a:spcBef>
+                <a:spcPts val="0"/>
+              </a:spcBef>
+              <a:spcAft>
+                <a:spcPts val="1440"/>
+              </a:spcAft>
+              <a:buSzPct val="45000"/>
+              <a:tabLst/>
+            </a:pPr>
+            <a:endParaRPr lang="en-US" sz="1800" b="0" i="0" u="none" strike="noStrike" kern="1200" cap="none" dirty="0">
+              <a:ln>
+                <a:noFill/>
+              </a:ln>
+              <a:latin typeface="Arial" pitchFamily="34"/>
+              <a:ea typeface="Arial" pitchFamily="34"/>
+              <a:cs typeface="Arial" pitchFamily="34"/>
+            </a:endParaRPr>
+          </a:p>
+          <a:p>
+            <a:pPr marL="0" marR="0" lvl="0" indent="0" algn="l" hangingPunct="0">
+              <a:lnSpc>
+                <a:spcPct val="100000"/>
+              </a:lnSpc>
+              <a:spcBef>
+                <a:spcPts val="0"/>
+              </a:spcBef>
+              <a:spcAft>
+                <a:spcPts val="1440"/>
+              </a:spcAft>
+              <a:buSzPct val="45000"/>
+              <a:tabLst/>
+            </a:pPr>
+            <a:r>
+              <a:rPr lang="en-US" sz="1800" b="1" i="0" u="none" strike="noStrike" kern="1200" cap="none" dirty="0">
+                <a:ln>
+                  <a:noFill/>
+                </a:ln>
+                <a:solidFill>
+                  <a:srgbClr val="4B83B5"/>
+                </a:solidFill>
+                <a:latin typeface="Arial" pitchFamily="34"/>
+                <a:ea typeface="Arial" pitchFamily="34"/>
+                <a:cs typeface="Arial" pitchFamily="34"/>
+              </a:rPr>
+              <a:t>Kurzweil</a:t>
+            </a:r>
+            <a:r>
+              <a:rPr lang="en-US" sz="1800" b="0" i="0" u="none" strike="noStrike" kern="1200" cap="none" dirty="0">
+                <a:ln>
+                  <a:noFill/>
+                </a:ln>
+                <a:solidFill>
+                  <a:srgbClr val="4B83B5"/>
+                </a:solidFill>
+                <a:latin typeface="Arial" pitchFamily="34"/>
+                <a:ea typeface="Arial" pitchFamily="34"/>
+                <a:cs typeface="Arial" pitchFamily="34"/>
+              </a:rPr>
+              <a:t> </a:t>
+            </a:r>
+            <a:r>
+              <a:rPr lang="en-US" sz="1800" b="0" i="0" u="none" strike="noStrike" kern="1200" cap="none" dirty="0">
+                <a:ln>
+                  <a:noFill/>
+                </a:ln>
+                <a:latin typeface="Arial" pitchFamily="34"/>
+                <a:ea typeface="Arial" pitchFamily="34"/>
+                <a:cs typeface="Arial" pitchFamily="34"/>
+              </a:rPr>
+              <a:t>(1990): “In summary, there appears to be no </a:t>
+            </a:r>
+            <a:r>
+              <a:rPr lang="en-US" sz="1800" b="0" i="1" u="none" strike="noStrike" kern="1200" cap="none" dirty="0">
+                <a:ln>
+                  <a:noFill/>
+                </a:ln>
+                <a:latin typeface="Arial" pitchFamily="34"/>
+                <a:ea typeface="Arial" pitchFamily="34"/>
+                <a:cs typeface="Arial" pitchFamily="34"/>
+              </a:rPr>
+              <a:t>simple</a:t>
+            </a:r>
+            <a:r>
+              <a:rPr lang="en-US" sz="1800" b="0" i="0" u="none" strike="noStrike" kern="1200" cap="none" dirty="0">
+                <a:ln>
+                  <a:noFill/>
+                </a:ln>
+                <a:latin typeface="Arial" pitchFamily="34"/>
+                <a:ea typeface="Arial" pitchFamily="34"/>
+                <a:cs typeface="Arial" pitchFamily="34"/>
+              </a:rPr>
+              <a:t> definition of intelligence that is satisfactory to most observers, and most would-be definers of intelligence end up with long checklists of its attributes.”</a:t>
+            </a:r>
+          </a:p>
+        </p:txBody>
+      </p:sp>
+    </p:spTree>
+    <p:extLst>
+      <p:ext uri="{BB962C8B-B14F-4D97-AF65-F5344CB8AC3E}">
+        <p14:creationId xmlns:p14="http://schemas.microsoft.com/office/powerpoint/2010/main" val="2498052185"/>
+      </p:ext>
+    </p:extLst>
+  </p:cSld>
+  <p:clrMapOvr>
+    <a:masterClrMapping/>
+  </p:clrMapOvr>
+  <mc:AlternateContent xmlns:mc="http://schemas.openxmlformats.org/markup-compatibility/2006" xmlns:p14="http://schemas.microsoft.com/office/powerpoint/2010/main">
+    <mc:Choice Requires="p14">
+      <p:transition spd="med" p14:dur="700">
+        <p:fade/>
+      </p:transition>
+    </mc:Choice>
+    <mc:Fallback xmlns="">
+      <p:transition spd="med">
+        <p:fade/>
+      </p:transition>
+    </mc:Fallback>
+  </mc:AlternateContent>
+</p:sld>
+</file>
+
+<file path=ppt/slides/slide11.xml><?xml version="1.0" encoding="utf-8"?>
+<p:sld xmlns:a="http://schemas.openxmlformats.org/drawingml/2006/main" xmlns:r="http://schemas.openxmlformats.org/officeDocument/2006/relationships" xmlns:p="http://schemas.openxmlformats.org/presentationml/2006/main">
+  <p:cSld>
+    <p:spTree>
+      <p:nvGrpSpPr>
+        <p:cNvPr id="1" name=""/>
+        <p:cNvGrpSpPr/>
+        <p:nvPr/>
+      </p:nvGrpSpPr>
+      <p:grpSpPr>
+        <a:xfrm>
+          <a:off x="0" y="0"/>
+          <a:ext cx="0" cy="0"/>
+          <a:chOff x="0" y="0"/>
+          <a:chExt cx="0" cy="0"/>
+        </a:xfrm>
+      </p:grpSpPr>
+      <p:sp>
+        <p:nvSpPr>
           <p:cNvPr id="4" name="Title 1">
             <a:extLst>
               <a:ext uri="{FF2B5EF4-FFF2-40B4-BE49-F238E27FC236}">
@@ -6331,7 +6649,7 @@
 </p:sld>
 </file>
 
-<file path=ppt/slides/slide11.xml><?xml version="1.0" encoding="utf-8"?>
+<file path=ppt/slides/slide12.xml><?xml version="1.0" encoding="utf-8"?>
 <p:sld xmlns:a="http://schemas.openxmlformats.org/drawingml/2006/main" xmlns:r="http://schemas.openxmlformats.org/officeDocument/2006/relationships" xmlns:p="http://schemas.openxmlformats.org/presentationml/2006/main">
   <p:cSld>
     <p:spTree>
@@ -6433,7 +6751,7 @@
 </p:sld>
 </file>
 
-<file path=ppt/slides/slide12.xml><?xml version="1.0" encoding="utf-8"?>
+<file path=ppt/slides/slide13.xml><?xml version="1.0" encoding="utf-8"?>
 <p:sld xmlns:a="http://schemas.openxmlformats.org/drawingml/2006/main" xmlns:r="http://schemas.openxmlformats.org/officeDocument/2006/relationships" xmlns:p="http://schemas.openxmlformats.org/presentationml/2006/main">
   <p:cSld>
     <p:spTree>
@@ -6526,7 +6844,7 @@
 </p:sld>
 </file>
 
-<file path=ppt/slides/slide13.xml><?xml version="1.0" encoding="utf-8"?>
+<file path=ppt/slides/slide14.xml><?xml version="1.0" encoding="utf-8"?>
 <p:sld xmlns:a="http://schemas.openxmlformats.org/drawingml/2006/main" xmlns:r="http://schemas.openxmlformats.org/officeDocument/2006/relationships" xmlns:p="http://schemas.openxmlformats.org/presentationml/2006/main">
   <p:cSld>
     <p:spTree>
@@ -6634,172 +6952,6 @@
     <p:extLst>
       <p:ext uri="{BB962C8B-B14F-4D97-AF65-F5344CB8AC3E}">
         <p14:creationId xmlns:p14="http://schemas.microsoft.com/office/powerpoint/2010/main" val="1226819478"/>
-      </p:ext>
-    </p:extLst>
-  </p:cSld>
-  <p:clrMapOvr>
-    <a:masterClrMapping/>
-  </p:clrMapOvr>
-  <mc:AlternateContent xmlns:mc="http://schemas.openxmlformats.org/markup-compatibility/2006" xmlns:p14="http://schemas.microsoft.com/office/powerpoint/2010/main">
-    <mc:Choice Requires="p14">
-      <p:transition spd="med" p14:dur="700">
-        <p:fade/>
-      </p:transition>
-    </mc:Choice>
-    <mc:Fallback xmlns="">
-      <p:transition spd="med">
-        <p:fade/>
-      </p:transition>
-    </mc:Fallback>
-  </mc:AlternateContent>
-</p:sld>
-</file>
-
-<file path=ppt/slides/slide14.xml><?xml version="1.0" encoding="utf-8"?>
-<p:sld xmlns:a="http://schemas.openxmlformats.org/drawingml/2006/main" xmlns:r="http://schemas.openxmlformats.org/officeDocument/2006/relationships" xmlns:p="http://schemas.openxmlformats.org/presentationml/2006/main">
-  <p:cSld>
-    <p:spTree>
-      <p:nvGrpSpPr>
-        <p:cNvPr id="1" name=""/>
-        <p:cNvGrpSpPr/>
-        <p:nvPr/>
-      </p:nvGrpSpPr>
-      <p:grpSpPr>
-        <a:xfrm>
-          <a:off x="0" y="0"/>
-          <a:ext cx="0" cy="0"/>
-          <a:chOff x="0" y="0"/>
-          <a:chExt cx="0" cy="0"/>
-        </a:xfrm>
-      </p:grpSpPr>
-      <p:sp>
-        <p:nvSpPr>
-          <p:cNvPr id="7" name="Title 6">
-            <a:extLst>
-              <a:ext uri="{FF2B5EF4-FFF2-40B4-BE49-F238E27FC236}">
-                <a16:creationId xmlns:a16="http://schemas.microsoft.com/office/drawing/2014/main" id="{BC039510-9FB4-4DE2-BBA1-1246681F0104}"/>
-              </a:ext>
-            </a:extLst>
-          </p:cNvPr>
-          <p:cNvSpPr>
-            <a:spLocks noGrp="1"/>
-          </p:cNvSpPr>
-          <p:nvPr>
-            <p:ph type="title"/>
-          </p:nvPr>
-        </p:nvSpPr>
-        <p:spPr/>
-        <p:txBody>
-          <a:bodyPr/>
-          <a:lstStyle/>
-          <a:p>
-            <a:pPr algn="ctr"/>
-            <a:endParaRPr lang="en-US" dirty="0">
-              <a:latin typeface="Palatino Linotype" panose="02040502050505030304" pitchFamily="18" charset="0"/>
-            </a:endParaRPr>
-          </a:p>
-        </p:txBody>
-      </p:sp>
-      <p:sp>
-        <p:nvSpPr>
-          <p:cNvPr id="3" name="Content Placeholder 2">
-            <a:extLst>
-              <a:ext uri="{FF2B5EF4-FFF2-40B4-BE49-F238E27FC236}">
-                <a16:creationId xmlns:a16="http://schemas.microsoft.com/office/drawing/2014/main" id="{5E3B4FD5-17E5-444B-94C8-CD1174E8FBB6}"/>
-              </a:ext>
-            </a:extLst>
-          </p:cNvPr>
-          <p:cNvSpPr>
-            <a:spLocks noGrp="1"/>
-          </p:cNvSpPr>
-          <p:nvPr>
-            <p:ph idx="1"/>
-          </p:nvPr>
-        </p:nvSpPr>
-        <p:spPr/>
-        <p:txBody>
-          <a:bodyPr/>
-          <a:lstStyle/>
-          <a:p>
-            <a:pPr marL="0" indent="0">
-              <a:buNone/>
-            </a:pPr>
-            <a:endParaRPr lang="en-US" dirty="0"/>
-          </a:p>
-          <a:p>
-            <a:pPr marL="0" indent="0">
-              <a:buNone/>
-            </a:pPr>
-            <a:endParaRPr lang="en-US" dirty="0"/>
-          </a:p>
-        </p:txBody>
-      </p:sp>
-      <p:sp>
-        <p:nvSpPr>
-          <p:cNvPr id="8" name="Title 1">
-            <a:extLst>
-              <a:ext uri="{FF2B5EF4-FFF2-40B4-BE49-F238E27FC236}">
-                <a16:creationId xmlns:a16="http://schemas.microsoft.com/office/drawing/2014/main" id="{17A758CD-2125-4598-B9A5-52FB7CBBAED3}"/>
-              </a:ext>
-            </a:extLst>
-          </p:cNvPr>
-          <p:cNvSpPr txBox="1">
-            <a:spLocks/>
-          </p:cNvSpPr>
-          <p:nvPr/>
-        </p:nvSpPr>
-        <p:spPr>
-          <a:xfrm>
-            <a:off x="838200" y="2678906"/>
-            <a:ext cx="10515600" cy="1500188"/>
-          </a:xfrm>
-          <a:prstGeom prst="rect">
-            <a:avLst/>
-          </a:prstGeom>
-          <a:noFill/>
-        </p:spPr>
-        <p:txBody>
-          <a:bodyPr vert="horz" lIns="91440" tIns="45720" rIns="91440" bIns="45720" rtlCol="0" anchor="ctr">
-            <a:normAutofit/>
-          </a:bodyPr>
-          <a:lstStyle>
-            <a:lvl1pPr algn="l" defTabSz="914400" rtl="0" eaLnBrk="1" latinLnBrk="0" hangingPunct="1">
-              <a:lnSpc>
-                <a:spcPct val="90000"/>
-              </a:lnSpc>
-              <a:spcBef>
-                <a:spcPct val="0"/>
-              </a:spcBef>
-              <a:buNone/>
-              <a:defRPr sz="4400" kern="1200">
-                <a:solidFill>
-                  <a:schemeClr val="tx1"/>
-                </a:solidFill>
-                <a:latin typeface="+mj-lt"/>
-                <a:ea typeface="+mj-ea"/>
-                <a:cs typeface="+mj-cs"/>
-              </a:defRPr>
-            </a:lvl1pPr>
-          </a:lstStyle>
-          <a:p>
-            <a:pPr algn="ctr"/>
-            <a:r>
-              <a:rPr lang="en-US" sz="5400" dirty="0">
-                <a:solidFill>
-                  <a:srgbClr val="4B83B5"/>
-                </a:solidFill>
-                <a:latin typeface="Palatino Linotype" panose="02040502050505030304" pitchFamily="18" charset="0"/>
-                <a:cs typeface="Segoe UI Light" panose="020B0502040204020203" pitchFamily="34" charset="0"/>
-              </a:rPr>
-              <a:t>kuki.ai</a:t>
-            </a:r>
-          </a:p>
-        </p:txBody>
-      </p:sp>
-    </p:spTree>
-    <p:extLst>
-      <p:ext uri="{BB962C8B-B14F-4D97-AF65-F5344CB8AC3E}">
-        <p14:creationId xmlns:p14="http://schemas.microsoft.com/office/powerpoint/2010/main" val="1543091714"/>
       </p:ext>
     </p:extLst>
   </p:cSld>
@@ -6840,6 +6992,172 @@
       </p:grpSpPr>
       <p:sp>
         <p:nvSpPr>
+          <p:cNvPr id="7" name="Title 6">
+            <a:extLst>
+              <a:ext uri="{FF2B5EF4-FFF2-40B4-BE49-F238E27FC236}">
+                <a16:creationId xmlns:a16="http://schemas.microsoft.com/office/drawing/2014/main" id="{BC039510-9FB4-4DE2-BBA1-1246681F0104}"/>
+              </a:ext>
+            </a:extLst>
+          </p:cNvPr>
+          <p:cNvSpPr>
+            <a:spLocks noGrp="1"/>
+          </p:cNvSpPr>
+          <p:nvPr>
+            <p:ph type="title"/>
+          </p:nvPr>
+        </p:nvSpPr>
+        <p:spPr/>
+        <p:txBody>
+          <a:bodyPr/>
+          <a:lstStyle/>
+          <a:p>
+            <a:pPr algn="ctr"/>
+            <a:endParaRPr lang="en-US" dirty="0">
+              <a:latin typeface="Palatino Linotype" panose="02040502050505030304" pitchFamily="18" charset="0"/>
+            </a:endParaRPr>
+          </a:p>
+        </p:txBody>
+      </p:sp>
+      <p:sp>
+        <p:nvSpPr>
+          <p:cNvPr id="3" name="Content Placeholder 2">
+            <a:extLst>
+              <a:ext uri="{FF2B5EF4-FFF2-40B4-BE49-F238E27FC236}">
+                <a16:creationId xmlns:a16="http://schemas.microsoft.com/office/drawing/2014/main" id="{5E3B4FD5-17E5-444B-94C8-CD1174E8FBB6}"/>
+              </a:ext>
+            </a:extLst>
+          </p:cNvPr>
+          <p:cNvSpPr>
+            <a:spLocks noGrp="1"/>
+          </p:cNvSpPr>
+          <p:nvPr>
+            <p:ph idx="1"/>
+          </p:nvPr>
+        </p:nvSpPr>
+        <p:spPr/>
+        <p:txBody>
+          <a:bodyPr/>
+          <a:lstStyle/>
+          <a:p>
+            <a:pPr marL="0" indent="0">
+              <a:buNone/>
+            </a:pPr>
+            <a:endParaRPr lang="en-US" dirty="0"/>
+          </a:p>
+          <a:p>
+            <a:pPr marL="0" indent="0">
+              <a:buNone/>
+            </a:pPr>
+            <a:endParaRPr lang="en-US" dirty="0"/>
+          </a:p>
+        </p:txBody>
+      </p:sp>
+      <p:sp>
+        <p:nvSpPr>
+          <p:cNvPr id="8" name="Title 1">
+            <a:extLst>
+              <a:ext uri="{FF2B5EF4-FFF2-40B4-BE49-F238E27FC236}">
+                <a16:creationId xmlns:a16="http://schemas.microsoft.com/office/drawing/2014/main" id="{17A758CD-2125-4598-B9A5-52FB7CBBAED3}"/>
+              </a:ext>
+            </a:extLst>
+          </p:cNvPr>
+          <p:cNvSpPr txBox="1">
+            <a:spLocks/>
+          </p:cNvSpPr>
+          <p:nvPr/>
+        </p:nvSpPr>
+        <p:spPr>
+          <a:xfrm>
+            <a:off x="838200" y="2678906"/>
+            <a:ext cx="10515600" cy="1500188"/>
+          </a:xfrm>
+          <a:prstGeom prst="rect">
+            <a:avLst/>
+          </a:prstGeom>
+          <a:noFill/>
+        </p:spPr>
+        <p:txBody>
+          <a:bodyPr vert="horz" lIns="91440" tIns="45720" rIns="91440" bIns="45720" rtlCol="0" anchor="ctr">
+            <a:normAutofit/>
+          </a:bodyPr>
+          <a:lstStyle>
+            <a:lvl1pPr algn="l" defTabSz="914400" rtl="0" eaLnBrk="1" latinLnBrk="0" hangingPunct="1">
+              <a:lnSpc>
+                <a:spcPct val="90000"/>
+              </a:lnSpc>
+              <a:spcBef>
+                <a:spcPct val="0"/>
+              </a:spcBef>
+              <a:buNone/>
+              <a:defRPr sz="4400" kern="1200">
+                <a:solidFill>
+                  <a:schemeClr val="tx1"/>
+                </a:solidFill>
+                <a:latin typeface="+mj-lt"/>
+                <a:ea typeface="+mj-ea"/>
+                <a:cs typeface="+mj-cs"/>
+              </a:defRPr>
+            </a:lvl1pPr>
+          </a:lstStyle>
+          <a:p>
+            <a:pPr algn="ctr"/>
+            <a:r>
+              <a:rPr lang="en-US" sz="5400" dirty="0">
+                <a:solidFill>
+                  <a:srgbClr val="4B83B5"/>
+                </a:solidFill>
+                <a:latin typeface="Palatino Linotype" panose="02040502050505030304" pitchFamily="18" charset="0"/>
+                <a:cs typeface="Segoe UI Light" panose="020B0502040204020203" pitchFamily="34" charset="0"/>
+              </a:rPr>
+              <a:t>kuki.ai</a:t>
+            </a:r>
+          </a:p>
+        </p:txBody>
+      </p:sp>
+    </p:spTree>
+    <p:extLst>
+      <p:ext uri="{BB962C8B-B14F-4D97-AF65-F5344CB8AC3E}">
+        <p14:creationId xmlns:p14="http://schemas.microsoft.com/office/powerpoint/2010/main" val="1543091714"/>
+      </p:ext>
+    </p:extLst>
+  </p:cSld>
+  <p:clrMapOvr>
+    <a:masterClrMapping/>
+  </p:clrMapOvr>
+  <mc:AlternateContent xmlns:mc="http://schemas.openxmlformats.org/markup-compatibility/2006" xmlns:p14="http://schemas.microsoft.com/office/powerpoint/2010/main">
+    <mc:Choice Requires="p14">
+      <p:transition spd="med" p14:dur="700">
+        <p:fade/>
+      </p:transition>
+    </mc:Choice>
+    <mc:Fallback xmlns="">
+      <p:transition spd="med">
+        <p:fade/>
+      </p:transition>
+    </mc:Fallback>
+  </mc:AlternateContent>
+</p:sld>
+</file>
+
+<file path=ppt/slides/slide16.xml><?xml version="1.0" encoding="utf-8"?>
+<p:sld xmlns:a="http://schemas.openxmlformats.org/drawingml/2006/main" xmlns:r="http://schemas.openxmlformats.org/officeDocument/2006/relationships" xmlns:p="http://schemas.openxmlformats.org/presentationml/2006/main">
+  <p:cSld>
+    <p:spTree>
+      <p:nvGrpSpPr>
+        <p:cNvPr id="1" name=""/>
+        <p:cNvGrpSpPr/>
+        <p:nvPr/>
+      </p:nvGrpSpPr>
+      <p:grpSpPr>
+        <a:xfrm>
+          <a:off x="0" y="0"/>
+          <a:ext cx="0" cy="0"/>
+          <a:chOff x="0" y="0"/>
+          <a:chExt cx="0" cy="0"/>
+        </a:xfrm>
+      </p:grpSpPr>
+      <p:sp>
+        <p:nvSpPr>
           <p:cNvPr id="5" name="Title 1">
             <a:extLst>
               <a:ext uri="{FF2B5EF4-FFF2-40B4-BE49-F238E27FC236}">
@@ -7044,7 +7362,7 @@
 </p:sld>
 </file>
 
-<file path=ppt/slides/slide16.xml><?xml version="1.0" encoding="utf-8"?>
+<file path=ppt/slides/slide17.xml><?xml version="1.0" encoding="utf-8"?>
 <p:sld xmlns:a="http://schemas.openxmlformats.org/drawingml/2006/main" xmlns:r="http://schemas.openxmlformats.org/officeDocument/2006/relationships" xmlns:p="http://schemas.openxmlformats.org/presentationml/2006/main">
   <p:cSld>
     <p:spTree>
@@ -7086,7 +7404,7 @@
 </p:sld>
 </file>
 
-<file path=ppt/slides/slide17.xml><?xml version="1.0" encoding="utf-8"?>
+<file path=ppt/slides/slide18.xml><?xml version="1.0" encoding="utf-8"?>
 <p:sld xmlns:a="http://schemas.openxmlformats.org/drawingml/2006/main" xmlns:r="http://schemas.openxmlformats.org/officeDocument/2006/relationships" xmlns:p="http://schemas.openxmlformats.org/presentationml/2006/main">
   <p:cSld>
     <p:spTree>
@@ -8570,6 +8888,95 @@
       </p:grpSpPr>
       <p:pic>
         <p:nvPicPr>
+          <p:cNvPr id="1028" name="Picture 4" descr="Perusall">
+            <a:extLst>
+              <a:ext uri="{FF2B5EF4-FFF2-40B4-BE49-F238E27FC236}">
+                <a16:creationId xmlns:a16="http://schemas.microsoft.com/office/drawing/2014/main" id="{C7495DC7-25F8-4987-AD6F-4B6C4C64757C}"/>
+              </a:ext>
+            </a:extLst>
+          </p:cNvPr>
+          <p:cNvPicPr>
+            <a:picLocks noChangeAspect="1" noChangeArrowheads="1"/>
+          </p:cNvPicPr>
+          <p:nvPr/>
+        </p:nvPicPr>
+        <p:blipFill>
+          <a:blip r:embed="rId3">
+            <a:extLst>
+              <a:ext uri="{28A0092B-C50C-407E-A947-70E740481C1C}">
+                <a14:useLocalDpi xmlns:a14="http://schemas.microsoft.com/office/drawing/2010/main" val="0"/>
+              </a:ext>
+            </a:extLst>
+          </a:blip>
+          <a:srcRect/>
+          <a:stretch>
+            <a:fillRect/>
+          </a:stretch>
+        </p:blipFill>
+        <p:spPr bwMode="auto">
+          <a:xfrm>
+            <a:off x="3940366" y="2082558"/>
+            <a:ext cx="4311267" cy="2692884"/>
+          </a:xfrm>
+          <a:prstGeom prst="rect">
+            <a:avLst/>
+          </a:prstGeom>
+          <a:noFill/>
+          <a:extLst>
+            <a:ext uri="{909E8E84-426E-40DD-AFC4-6F175D3DCCD1}">
+              <a14:hiddenFill xmlns:a14="http://schemas.microsoft.com/office/drawing/2010/main">
+                <a:solidFill>
+                  <a:srgbClr val="FFFFFF"/>
+                </a:solidFill>
+              </a14:hiddenFill>
+            </a:ext>
+          </a:extLst>
+        </p:spPr>
+      </p:pic>
+    </p:spTree>
+    <p:extLst>
+      <p:ext uri="{BB962C8B-B14F-4D97-AF65-F5344CB8AC3E}">
+        <p14:creationId xmlns:p14="http://schemas.microsoft.com/office/powerpoint/2010/main" val="3099461396"/>
+      </p:ext>
+    </p:extLst>
+  </p:cSld>
+  <p:clrMapOvr>
+    <a:masterClrMapping/>
+  </p:clrMapOvr>
+  <mc:AlternateContent xmlns:mc="http://schemas.openxmlformats.org/markup-compatibility/2006" xmlns:p14="http://schemas.microsoft.com/office/powerpoint/2010/main">
+    <mc:Choice Requires="p14">
+      <p:transition spd="med" p14:dur="700">
+        <p:fade/>
+      </p:transition>
+    </mc:Choice>
+    <mc:Fallback xmlns="">
+      <p:transition spd="med">
+        <p:fade/>
+      </p:transition>
+    </mc:Fallback>
+  </mc:AlternateContent>
+</p:sld>
+</file>
+
+<file path=ppt/slides/slide7.xml><?xml version="1.0" encoding="utf-8"?>
+<p:sld xmlns:a="http://schemas.openxmlformats.org/drawingml/2006/main" xmlns:r="http://schemas.openxmlformats.org/officeDocument/2006/relationships" xmlns:p="http://schemas.openxmlformats.org/presentationml/2006/main">
+  <p:cSld>
+    <p:spTree>
+      <p:nvGrpSpPr>
+        <p:cNvPr id="1" name=""/>
+        <p:cNvGrpSpPr/>
+        <p:nvPr/>
+      </p:nvGrpSpPr>
+      <p:grpSpPr>
+        <a:xfrm>
+          <a:off x="0" y="0"/>
+          <a:ext cx="0" cy="0"/>
+          <a:chOff x="0" y="0"/>
+          <a:chExt cx="0" cy="0"/>
+        </a:xfrm>
+      </p:grpSpPr>
+      <p:pic>
+        <p:nvPicPr>
           <p:cNvPr id="1026" name="Picture 2" descr="Lieutenant Commander Data Star Trek TNG Painting by Giulia Riva">
             <a:extLst>
               <a:ext uri="{FF2B5EF4-FFF2-40B4-BE49-F238E27FC236}">
@@ -8655,7 +9062,7 @@
 </p:sld>
 </file>
 
-<file path=ppt/slides/slide7.xml><?xml version="1.0" encoding="utf-8"?>
+<file path=ppt/slides/slide8.xml><?xml version="1.0" encoding="utf-8"?>
 <p:sld xmlns:a="http://schemas.openxmlformats.org/drawingml/2006/main" xmlns:r="http://schemas.openxmlformats.org/officeDocument/2006/relationships" xmlns:p="http://schemas.openxmlformats.org/presentationml/2006/main">
   <p:cSld>
     <p:spTree>
@@ -9395,7 +9802,7 @@
 </p:sld>
 </file>
 
-<file path=ppt/slides/slide8.xml><?xml version="1.0" encoding="utf-8"?>
+<file path=ppt/slides/slide9.xml><?xml version="1.0" encoding="utf-8"?>
 <p:sld xmlns:a="http://schemas.openxmlformats.org/drawingml/2006/main" xmlns:r="http://schemas.openxmlformats.org/officeDocument/2006/relationships" xmlns:p="http://schemas.openxmlformats.org/presentationml/2006/main">
   <p:cSld>
     <p:spTree>
@@ -9672,384 +10079,6 @@
     <p:extLst>
       <p:ext uri="{BB962C8B-B14F-4D97-AF65-F5344CB8AC3E}">
         <p14:creationId xmlns:p14="http://schemas.microsoft.com/office/powerpoint/2010/main" val="55415511"/>
-      </p:ext>
-    </p:extLst>
-  </p:cSld>
-  <p:clrMapOvr>
-    <a:masterClrMapping/>
-  </p:clrMapOvr>
-  <mc:AlternateContent xmlns:mc="http://schemas.openxmlformats.org/markup-compatibility/2006" xmlns:p14="http://schemas.microsoft.com/office/powerpoint/2010/main">
-    <mc:Choice Requires="p14">
-      <p:transition spd="med" p14:dur="700">
-        <p:fade/>
-      </p:transition>
-    </mc:Choice>
-    <mc:Fallback xmlns="">
-      <p:transition spd="med">
-        <p:fade/>
-      </p:transition>
-    </mc:Fallback>
-  </mc:AlternateContent>
-</p:sld>
-</file>
-
-<file path=ppt/slides/slide9.xml><?xml version="1.0" encoding="utf-8"?>
-<p:sld xmlns:a="http://schemas.openxmlformats.org/drawingml/2006/main" xmlns:r="http://schemas.openxmlformats.org/officeDocument/2006/relationships" xmlns:p="http://schemas.openxmlformats.org/presentationml/2006/main">
-  <p:cSld>
-    <p:spTree>
-      <p:nvGrpSpPr>
-        <p:cNvPr id="1" name=""/>
-        <p:cNvGrpSpPr/>
-        <p:nvPr/>
-      </p:nvGrpSpPr>
-      <p:grpSpPr>
-        <a:xfrm>
-          <a:off x="0" y="0"/>
-          <a:ext cx="0" cy="0"/>
-          <a:chOff x="0" y="0"/>
-          <a:chExt cx="0" cy="0"/>
-        </a:xfrm>
-      </p:grpSpPr>
-      <p:sp>
-        <p:nvSpPr>
-          <p:cNvPr id="5" name="TextBox 4">
-            <a:extLst>
-              <a:ext uri="{FF2B5EF4-FFF2-40B4-BE49-F238E27FC236}">
-                <a16:creationId xmlns:a16="http://schemas.microsoft.com/office/drawing/2014/main" id="{202BF5D3-E0FE-421D-887E-591AC19A8449}"/>
-              </a:ext>
-            </a:extLst>
-          </p:cNvPr>
-          <p:cNvSpPr txBox="1"/>
-          <p:nvPr/>
-        </p:nvSpPr>
-        <p:spPr>
-          <a:xfrm>
-            <a:off x="1107743" y="905232"/>
-            <a:ext cx="9976513" cy="5047536"/>
-          </a:xfrm>
-          <a:prstGeom prst="rect">
-            <a:avLst/>
-          </a:prstGeom>
-          <a:noFill/>
-        </p:spPr>
-        <p:txBody>
-          <a:bodyPr wrap="square">
-            <a:spAutoFit/>
-          </a:bodyPr>
-          <a:lstStyle/>
-          <a:p>
-            <a:pPr marL="0" marR="0" lvl="0" indent="0" algn="l" hangingPunct="0">
-              <a:lnSpc>
-                <a:spcPct val="100000"/>
-              </a:lnSpc>
-              <a:spcBef>
-                <a:spcPts val="0"/>
-              </a:spcBef>
-              <a:spcAft>
-                <a:spcPts val="1440"/>
-              </a:spcAft>
-              <a:buSzPct val="45000"/>
-              <a:tabLst/>
-            </a:pPr>
-            <a:r>
-              <a:rPr lang="en-US" sz="1800" b="1" i="0" u="none" strike="noStrike" kern="1200" cap="none" dirty="0">
-                <a:ln>
-                  <a:noFill/>
-                </a:ln>
-                <a:solidFill>
-                  <a:srgbClr val="4B83B5"/>
-                </a:solidFill>
-                <a:latin typeface="Arial" pitchFamily="34"/>
-                <a:ea typeface="Arial" pitchFamily="34"/>
-                <a:cs typeface="Arial" pitchFamily="34"/>
-              </a:rPr>
-              <a:t>McCarthy</a:t>
-            </a:r>
-            <a:r>
-              <a:rPr lang="en-US" sz="1800" b="0" i="0" u="none" strike="noStrike" kern="1200" cap="none" dirty="0">
-                <a:ln>
-                  <a:noFill/>
-                </a:ln>
-                <a:solidFill>
-                  <a:srgbClr val="4B83B5"/>
-                </a:solidFill>
-                <a:latin typeface="Arial" pitchFamily="34"/>
-                <a:ea typeface="Arial" pitchFamily="34"/>
-                <a:cs typeface="Arial" pitchFamily="34"/>
-              </a:rPr>
-              <a:t> </a:t>
-            </a:r>
-            <a:r>
-              <a:rPr lang="en-US" sz="1800" b="0" i="0" u="none" strike="noStrike" kern="1200" cap="none" dirty="0">
-                <a:ln>
-                  <a:noFill/>
-                </a:ln>
-                <a:latin typeface="Arial" pitchFamily="34"/>
-                <a:ea typeface="Arial" pitchFamily="34"/>
-                <a:cs typeface="Arial" pitchFamily="34"/>
-              </a:rPr>
-              <a:t>(2007): “Intelligence is the computational part of the ability to achieve goals in the world. Varying kinds and degrees of intelligence occur in people, many animals and some machines.”</a:t>
-            </a:r>
-          </a:p>
-          <a:p>
-            <a:pPr marL="0" marR="0" lvl="0" indent="0" algn="l" hangingPunct="0">
-              <a:lnSpc>
-                <a:spcPct val="100000"/>
-              </a:lnSpc>
-              <a:spcBef>
-                <a:spcPts val="0"/>
-              </a:spcBef>
-              <a:spcAft>
-                <a:spcPts val="1440"/>
-              </a:spcAft>
-              <a:buSzPct val="45000"/>
-              <a:tabLst/>
-            </a:pPr>
-            <a:endParaRPr lang="en-US" sz="1800" b="0" i="0" u="none" strike="noStrike" kern="1200" cap="none" dirty="0">
-              <a:ln>
-                <a:noFill/>
-              </a:ln>
-              <a:latin typeface="Arial" pitchFamily="34"/>
-              <a:ea typeface="Arial" pitchFamily="34"/>
-              <a:cs typeface="Arial" pitchFamily="34"/>
-            </a:endParaRPr>
-          </a:p>
-          <a:p>
-            <a:pPr marL="0" marR="0" lvl="0" indent="0" algn="l" hangingPunct="0">
-              <a:lnSpc>
-                <a:spcPct val="100000"/>
-              </a:lnSpc>
-              <a:spcBef>
-                <a:spcPts val="0"/>
-              </a:spcBef>
-              <a:spcAft>
-                <a:spcPts val="1440"/>
-              </a:spcAft>
-              <a:buSzPct val="45000"/>
-              <a:tabLst/>
-            </a:pPr>
-            <a:r>
-              <a:rPr lang="en-US" sz="1800" b="1" i="0" u="none" strike="noStrike" kern="1200" cap="none" dirty="0">
-                <a:ln>
-                  <a:noFill/>
-                </a:ln>
-                <a:solidFill>
-                  <a:srgbClr val="4B83B5"/>
-                </a:solidFill>
-                <a:latin typeface="Arial" pitchFamily="34"/>
-                <a:ea typeface="Arial" pitchFamily="34"/>
-                <a:cs typeface="Arial" pitchFamily="34"/>
-              </a:rPr>
-              <a:t>Allen Newell</a:t>
-            </a:r>
-            <a:r>
-              <a:rPr lang="en-US" sz="1800" b="0" i="0" u="none" strike="noStrike" kern="1200" cap="none" dirty="0">
-                <a:ln>
-                  <a:noFill/>
-                </a:ln>
-                <a:solidFill>
-                  <a:srgbClr val="4B83B5"/>
-                </a:solidFill>
-                <a:latin typeface="Arial" pitchFamily="34"/>
-                <a:ea typeface="Arial" pitchFamily="34"/>
-                <a:cs typeface="Arial" pitchFamily="34"/>
-              </a:rPr>
-              <a:t> </a:t>
-            </a:r>
-            <a:r>
-              <a:rPr lang="en-US" sz="1800" b="0" i="0" u="none" strike="noStrike" kern="1200" cap="none" dirty="0">
-                <a:ln>
-                  <a:noFill/>
-                </a:ln>
-                <a:latin typeface="Arial" pitchFamily="34"/>
-                <a:ea typeface="Arial" pitchFamily="34"/>
-                <a:cs typeface="Arial" pitchFamily="34"/>
-              </a:rPr>
-              <a:t>(1990): An intelligent system “operates in real-time; exploits vast amounts of knowledge; tolerates erroneous, unexpected, and possibly unknown inputs; uses symbols and abstractions; communicates using some form of natural language; learns from the environment; and exhibits adaptive goal-oriented behavior.”</a:t>
-            </a:r>
-          </a:p>
-          <a:p>
-            <a:pPr marL="0" marR="0" lvl="0" indent="0" algn="l" hangingPunct="0">
-              <a:lnSpc>
-                <a:spcPct val="100000"/>
-              </a:lnSpc>
-              <a:spcBef>
-                <a:spcPts val="0"/>
-              </a:spcBef>
-              <a:spcAft>
-                <a:spcPts val="1440"/>
-              </a:spcAft>
-              <a:buSzPct val="45000"/>
-              <a:tabLst/>
-            </a:pPr>
-            <a:endParaRPr lang="en-US" sz="1800" b="0" i="0" u="none" strike="noStrike" kern="1200" cap="none" dirty="0">
-              <a:ln>
-                <a:noFill/>
-              </a:ln>
-              <a:latin typeface="Arial" pitchFamily="34"/>
-              <a:ea typeface="Arial" pitchFamily="34"/>
-              <a:cs typeface="Arial" pitchFamily="34"/>
-            </a:endParaRPr>
-          </a:p>
-          <a:p>
-            <a:pPr marL="0" marR="0" lvl="0" indent="0" algn="l" hangingPunct="0">
-              <a:lnSpc>
-                <a:spcPct val="100000"/>
-              </a:lnSpc>
-              <a:spcBef>
-                <a:spcPts val="0"/>
-              </a:spcBef>
-              <a:spcAft>
-                <a:spcPts val="1440"/>
-              </a:spcAft>
-              <a:buSzPct val="45000"/>
-              <a:tabLst/>
-            </a:pPr>
-            <a:r>
-              <a:rPr lang="en-US" sz="1800" b="1" i="0" u="none" strike="noStrike" kern="1200" cap="none" dirty="0">
-                <a:ln>
-                  <a:noFill/>
-                </a:ln>
-                <a:solidFill>
-                  <a:srgbClr val="4B83B5"/>
-                </a:solidFill>
-                <a:latin typeface="Arial" pitchFamily="34"/>
-                <a:ea typeface="Arial" pitchFamily="34"/>
-                <a:cs typeface="Arial" pitchFamily="34"/>
-              </a:rPr>
-              <a:t>Kurzweil</a:t>
-            </a:r>
-            <a:r>
-              <a:rPr lang="en-US" sz="1800" b="0" i="0" u="none" strike="noStrike" kern="1200" cap="none" dirty="0">
-                <a:ln>
-                  <a:noFill/>
-                </a:ln>
-                <a:solidFill>
-                  <a:srgbClr val="4B83B5"/>
-                </a:solidFill>
-                <a:latin typeface="Arial" pitchFamily="34"/>
-                <a:ea typeface="Arial" pitchFamily="34"/>
-                <a:cs typeface="Arial" pitchFamily="34"/>
-              </a:rPr>
-              <a:t> </a:t>
-            </a:r>
-            <a:r>
-              <a:rPr lang="en-US" sz="1800" b="0" i="0" u="none" strike="noStrike" kern="1200" cap="none" dirty="0">
-                <a:ln>
-                  <a:noFill/>
-                </a:ln>
-                <a:latin typeface="Arial" pitchFamily="34"/>
-                <a:ea typeface="Arial" pitchFamily="34"/>
-                <a:cs typeface="Arial" pitchFamily="34"/>
-              </a:rPr>
-              <a:t>(1990): “In summary, there appears to be no </a:t>
-            </a:r>
-            <a:r>
-              <a:rPr lang="en-US" sz="1800" b="0" i="1" u="none" strike="noStrike" kern="1200" cap="none" dirty="0">
-                <a:ln>
-                  <a:noFill/>
-                </a:ln>
-                <a:latin typeface="Arial" pitchFamily="34"/>
-                <a:ea typeface="Arial" pitchFamily="34"/>
-                <a:cs typeface="Arial" pitchFamily="34"/>
-              </a:rPr>
-              <a:t>simple</a:t>
-            </a:r>
-            <a:r>
-              <a:rPr lang="en-US" sz="1800" b="0" i="0" u="none" strike="noStrike" kern="1200" cap="none" dirty="0">
-                <a:ln>
-                  <a:noFill/>
-                </a:ln>
-                <a:latin typeface="Arial" pitchFamily="34"/>
-                <a:ea typeface="Arial" pitchFamily="34"/>
-                <a:cs typeface="Arial" pitchFamily="34"/>
-              </a:rPr>
-              <a:t> definition of intelligence that is satisfactory to most observers, and most would-be definers of intelligence end up with long checklists of its attributes.”</a:t>
-            </a:r>
-          </a:p>
-          <a:p>
-            <a:pPr marL="0" marR="0" lvl="0" indent="0" algn="l" hangingPunct="0">
-              <a:lnSpc>
-                <a:spcPct val="100000"/>
-              </a:lnSpc>
-              <a:spcBef>
-                <a:spcPts val="0"/>
-              </a:spcBef>
-              <a:spcAft>
-                <a:spcPts val="1440"/>
-              </a:spcAft>
-              <a:buSzPct val="45000"/>
-              <a:tabLst/>
-            </a:pPr>
-            <a:endParaRPr lang="en-US" sz="1800" b="0" i="0" u="none" strike="noStrike" kern="1200" cap="none" dirty="0">
-              <a:ln>
-                <a:noFill/>
-              </a:ln>
-              <a:latin typeface="Arial" pitchFamily="34"/>
-              <a:ea typeface="Arial" pitchFamily="34"/>
-              <a:cs typeface="Arial" pitchFamily="34"/>
-            </a:endParaRPr>
-          </a:p>
-          <a:p>
-            <a:pPr marL="0" marR="0" lvl="0" indent="0" algn="l" hangingPunct="0">
-              <a:lnSpc>
-                <a:spcPct val="100000"/>
-              </a:lnSpc>
-              <a:spcBef>
-                <a:spcPts val="0"/>
-              </a:spcBef>
-              <a:spcAft>
-                <a:spcPts val="1440"/>
-              </a:spcAft>
-              <a:buSzPct val="45000"/>
-              <a:tabLst/>
-            </a:pPr>
-            <a:r>
-              <a:rPr lang="en-US" sz="1800" b="1" i="0" u="none" strike="noStrike" kern="1200" cap="none" dirty="0">
-                <a:ln>
-                  <a:noFill/>
-                </a:ln>
-                <a:solidFill>
-                  <a:srgbClr val="4B83B5"/>
-                </a:solidFill>
-                <a:latin typeface="Arial" pitchFamily="34"/>
-                <a:ea typeface="Arial" pitchFamily="34"/>
-                <a:cs typeface="Arial" pitchFamily="34"/>
-              </a:rPr>
-              <a:t>Alan Turing</a:t>
-            </a:r>
-            <a:r>
-              <a:rPr lang="en-US" sz="1800" b="0" i="0" u="none" strike="noStrike" kern="1200" cap="none" dirty="0">
-                <a:ln>
-                  <a:noFill/>
-                </a:ln>
-                <a:solidFill>
-                  <a:srgbClr val="4B83B5"/>
-                </a:solidFill>
-                <a:latin typeface="Arial" pitchFamily="34"/>
-                <a:ea typeface="Arial" pitchFamily="34"/>
-                <a:cs typeface="Arial" pitchFamily="34"/>
-              </a:rPr>
-              <a:t> </a:t>
-            </a:r>
-            <a:r>
-              <a:rPr lang="en-US" sz="1800" b="0" i="0" u="none" strike="noStrike" kern="1200" cap="none" dirty="0">
-                <a:ln>
-                  <a:noFill/>
-                </a:ln>
-                <a:latin typeface="Arial" pitchFamily="34"/>
-                <a:ea typeface="Arial" pitchFamily="34"/>
-                <a:cs typeface="Arial" pitchFamily="34"/>
-              </a:rPr>
-              <a:t>(1950): The “imitation game” (now called the “Turing test”).</a:t>
-            </a:r>
-          </a:p>
-        </p:txBody>
-      </p:sp>
-    </p:spTree>
-    <p:extLst>
-      <p:ext uri="{BB962C8B-B14F-4D97-AF65-F5344CB8AC3E}">
-        <p14:creationId xmlns:p14="http://schemas.microsoft.com/office/powerpoint/2010/main" val="2498052185"/>
       </p:ext>
     </p:extLst>
   </p:cSld>

</xml_diff>